<commit_message>
Signed-off-by: liyi002  <liyi002@bitbucket.org> 132·4
</commit_message>
<xml_diff>
--- a/Papers/基于频域的红外可见光融合/images/频域融合.pptx
+++ b/Papers/基于频域的红外可见光融合/images/频域融合.pptx
@@ -200,7 +200,7 @@
           <a:p>
             <a:fld id="{730F7C05-AD7F-4FFA-A0C0-1536BA5A251F}" type="datetimeFigureOut">
               <a:rPr lang="zh-CN" altLang="en-US" smtClean="0"/>
-              <a:t>2025/8/4</a:t>
+              <a:t>2025/9/4</a:t>
             </a:fld>
             <a:endParaRPr lang="zh-CN" altLang="en-US"/>
           </a:p>
@@ -1076,7 +1076,7 @@
           <a:p>
             <a:fld id="{978008A0-1351-474F-B2A3-B5A922791B5E}" type="datetimeFigureOut">
               <a:rPr lang="zh-CN" altLang="en-US" smtClean="0"/>
-              <a:t>2025/8/4</a:t>
+              <a:t>2025/9/4</a:t>
             </a:fld>
             <a:endParaRPr lang="zh-CN" altLang="en-US"/>
           </a:p>
@@ -1244,7 +1244,7 @@
           <a:p>
             <a:fld id="{978008A0-1351-474F-B2A3-B5A922791B5E}" type="datetimeFigureOut">
               <a:rPr lang="zh-CN" altLang="en-US" smtClean="0"/>
-              <a:t>2025/8/4</a:t>
+              <a:t>2025/9/4</a:t>
             </a:fld>
             <a:endParaRPr lang="zh-CN" altLang="en-US"/>
           </a:p>
@@ -1422,7 +1422,7 @@
           <a:p>
             <a:fld id="{978008A0-1351-474F-B2A3-B5A922791B5E}" type="datetimeFigureOut">
               <a:rPr lang="zh-CN" altLang="en-US" smtClean="0"/>
-              <a:t>2025/8/4</a:t>
+              <a:t>2025/9/4</a:t>
             </a:fld>
             <a:endParaRPr lang="zh-CN" altLang="en-US"/>
           </a:p>
@@ -1949,7 +1949,7 @@
           <a:p>
             <a:fld id="{978008A0-1351-474F-B2A3-B5A922791B5E}" type="datetimeFigureOut">
               <a:rPr lang="zh-CN" altLang="en-US" smtClean="0"/>
-              <a:t>2025/8/4</a:t>
+              <a:t>2025/9/4</a:t>
             </a:fld>
             <a:endParaRPr lang="zh-CN" altLang="en-US"/>
           </a:p>
@@ -2194,7 +2194,7 @@
           <a:p>
             <a:fld id="{978008A0-1351-474F-B2A3-B5A922791B5E}" type="datetimeFigureOut">
               <a:rPr lang="zh-CN" altLang="en-US" smtClean="0"/>
-              <a:t>2025/8/4</a:t>
+              <a:t>2025/9/4</a:t>
             </a:fld>
             <a:endParaRPr lang="zh-CN" altLang="en-US"/>
           </a:p>
@@ -2423,7 +2423,7 @@
           <a:p>
             <a:fld id="{978008A0-1351-474F-B2A3-B5A922791B5E}" type="datetimeFigureOut">
               <a:rPr lang="zh-CN" altLang="en-US" smtClean="0"/>
-              <a:t>2025/8/4</a:t>
+              <a:t>2025/9/4</a:t>
             </a:fld>
             <a:endParaRPr lang="zh-CN" altLang="en-US"/>
           </a:p>
@@ -2787,7 +2787,7 @@
           <a:p>
             <a:fld id="{978008A0-1351-474F-B2A3-B5A922791B5E}" type="datetimeFigureOut">
               <a:rPr lang="zh-CN" altLang="en-US" smtClean="0"/>
-              <a:t>2025/8/4</a:t>
+              <a:t>2025/9/4</a:t>
             </a:fld>
             <a:endParaRPr lang="zh-CN" altLang="en-US"/>
           </a:p>
@@ -2904,7 +2904,7 @@
           <a:p>
             <a:fld id="{978008A0-1351-474F-B2A3-B5A922791B5E}" type="datetimeFigureOut">
               <a:rPr lang="zh-CN" altLang="en-US" smtClean="0"/>
-              <a:t>2025/8/4</a:t>
+              <a:t>2025/9/4</a:t>
             </a:fld>
             <a:endParaRPr lang="zh-CN" altLang="en-US"/>
           </a:p>
@@ -2999,7 +2999,7 @@
           <a:p>
             <a:fld id="{978008A0-1351-474F-B2A3-B5A922791B5E}" type="datetimeFigureOut">
               <a:rPr lang="zh-CN" altLang="en-US" smtClean="0"/>
-              <a:t>2025/8/4</a:t>
+              <a:t>2025/9/4</a:t>
             </a:fld>
             <a:endParaRPr lang="zh-CN" altLang="en-US"/>
           </a:p>
@@ -3274,7 +3274,7 @@
           <a:p>
             <a:fld id="{978008A0-1351-474F-B2A3-B5A922791B5E}" type="datetimeFigureOut">
               <a:rPr lang="zh-CN" altLang="en-US" smtClean="0"/>
-              <a:t>2025/8/4</a:t>
+              <a:t>2025/9/4</a:t>
             </a:fld>
             <a:endParaRPr lang="zh-CN" altLang="en-US"/>
           </a:p>
@@ -3526,7 +3526,7 @@
           <a:p>
             <a:fld id="{978008A0-1351-474F-B2A3-B5A922791B5E}" type="datetimeFigureOut">
               <a:rPr lang="zh-CN" altLang="en-US" smtClean="0"/>
-              <a:t>2025/8/4</a:t>
+              <a:t>2025/9/4</a:t>
             </a:fld>
             <a:endParaRPr lang="zh-CN" altLang="en-US"/>
           </a:p>
@@ -3737,7 +3737,7 @@
           <a:p>
             <a:fld id="{978008A0-1351-474F-B2A3-B5A922791B5E}" type="datetimeFigureOut">
               <a:rPr lang="zh-CN" altLang="en-US" smtClean="0"/>
-              <a:t>2025/8/4</a:t>
+              <a:t>2025/9/4</a:t>
             </a:fld>
             <a:endParaRPr lang="zh-CN" altLang="en-US"/>
           </a:p>
@@ -4143,42 +4143,12 @@
           <a:chExt cx="0" cy="0"/>
         </a:xfrm>
       </p:grpSpPr>
-      <p:pic>
-        <p:nvPicPr>
-          <p:cNvPr id="151" name="图片 150">
+      <p:sp>
+        <p:nvSpPr>
+          <p:cNvPr id="40" name="矩形: 圆角 39">
             <a:extLst>
               <a:ext uri="{FF2B5EF4-FFF2-40B4-BE49-F238E27FC236}">
-                <a16:creationId xmlns:a16="http://schemas.microsoft.com/office/drawing/2014/main" id="{3F734187-83F5-4EFC-AC56-8D5AF4952B37}"/>
-              </a:ext>
-            </a:extLst>
-          </p:cNvPr>
-          <p:cNvPicPr>
-            <a:picLocks noChangeAspect="1"/>
-          </p:cNvPicPr>
-          <p:nvPr/>
-        </p:nvPicPr>
-        <p:blipFill>
-          <a:blip r:embed="rId2"/>
-          <a:stretch>
-            <a:fillRect/>
-          </a:stretch>
-        </p:blipFill>
-        <p:spPr>
-          <a:xfrm>
-            <a:off x="237172" y="2746057"/>
-            <a:ext cx="6117907" cy="2343134"/>
-          </a:xfrm>
-          <a:prstGeom prst="rect">
-            <a:avLst/>
-          </a:prstGeom>
-        </p:spPr>
-      </p:pic>
-      <p:sp>
-        <p:nvSpPr>
-          <p:cNvPr id="145" name="矩形: 圆角 144">
-            <a:extLst>
-              <a:ext uri="{FF2B5EF4-FFF2-40B4-BE49-F238E27FC236}">
-                <a16:creationId xmlns:a16="http://schemas.microsoft.com/office/drawing/2014/main" id="{3A93A747-0D44-4D93-A813-F6BA825D4AA1}"/>
+                <a16:creationId xmlns:a16="http://schemas.microsoft.com/office/drawing/2014/main" id="{7E8A4446-D921-419F-B127-07836F7FBEF0}"/>
               </a:ext>
             </a:extLst>
           </p:cNvPr>
@@ -4187,8 +4157,8 @@
         </p:nvSpPr>
         <p:spPr>
           <a:xfrm>
-            <a:off x="6653285" y="2906972"/>
-            <a:ext cx="3534770" cy="1978925"/>
+            <a:off x="0" y="0"/>
+            <a:ext cx="12084682" cy="2523193"/>
           </a:xfrm>
           <a:prstGeom prst="roundRect">
             <a:avLst/>
@@ -4199,7 +4169,7 @@
               <a:lumOff val="80000"/>
             </a:schemeClr>
           </a:solidFill>
-          <a:ln w="19050">
+          <a:ln w="12700">
             <a:solidFill>
               <a:schemeClr val="tx1"/>
             </a:solidFill>
@@ -4227,42 +4197,609 @@
           <a:lstStyle/>
           <a:p>
             <a:pPr algn="ctr"/>
-            <a:endParaRPr lang="zh-CN" altLang="en-US"/>
-          </a:p>
-        </p:txBody>
-      </p:sp>
-      <p:sp>
-        <p:nvSpPr>
-          <p:cNvPr id="40" name="矩形: 圆角 39">
-            <a:extLst>
-              <a:ext uri="{FF2B5EF4-FFF2-40B4-BE49-F238E27FC236}">
-                <a16:creationId xmlns:a16="http://schemas.microsoft.com/office/drawing/2014/main" id="{7E8A4446-D921-419F-B127-07836F7FBEF0}"/>
-              </a:ext>
-            </a:extLst>
-          </p:cNvPr>
+            <a:endParaRPr lang="zh-CN" altLang="en-US" dirty="0"/>
+          </a:p>
+        </p:txBody>
+      </p:sp>
+      <p:sp>
+        <p:nvSpPr>
+          <p:cNvPr id="22" name="Google Shape;9989;p124"/>
           <p:cNvSpPr/>
           <p:nvPr/>
         </p:nvSpPr>
         <p:spPr>
           <a:xfrm>
-            <a:off x="55002" y="55002"/>
-            <a:ext cx="11832198" cy="2523193"/>
+            <a:off x="4019712" y="939761"/>
+            <a:ext cx="1007232" cy="634500"/>
           </a:xfrm>
           <a:prstGeom prst="roundRect">
-            <a:avLst/>
+            <a:avLst>
+              <a:gd name="adj" fmla="val 16667"/>
+            </a:avLst>
           </a:prstGeom>
           <a:solidFill>
-            <a:schemeClr val="accent1">
+            <a:schemeClr val="accent4">
               <a:lumMod val="20000"/>
               <a:lumOff val="80000"/>
             </a:schemeClr>
           </a:solidFill>
-          <a:ln w="12700">
-            <a:solidFill>
-              <a:schemeClr val="tx1"/>
-            </a:solidFill>
-            <a:prstDash val="sysDash"/>
-          </a:ln>
+          <a:ln w="12700" cap="flat" cmpd="sng">
+            <a:solidFill>
+              <a:srgbClr val="000000"/>
+            </a:solidFill>
+            <a:prstDash val="solid"/>
+            <a:round/>
+            <a:headEnd type="none" w="sm" len="sm"/>
+            <a:tailEnd type="none" w="sm" len="sm"/>
+          </a:ln>
+        </p:spPr>
+        <p:txBody>
+          <a:bodyPr spcFirstLastPara="1" wrap="square" lIns="91425" tIns="91425" rIns="91425" bIns="91425" anchor="ctr" anchorCtr="0">
+            <a:noAutofit/>
+          </a:bodyPr>
+          <a:lstStyle/>
+          <a:p>
+            <a:pPr marL="0" lvl="0" indent="0" algn="ctr" rtl="0">
+              <a:spcBef>
+                <a:spcPts val="0"/>
+              </a:spcBef>
+              <a:spcAft>
+                <a:spcPts val="0"/>
+              </a:spcAft>
+              <a:buNone/>
+            </a:pPr>
+            <a:r>
+              <a:rPr lang="en-US" sz="1400" b="1" dirty="0"/>
+              <a:t>Fourier Process</a:t>
+            </a:r>
+            <a:endParaRPr lang="en" sz="1400" b="1" dirty="0"/>
+          </a:p>
+          <a:p>
+            <a:pPr marL="0" lvl="0" indent="0" algn="ctr" rtl="0">
+              <a:spcBef>
+                <a:spcPts val="0"/>
+              </a:spcBef>
+              <a:spcAft>
+                <a:spcPts val="0"/>
+              </a:spcAft>
+              <a:buNone/>
+            </a:pPr>
+            <a:r>
+              <a:rPr lang="en" sz="1400" b="1" dirty="0"/>
+              <a:t>Block</a:t>
+            </a:r>
+            <a:endParaRPr sz="1400" b="1" dirty="0"/>
+          </a:p>
+        </p:txBody>
+      </p:sp>
+      <p:sp>
+        <p:nvSpPr>
+          <p:cNvPr id="34" name="Google Shape;10204;p134"/>
+          <p:cNvSpPr/>
+          <p:nvPr/>
+        </p:nvSpPr>
+        <p:spPr>
+          <a:xfrm>
+            <a:off x="1306120" y="1449933"/>
+            <a:ext cx="1034472" cy="972546"/>
+          </a:xfrm>
+          <a:prstGeom prst="roundRect">
+            <a:avLst>
+              <a:gd name="adj" fmla="val 16667"/>
+            </a:avLst>
+          </a:prstGeom>
+          <a:noFill/>
+          <a:ln w="9525" cap="flat" cmpd="sng">
+            <a:solidFill>
+              <a:schemeClr val="dk1"/>
+            </a:solidFill>
+            <a:prstDash val="lgDash"/>
+            <a:round/>
+            <a:headEnd type="none" w="sm" len="sm"/>
+            <a:tailEnd type="none" w="sm" len="sm"/>
+          </a:ln>
+        </p:spPr>
+        <p:txBody>
+          <a:bodyPr spcFirstLastPara="1" wrap="square" lIns="91425" tIns="91425" rIns="91425" bIns="91425" anchor="ctr" anchorCtr="0">
+            <a:noAutofit/>
+          </a:bodyPr>
+          <a:lstStyle/>
+          <a:p>
+            <a:pPr marL="0" lvl="0" indent="0" algn="ctr" rtl="0">
+              <a:spcBef>
+                <a:spcPts val="0"/>
+              </a:spcBef>
+              <a:spcAft>
+                <a:spcPts val="0"/>
+              </a:spcAft>
+              <a:buNone/>
+            </a:pPr>
+            <a:r>
+              <a:rPr lang="en" sz="1200" b="1" dirty="0">
+                <a:latin typeface="Times New Roman"/>
+                <a:ea typeface="Times New Roman"/>
+                <a:cs typeface="Times New Roman"/>
+                <a:sym typeface="Times New Roman"/>
+              </a:rPr>
+              <a:t>Image Augumen</a:t>
+            </a:r>
+          </a:p>
+          <a:p>
+            <a:pPr marL="0" lvl="0" indent="0" algn="ctr" rtl="0">
+              <a:spcBef>
+                <a:spcPts val="0"/>
+              </a:spcBef>
+              <a:spcAft>
+                <a:spcPts val="0"/>
+              </a:spcAft>
+              <a:buNone/>
+            </a:pPr>
+            <a:r>
+              <a:rPr lang="en" sz="1200" b="1" dirty="0">
+                <a:latin typeface="Times New Roman"/>
+                <a:ea typeface="Times New Roman"/>
+                <a:cs typeface="Times New Roman"/>
+                <a:sym typeface="Times New Roman"/>
+              </a:rPr>
+              <a:t>-tion</a:t>
+            </a:r>
+            <a:r>
+              <a:rPr lang="en" sz="1200" dirty="0">
+                <a:latin typeface="Times New Roman"/>
+                <a:ea typeface="Times New Roman"/>
+                <a:cs typeface="Times New Roman"/>
+                <a:sym typeface="Times New Roman"/>
+              </a:rPr>
+              <a:t>(flip</a:t>
+            </a:r>
+            <a:r>
+              <a:rPr lang="zh-CN" altLang="en-US" sz="1200" dirty="0">
+                <a:latin typeface="Times New Roman"/>
+                <a:ea typeface="Times New Roman"/>
+                <a:cs typeface="Times New Roman"/>
+                <a:sym typeface="Times New Roman"/>
+              </a:rPr>
+              <a:t>，</a:t>
+            </a:r>
+            <a:r>
+              <a:rPr lang="en" sz="1200" dirty="0">
+                <a:latin typeface="Times New Roman"/>
+                <a:ea typeface="Times New Roman"/>
+                <a:cs typeface="Times New Roman"/>
+                <a:sym typeface="Times New Roman"/>
+              </a:rPr>
+              <a:t>rotation</a:t>
+            </a:r>
+            <a:r>
+              <a:rPr lang="en-US" sz="1200" dirty="0">
+                <a:latin typeface="Times New Roman"/>
+                <a:ea typeface="Times New Roman"/>
+                <a:cs typeface="Times New Roman"/>
+                <a:sym typeface="Times New Roman"/>
+              </a:rPr>
+              <a:t>…</a:t>
+            </a:r>
+            <a:r>
+              <a:rPr lang="en" sz="1200" dirty="0">
+                <a:latin typeface="Times New Roman"/>
+                <a:ea typeface="Times New Roman"/>
+                <a:cs typeface="Times New Roman"/>
+                <a:sym typeface="Times New Roman"/>
+              </a:rPr>
+              <a:t>)</a:t>
+            </a:r>
+            <a:endParaRPr sz="1200" dirty="0">
+              <a:latin typeface="Times New Roman"/>
+              <a:ea typeface="Times New Roman"/>
+              <a:cs typeface="Times New Roman"/>
+              <a:sym typeface="Times New Roman"/>
+            </a:endParaRPr>
+          </a:p>
+        </p:txBody>
+      </p:sp>
+      <p:pic>
+        <p:nvPicPr>
+          <p:cNvPr id="3" name="图片 2">
+            <a:extLst>
+              <a:ext uri="{FF2B5EF4-FFF2-40B4-BE49-F238E27FC236}">
+                <a16:creationId xmlns:a16="http://schemas.microsoft.com/office/drawing/2014/main" id="{547B9A90-1E43-4D4F-88E8-899E7CE8FA60}"/>
+              </a:ext>
+            </a:extLst>
+          </p:cNvPr>
+          <p:cNvPicPr>
+            <a:picLocks noChangeAspect="1"/>
+          </p:cNvPicPr>
+          <p:nvPr/>
+        </p:nvPicPr>
+        <p:blipFill>
+          <a:blip r:embed="rId2" cstate="print">
+            <a:extLst>
+              <a:ext uri="{28A0092B-C50C-407E-A947-70E740481C1C}">
+                <a14:useLocalDpi xmlns:a14="http://schemas.microsoft.com/office/drawing/2010/main" val="0"/>
+              </a:ext>
+            </a:extLst>
+          </a:blip>
+          <a:stretch>
+            <a:fillRect/>
+          </a:stretch>
+        </p:blipFill>
+        <p:spPr>
+          <a:xfrm>
+            <a:off x="2712782" y="1621955"/>
+            <a:ext cx="883404" cy="749248"/>
+          </a:xfrm>
+          <a:prstGeom prst="rect">
+            <a:avLst/>
+          </a:prstGeom>
+        </p:spPr>
+      </p:pic>
+      <p:pic>
+        <p:nvPicPr>
+          <p:cNvPr id="31" name="图片 30">
+            <a:extLst>
+              <a:ext uri="{FF2B5EF4-FFF2-40B4-BE49-F238E27FC236}">
+                <a16:creationId xmlns:a16="http://schemas.microsoft.com/office/drawing/2014/main" id="{9B32B5D8-9E8E-4A69-827F-71FE5D6165F7}"/>
+              </a:ext>
+            </a:extLst>
+          </p:cNvPr>
+          <p:cNvPicPr>
+            <a:picLocks noChangeAspect="1"/>
+          </p:cNvPicPr>
+          <p:nvPr/>
+        </p:nvPicPr>
+        <p:blipFill>
+          <a:blip r:embed="rId3" cstate="print">
+            <a:extLst>
+              <a:ext uri="{28A0092B-C50C-407E-A947-70E740481C1C}">
+                <a14:useLocalDpi xmlns:a14="http://schemas.microsoft.com/office/drawing/2010/main" val="0"/>
+              </a:ext>
+            </a:extLst>
+          </a:blip>
+          <a:stretch>
+            <a:fillRect/>
+          </a:stretch>
+        </p:blipFill>
+        <p:spPr>
+          <a:xfrm>
+            <a:off x="5257894" y="894681"/>
+            <a:ext cx="852643" cy="722579"/>
+          </a:xfrm>
+          <a:prstGeom prst="rect">
+            <a:avLst/>
+          </a:prstGeom>
+        </p:spPr>
+      </p:pic>
+      <p:pic>
+        <p:nvPicPr>
+          <p:cNvPr id="32" name="图片 31">
+            <a:extLst>
+              <a:ext uri="{FF2B5EF4-FFF2-40B4-BE49-F238E27FC236}">
+                <a16:creationId xmlns:a16="http://schemas.microsoft.com/office/drawing/2014/main" id="{84109C07-A6AD-4275-808E-7440F96C273C}"/>
+              </a:ext>
+            </a:extLst>
+          </p:cNvPr>
+          <p:cNvPicPr>
+            <a:picLocks noChangeAspect="1"/>
+          </p:cNvPicPr>
+          <p:nvPr/>
+        </p:nvPicPr>
+        <p:blipFill>
+          <a:blip r:embed="rId4" cstate="print">
+            <a:extLst>
+              <a:ext uri="{28A0092B-C50C-407E-A947-70E740481C1C}">
+                <a14:useLocalDpi xmlns:a14="http://schemas.microsoft.com/office/drawing/2010/main" val="0"/>
+              </a:ext>
+            </a:extLst>
+          </a:blip>
+          <a:stretch>
+            <a:fillRect/>
+          </a:stretch>
+        </p:blipFill>
+        <p:spPr>
+          <a:xfrm>
+            <a:off x="120251" y="525380"/>
+            <a:ext cx="807194" cy="684063"/>
+          </a:xfrm>
+          <a:prstGeom prst="rect">
+            <a:avLst/>
+          </a:prstGeom>
+        </p:spPr>
+      </p:pic>
+      <p:pic>
+        <p:nvPicPr>
+          <p:cNvPr id="33" name="图片 32">
+            <a:extLst>
+              <a:ext uri="{FF2B5EF4-FFF2-40B4-BE49-F238E27FC236}">
+                <a16:creationId xmlns:a16="http://schemas.microsoft.com/office/drawing/2014/main" id="{7C3B6477-F527-47AB-9A97-4A25FB8EF3D9}"/>
+              </a:ext>
+            </a:extLst>
+          </p:cNvPr>
+          <p:cNvPicPr>
+            <a:picLocks noChangeAspect="1"/>
+          </p:cNvPicPr>
+          <p:nvPr/>
+        </p:nvPicPr>
+        <p:blipFill>
+          <a:blip r:embed="rId5" cstate="print">
+            <a:extLst>
+              <a:ext uri="{28A0092B-C50C-407E-A947-70E740481C1C}">
+                <a14:useLocalDpi xmlns:a14="http://schemas.microsoft.com/office/drawing/2010/main" val="0"/>
+              </a:ext>
+            </a:extLst>
+          </a:blip>
+          <a:stretch>
+            <a:fillRect/>
+          </a:stretch>
+        </p:blipFill>
+        <p:spPr>
+          <a:xfrm>
+            <a:off x="120855" y="1371943"/>
+            <a:ext cx="807194" cy="684063"/>
+          </a:xfrm>
+          <a:prstGeom prst="rect">
+            <a:avLst/>
+          </a:prstGeom>
+        </p:spPr>
+      </p:pic>
+      <p:pic>
+        <p:nvPicPr>
+          <p:cNvPr id="36" name="图片 35">
+            <a:extLst>
+              <a:ext uri="{FF2B5EF4-FFF2-40B4-BE49-F238E27FC236}">
+                <a16:creationId xmlns:a16="http://schemas.microsoft.com/office/drawing/2014/main" id="{4AB44BCA-2974-4017-80B6-212027DD82B8}"/>
+              </a:ext>
+            </a:extLst>
+          </p:cNvPr>
+          <p:cNvPicPr>
+            <a:picLocks noChangeAspect="1"/>
+          </p:cNvPicPr>
+          <p:nvPr/>
+        </p:nvPicPr>
+        <p:blipFill>
+          <a:blip r:embed="rId6" cstate="print">
+            <a:extLst>
+              <a:ext uri="{28A0092B-C50C-407E-A947-70E740481C1C}">
+                <a14:useLocalDpi xmlns:a14="http://schemas.microsoft.com/office/drawing/2010/main" val="0"/>
+              </a:ext>
+            </a:extLst>
+          </a:blip>
+          <a:stretch>
+            <a:fillRect/>
+          </a:stretch>
+        </p:blipFill>
+        <p:spPr>
+          <a:xfrm>
+            <a:off x="11258010" y="908326"/>
+            <a:ext cx="788228" cy="667990"/>
+          </a:xfrm>
+          <a:prstGeom prst="rect">
+            <a:avLst/>
+          </a:prstGeom>
+        </p:spPr>
+      </p:pic>
+      <p:sp>
+        <p:nvSpPr>
+          <p:cNvPr id="71" name="文本框 70">
+            <a:extLst>
+              <a:ext uri="{FF2B5EF4-FFF2-40B4-BE49-F238E27FC236}">
+                <a16:creationId xmlns:a16="http://schemas.microsoft.com/office/drawing/2014/main" id="{1FC788DA-F9DC-469D-909E-C5E713343E27}"/>
+              </a:ext>
+            </a:extLst>
+          </p:cNvPr>
+          <p:cNvSpPr txBox="1"/>
+          <p:nvPr/>
+        </p:nvSpPr>
+        <p:spPr>
+          <a:xfrm>
+            <a:off x="3267433" y="0"/>
+            <a:ext cx="6094854" cy="369332"/>
+          </a:xfrm>
+          <a:prstGeom prst="rect">
+            <a:avLst/>
+          </a:prstGeom>
+          <a:noFill/>
+        </p:spPr>
+        <p:txBody>
+          <a:bodyPr wrap="square">
+            <a:spAutoFit/>
+          </a:bodyPr>
+          <a:lstStyle/>
+          <a:p>
+            <a:r>
+              <a:rPr lang="en-US" altLang="zh-CN" b="1" dirty="0"/>
+              <a:t>HVI</a:t>
+            </a:r>
+            <a:r>
+              <a:rPr lang="zh-CN" altLang="en-US" b="1" dirty="0"/>
+              <a:t> Multi-Modality </a:t>
+            </a:r>
+            <a:r>
+              <a:rPr lang="en-US" altLang="zh-CN" b="1" dirty="0"/>
+              <a:t>I</a:t>
+            </a:r>
+            <a:r>
+              <a:rPr lang="zh-CN" altLang="en-US" b="1" dirty="0"/>
+              <a:t>m</a:t>
+            </a:r>
+            <a:r>
+              <a:rPr lang="en-US" altLang="zh-CN" b="1" dirty="0"/>
+              <a:t>a</a:t>
+            </a:r>
+            <a:r>
+              <a:rPr lang="zh-CN" altLang="en-US" b="1" dirty="0"/>
+              <a:t>ge </a:t>
+            </a:r>
+            <a:r>
+              <a:rPr lang="en-US" altLang="zh-CN" b="1" dirty="0"/>
+              <a:t>F</a:t>
+            </a:r>
+            <a:r>
+              <a:rPr lang="zh-CN" altLang="en-US" b="1" dirty="0"/>
+              <a:t>usion (</a:t>
+            </a:r>
+            <a:r>
+              <a:rPr lang="en-US" altLang="zh-CN" b="1" dirty="0"/>
+              <a:t>H</a:t>
+            </a:r>
+            <a:r>
+              <a:rPr lang="zh-CN" altLang="en-US" b="1" dirty="0"/>
+              <a:t>M</a:t>
+            </a:r>
+            <a:r>
+              <a:rPr lang="en-US" altLang="zh-CN" b="1" dirty="0"/>
+              <a:t>IF</a:t>
+            </a:r>
+            <a:r>
+              <a:rPr lang="zh-CN" altLang="en-US" b="1" dirty="0"/>
+              <a:t>)</a:t>
+            </a:r>
+          </a:p>
+        </p:txBody>
+      </p:sp>
+      <p:sp>
+        <p:nvSpPr>
+          <p:cNvPr id="73" name="Google Shape;8410;p96">
+            <a:extLst>
+              <a:ext uri="{FF2B5EF4-FFF2-40B4-BE49-F238E27FC236}">
+                <a16:creationId xmlns:a16="http://schemas.microsoft.com/office/drawing/2014/main" id="{E8F9CF38-823D-4F89-B6A6-CE2927C436FF}"/>
+              </a:ext>
+            </a:extLst>
+          </p:cNvPr>
+          <p:cNvSpPr txBox="1"/>
+          <p:nvPr/>
+        </p:nvSpPr>
+        <p:spPr>
+          <a:xfrm>
+            <a:off x="143823" y="276971"/>
+            <a:ext cx="929666" cy="229951"/>
+          </a:xfrm>
+          <a:prstGeom prst="rect">
+            <a:avLst/>
+          </a:prstGeom>
+          <a:noFill/>
+          <a:ln>
+            <a:noFill/>
+          </a:ln>
+        </p:spPr>
+        <p:txBody>
+          <a:bodyPr spcFirstLastPara="1" wrap="square" lIns="91425" tIns="91425" rIns="91425" bIns="91425" anchor="t" anchorCtr="0">
+            <a:noAutofit/>
+          </a:bodyPr>
+          <a:lstStyle/>
+          <a:p>
+            <a:pPr marL="0" lvl="0" indent="0" algn="l" rtl="0">
+              <a:spcBef>
+                <a:spcPts val="0"/>
+              </a:spcBef>
+              <a:spcAft>
+                <a:spcPts val="0"/>
+              </a:spcAft>
+              <a:buNone/>
+            </a:pPr>
+            <a:r>
+              <a:rPr lang="en" sz="1000" b="1" dirty="0"/>
+              <a:t>Input visible</a:t>
+            </a:r>
+            <a:endParaRPr sz="1000" b="1" dirty="0"/>
+          </a:p>
+        </p:txBody>
+      </p:sp>
+      <p:cxnSp>
+        <p:nvCxnSpPr>
+          <p:cNvPr id="81" name="Google Shape;10001;p124">
+            <a:extLst>
+              <a:ext uri="{FF2B5EF4-FFF2-40B4-BE49-F238E27FC236}">
+                <a16:creationId xmlns:a16="http://schemas.microsoft.com/office/drawing/2014/main" id="{69799628-0B94-4FC8-A7D0-B2F039EE6FE8}"/>
+              </a:ext>
+            </a:extLst>
+          </p:cNvPr>
+          <p:cNvCxnSpPr>
+            <a:cxnSpLocks/>
+            <a:stCxn id="22" idx="3"/>
+            <a:endCxn id="31" idx="1"/>
+          </p:cNvCxnSpPr>
+          <p:nvPr/>
+        </p:nvCxnSpPr>
+        <p:spPr>
+          <a:xfrm flipV="1">
+            <a:off x="5026944" y="1255971"/>
+            <a:ext cx="230950" cy="1040"/>
+          </a:xfrm>
+          <a:prstGeom prst="straightConnector1">
+            <a:avLst/>
+          </a:prstGeom>
+          <a:noFill/>
+          <a:ln w="19050" cap="flat" cmpd="sng">
+            <a:solidFill>
+              <a:srgbClr val="000000"/>
+            </a:solidFill>
+            <a:prstDash val="solid"/>
+            <a:round/>
+            <a:headEnd type="none" w="med" len="med"/>
+            <a:tailEnd type="triangle" w="med" len="med"/>
+          </a:ln>
+        </p:spPr>
+      </p:cxnSp>
+      <p:cxnSp>
+        <p:nvCxnSpPr>
+          <p:cNvPr id="85" name="Google Shape;10001;p124">
+            <a:extLst>
+              <a:ext uri="{FF2B5EF4-FFF2-40B4-BE49-F238E27FC236}">
+                <a16:creationId xmlns:a16="http://schemas.microsoft.com/office/drawing/2014/main" id="{BFA43D49-AE42-46E9-9750-E7AA0438CDBE}"/>
+              </a:ext>
+            </a:extLst>
+          </p:cNvPr>
+          <p:cNvCxnSpPr>
+            <a:cxnSpLocks/>
+          </p:cNvCxnSpPr>
+          <p:nvPr/>
+        </p:nvCxnSpPr>
+        <p:spPr>
+          <a:xfrm>
+            <a:off x="6104415" y="1253020"/>
+            <a:ext cx="282737" cy="0"/>
+          </a:xfrm>
+          <a:prstGeom prst="straightConnector1">
+            <a:avLst/>
+          </a:prstGeom>
+          <a:noFill/>
+          <a:ln w="19050" cap="flat" cmpd="sng">
+            <a:solidFill>
+              <a:srgbClr val="000000"/>
+            </a:solidFill>
+            <a:prstDash val="solid"/>
+            <a:round/>
+            <a:headEnd type="none" w="med" len="med"/>
+            <a:tailEnd type="triangle" w="med" len="med"/>
+          </a:ln>
+        </p:spPr>
+      </p:cxnSp>
+      <p:sp>
+        <p:nvSpPr>
+          <p:cNvPr id="5" name="梯形 4">
+            <a:extLst>
+              <a:ext uri="{FF2B5EF4-FFF2-40B4-BE49-F238E27FC236}">
+                <a16:creationId xmlns:a16="http://schemas.microsoft.com/office/drawing/2014/main" id="{C6FF907B-FCFB-414C-85C2-67432A535389}"/>
+              </a:ext>
+            </a:extLst>
+          </p:cNvPr>
+          <p:cNvSpPr/>
+          <p:nvPr/>
+        </p:nvSpPr>
+        <p:spPr>
+          <a:xfrm rot="5400000">
+            <a:off x="6619163" y="757450"/>
+            <a:ext cx="613400" cy="997037"/>
+          </a:xfrm>
+          <a:prstGeom prst="trapezoid">
+            <a:avLst/>
+          </a:prstGeom>
+          <a:solidFill>
+            <a:schemeClr val="accent3">
+              <a:lumMod val="40000"/>
+              <a:lumOff val="60000"/>
+            </a:schemeClr>
+          </a:solidFill>
         </p:spPr>
         <p:style>
           <a:lnRef idx="2">
@@ -4285,20 +4822,154 @@
           <a:lstStyle/>
           <a:p>
             <a:pPr algn="ctr"/>
+            <a:endParaRPr lang="zh-CN" altLang="en-US" sz="1200" b="1" dirty="0">
+              <a:solidFill>
+                <a:schemeClr val="tx1"/>
+              </a:solidFill>
+            </a:endParaRPr>
+          </a:p>
+        </p:txBody>
+      </p:sp>
+      <p:sp>
+        <p:nvSpPr>
+          <p:cNvPr id="63" name="梯形 62">
+            <a:extLst>
+              <a:ext uri="{FF2B5EF4-FFF2-40B4-BE49-F238E27FC236}">
+                <a16:creationId xmlns:a16="http://schemas.microsoft.com/office/drawing/2014/main" id="{09916C4F-7D3F-49B6-805F-F1A478166C3B}"/>
+              </a:ext>
+            </a:extLst>
+          </p:cNvPr>
+          <p:cNvSpPr/>
+          <p:nvPr/>
+        </p:nvSpPr>
+        <p:spPr>
+          <a:xfrm rot="16200000">
+            <a:off x="10273351" y="756310"/>
+            <a:ext cx="549710" cy="967468"/>
+          </a:xfrm>
+          <a:prstGeom prst="trapezoid">
+            <a:avLst/>
+          </a:prstGeom>
+          <a:solidFill>
+            <a:schemeClr val="accent3">
+              <a:lumMod val="40000"/>
+              <a:lumOff val="60000"/>
+            </a:schemeClr>
+          </a:solidFill>
+        </p:spPr>
+        <p:style>
+          <a:lnRef idx="2">
+            <a:schemeClr val="accent1">
+              <a:shade val="50000"/>
+            </a:schemeClr>
+          </a:lnRef>
+          <a:fillRef idx="1">
+            <a:schemeClr val="accent1"/>
+          </a:fillRef>
+          <a:effectRef idx="0">
+            <a:schemeClr val="accent1"/>
+          </a:effectRef>
+          <a:fontRef idx="minor">
+            <a:schemeClr val="lt1"/>
+          </a:fontRef>
+        </p:style>
+        <p:txBody>
+          <a:bodyPr rtlCol="0" anchor="ctr"/>
+          <a:lstStyle/>
+          <a:p>
+            <a:pPr algn="ctr"/>
             <a:endParaRPr lang="zh-CN" altLang="en-US" dirty="0"/>
           </a:p>
         </p:txBody>
       </p:sp>
       <p:sp>
         <p:nvSpPr>
-          <p:cNvPr id="22" name="Google Shape;9989;p124"/>
+          <p:cNvPr id="20" name="文本框 19">
+            <a:extLst>
+              <a:ext uri="{FF2B5EF4-FFF2-40B4-BE49-F238E27FC236}">
+                <a16:creationId xmlns:a16="http://schemas.microsoft.com/office/drawing/2014/main" id="{388A6BE9-78A1-4B73-9893-7240B680619B}"/>
+              </a:ext>
+            </a:extLst>
+          </p:cNvPr>
+          <p:cNvSpPr txBox="1"/>
+          <p:nvPr/>
+        </p:nvSpPr>
+        <p:spPr>
+          <a:xfrm>
+            <a:off x="6516805" y="1098644"/>
+            <a:ext cx="843501" cy="307777"/>
+          </a:xfrm>
+          <a:prstGeom prst="rect">
+            <a:avLst/>
+          </a:prstGeom>
+          <a:noFill/>
+        </p:spPr>
+        <p:txBody>
+          <a:bodyPr wrap="none" rtlCol="0">
+            <a:spAutoFit/>
+          </a:bodyPr>
+          <a:lstStyle/>
+          <a:p>
+            <a:r>
+              <a:rPr lang="en-US" altLang="zh-CN" sz="1400" b="1" dirty="0"/>
+              <a:t>Encoder</a:t>
+            </a:r>
+            <a:endParaRPr lang="zh-CN" altLang="en-US" sz="1400" b="1" dirty="0"/>
+          </a:p>
+        </p:txBody>
+      </p:sp>
+      <p:sp>
+        <p:nvSpPr>
+          <p:cNvPr id="66" name="文本框 65">
+            <a:extLst>
+              <a:ext uri="{FF2B5EF4-FFF2-40B4-BE49-F238E27FC236}">
+                <a16:creationId xmlns:a16="http://schemas.microsoft.com/office/drawing/2014/main" id="{FDE87036-A2CE-47EF-96F9-95D995BBDC0B}"/>
+              </a:ext>
+            </a:extLst>
+          </p:cNvPr>
+          <p:cNvSpPr txBox="1"/>
+          <p:nvPr/>
+        </p:nvSpPr>
+        <p:spPr>
+          <a:xfrm>
+            <a:off x="10119814" y="1094095"/>
+            <a:ext cx="870751" cy="307777"/>
+          </a:xfrm>
+          <a:prstGeom prst="rect">
+            <a:avLst/>
+          </a:prstGeom>
+          <a:noFill/>
+        </p:spPr>
+        <p:txBody>
+          <a:bodyPr wrap="none" rtlCol="0">
+            <a:spAutoFit/>
+          </a:bodyPr>
+          <a:lstStyle/>
+          <a:p>
+            <a:r>
+              <a:rPr lang="en-US" altLang="zh-CN" sz="1400" b="1" dirty="0"/>
+              <a:t>Decoder</a:t>
+            </a:r>
+            <a:endParaRPr lang="zh-CN" altLang="en-US" sz="1400" b="1" dirty="0"/>
+          </a:p>
+        </p:txBody>
+      </p:sp>
+      <p:sp>
+        <p:nvSpPr>
+          <p:cNvPr id="72" name="Google Shape;9989;p124">
+            <a:extLst>
+              <a:ext uri="{FF2B5EF4-FFF2-40B4-BE49-F238E27FC236}">
+                <a16:creationId xmlns:a16="http://schemas.microsoft.com/office/drawing/2014/main" id="{ED44B48C-1DD6-4676-A181-5CAF8CA8A394}"/>
+              </a:ext>
+            </a:extLst>
+          </p:cNvPr>
           <p:cNvSpPr/>
           <p:nvPr/>
         </p:nvSpPr>
         <p:spPr>
           <a:xfrm>
-            <a:off x="1433461" y="1008000"/>
-            <a:ext cx="1007232" cy="634500"/>
+            <a:off x="7833814" y="673562"/>
+            <a:ext cx="1501255" cy="382357"/>
           </a:xfrm>
           <a:prstGeom prst="roundRect">
             <a:avLst>
@@ -4337,10 +5008,64 @@
               <a:buNone/>
             </a:pPr>
             <a:r>
-              <a:rPr lang="en" dirty="0"/>
-              <a:t>HVI</a:t>
-            </a:r>
-          </a:p>
+              <a:rPr lang="en-US" sz="1200" b="1" dirty="0"/>
+              <a:t>Fourier </a:t>
+            </a:r>
+            <a:r>
+              <a:rPr lang="en-US" sz="1200" b="1" dirty="0" err="1"/>
+              <a:t>Conver</a:t>
+            </a:r>
+            <a:r>
+              <a:rPr lang="en-US" sz="1200" b="1" dirty="0"/>
+              <a:t> Branch</a:t>
+            </a:r>
+            <a:endParaRPr lang="en" sz="1200" b="1" dirty="0"/>
+          </a:p>
+        </p:txBody>
+      </p:sp>
+      <p:sp>
+        <p:nvSpPr>
+          <p:cNvPr id="76" name="Google Shape;9989;p124">
+            <a:extLst>
+              <a:ext uri="{FF2B5EF4-FFF2-40B4-BE49-F238E27FC236}">
+                <a16:creationId xmlns:a16="http://schemas.microsoft.com/office/drawing/2014/main" id="{1273075D-87E6-4B09-9B51-8E4B02229759}"/>
+              </a:ext>
+            </a:extLst>
+          </p:cNvPr>
+          <p:cNvSpPr/>
+          <p:nvPr/>
+        </p:nvSpPr>
+        <p:spPr>
+          <a:xfrm>
+            <a:off x="7842911" y="1483057"/>
+            <a:ext cx="1501255" cy="382357"/>
+          </a:xfrm>
+          <a:prstGeom prst="roundRect">
+            <a:avLst>
+              <a:gd name="adj" fmla="val 16667"/>
+            </a:avLst>
+          </a:prstGeom>
+          <a:solidFill>
+            <a:schemeClr val="accent4">
+              <a:lumMod val="20000"/>
+              <a:lumOff val="80000"/>
+            </a:schemeClr>
+          </a:solidFill>
+          <a:ln w="12700" cap="flat" cmpd="sng">
+            <a:solidFill>
+              <a:srgbClr val="000000"/>
+            </a:solidFill>
+            <a:prstDash val="solid"/>
+            <a:round/>
+            <a:headEnd type="none" w="sm" len="sm"/>
+            <a:tailEnd type="none" w="sm" len="sm"/>
+          </a:ln>
+        </p:spPr>
+        <p:txBody>
+          <a:bodyPr spcFirstLastPara="1" wrap="square" lIns="91425" tIns="91425" rIns="91425" bIns="91425" anchor="ctr" anchorCtr="0">
+            <a:noAutofit/>
+          </a:bodyPr>
+          <a:lstStyle/>
           <a:p>
             <a:pPr marL="0" lvl="0" indent="0" algn="ctr" rtl="0">
               <a:spcBef>
@@ -4352,708 +5077,49 @@
               <a:buNone/>
             </a:pPr>
             <a:r>
-              <a:rPr lang="en" dirty="0"/>
-              <a:t>Fuser</a:t>
-            </a:r>
-            <a:endParaRPr dirty="0"/>
-          </a:p>
-        </p:txBody>
-      </p:sp>
-      <p:sp>
-        <p:nvSpPr>
-          <p:cNvPr id="34" name="Google Shape;10204;p134"/>
-          <p:cNvSpPr/>
-          <p:nvPr/>
-        </p:nvSpPr>
-        <p:spPr>
-          <a:xfrm>
-            <a:off x="4185797" y="842606"/>
-            <a:ext cx="1383105" cy="970954"/>
-          </a:xfrm>
-          <a:prstGeom prst="roundRect">
-            <a:avLst>
-              <a:gd name="adj" fmla="val 16667"/>
-            </a:avLst>
-          </a:prstGeom>
-          <a:noFill/>
-          <a:ln w="9525" cap="flat" cmpd="sng">
-            <a:solidFill>
-              <a:schemeClr val="dk1"/>
-            </a:solidFill>
-            <a:prstDash val="lgDash"/>
-            <a:round/>
-            <a:headEnd type="none" w="sm" len="sm"/>
-            <a:tailEnd type="none" w="sm" len="sm"/>
-          </a:ln>
-        </p:spPr>
-        <p:txBody>
-          <a:bodyPr spcFirstLastPara="1" wrap="square" lIns="91425" tIns="91425" rIns="91425" bIns="91425" anchor="ctr" anchorCtr="0">
-            <a:noAutofit/>
-          </a:bodyPr>
-          <a:lstStyle/>
-          <a:p>
-            <a:pPr marL="0" lvl="0" indent="0" algn="ctr" rtl="0">
-              <a:spcBef>
-                <a:spcPts val="0"/>
-              </a:spcBef>
-              <a:spcAft>
-                <a:spcPts val="0"/>
-              </a:spcAft>
-              <a:buNone/>
-            </a:pPr>
-            <a:r>
-              <a:rPr lang="en" sz="1400" b="1" dirty="0">
-                <a:latin typeface="Times New Roman"/>
-                <a:ea typeface="Times New Roman"/>
-                <a:cs typeface="Times New Roman"/>
-                <a:sym typeface="Times New Roman"/>
-              </a:rPr>
-              <a:t>Image Augumention</a:t>
-            </a:r>
-          </a:p>
-          <a:p>
-            <a:pPr marL="0" lvl="0" indent="0" algn="ctr" rtl="0">
-              <a:spcBef>
-                <a:spcPts val="0"/>
-              </a:spcBef>
-              <a:spcAft>
-                <a:spcPts val="0"/>
-              </a:spcAft>
-              <a:buNone/>
-            </a:pPr>
-            <a:r>
-              <a:rPr lang="en" sz="1400" dirty="0">
-                <a:latin typeface="Times New Roman"/>
-                <a:ea typeface="Times New Roman"/>
-                <a:cs typeface="Times New Roman"/>
-                <a:sym typeface="Times New Roman"/>
-              </a:rPr>
-              <a:t>(flip</a:t>
-            </a:r>
-            <a:r>
-              <a:rPr lang="zh-CN" altLang="en-US" sz="1400" dirty="0">
-                <a:latin typeface="Times New Roman"/>
-                <a:ea typeface="Times New Roman"/>
-                <a:cs typeface="Times New Roman"/>
-                <a:sym typeface="Times New Roman"/>
-              </a:rPr>
-              <a:t>，</a:t>
-            </a:r>
-            <a:r>
-              <a:rPr lang="en" sz="1400" dirty="0">
-                <a:latin typeface="Times New Roman"/>
-                <a:ea typeface="Times New Roman"/>
-                <a:cs typeface="Times New Roman"/>
-                <a:sym typeface="Times New Roman"/>
-              </a:rPr>
-              <a:t>rotation,</a:t>
-            </a:r>
-          </a:p>
-          <a:p>
-            <a:pPr marL="0" lvl="0" indent="0" algn="ctr" rtl="0">
-              <a:spcBef>
-                <a:spcPts val="0"/>
-              </a:spcBef>
-              <a:spcAft>
-                <a:spcPts val="0"/>
-              </a:spcAft>
-              <a:buNone/>
-            </a:pPr>
-            <a:r>
-              <a:rPr lang="en" sz="1400" dirty="0">
-                <a:latin typeface="Times New Roman"/>
-                <a:ea typeface="Times New Roman"/>
-                <a:cs typeface="Times New Roman"/>
-                <a:sym typeface="Times New Roman"/>
-              </a:rPr>
-              <a:t>translation</a:t>
-            </a:r>
-            <a:r>
-              <a:rPr lang="en-US" sz="1400" dirty="0">
-                <a:latin typeface="Times New Roman"/>
-                <a:ea typeface="Times New Roman"/>
-                <a:cs typeface="Times New Roman"/>
-                <a:sym typeface="Times New Roman"/>
-              </a:rPr>
-              <a:t>…</a:t>
-            </a:r>
-            <a:r>
-              <a:rPr lang="en" sz="1400" dirty="0">
-                <a:latin typeface="Times New Roman"/>
-                <a:ea typeface="Times New Roman"/>
-                <a:cs typeface="Times New Roman"/>
-                <a:sym typeface="Times New Roman"/>
-              </a:rPr>
-              <a:t>)</a:t>
-            </a:r>
-            <a:endParaRPr sz="1400" dirty="0">
-              <a:latin typeface="Times New Roman"/>
-              <a:ea typeface="Times New Roman"/>
-              <a:cs typeface="Times New Roman"/>
-              <a:sym typeface="Times New Roman"/>
-            </a:endParaRPr>
-          </a:p>
-        </p:txBody>
-      </p:sp>
-      <mc:AlternateContent xmlns:mc="http://schemas.openxmlformats.org/markup-compatibility/2006">
-        <mc:Choice xmlns:a14="http://schemas.microsoft.com/office/drawing/2010/main" Requires="a14">
-          <p:sp>
-            <p:nvSpPr>
-              <p:cNvPr id="41" name="Google Shape;10169;p131"/>
-              <p:cNvSpPr/>
-              <p:nvPr/>
-            </p:nvSpPr>
-            <p:spPr>
-              <a:xfrm>
-                <a:off x="7398000" y="682530"/>
-                <a:ext cx="772388" cy="310934"/>
-              </a:xfrm>
-              <a:prstGeom prst="roundRect">
-                <a:avLst>
-                  <a:gd name="adj" fmla="val 16667"/>
-                </a:avLst>
-              </a:prstGeom>
-              <a:solidFill>
-                <a:srgbClr val="A4C2F4"/>
-              </a:solidFill>
-              <a:ln w="12700" cap="flat" cmpd="sng">
-                <a:solidFill>
-                  <a:schemeClr val="dk2"/>
-                </a:solidFill>
-                <a:prstDash val="solid"/>
-                <a:round/>
-                <a:headEnd type="none" w="sm" len="sm"/>
-                <a:tailEnd type="none" w="sm" len="sm"/>
-              </a:ln>
-            </p:spPr>
-            <p:txBody>
-              <a:bodyPr spcFirstLastPara="1" wrap="square" lIns="91425" tIns="91425" rIns="91425" bIns="91425" anchor="ctr" anchorCtr="0">
-                <a:noAutofit/>
-              </a:bodyPr>
-              <a:lstStyle/>
-              <a:p>
-                <a:pPr marL="0" lvl="0" indent="0" algn="ctr" rtl="0">
-                  <a:spcBef>
-                    <a:spcPts val="0"/>
-                  </a:spcBef>
-                  <a:spcAft>
-                    <a:spcPts val="0"/>
-                  </a:spcAft>
-                  <a:buNone/>
-                </a:pPr>
-                <a14:m>
-                  <m:oMathPara xmlns:m="http://schemas.openxmlformats.org/officeDocument/2006/math">
-                    <m:oMathParaPr>
-                      <m:jc m:val="centerGroup"/>
-                    </m:oMathParaPr>
-                    <m:oMath xmlns:m="http://schemas.openxmlformats.org/officeDocument/2006/math">
-                      <m:sSub>
-                        <m:sSubPr>
-                          <m:ctrlPr>
-                            <a:rPr lang="pt-BR" altLang="zh-CN" sz="1800" b="1" i="1" smtClean="0">
-                              <a:latin typeface="Cambria Math" panose="02040503050406030204" pitchFamily="18" charset="0"/>
-                            </a:rPr>
-                          </m:ctrlPr>
-                        </m:sSubPr>
-                        <m:e>
-                          <m:r>
-                            <a:rPr lang="en-US" altLang="zh-CN" sz="1800" b="1" i="1" smtClean="0">
-                              <a:latin typeface="Cambria Math" panose="02040503050406030204" pitchFamily="18" charset="0"/>
-                            </a:rPr>
-                            <m:t>𝑨</m:t>
-                          </m:r>
-                        </m:e>
-                        <m:sub>
-                          <m:r>
-                            <a:rPr lang="en-US" altLang="zh-CN" sz="1800" b="1" i="1" smtClean="0">
-                              <a:latin typeface="Cambria Math" panose="02040503050406030204" pitchFamily="18" charset="0"/>
-                            </a:rPr>
-                            <m:t>𝒗</m:t>
-                          </m:r>
-                        </m:sub>
-                      </m:sSub>
-                    </m:oMath>
-                  </m:oMathPara>
-                </a14:m>
-                <a:endParaRPr dirty="0">
-                  <a:latin typeface="Times New Roman"/>
-                  <a:ea typeface="Times New Roman"/>
-                  <a:cs typeface="Times New Roman"/>
-                  <a:sym typeface="Times New Roman"/>
-                </a:endParaRPr>
-              </a:p>
-            </p:txBody>
-          </p:sp>
-        </mc:Choice>
-        <mc:Fallback>
-          <p:sp>
-            <p:nvSpPr>
-              <p:cNvPr id="41" name="Google Shape;10169;p131"/>
-              <p:cNvSpPr>
-                <a:spLocks noRot="1" noChangeAspect="1" noMove="1" noResize="1" noEditPoints="1" noAdjustHandles="1" noChangeArrowheads="1" noChangeShapeType="1" noTextEdit="1"/>
-              </p:cNvSpPr>
-              <p:nvPr/>
-            </p:nvSpPr>
-            <p:spPr>
-              <a:xfrm>
-                <a:off x="7398000" y="682530"/>
-                <a:ext cx="772388" cy="310934"/>
-              </a:xfrm>
-              <a:prstGeom prst="roundRect">
-                <a:avLst>
-                  <a:gd name="adj" fmla="val 16667"/>
-                </a:avLst>
-              </a:prstGeom>
-              <a:blipFill>
-                <a:blip r:embed="rId3"/>
-                <a:stretch>
-                  <a:fillRect b="-3774"/>
-                </a:stretch>
-              </a:blipFill>
-              <a:ln w="12700" cap="flat" cmpd="sng">
-                <a:solidFill>
-                  <a:schemeClr val="dk2"/>
-                </a:solidFill>
-                <a:prstDash val="solid"/>
-                <a:round/>
-                <a:headEnd type="none" w="sm" len="sm"/>
-                <a:tailEnd type="none" w="sm" len="sm"/>
-              </a:ln>
-            </p:spPr>
-            <p:txBody>
-              <a:bodyPr/>
-              <a:lstStyle/>
-              <a:p>
-                <a:r>
-                  <a:rPr lang="zh-CN" altLang="en-US">
-                    <a:noFill/>
-                  </a:rPr>
-                  <a:t> </a:t>
-                </a:r>
-              </a:p>
-            </p:txBody>
-          </p:sp>
-        </mc:Fallback>
-      </mc:AlternateContent>
-      <mc:AlternateContent xmlns:mc="http://schemas.openxmlformats.org/markup-compatibility/2006">
-        <mc:Choice xmlns:a14="http://schemas.microsoft.com/office/drawing/2010/main" Requires="a14">
-          <p:sp>
-            <p:nvSpPr>
-              <p:cNvPr id="47" name="Google Shape;10169;p131"/>
-              <p:cNvSpPr/>
-              <p:nvPr/>
-            </p:nvSpPr>
-            <p:spPr>
-              <a:xfrm>
-                <a:off x="7398000" y="1658992"/>
-                <a:ext cx="772388" cy="310934"/>
-              </a:xfrm>
-              <a:prstGeom prst="roundRect">
-                <a:avLst>
-                  <a:gd name="adj" fmla="val 16667"/>
-                </a:avLst>
-              </a:prstGeom>
-              <a:solidFill>
-                <a:srgbClr val="A4C2F4"/>
-              </a:solidFill>
-              <a:ln w="12700" cap="flat" cmpd="sng">
-                <a:solidFill>
-                  <a:schemeClr val="dk2"/>
-                </a:solidFill>
-                <a:prstDash val="solid"/>
-                <a:round/>
-                <a:headEnd type="none" w="sm" len="sm"/>
-                <a:tailEnd type="none" w="sm" len="sm"/>
-              </a:ln>
-            </p:spPr>
-            <p:txBody>
-              <a:bodyPr spcFirstLastPara="1" wrap="square" lIns="91425" tIns="91425" rIns="91425" bIns="91425" anchor="ctr" anchorCtr="0">
-                <a:noAutofit/>
-              </a:bodyPr>
-              <a:lstStyle/>
-              <a:p>
-                <a:pPr marL="0" lvl="0" indent="0" algn="ctr" rtl="0">
-                  <a:spcBef>
-                    <a:spcPts val="0"/>
-                  </a:spcBef>
-                  <a:spcAft>
-                    <a:spcPts val="0"/>
-                  </a:spcAft>
-                  <a:buNone/>
-                </a:pPr>
-                <a14:m>
-                  <m:oMathPara xmlns:m="http://schemas.openxmlformats.org/officeDocument/2006/math">
-                    <m:oMathParaPr>
-                      <m:jc m:val="centerGroup"/>
-                    </m:oMathParaPr>
-                    <m:oMath xmlns:m="http://schemas.openxmlformats.org/officeDocument/2006/math">
-                      <m:sSub>
-                        <m:sSubPr>
-                          <m:ctrlPr>
-                            <a:rPr lang="pt-BR" altLang="zh-CN" sz="1800" b="1" i="1" smtClean="0">
-                              <a:latin typeface="Cambria Math" panose="02040503050406030204" pitchFamily="18" charset="0"/>
-                            </a:rPr>
-                          </m:ctrlPr>
-                        </m:sSubPr>
-                        <m:e>
-                          <m:r>
-                            <a:rPr lang="en-US" altLang="zh-CN" sz="1800" b="1" i="1" smtClean="0">
-                              <a:latin typeface="Cambria Math" panose="02040503050406030204" pitchFamily="18" charset="0"/>
-                            </a:rPr>
-                            <m:t>𝑨</m:t>
-                          </m:r>
-                        </m:e>
-                        <m:sub>
-                          <m:r>
-                            <a:rPr lang="en-US" altLang="zh-CN" sz="1800" b="1" i="1" smtClean="0">
-                              <a:latin typeface="Cambria Math" panose="02040503050406030204" pitchFamily="18" charset="0"/>
-                            </a:rPr>
-                            <m:t>𝒊</m:t>
-                          </m:r>
-                        </m:sub>
-                      </m:sSub>
-                    </m:oMath>
-                  </m:oMathPara>
-                </a14:m>
-                <a:endParaRPr dirty="0">
-                  <a:latin typeface="Times New Roman"/>
-                  <a:ea typeface="Times New Roman"/>
-                  <a:cs typeface="Times New Roman"/>
-                  <a:sym typeface="Times New Roman"/>
-                </a:endParaRPr>
-              </a:p>
-            </p:txBody>
-          </p:sp>
-        </mc:Choice>
-        <mc:Fallback>
-          <p:sp>
-            <p:nvSpPr>
-              <p:cNvPr id="47" name="Google Shape;10169;p131"/>
-              <p:cNvSpPr>
-                <a:spLocks noRot="1" noChangeAspect="1" noMove="1" noResize="1" noEditPoints="1" noAdjustHandles="1" noChangeArrowheads="1" noChangeShapeType="1" noTextEdit="1"/>
-              </p:cNvSpPr>
-              <p:nvPr/>
-            </p:nvSpPr>
-            <p:spPr>
-              <a:xfrm>
-                <a:off x="7398000" y="1658992"/>
-                <a:ext cx="772388" cy="310934"/>
-              </a:xfrm>
-              <a:prstGeom prst="roundRect">
-                <a:avLst>
-                  <a:gd name="adj" fmla="val 16667"/>
-                </a:avLst>
-              </a:prstGeom>
-              <a:blipFill>
-                <a:blip r:embed="rId4"/>
-                <a:stretch>
-                  <a:fillRect b="-9434"/>
-                </a:stretch>
-              </a:blipFill>
-              <a:ln w="12700" cap="flat" cmpd="sng">
-                <a:solidFill>
-                  <a:schemeClr val="dk2"/>
-                </a:solidFill>
-                <a:prstDash val="solid"/>
-                <a:round/>
-                <a:headEnd type="none" w="sm" len="sm"/>
-                <a:tailEnd type="none" w="sm" len="sm"/>
-              </a:ln>
-            </p:spPr>
-            <p:txBody>
-              <a:bodyPr/>
-              <a:lstStyle/>
-              <a:p>
-                <a:r>
-                  <a:rPr lang="zh-CN" altLang="en-US">
-                    <a:noFill/>
-                  </a:rPr>
-                  <a:t> </a:t>
-                </a:r>
-              </a:p>
-            </p:txBody>
-          </p:sp>
-        </mc:Fallback>
-      </mc:AlternateContent>
-      <p:pic>
-        <p:nvPicPr>
-          <p:cNvPr id="3" name="图片 2">
-            <a:extLst>
-              <a:ext uri="{FF2B5EF4-FFF2-40B4-BE49-F238E27FC236}">
-                <a16:creationId xmlns:a16="http://schemas.microsoft.com/office/drawing/2014/main" id="{547B9A90-1E43-4D4F-88E8-899E7CE8FA60}"/>
-              </a:ext>
-            </a:extLst>
-          </p:cNvPr>
-          <p:cNvPicPr>
-            <a:picLocks noChangeAspect="1"/>
-          </p:cNvPicPr>
-          <p:nvPr/>
-        </p:nvPicPr>
-        <p:blipFill>
-          <a:blip r:embed="rId5" cstate="print">
-            <a:extLst>
-              <a:ext uri="{28A0092B-C50C-407E-A947-70E740481C1C}">
-                <a14:useLocalDpi xmlns:a14="http://schemas.microsoft.com/office/drawing/2010/main" val="0"/>
-              </a:ext>
-            </a:extLst>
-          </a:blip>
-          <a:stretch>
-            <a:fillRect/>
-          </a:stretch>
-        </p:blipFill>
-        <p:spPr>
-          <a:xfrm>
-            <a:off x="6001892" y="857680"/>
-            <a:ext cx="1073128" cy="910160"/>
-          </a:xfrm>
-          <a:prstGeom prst="rect">
-            <a:avLst/>
-          </a:prstGeom>
-        </p:spPr>
-      </p:pic>
-      <p:pic>
-        <p:nvPicPr>
-          <p:cNvPr id="29" name="图片 28">
-            <a:extLst>
-              <a:ext uri="{FF2B5EF4-FFF2-40B4-BE49-F238E27FC236}">
-                <a16:creationId xmlns:a16="http://schemas.microsoft.com/office/drawing/2014/main" id="{AFEA0376-2074-4FBD-92A9-23B2F15BE882}"/>
-              </a:ext>
-            </a:extLst>
-          </p:cNvPr>
-          <p:cNvPicPr>
-            <a:picLocks noChangeAspect="1"/>
-          </p:cNvPicPr>
-          <p:nvPr/>
-        </p:nvPicPr>
-        <p:blipFill>
-          <a:blip r:embed="rId6" cstate="print">
-            <a:extLst>
-              <a:ext uri="{28A0092B-C50C-407E-A947-70E740481C1C}">
-                <a14:useLocalDpi xmlns:a14="http://schemas.microsoft.com/office/drawing/2010/main" val="0"/>
-              </a:ext>
-            </a:extLst>
-          </a:blip>
-          <a:stretch>
-            <a:fillRect/>
-          </a:stretch>
-        </p:blipFill>
-        <p:spPr>
-          <a:xfrm>
-            <a:off x="8460000" y="1531328"/>
-            <a:ext cx="681249" cy="577330"/>
-          </a:xfrm>
-          <a:prstGeom prst="rect">
-            <a:avLst/>
-          </a:prstGeom>
-        </p:spPr>
-      </p:pic>
-      <p:pic>
-        <p:nvPicPr>
-          <p:cNvPr id="30" name="图片 29">
-            <a:extLst>
-              <a:ext uri="{FF2B5EF4-FFF2-40B4-BE49-F238E27FC236}">
-                <a16:creationId xmlns:a16="http://schemas.microsoft.com/office/drawing/2014/main" id="{33E3702E-50AC-4478-B006-3AC5ED3E59DC}"/>
-              </a:ext>
-            </a:extLst>
-          </p:cNvPr>
-          <p:cNvPicPr>
-            <a:picLocks noChangeAspect="1"/>
-          </p:cNvPicPr>
-          <p:nvPr/>
-        </p:nvPicPr>
-        <p:blipFill>
-          <a:blip r:embed="rId7" cstate="print">
-            <a:extLst>
-              <a:ext uri="{28A0092B-C50C-407E-A947-70E740481C1C}">
-                <a14:useLocalDpi xmlns:a14="http://schemas.microsoft.com/office/drawing/2010/main" val="0"/>
-              </a:ext>
-            </a:extLst>
-          </a:blip>
-          <a:stretch>
-            <a:fillRect/>
-          </a:stretch>
-        </p:blipFill>
-        <p:spPr>
-          <a:xfrm>
-            <a:off x="8480625" y="613067"/>
-            <a:ext cx="681249" cy="577330"/>
-          </a:xfrm>
-          <a:prstGeom prst="rect">
-            <a:avLst/>
-          </a:prstGeom>
-        </p:spPr>
-      </p:pic>
-      <p:pic>
-        <p:nvPicPr>
-          <p:cNvPr id="31" name="图片 30">
-            <a:extLst>
-              <a:ext uri="{FF2B5EF4-FFF2-40B4-BE49-F238E27FC236}">
-                <a16:creationId xmlns:a16="http://schemas.microsoft.com/office/drawing/2014/main" id="{9B32B5D8-9E8E-4A69-827F-71FE5D6165F7}"/>
-              </a:ext>
-            </a:extLst>
-          </p:cNvPr>
-          <p:cNvPicPr>
-            <a:picLocks noChangeAspect="1"/>
-          </p:cNvPicPr>
-          <p:nvPr/>
-        </p:nvPicPr>
-        <p:blipFill>
-          <a:blip r:embed="rId8" cstate="print">
-            <a:extLst>
-              <a:ext uri="{28A0092B-C50C-407E-A947-70E740481C1C}">
-                <a14:useLocalDpi xmlns:a14="http://schemas.microsoft.com/office/drawing/2010/main" val="0"/>
-              </a:ext>
-            </a:extLst>
-          </a:blip>
-          <a:stretch>
-            <a:fillRect/>
-          </a:stretch>
-        </p:blipFill>
-        <p:spPr>
-          <a:xfrm>
-            <a:off x="2883183" y="928800"/>
-            <a:ext cx="943103" cy="799240"/>
-          </a:xfrm>
-          <a:prstGeom prst="rect">
-            <a:avLst/>
-          </a:prstGeom>
-        </p:spPr>
-      </p:pic>
-      <p:pic>
-        <p:nvPicPr>
-          <p:cNvPr id="32" name="图片 31">
-            <a:extLst>
-              <a:ext uri="{FF2B5EF4-FFF2-40B4-BE49-F238E27FC236}">
-                <a16:creationId xmlns:a16="http://schemas.microsoft.com/office/drawing/2014/main" id="{84109C07-A6AD-4275-808E-7440F96C273C}"/>
-              </a:ext>
-            </a:extLst>
-          </p:cNvPr>
-          <p:cNvPicPr>
-            <a:picLocks noChangeAspect="1"/>
-          </p:cNvPicPr>
-          <p:nvPr/>
-        </p:nvPicPr>
-        <p:blipFill>
-          <a:blip r:embed="rId9" cstate="print">
-            <a:extLst>
-              <a:ext uri="{28A0092B-C50C-407E-A947-70E740481C1C}">
-                <a14:useLocalDpi xmlns:a14="http://schemas.microsoft.com/office/drawing/2010/main" val="0"/>
-              </a:ext>
-            </a:extLst>
-          </a:blip>
-          <a:stretch>
-            <a:fillRect/>
-          </a:stretch>
-        </p:blipFill>
-        <p:spPr>
-          <a:xfrm>
-            <a:off x="120250" y="525380"/>
-            <a:ext cx="876653" cy="742927"/>
-          </a:xfrm>
-          <a:prstGeom prst="rect">
-            <a:avLst/>
-          </a:prstGeom>
-        </p:spPr>
-      </p:pic>
-      <p:pic>
-        <p:nvPicPr>
-          <p:cNvPr id="33" name="图片 32">
-            <a:extLst>
-              <a:ext uri="{FF2B5EF4-FFF2-40B4-BE49-F238E27FC236}">
-                <a16:creationId xmlns:a16="http://schemas.microsoft.com/office/drawing/2014/main" id="{7C3B6477-F527-47AB-9A97-4A25FB8EF3D9}"/>
-              </a:ext>
-            </a:extLst>
-          </p:cNvPr>
-          <p:cNvPicPr>
-            <a:picLocks noChangeAspect="1"/>
-          </p:cNvPicPr>
-          <p:nvPr/>
-        </p:nvPicPr>
-        <p:blipFill>
-          <a:blip r:embed="rId10" cstate="print">
-            <a:extLst>
-              <a:ext uri="{28A0092B-C50C-407E-A947-70E740481C1C}">
-                <a14:useLocalDpi xmlns:a14="http://schemas.microsoft.com/office/drawing/2010/main" val="0"/>
-              </a:ext>
-            </a:extLst>
-          </a:blip>
-          <a:stretch>
-            <a:fillRect/>
-          </a:stretch>
-        </p:blipFill>
-        <p:spPr>
-          <a:xfrm>
-            <a:off x="120854" y="1371943"/>
-            <a:ext cx="876653" cy="742927"/>
-          </a:xfrm>
-          <a:prstGeom prst="rect">
-            <a:avLst/>
-          </a:prstGeom>
-        </p:spPr>
-      </p:pic>
-      <p:pic>
-        <p:nvPicPr>
-          <p:cNvPr id="36" name="图片 35">
-            <a:extLst>
-              <a:ext uri="{FF2B5EF4-FFF2-40B4-BE49-F238E27FC236}">
-                <a16:creationId xmlns:a16="http://schemas.microsoft.com/office/drawing/2014/main" id="{4AB44BCA-2974-4017-80B6-212027DD82B8}"/>
-              </a:ext>
-            </a:extLst>
-          </p:cNvPr>
-          <p:cNvPicPr>
-            <a:picLocks noChangeAspect="1"/>
-          </p:cNvPicPr>
-          <p:nvPr/>
-        </p:nvPicPr>
-        <p:blipFill>
-          <a:blip r:embed="rId8" cstate="print">
-            <a:extLst>
-              <a:ext uri="{28A0092B-C50C-407E-A947-70E740481C1C}">
-                <a14:useLocalDpi xmlns:a14="http://schemas.microsoft.com/office/drawing/2010/main" val="0"/>
-              </a:ext>
-            </a:extLst>
-          </a:blip>
-          <a:stretch>
-            <a:fillRect/>
-          </a:stretch>
-        </p:blipFill>
-        <p:spPr>
-          <a:xfrm>
-            <a:off x="10884770" y="928799"/>
-            <a:ext cx="943103" cy="799240"/>
-          </a:xfrm>
-          <a:prstGeom prst="rect">
-            <a:avLst/>
-          </a:prstGeom>
-        </p:spPr>
-      </p:pic>
+              <a:rPr lang="en-US" sz="1200" b="1" dirty="0"/>
+              <a:t>Multi-scale </a:t>
+            </a:r>
+            <a:r>
+              <a:rPr lang="en-US" sz="1200" b="1" dirty="0" err="1"/>
+              <a:t>Conver</a:t>
+            </a:r>
+            <a:r>
+              <a:rPr lang="en-US" sz="1200" b="1" dirty="0"/>
+              <a:t> Branch</a:t>
+            </a:r>
+            <a:endParaRPr lang="en" sz="1200" b="1" dirty="0"/>
+          </a:p>
+        </p:txBody>
+      </p:sp>
       <p:cxnSp>
         <p:nvCxnSpPr>
-          <p:cNvPr id="16" name="连接符: 肘形 15">
+          <p:cNvPr id="77" name="连接符: 肘形 76">
             <a:extLst>
               <a:ext uri="{FF2B5EF4-FFF2-40B4-BE49-F238E27FC236}">
-                <a16:creationId xmlns:a16="http://schemas.microsoft.com/office/drawing/2014/main" id="{A3352929-F7DF-424B-998A-6727ABF7E374}"/>
+                <a16:creationId xmlns:a16="http://schemas.microsoft.com/office/drawing/2014/main" id="{F93F9760-1248-4E14-AB4E-E5B62F2DB04B}"/>
               </a:ext>
             </a:extLst>
           </p:cNvPr>
           <p:cNvCxnSpPr>
             <a:cxnSpLocks/>
+            <a:stCxn id="5" idx="0"/>
+            <a:endCxn id="72" idx="1"/>
           </p:cNvCxnSpPr>
           <p:nvPr/>
         </p:nvCxnSpPr>
         <p:spPr>
-          <a:xfrm rot="5400000" flipH="1" flipV="1">
-            <a:off x="834748" y="101965"/>
-            <a:ext cx="154120" cy="692710"/>
-          </a:xfrm>
-          <a:prstGeom prst="bentConnector2">
-            <a:avLst/>
-          </a:prstGeom>
-          <a:ln w="12700">
+          <a:xfrm flipV="1">
+            <a:off x="7424382" y="864741"/>
+            <a:ext cx="409432" cy="391228"/>
+          </a:xfrm>
+          <a:prstGeom prst="bentConnector3">
+            <a:avLst/>
+          </a:prstGeom>
+          <a:ln w="19050">
             <a:solidFill>
               <a:schemeClr val="tx1"/>
             </a:solidFill>
-            <a:prstDash val="sysDash"/>
             <a:tailEnd type="triangle"/>
           </a:ln>
         </p:spPr>
@@ -5074,32 +5140,32 @@
       </p:cxnSp>
       <p:cxnSp>
         <p:nvCxnSpPr>
-          <p:cNvPr id="54" name="连接符: 肘形 53">
+          <p:cNvPr id="79" name="连接符: 肘形 78">
             <a:extLst>
               <a:ext uri="{FF2B5EF4-FFF2-40B4-BE49-F238E27FC236}">
-                <a16:creationId xmlns:a16="http://schemas.microsoft.com/office/drawing/2014/main" id="{9A74E4A6-A0C7-43B2-A9D3-B22F4C30366C}"/>
+                <a16:creationId xmlns:a16="http://schemas.microsoft.com/office/drawing/2014/main" id="{FFB0ADDF-D860-4BF4-A624-8A16E911183B}"/>
               </a:ext>
             </a:extLst>
           </p:cNvPr>
           <p:cNvCxnSpPr>
             <a:cxnSpLocks/>
-            <a:stCxn id="33" idx="2"/>
+            <a:stCxn id="5" idx="0"/>
+            <a:endCxn id="76" idx="1"/>
           </p:cNvCxnSpPr>
           <p:nvPr/>
         </p:nvCxnSpPr>
         <p:spPr>
-          <a:xfrm rot="16200000" flipH="1">
-            <a:off x="804763" y="1869288"/>
-            <a:ext cx="205252" cy="696416"/>
-          </a:xfrm>
-          <a:prstGeom prst="bentConnector2">
-            <a:avLst/>
-          </a:prstGeom>
-          <a:ln w="12700">
+          <a:xfrm>
+            <a:off x="7424382" y="1255969"/>
+            <a:ext cx="418529" cy="418267"/>
+          </a:xfrm>
+          <a:prstGeom prst="bentConnector3">
+            <a:avLst/>
+          </a:prstGeom>
+          <a:ln w="19050">
             <a:solidFill>
               <a:schemeClr val="tx1"/>
             </a:solidFill>
-            <a:prstDash val="sysDash"/>
             <a:tailEnd type="triangle"/>
           </a:ln>
         </p:spPr>
@@ -5120,10 +5186,10 @@
       </p:cxnSp>
       <p:cxnSp>
         <p:nvCxnSpPr>
-          <p:cNvPr id="56" name="连接符: 肘形 55">
+          <p:cNvPr id="80" name="Google Shape;10001;p124">
             <a:extLst>
               <a:ext uri="{FF2B5EF4-FFF2-40B4-BE49-F238E27FC236}">
-                <a16:creationId xmlns:a16="http://schemas.microsoft.com/office/drawing/2014/main" id="{9C239A87-99BE-4C5B-85DE-EDD45071B399}"/>
+                <a16:creationId xmlns:a16="http://schemas.microsoft.com/office/drawing/2014/main" id="{270D4591-66AA-4A87-8F48-CEB95F28C40C}"/>
               </a:ext>
             </a:extLst>
           </p:cNvPr>
@@ -5133,18 +5199,55 @@
           <p:nvPr/>
         </p:nvCxnSpPr>
         <p:spPr>
-          <a:xfrm rot="16200000" flipV="1">
-            <a:off x="2718634" y="272072"/>
-            <a:ext cx="509414" cy="762789"/>
-          </a:xfrm>
-          <a:prstGeom prst="bentConnector2">
-            <a:avLst/>
-          </a:prstGeom>
-          <a:ln w="12700">
+          <a:xfrm>
+            <a:off x="11016608" y="1215534"/>
+            <a:ext cx="282737" cy="0"/>
+          </a:xfrm>
+          <a:prstGeom prst="straightConnector1">
+            <a:avLst/>
+          </a:prstGeom>
+          <a:noFill/>
+          <a:ln w="19050" cap="flat" cmpd="sng">
+            <a:solidFill>
+              <a:srgbClr val="000000"/>
+            </a:solidFill>
+            <a:prstDash val="solid"/>
+            <a:round/>
+            <a:headEnd type="none" w="med" len="med"/>
+            <a:tailEnd type="triangle" w="med" len="med"/>
+          </a:ln>
+        </p:spPr>
+      </p:cxnSp>
+      <p:cxnSp>
+        <p:nvCxnSpPr>
+          <p:cNvPr id="82" name="连接符: 肘形 81">
+            <a:extLst>
+              <a:ext uri="{FF2B5EF4-FFF2-40B4-BE49-F238E27FC236}">
+                <a16:creationId xmlns:a16="http://schemas.microsoft.com/office/drawing/2014/main" id="{E472B30F-5FD2-4E9E-A8D7-1D23414AF70A}"/>
+              </a:ext>
+            </a:extLst>
+          </p:cNvPr>
+          <p:cNvCxnSpPr>
+            <a:cxnSpLocks/>
+            <a:stCxn id="72" idx="3"/>
+            <a:endCxn id="63" idx="0"/>
+          </p:cNvCxnSpPr>
+          <p:nvPr/>
+        </p:nvCxnSpPr>
+        <p:spPr>
+          <a:xfrm>
+            <a:off x="9335069" y="864741"/>
+            <a:ext cx="729403" cy="375303"/>
+          </a:xfrm>
+          <a:prstGeom prst="bentConnector3">
+            <a:avLst>
+              <a:gd name="adj1" fmla="val 50000"/>
+            </a:avLst>
+          </a:prstGeom>
+          <a:ln w="19050">
             <a:solidFill>
               <a:schemeClr val="tx1"/>
             </a:solidFill>
-            <a:prstDash val="sysDash"/>
             <a:tailEnd type="triangle"/>
           </a:ln>
         </p:spPr>
@@ -5165,32 +5268,34 @@
       </p:cxnSp>
       <p:cxnSp>
         <p:nvCxnSpPr>
-          <p:cNvPr id="57" name="连接符: 肘形 56">
+          <p:cNvPr id="84" name="连接符: 肘形 83">
             <a:extLst>
               <a:ext uri="{FF2B5EF4-FFF2-40B4-BE49-F238E27FC236}">
-                <a16:creationId xmlns:a16="http://schemas.microsoft.com/office/drawing/2014/main" id="{DD0789C9-9521-45F3-A8AB-E842E4D92134}"/>
+                <a16:creationId xmlns:a16="http://schemas.microsoft.com/office/drawing/2014/main" id="{744CA3FD-6444-47D0-B121-E4F48EBA214E}"/>
               </a:ext>
             </a:extLst>
           </p:cNvPr>
           <p:cNvCxnSpPr>
             <a:cxnSpLocks/>
-            <a:stCxn id="31" idx="2"/>
+            <a:stCxn id="76" idx="3"/>
+            <a:endCxn id="63" idx="0"/>
           </p:cNvCxnSpPr>
           <p:nvPr/>
         </p:nvCxnSpPr>
         <p:spPr>
-          <a:xfrm rot="5400000">
-            <a:off x="2694924" y="1660311"/>
-            <a:ext cx="592082" cy="727541"/>
-          </a:xfrm>
-          <a:prstGeom prst="bentConnector2">
-            <a:avLst/>
-          </a:prstGeom>
-          <a:ln w="12700">
+          <a:xfrm flipV="1">
+            <a:off x="9344166" y="1240044"/>
+            <a:ext cx="720306" cy="434192"/>
+          </a:xfrm>
+          <a:prstGeom prst="bentConnector3">
+            <a:avLst>
+              <a:gd name="adj1" fmla="val 50000"/>
+            </a:avLst>
+          </a:prstGeom>
+          <a:ln w="19050">
             <a:solidFill>
               <a:schemeClr val="tx1"/>
             </a:solidFill>
-            <a:prstDash val="sysDash"/>
             <a:tailEnd type="triangle"/>
           </a:ln>
         </p:spPr>
@@ -5209,730 +5314,12 @@
           </a:fontRef>
         </p:style>
       </p:cxnSp>
-      <p:cxnSp>
-        <p:nvCxnSpPr>
-          <p:cNvPr id="64" name="连接符: 肘形 63">
+      <p:sp>
+        <p:nvSpPr>
+          <p:cNvPr id="87" name="Google Shape;9989;p124">
             <a:extLst>
               <a:ext uri="{FF2B5EF4-FFF2-40B4-BE49-F238E27FC236}">
-                <a16:creationId xmlns:a16="http://schemas.microsoft.com/office/drawing/2014/main" id="{E38C4271-8ABA-4A9B-843E-CCB5A2CEE782}"/>
-              </a:ext>
-            </a:extLst>
-          </p:cNvPr>
-          <p:cNvCxnSpPr>
-            <a:cxnSpLocks/>
-            <a:stCxn id="3" idx="0"/>
-          </p:cNvCxnSpPr>
-          <p:nvPr/>
-        </p:nvCxnSpPr>
-        <p:spPr>
-          <a:xfrm rot="5400000" flipH="1" flipV="1">
-            <a:off x="7698991" y="-689687"/>
-            <a:ext cx="386832" cy="2707902"/>
-          </a:xfrm>
-          <a:prstGeom prst="bentConnector2">
-            <a:avLst/>
-          </a:prstGeom>
-          <a:ln w="12700">
-            <a:solidFill>
-              <a:schemeClr val="tx1"/>
-            </a:solidFill>
-            <a:prstDash val="sysDash"/>
-            <a:tailEnd type="triangle"/>
-          </a:ln>
-        </p:spPr>
-        <p:style>
-          <a:lnRef idx="1">
-            <a:schemeClr val="accent1"/>
-          </a:lnRef>
-          <a:fillRef idx="0">
-            <a:schemeClr val="accent1"/>
-          </a:fillRef>
-          <a:effectRef idx="0">
-            <a:schemeClr val="accent1"/>
-          </a:effectRef>
-          <a:fontRef idx="minor">
-            <a:schemeClr val="tx1"/>
-          </a:fontRef>
-        </p:style>
-      </p:cxnSp>
-      <p:cxnSp>
-        <p:nvCxnSpPr>
-          <p:cNvPr id="70" name="连接符: 肘形 69">
-            <a:extLst>
-              <a:ext uri="{FF2B5EF4-FFF2-40B4-BE49-F238E27FC236}">
-                <a16:creationId xmlns:a16="http://schemas.microsoft.com/office/drawing/2014/main" id="{AB0E0789-B8AA-40CD-9442-4296A5620CB0}"/>
-              </a:ext>
-            </a:extLst>
-          </p:cNvPr>
-          <p:cNvCxnSpPr>
-            <a:cxnSpLocks/>
-            <a:stCxn id="36" idx="0"/>
-          </p:cNvCxnSpPr>
-          <p:nvPr/>
-        </p:nvCxnSpPr>
-        <p:spPr>
-          <a:xfrm rot="16200000" flipV="1">
-            <a:off x="10788872" y="361348"/>
-            <a:ext cx="437480" cy="697421"/>
-          </a:xfrm>
-          <a:prstGeom prst="bentConnector2">
-            <a:avLst/>
-          </a:prstGeom>
-          <a:ln w="12700">
-            <a:solidFill>
-              <a:schemeClr val="tx1"/>
-            </a:solidFill>
-            <a:prstDash val="sysDash"/>
-            <a:tailEnd type="triangle"/>
-          </a:ln>
-        </p:spPr>
-        <p:style>
-          <a:lnRef idx="1">
-            <a:schemeClr val="accent1"/>
-          </a:lnRef>
-          <a:fillRef idx="0">
-            <a:schemeClr val="accent1"/>
-          </a:fillRef>
-          <a:effectRef idx="0">
-            <a:schemeClr val="accent1"/>
-          </a:effectRef>
-          <a:fontRef idx="minor">
-            <a:schemeClr val="tx1"/>
-          </a:fontRef>
-        </p:style>
-      </p:cxnSp>
-      <p:sp>
-        <p:nvSpPr>
-          <p:cNvPr id="71" name="文本框 70">
-            <a:extLst>
-              <a:ext uri="{FF2B5EF4-FFF2-40B4-BE49-F238E27FC236}">
-                <a16:creationId xmlns:a16="http://schemas.microsoft.com/office/drawing/2014/main" id="{1FC788DA-F9DC-469D-909E-C5E713343E27}"/>
-              </a:ext>
-            </a:extLst>
-          </p:cNvPr>
-          <p:cNvSpPr txBox="1"/>
-          <p:nvPr/>
-        </p:nvSpPr>
-        <p:spPr>
-          <a:xfrm>
-            <a:off x="3267433" y="0"/>
-            <a:ext cx="6094854" cy="369332"/>
-          </a:xfrm>
-          <a:prstGeom prst="rect">
-            <a:avLst/>
-          </a:prstGeom>
-          <a:noFill/>
-        </p:spPr>
-        <p:txBody>
-          <a:bodyPr wrap="square">
-            <a:spAutoFit/>
-          </a:bodyPr>
-          <a:lstStyle/>
-          <a:p>
-            <a:r>
-              <a:rPr lang="en-US" altLang="zh-CN" b="1" dirty="0"/>
-              <a:t>HVI</a:t>
-            </a:r>
-            <a:r>
-              <a:rPr lang="zh-CN" altLang="en-US" b="1" dirty="0"/>
-              <a:t> Multi-Modality </a:t>
-            </a:r>
-            <a:r>
-              <a:rPr lang="en-US" altLang="zh-CN" b="1" dirty="0"/>
-              <a:t>I</a:t>
-            </a:r>
-            <a:r>
-              <a:rPr lang="zh-CN" altLang="en-US" b="1" dirty="0"/>
-              <a:t>m</a:t>
-            </a:r>
-            <a:r>
-              <a:rPr lang="en-US" altLang="zh-CN" b="1" dirty="0"/>
-              <a:t>a</a:t>
-            </a:r>
-            <a:r>
-              <a:rPr lang="zh-CN" altLang="en-US" b="1" dirty="0"/>
-              <a:t>ge </a:t>
-            </a:r>
-            <a:r>
-              <a:rPr lang="en-US" altLang="zh-CN" b="1" dirty="0"/>
-              <a:t>F</a:t>
-            </a:r>
-            <a:r>
-              <a:rPr lang="zh-CN" altLang="en-US" b="1" dirty="0"/>
-              <a:t>usion (</a:t>
-            </a:r>
-            <a:r>
-              <a:rPr lang="en-US" altLang="zh-CN" b="1" dirty="0"/>
-              <a:t>H</a:t>
-            </a:r>
-            <a:r>
-              <a:rPr lang="zh-CN" altLang="en-US" b="1" dirty="0"/>
-              <a:t>M</a:t>
-            </a:r>
-            <a:r>
-              <a:rPr lang="en-US" altLang="zh-CN" b="1" dirty="0"/>
-              <a:t>IF</a:t>
-            </a:r>
-            <a:r>
-              <a:rPr lang="zh-CN" altLang="en-US" b="1" dirty="0"/>
-              <a:t>)</a:t>
-            </a:r>
-          </a:p>
-        </p:txBody>
-      </p:sp>
-      <p:sp>
-        <p:nvSpPr>
-          <p:cNvPr id="73" name="Google Shape;8410;p96">
-            <a:extLst>
-              <a:ext uri="{FF2B5EF4-FFF2-40B4-BE49-F238E27FC236}">
-                <a16:creationId xmlns:a16="http://schemas.microsoft.com/office/drawing/2014/main" id="{E8F9CF38-823D-4F89-B6A6-CE2927C436FF}"/>
-              </a:ext>
-            </a:extLst>
-          </p:cNvPr>
-          <p:cNvSpPr txBox="1"/>
-          <p:nvPr/>
-        </p:nvSpPr>
-        <p:spPr>
-          <a:xfrm>
-            <a:off x="143823" y="276971"/>
-            <a:ext cx="929666" cy="229951"/>
-          </a:xfrm>
-          <a:prstGeom prst="rect">
-            <a:avLst/>
-          </a:prstGeom>
-          <a:noFill/>
-          <a:ln>
-            <a:noFill/>
-          </a:ln>
-        </p:spPr>
-        <p:txBody>
-          <a:bodyPr spcFirstLastPara="1" wrap="square" lIns="91425" tIns="91425" rIns="91425" bIns="91425" anchor="t" anchorCtr="0">
-            <a:noAutofit/>
-          </a:bodyPr>
-          <a:lstStyle/>
-          <a:p>
-            <a:pPr marL="0" lvl="0" indent="0" algn="l" rtl="0">
-              <a:spcBef>
-                <a:spcPts val="0"/>
-              </a:spcBef>
-              <a:spcAft>
-                <a:spcPts val="0"/>
-              </a:spcAft>
-              <a:buNone/>
-            </a:pPr>
-            <a:r>
-              <a:rPr lang="en" sz="1000" b="1" dirty="0"/>
-              <a:t>Input visible</a:t>
-            </a:r>
-            <a:endParaRPr sz="1000" b="1" dirty="0"/>
-          </a:p>
-        </p:txBody>
-      </p:sp>
-      <p:sp>
-        <p:nvSpPr>
-          <p:cNvPr id="74" name="Google Shape;8410;p96">
-            <a:extLst>
-              <a:ext uri="{FF2B5EF4-FFF2-40B4-BE49-F238E27FC236}">
-                <a16:creationId xmlns:a16="http://schemas.microsoft.com/office/drawing/2014/main" id="{0D54AF3D-8AD5-461E-BA38-0D38B2DCA39D}"/>
-              </a:ext>
-            </a:extLst>
-          </p:cNvPr>
-          <p:cNvSpPr txBox="1"/>
-          <p:nvPr/>
-        </p:nvSpPr>
-        <p:spPr>
-          <a:xfrm>
-            <a:off x="143389" y="2054511"/>
-            <a:ext cx="1057053" cy="265823"/>
-          </a:xfrm>
-          <a:prstGeom prst="rect">
-            <a:avLst/>
-          </a:prstGeom>
-          <a:noFill/>
-          <a:ln>
-            <a:noFill/>
-          </a:ln>
-        </p:spPr>
-        <p:txBody>
-          <a:bodyPr spcFirstLastPara="1" wrap="square" lIns="91425" tIns="91425" rIns="91425" bIns="91425" anchor="t" anchorCtr="0">
-            <a:noAutofit/>
-          </a:bodyPr>
-          <a:lstStyle/>
-          <a:p>
-            <a:pPr marL="0" lvl="0" indent="0" algn="l" rtl="0">
-              <a:spcBef>
-                <a:spcPts val="0"/>
-              </a:spcBef>
-              <a:spcAft>
-                <a:spcPts val="0"/>
-              </a:spcAft>
-              <a:buNone/>
-            </a:pPr>
-            <a:r>
-              <a:rPr lang="en" sz="1000" b="1" dirty="0"/>
-              <a:t>Input I</a:t>
-            </a:r>
-            <a:r>
-              <a:rPr lang="en-US" altLang="zh-CN" sz="1000" b="1" dirty="0" err="1"/>
-              <a:t>nfrared</a:t>
-            </a:r>
-            <a:endParaRPr sz="1000" b="1" dirty="0"/>
-          </a:p>
-        </p:txBody>
-      </p:sp>
-      <p:cxnSp>
-        <p:nvCxnSpPr>
-          <p:cNvPr id="75" name="连接符: 肘形 74">
-            <a:extLst>
-              <a:ext uri="{FF2B5EF4-FFF2-40B4-BE49-F238E27FC236}">
-                <a16:creationId xmlns:a16="http://schemas.microsoft.com/office/drawing/2014/main" id="{79ABDCA6-E04A-4C1C-ADAF-CB96131D44B0}"/>
-              </a:ext>
-            </a:extLst>
-          </p:cNvPr>
-          <p:cNvCxnSpPr>
-            <a:cxnSpLocks/>
-            <a:stCxn id="32" idx="3"/>
-            <a:endCxn id="22" idx="1"/>
-          </p:cNvCxnSpPr>
-          <p:nvPr/>
-        </p:nvCxnSpPr>
-        <p:spPr>
-          <a:xfrm>
-            <a:off x="996903" y="896844"/>
-            <a:ext cx="436558" cy="428406"/>
-          </a:xfrm>
-          <a:prstGeom prst="bentConnector3">
-            <a:avLst/>
-          </a:prstGeom>
-          <a:ln w="12700">
-            <a:solidFill>
-              <a:schemeClr val="tx1"/>
-            </a:solidFill>
-            <a:tailEnd type="triangle"/>
-          </a:ln>
-        </p:spPr>
-        <p:style>
-          <a:lnRef idx="1">
-            <a:schemeClr val="accent1"/>
-          </a:lnRef>
-          <a:fillRef idx="0">
-            <a:schemeClr val="accent1"/>
-          </a:fillRef>
-          <a:effectRef idx="0">
-            <a:schemeClr val="accent1"/>
-          </a:effectRef>
-          <a:fontRef idx="minor">
-            <a:schemeClr val="tx1"/>
-          </a:fontRef>
-        </p:style>
-      </p:cxnSp>
-      <p:cxnSp>
-        <p:nvCxnSpPr>
-          <p:cNvPr id="78" name="连接符: 肘形 77">
-            <a:extLst>
-              <a:ext uri="{FF2B5EF4-FFF2-40B4-BE49-F238E27FC236}">
-                <a16:creationId xmlns:a16="http://schemas.microsoft.com/office/drawing/2014/main" id="{F9AF7412-40A6-405C-8378-9E3F1FD043BE}"/>
-              </a:ext>
-            </a:extLst>
-          </p:cNvPr>
-          <p:cNvCxnSpPr>
-            <a:cxnSpLocks/>
-            <a:stCxn id="33" idx="3"/>
-            <a:endCxn id="22" idx="1"/>
-          </p:cNvCxnSpPr>
-          <p:nvPr/>
-        </p:nvCxnSpPr>
-        <p:spPr>
-          <a:xfrm flipV="1">
-            <a:off x="997507" y="1325250"/>
-            <a:ext cx="435954" cy="418157"/>
-          </a:xfrm>
-          <a:prstGeom prst="bentConnector3">
-            <a:avLst/>
-          </a:prstGeom>
-          <a:ln w="12700">
-            <a:solidFill>
-              <a:schemeClr val="tx1"/>
-            </a:solidFill>
-            <a:tailEnd type="triangle"/>
-          </a:ln>
-        </p:spPr>
-        <p:style>
-          <a:lnRef idx="1">
-            <a:schemeClr val="accent1"/>
-          </a:lnRef>
-          <a:fillRef idx="0">
-            <a:schemeClr val="accent1"/>
-          </a:fillRef>
-          <a:effectRef idx="0">
-            <a:schemeClr val="accent1"/>
-          </a:effectRef>
-          <a:fontRef idx="minor">
-            <a:schemeClr val="tx1"/>
-          </a:fontRef>
-        </p:style>
-      </p:cxnSp>
-      <p:cxnSp>
-        <p:nvCxnSpPr>
-          <p:cNvPr id="81" name="Google Shape;10001;p124">
-            <a:extLst>
-              <a:ext uri="{FF2B5EF4-FFF2-40B4-BE49-F238E27FC236}">
-                <a16:creationId xmlns:a16="http://schemas.microsoft.com/office/drawing/2014/main" id="{69799628-0B94-4FC8-A7D0-B2F039EE6FE8}"/>
-              </a:ext>
-            </a:extLst>
-          </p:cNvPr>
-          <p:cNvCxnSpPr>
-            <a:cxnSpLocks/>
-            <a:stCxn id="22" idx="3"/>
-            <a:endCxn id="31" idx="1"/>
-          </p:cNvCxnSpPr>
-          <p:nvPr/>
-        </p:nvCxnSpPr>
-        <p:spPr>
-          <a:xfrm>
-            <a:off x="2440693" y="1325250"/>
-            <a:ext cx="442490" cy="3170"/>
-          </a:xfrm>
-          <a:prstGeom prst="straightConnector1">
-            <a:avLst/>
-          </a:prstGeom>
-          <a:noFill/>
-          <a:ln w="19050" cap="flat" cmpd="sng">
-            <a:solidFill>
-              <a:srgbClr val="000000"/>
-            </a:solidFill>
-            <a:prstDash val="solid"/>
-            <a:round/>
-            <a:headEnd type="none" w="med" len="med"/>
-            <a:tailEnd type="triangle" w="med" len="med"/>
-          </a:ln>
-        </p:spPr>
-      </p:cxnSp>
-      <p:cxnSp>
-        <p:nvCxnSpPr>
-          <p:cNvPr id="85" name="Google Shape;10001;p124">
-            <a:extLst>
-              <a:ext uri="{FF2B5EF4-FFF2-40B4-BE49-F238E27FC236}">
-                <a16:creationId xmlns:a16="http://schemas.microsoft.com/office/drawing/2014/main" id="{BFA43D49-AE42-46E9-9750-E7AA0438CDBE}"/>
-              </a:ext>
-            </a:extLst>
-          </p:cNvPr>
-          <p:cNvCxnSpPr>
-            <a:cxnSpLocks/>
-            <a:endCxn id="34" idx="1"/>
-          </p:cNvCxnSpPr>
-          <p:nvPr/>
-        </p:nvCxnSpPr>
-        <p:spPr>
-          <a:xfrm>
-            <a:off x="3825240" y="1328083"/>
-            <a:ext cx="360557" cy="0"/>
-          </a:xfrm>
-          <a:prstGeom prst="straightConnector1">
-            <a:avLst/>
-          </a:prstGeom>
-          <a:noFill/>
-          <a:ln w="19050" cap="flat" cmpd="sng">
-            <a:solidFill>
-              <a:srgbClr val="000000"/>
-            </a:solidFill>
-            <a:prstDash val="solid"/>
-            <a:round/>
-            <a:headEnd type="none" w="med" len="med"/>
-            <a:tailEnd type="triangle" w="med" len="med"/>
-          </a:ln>
-        </p:spPr>
-      </p:cxnSp>
-      <p:cxnSp>
-        <p:nvCxnSpPr>
-          <p:cNvPr id="92" name="Google Shape;10001;p124">
-            <a:extLst>
-              <a:ext uri="{FF2B5EF4-FFF2-40B4-BE49-F238E27FC236}">
-                <a16:creationId xmlns:a16="http://schemas.microsoft.com/office/drawing/2014/main" id="{B5570E1E-5CD5-4954-A002-9A9791890FAB}"/>
-              </a:ext>
-            </a:extLst>
-          </p:cNvPr>
-          <p:cNvCxnSpPr>
-            <a:cxnSpLocks/>
-          </p:cNvCxnSpPr>
-          <p:nvPr/>
-        </p:nvCxnSpPr>
-        <p:spPr>
-          <a:xfrm>
-            <a:off x="5569973" y="1315090"/>
-            <a:ext cx="442490" cy="3170"/>
-          </a:xfrm>
-          <a:prstGeom prst="straightConnector1">
-            <a:avLst/>
-          </a:prstGeom>
-          <a:noFill/>
-          <a:ln w="19050" cap="flat" cmpd="sng">
-            <a:solidFill>
-              <a:srgbClr val="000000"/>
-            </a:solidFill>
-            <a:prstDash val="solid"/>
-            <a:round/>
-            <a:headEnd type="none" w="med" len="med"/>
-            <a:tailEnd type="triangle" w="med" len="med"/>
-          </a:ln>
-        </p:spPr>
-      </p:cxnSp>
-      <p:cxnSp>
-        <p:nvCxnSpPr>
-          <p:cNvPr id="93" name="连接符: 肘形 92">
-            <a:extLst>
-              <a:ext uri="{FF2B5EF4-FFF2-40B4-BE49-F238E27FC236}">
-                <a16:creationId xmlns:a16="http://schemas.microsoft.com/office/drawing/2014/main" id="{65593034-29B0-4B2C-B381-DF7572B2ACC8}"/>
-              </a:ext>
-            </a:extLst>
-          </p:cNvPr>
-          <p:cNvCxnSpPr>
-            <a:cxnSpLocks/>
-            <a:stCxn id="3" idx="3"/>
-            <a:endCxn id="41" idx="1"/>
-          </p:cNvCxnSpPr>
-          <p:nvPr/>
-        </p:nvCxnSpPr>
-        <p:spPr>
-          <a:xfrm flipV="1">
-            <a:off x="7075020" y="837997"/>
-            <a:ext cx="322980" cy="474763"/>
-          </a:xfrm>
-          <a:prstGeom prst="bentConnector3">
-            <a:avLst/>
-          </a:prstGeom>
-          <a:ln w="12700">
-            <a:solidFill>
-              <a:schemeClr val="tx1"/>
-            </a:solidFill>
-            <a:tailEnd type="triangle"/>
-          </a:ln>
-        </p:spPr>
-        <p:style>
-          <a:lnRef idx="1">
-            <a:schemeClr val="accent1"/>
-          </a:lnRef>
-          <a:fillRef idx="0">
-            <a:schemeClr val="accent1"/>
-          </a:fillRef>
-          <a:effectRef idx="0">
-            <a:schemeClr val="accent1"/>
-          </a:effectRef>
-          <a:fontRef idx="minor">
-            <a:schemeClr val="tx1"/>
-          </a:fontRef>
-        </p:style>
-      </p:cxnSp>
-      <p:cxnSp>
-        <p:nvCxnSpPr>
-          <p:cNvPr id="94" name="连接符: 肘形 93">
-            <a:extLst>
-              <a:ext uri="{FF2B5EF4-FFF2-40B4-BE49-F238E27FC236}">
-                <a16:creationId xmlns:a16="http://schemas.microsoft.com/office/drawing/2014/main" id="{2A8C301F-86E7-460C-9242-B3686991DB92}"/>
-              </a:ext>
-            </a:extLst>
-          </p:cNvPr>
-          <p:cNvCxnSpPr>
-            <a:cxnSpLocks/>
-            <a:stCxn id="3" idx="3"/>
-            <a:endCxn id="47" idx="1"/>
-          </p:cNvCxnSpPr>
-          <p:nvPr/>
-        </p:nvCxnSpPr>
-        <p:spPr>
-          <a:xfrm>
-            <a:off x="7075020" y="1312760"/>
-            <a:ext cx="322980" cy="501699"/>
-          </a:xfrm>
-          <a:prstGeom prst="bentConnector3">
-            <a:avLst>
-              <a:gd name="adj1" fmla="val 50000"/>
-            </a:avLst>
-          </a:prstGeom>
-          <a:ln w="12700">
-            <a:solidFill>
-              <a:schemeClr val="tx1"/>
-            </a:solidFill>
-            <a:tailEnd type="triangle"/>
-          </a:ln>
-        </p:spPr>
-        <p:style>
-          <a:lnRef idx="1">
-            <a:schemeClr val="accent1"/>
-          </a:lnRef>
-          <a:fillRef idx="0">
-            <a:schemeClr val="accent1"/>
-          </a:fillRef>
-          <a:effectRef idx="0">
-            <a:schemeClr val="accent1"/>
-          </a:effectRef>
-          <a:fontRef idx="minor">
-            <a:schemeClr val="tx1"/>
-          </a:fontRef>
-        </p:style>
-      </p:cxnSp>
-      <p:cxnSp>
-        <p:nvCxnSpPr>
-          <p:cNvPr id="104" name="Google Shape;10001;p124">
-            <a:extLst>
-              <a:ext uri="{FF2B5EF4-FFF2-40B4-BE49-F238E27FC236}">
-                <a16:creationId xmlns:a16="http://schemas.microsoft.com/office/drawing/2014/main" id="{73C541E9-884A-4491-8531-8CA1D167A812}"/>
-              </a:ext>
-            </a:extLst>
-          </p:cNvPr>
-          <p:cNvCxnSpPr>
-            <a:cxnSpLocks/>
-          </p:cNvCxnSpPr>
-          <p:nvPr/>
-        </p:nvCxnSpPr>
-        <p:spPr>
-          <a:xfrm flipV="1">
-            <a:off x="8197440" y="841848"/>
-            <a:ext cx="265916" cy="1"/>
-          </a:xfrm>
-          <a:prstGeom prst="straightConnector1">
-            <a:avLst/>
-          </a:prstGeom>
-          <a:noFill/>
-          <a:ln w="19050" cap="flat" cmpd="sng">
-            <a:solidFill>
-              <a:srgbClr val="000000"/>
-            </a:solidFill>
-            <a:prstDash val="solid"/>
-            <a:round/>
-            <a:headEnd type="none" w="med" len="med"/>
-            <a:tailEnd type="triangle" w="med" len="med"/>
-          </a:ln>
-        </p:spPr>
-      </p:cxnSp>
-      <p:cxnSp>
-        <p:nvCxnSpPr>
-          <p:cNvPr id="108" name="Google Shape;10001;p124">
-            <a:extLst>
-              <a:ext uri="{FF2B5EF4-FFF2-40B4-BE49-F238E27FC236}">
-                <a16:creationId xmlns:a16="http://schemas.microsoft.com/office/drawing/2014/main" id="{B8C02853-B2CF-4CA0-A399-094958B02F28}"/>
-              </a:ext>
-            </a:extLst>
-          </p:cNvPr>
-          <p:cNvCxnSpPr>
-            <a:cxnSpLocks/>
-          </p:cNvCxnSpPr>
-          <p:nvPr/>
-        </p:nvCxnSpPr>
-        <p:spPr>
-          <a:xfrm flipV="1">
-            <a:off x="8184836" y="1812395"/>
-            <a:ext cx="265916" cy="1"/>
-          </a:xfrm>
-          <a:prstGeom prst="straightConnector1">
-            <a:avLst/>
-          </a:prstGeom>
-          <a:noFill/>
-          <a:ln w="19050" cap="flat" cmpd="sng">
-            <a:solidFill>
-              <a:srgbClr val="000000"/>
-            </a:solidFill>
-            <a:prstDash val="solid"/>
-            <a:round/>
-            <a:headEnd type="none" w="med" len="med"/>
-            <a:tailEnd type="triangle" w="med" len="med"/>
-          </a:ln>
-        </p:spPr>
-      </p:cxnSp>
-      <p:cxnSp>
-        <p:nvCxnSpPr>
-          <p:cNvPr id="109" name="连接符: 肘形 108">
-            <a:extLst>
-              <a:ext uri="{FF2B5EF4-FFF2-40B4-BE49-F238E27FC236}">
-                <a16:creationId xmlns:a16="http://schemas.microsoft.com/office/drawing/2014/main" id="{C9A35B60-4166-48CF-BC95-E9543D76502A}"/>
-              </a:ext>
-            </a:extLst>
-          </p:cNvPr>
-          <p:cNvCxnSpPr>
-            <a:cxnSpLocks/>
-          </p:cNvCxnSpPr>
-          <p:nvPr/>
-        </p:nvCxnSpPr>
-        <p:spPr>
-          <a:xfrm>
-            <a:off x="9165772" y="904865"/>
-            <a:ext cx="436558" cy="428406"/>
-          </a:xfrm>
-          <a:prstGeom prst="bentConnector3">
-            <a:avLst/>
-          </a:prstGeom>
-          <a:ln w="12700">
-            <a:solidFill>
-              <a:schemeClr val="tx1"/>
-            </a:solidFill>
-            <a:tailEnd type="triangle"/>
-          </a:ln>
-        </p:spPr>
-        <p:style>
-          <a:lnRef idx="1">
-            <a:schemeClr val="accent1"/>
-          </a:lnRef>
-          <a:fillRef idx="0">
-            <a:schemeClr val="accent1"/>
-          </a:fillRef>
-          <a:effectRef idx="0">
-            <a:schemeClr val="accent1"/>
-          </a:effectRef>
-          <a:fontRef idx="minor">
-            <a:schemeClr val="tx1"/>
-          </a:fontRef>
-        </p:style>
-      </p:cxnSp>
-      <p:cxnSp>
-        <p:nvCxnSpPr>
-          <p:cNvPr id="110" name="连接符: 肘形 109">
-            <a:extLst>
-              <a:ext uri="{FF2B5EF4-FFF2-40B4-BE49-F238E27FC236}">
-                <a16:creationId xmlns:a16="http://schemas.microsoft.com/office/drawing/2014/main" id="{3EF06F3D-B5A1-4605-A80F-683F1AD80A81}"/>
-              </a:ext>
-            </a:extLst>
-          </p:cNvPr>
-          <p:cNvCxnSpPr>
-            <a:cxnSpLocks/>
-          </p:cNvCxnSpPr>
-          <p:nvPr/>
-        </p:nvCxnSpPr>
-        <p:spPr>
-          <a:xfrm flipV="1">
-            <a:off x="9166376" y="1333271"/>
-            <a:ext cx="435954" cy="418157"/>
-          </a:xfrm>
-          <a:prstGeom prst="bentConnector3">
-            <a:avLst/>
-          </a:prstGeom>
-          <a:ln w="12700">
-            <a:solidFill>
-              <a:schemeClr val="tx1"/>
-            </a:solidFill>
-            <a:tailEnd type="triangle"/>
-          </a:ln>
-        </p:spPr>
-        <p:style>
-          <a:lnRef idx="1">
-            <a:schemeClr val="accent1"/>
-          </a:lnRef>
-          <a:fillRef idx="0">
-            <a:schemeClr val="accent1"/>
-          </a:fillRef>
-          <a:effectRef idx="0">
-            <a:schemeClr val="accent1"/>
-          </a:effectRef>
-          <a:fontRef idx="minor">
-            <a:schemeClr val="tx1"/>
-          </a:fontRef>
-        </p:style>
-      </p:cxnSp>
-      <p:sp>
-        <p:nvSpPr>
-          <p:cNvPr id="111" name="Google Shape;9989;p124">
-            <a:extLst>
-              <a:ext uri="{FF2B5EF4-FFF2-40B4-BE49-F238E27FC236}">
-                <a16:creationId xmlns:a16="http://schemas.microsoft.com/office/drawing/2014/main" id="{A722B676-ED3C-48B6-B13E-73BCCB6C1B6D}"/>
+                <a16:creationId xmlns:a16="http://schemas.microsoft.com/office/drawing/2014/main" id="{895F90D7-C3DF-4C4B-86B7-17310B22D26C}"/>
               </a:ext>
             </a:extLst>
           </p:cNvPr>
@@ -5941,8 +5328,8 @@
         </p:nvSpPr>
         <p:spPr>
           <a:xfrm>
-            <a:off x="9602330" y="1050397"/>
-            <a:ext cx="1007232" cy="634500"/>
+            <a:off x="9412670" y="1100167"/>
+            <a:ext cx="523355" cy="259968"/>
           </a:xfrm>
           <a:prstGeom prst="roundRect">
             <a:avLst>
@@ -5950,14 +5337,17 @@
             </a:avLst>
           </a:prstGeom>
           <a:solidFill>
-            <a:schemeClr val="accent4">
+            <a:schemeClr val="accent3">
               <a:lumMod val="20000"/>
               <a:lumOff val="80000"/>
             </a:schemeClr>
           </a:solidFill>
           <a:ln w="12700" cap="flat" cmpd="sng">
             <a:solidFill>
-              <a:srgbClr val="000000"/>
+              <a:schemeClr val="accent3">
+                <a:lumMod val="40000"/>
+                <a:lumOff val="60000"/>
+              </a:schemeClr>
             </a:solidFill>
             <a:prstDash val="solid"/>
             <a:round/>
@@ -5981,10 +5371,51 @@
               <a:buNone/>
             </a:pPr>
             <a:r>
-              <a:rPr lang="en" dirty="0"/>
-              <a:t>HVI</a:t>
-            </a:r>
-          </a:p>
+              <a:rPr lang="en-US" sz="1200" b="1" dirty="0"/>
+              <a:t>Fuse</a:t>
+            </a:r>
+            <a:endParaRPr sz="1200" b="1" dirty="0"/>
+          </a:p>
+        </p:txBody>
+      </p:sp>
+      <p:sp>
+        <p:nvSpPr>
+          <p:cNvPr id="95" name="Google Shape;10204;p134">
+            <a:extLst>
+              <a:ext uri="{FF2B5EF4-FFF2-40B4-BE49-F238E27FC236}">
+                <a16:creationId xmlns:a16="http://schemas.microsoft.com/office/drawing/2014/main" id="{12C525B0-1845-4134-8378-02C3E0A44C9B}"/>
+              </a:ext>
+            </a:extLst>
+          </p:cNvPr>
+          <p:cNvSpPr/>
+          <p:nvPr/>
+        </p:nvSpPr>
+        <p:spPr>
+          <a:xfrm>
+            <a:off x="1362987" y="223909"/>
+            <a:ext cx="1034472" cy="972546"/>
+          </a:xfrm>
+          <a:prstGeom prst="roundRect">
+            <a:avLst>
+              <a:gd name="adj" fmla="val 16667"/>
+            </a:avLst>
+          </a:prstGeom>
+          <a:noFill/>
+          <a:ln w="9525" cap="flat" cmpd="sng">
+            <a:solidFill>
+              <a:schemeClr val="dk1"/>
+            </a:solidFill>
+            <a:prstDash val="lgDash"/>
+            <a:round/>
+            <a:headEnd type="none" w="sm" len="sm"/>
+            <a:tailEnd type="none" w="sm" len="sm"/>
+          </a:ln>
+        </p:spPr>
+        <p:txBody>
+          <a:bodyPr spcFirstLastPara="1" wrap="square" lIns="91425" tIns="91425" rIns="91425" bIns="91425" anchor="ctr" anchorCtr="0">
+            <a:noAutofit/>
+          </a:bodyPr>
+          <a:lstStyle/>
           <a:p>
             <a:pPr marL="0" lvl="0" indent="0" algn="ctr" rtl="0">
               <a:spcBef>
@@ -5996,763 +5427,94 @@
               <a:buNone/>
             </a:pPr>
             <a:r>
-              <a:rPr lang="en" dirty="0"/>
-              <a:t>Fuser</a:t>
-            </a:r>
-            <a:endParaRPr dirty="0"/>
-          </a:p>
-        </p:txBody>
-      </p:sp>
-      <p:cxnSp>
-        <p:nvCxnSpPr>
-          <p:cNvPr id="113" name="Google Shape;10001;p124">
-            <a:extLst>
-              <a:ext uri="{FF2B5EF4-FFF2-40B4-BE49-F238E27FC236}">
-                <a16:creationId xmlns:a16="http://schemas.microsoft.com/office/drawing/2014/main" id="{32632C33-6B6A-436B-8893-F8D5A553612E}"/>
-              </a:ext>
-            </a:extLst>
-          </p:cNvPr>
-          <p:cNvCxnSpPr>
-            <a:cxnSpLocks/>
-            <a:endCxn id="36" idx="1"/>
-          </p:cNvCxnSpPr>
-          <p:nvPr/>
-        </p:nvCxnSpPr>
-        <p:spPr>
-          <a:xfrm>
-            <a:off x="10610632" y="1316235"/>
-            <a:ext cx="274138" cy="12184"/>
-          </a:xfrm>
-          <a:prstGeom prst="straightConnector1">
-            <a:avLst/>
-          </a:prstGeom>
-          <a:noFill/>
-          <a:ln w="19050" cap="flat" cmpd="sng">
-            <a:solidFill>
-              <a:srgbClr val="000000"/>
-            </a:solidFill>
-            <a:prstDash val="solid"/>
-            <a:round/>
-            <a:headEnd type="none" w="med" len="med"/>
-            <a:tailEnd type="triangle" w="med" len="med"/>
-          </a:ln>
-        </p:spPr>
-      </p:cxnSp>
-      <mc:AlternateContent xmlns:mc="http://schemas.openxmlformats.org/markup-compatibility/2006">
-        <mc:Choice xmlns:a14="http://schemas.microsoft.com/office/drawing/2010/main" Requires="a14">
-          <p:sp>
-            <p:nvSpPr>
-              <p:cNvPr id="114" name="Google Shape;8410;p96">
-                <a:extLst>
-                  <a:ext uri="{FF2B5EF4-FFF2-40B4-BE49-F238E27FC236}">
-                    <a16:creationId xmlns:a16="http://schemas.microsoft.com/office/drawing/2014/main" id="{0E1AFA0A-C128-490B-A386-B98CAFCFC338}"/>
-                  </a:ext>
-                </a:extLst>
-              </p:cNvPr>
-              <p:cNvSpPr txBox="1"/>
-              <p:nvPr/>
-            </p:nvSpPr>
-            <p:spPr>
-              <a:xfrm>
-                <a:off x="1292640" y="177420"/>
-                <a:ext cx="1293611" cy="361667"/>
-              </a:xfrm>
-              <a:prstGeom prst="rect">
-                <a:avLst/>
-              </a:prstGeom>
-              <a:noFill/>
-              <a:ln w="12700">
-                <a:solidFill>
-                  <a:schemeClr val="tx1"/>
-                </a:solidFill>
-                <a:prstDash val="sysDash"/>
-              </a:ln>
-            </p:spPr>
-            <p:txBody>
-              <a:bodyPr spcFirstLastPara="1" wrap="square" lIns="91425" tIns="91425" rIns="91425" bIns="91425" anchor="t" anchorCtr="0">
-                <a:noAutofit/>
-              </a:bodyPr>
-              <a:lstStyle/>
-              <a:p>
-                <a:pPr lvl="0"/>
-                <a14:m>
-                  <m:oMathPara xmlns:m="http://schemas.openxmlformats.org/officeDocument/2006/math">
-                    <m:oMathParaPr>
-                      <m:jc m:val="centerGroup"/>
-                    </m:oMathParaPr>
-                    <m:oMath xmlns:m="http://schemas.openxmlformats.org/officeDocument/2006/math">
-                      <m:r>
-                        <a:rPr lang="en-US" sz="1600" b="1" i="1" smtClean="0">
-                          <a:latin typeface="Cambria Math" panose="02040503050406030204" pitchFamily="18" charset="0"/>
-                        </a:rPr>
-                        <m:t>𝑳</m:t>
-                      </m:r>
-                      <m:d>
-                        <m:dPr>
-                          <m:ctrlPr>
-                            <a:rPr lang="pt-BR" sz="1600" b="1" i="1" smtClean="0">
-                              <a:latin typeface="Cambria Math" panose="02040503050406030204" pitchFamily="18" charset="0"/>
-                            </a:rPr>
-                          </m:ctrlPr>
-                        </m:dPr>
-                        <m:e>
-                          <m:sSub>
-                            <m:sSubPr>
-                              <m:ctrlPr>
-                                <a:rPr lang="pt-BR" altLang="zh-CN" sz="1600" b="1" i="1">
-                                  <a:latin typeface="Cambria Math" panose="02040503050406030204" pitchFamily="18" charset="0"/>
-                                </a:rPr>
-                              </m:ctrlPr>
-                            </m:sSubPr>
-                            <m:e>
-                              <m:r>
-                                <a:rPr lang="en-US" altLang="zh-CN" sz="1600" b="1" i="1" smtClean="0">
-                                  <a:latin typeface="Cambria Math" panose="02040503050406030204" pitchFamily="18" charset="0"/>
-                                </a:rPr>
-                                <m:t>𝑨</m:t>
-                              </m:r>
-                            </m:e>
-                            <m:sub>
-                              <m:r>
-                                <a:rPr lang="en-US" altLang="zh-CN" sz="1600" b="1" i="1" smtClean="0">
-                                  <a:latin typeface="Cambria Math" panose="02040503050406030204" pitchFamily="18" charset="0"/>
-                                </a:rPr>
-                                <m:t>𝒗</m:t>
-                              </m:r>
-                            </m:sub>
-                          </m:sSub>
-                          <m:d>
-                            <m:dPr>
-                              <m:ctrlPr>
-                                <a:rPr lang="en-US" altLang="zh-CN" sz="1600" b="1" i="1" smtClean="0">
-                                  <a:latin typeface="Cambria Math" panose="02040503050406030204" pitchFamily="18" charset="0"/>
-                                </a:rPr>
-                              </m:ctrlPr>
-                            </m:dPr>
-                            <m:e>
-                              <m:r>
-                                <a:rPr lang="en-US" altLang="zh-CN" sz="1600" b="1" i="1" smtClean="0">
-                                  <a:latin typeface="Cambria Math" panose="02040503050406030204" pitchFamily="18" charset="0"/>
-                                </a:rPr>
-                                <m:t>𝒇</m:t>
-                              </m:r>
-                            </m:e>
-                          </m:d>
-                          <m:r>
-                            <a:rPr lang="en-US" altLang="zh-CN" sz="1600" b="1" i="1" smtClean="0">
-                              <a:latin typeface="Cambria Math" panose="02040503050406030204" pitchFamily="18" charset="0"/>
-                            </a:rPr>
-                            <m:t>,</m:t>
-                          </m:r>
-                          <m:r>
-                            <a:rPr lang="en-US" altLang="zh-CN" sz="1600" b="1" i="1" smtClean="0">
-                              <a:latin typeface="Cambria Math" panose="02040503050406030204" pitchFamily="18" charset="0"/>
-                            </a:rPr>
-                            <m:t>𝒗</m:t>
-                          </m:r>
-                        </m:e>
-                      </m:d>
-                    </m:oMath>
-                  </m:oMathPara>
-                </a14:m>
-                <a:endParaRPr sz="1600" b="1" dirty="0"/>
-              </a:p>
-            </p:txBody>
-          </p:sp>
-        </mc:Choice>
-        <mc:Fallback>
-          <p:sp>
-            <p:nvSpPr>
-              <p:cNvPr id="114" name="Google Shape;8410;p96">
-                <a:extLst>
-                  <a:ext uri="{FF2B5EF4-FFF2-40B4-BE49-F238E27FC236}">
-                    <a16:creationId xmlns:a16="http://schemas.microsoft.com/office/drawing/2014/main" id="{0E1AFA0A-C128-490B-A386-B98CAFCFC338}"/>
-                  </a:ext>
-                </a:extLst>
-              </p:cNvPr>
-              <p:cNvSpPr txBox="1">
-                <a:spLocks noRot="1" noChangeAspect="1" noMove="1" noResize="1" noEditPoints="1" noAdjustHandles="1" noChangeArrowheads="1" noChangeShapeType="1" noTextEdit="1"/>
-              </p:cNvSpPr>
-              <p:nvPr/>
-            </p:nvSpPr>
-            <p:spPr>
-              <a:xfrm>
-                <a:off x="1292640" y="177420"/>
-                <a:ext cx="1293611" cy="361667"/>
-              </a:xfrm>
-              <a:prstGeom prst="rect">
-                <a:avLst/>
-              </a:prstGeom>
-              <a:blipFill>
-                <a:blip r:embed="rId11"/>
-                <a:stretch>
-                  <a:fillRect b="-14754"/>
-                </a:stretch>
-              </a:blipFill>
-              <a:ln w="12700">
-                <a:solidFill>
-                  <a:schemeClr val="tx1"/>
-                </a:solidFill>
-                <a:prstDash val="sysDash"/>
-              </a:ln>
-            </p:spPr>
-            <p:txBody>
-              <a:bodyPr/>
-              <a:lstStyle/>
-              <a:p>
-                <a:r>
-                  <a:rPr lang="zh-CN" altLang="en-US">
-                    <a:noFill/>
-                  </a:rPr>
-                  <a:t> </a:t>
-                </a:r>
-              </a:p>
-            </p:txBody>
-          </p:sp>
-        </mc:Fallback>
-      </mc:AlternateContent>
-      <mc:AlternateContent xmlns:mc="http://schemas.openxmlformats.org/markup-compatibility/2006">
-        <mc:Choice xmlns:a14="http://schemas.microsoft.com/office/drawing/2010/main" Requires="a14">
-          <p:sp>
-            <p:nvSpPr>
-              <p:cNvPr id="120" name="Google Shape;8410;p96">
-                <a:extLst>
-                  <a:ext uri="{FF2B5EF4-FFF2-40B4-BE49-F238E27FC236}">
-                    <a16:creationId xmlns:a16="http://schemas.microsoft.com/office/drawing/2014/main" id="{FDBD8B0E-89C9-4192-A15A-C7BACF858213}"/>
-                  </a:ext>
-                </a:extLst>
-              </p:cNvPr>
-              <p:cNvSpPr txBox="1"/>
-              <p:nvPr/>
-            </p:nvSpPr>
-            <p:spPr>
-              <a:xfrm>
-                <a:off x="1308563" y="2083557"/>
-                <a:ext cx="1293611" cy="361667"/>
-              </a:xfrm>
-              <a:prstGeom prst="rect">
-                <a:avLst/>
-              </a:prstGeom>
-              <a:noFill/>
-              <a:ln w="12700">
-                <a:solidFill>
-                  <a:schemeClr val="tx1"/>
-                </a:solidFill>
-                <a:prstDash val="sysDash"/>
-              </a:ln>
-            </p:spPr>
-            <p:txBody>
-              <a:bodyPr spcFirstLastPara="1" wrap="square" lIns="91425" tIns="91425" rIns="91425" bIns="91425" anchor="t" anchorCtr="0">
-                <a:noAutofit/>
-              </a:bodyPr>
-              <a:lstStyle/>
-              <a:p>
-                <a:pPr lvl="0"/>
-                <a14:m>
-                  <m:oMathPara xmlns:m="http://schemas.openxmlformats.org/officeDocument/2006/math">
-                    <m:oMathParaPr>
-                      <m:jc m:val="centerGroup"/>
-                    </m:oMathParaPr>
-                    <m:oMath xmlns:m="http://schemas.openxmlformats.org/officeDocument/2006/math">
-                      <m:r>
-                        <a:rPr lang="en-US" sz="1600" b="1" i="1" smtClean="0">
-                          <a:latin typeface="Cambria Math" panose="02040503050406030204" pitchFamily="18" charset="0"/>
-                        </a:rPr>
-                        <m:t>𝑳</m:t>
-                      </m:r>
-                      <m:d>
-                        <m:dPr>
-                          <m:ctrlPr>
-                            <a:rPr lang="pt-BR" sz="1600" b="1" i="1" smtClean="0">
-                              <a:latin typeface="Cambria Math" panose="02040503050406030204" pitchFamily="18" charset="0"/>
-                            </a:rPr>
-                          </m:ctrlPr>
-                        </m:dPr>
-                        <m:e>
-                          <m:sSub>
-                            <m:sSubPr>
-                              <m:ctrlPr>
-                                <a:rPr lang="pt-BR" altLang="zh-CN" sz="1600" b="1" i="1">
-                                  <a:latin typeface="Cambria Math" panose="02040503050406030204" pitchFamily="18" charset="0"/>
-                                </a:rPr>
-                              </m:ctrlPr>
-                            </m:sSubPr>
-                            <m:e>
-                              <m:r>
-                                <a:rPr lang="en-US" altLang="zh-CN" sz="1600" b="1" i="1" smtClean="0">
-                                  <a:latin typeface="Cambria Math" panose="02040503050406030204" pitchFamily="18" charset="0"/>
-                                </a:rPr>
-                                <m:t>𝑨</m:t>
-                              </m:r>
-                            </m:e>
-                            <m:sub>
-                              <m:r>
-                                <a:rPr lang="en-US" altLang="zh-CN" sz="1600" b="1" i="1" smtClean="0">
-                                  <a:latin typeface="Cambria Math" panose="02040503050406030204" pitchFamily="18" charset="0"/>
-                                </a:rPr>
-                                <m:t>𝒊</m:t>
-                              </m:r>
-                            </m:sub>
-                          </m:sSub>
-                          <m:d>
-                            <m:dPr>
-                              <m:ctrlPr>
-                                <a:rPr lang="en-US" altLang="zh-CN" sz="1600" b="1" i="1" smtClean="0">
-                                  <a:latin typeface="Cambria Math" panose="02040503050406030204" pitchFamily="18" charset="0"/>
-                                </a:rPr>
-                              </m:ctrlPr>
-                            </m:dPr>
-                            <m:e>
-                              <m:r>
-                                <a:rPr lang="en-US" altLang="zh-CN" sz="1600" b="1" i="1" smtClean="0">
-                                  <a:latin typeface="Cambria Math" panose="02040503050406030204" pitchFamily="18" charset="0"/>
-                                </a:rPr>
-                                <m:t>𝒇</m:t>
-                              </m:r>
-                            </m:e>
-                          </m:d>
-                          <m:r>
-                            <a:rPr lang="en-US" altLang="zh-CN" sz="1600" b="1" i="1" smtClean="0">
-                              <a:latin typeface="Cambria Math" panose="02040503050406030204" pitchFamily="18" charset="0"/>
-                            </a:rPr>
-                            <m:t>,</m:t>
-                          </m:r>
-                          <m:r>
-                            <a:rPr lang="en-US" altLang="zh-CN" sz="1600" b="1" i="1" smtClean="0">
-                              <a:latin typeface="Cambria Math" panose="02040503050406030204" pitchFamily="18" charset="0"/>
-                            </a:rPr>
-                            <m:t>𝒊</m:t>
-                          </m:r>
-                        </m:e>
-                      </m:d>
-                    </m:oMath>
-                  </m:oMathPara>
-                </a14:m>
-                <a:endParaRPr sz="1600" b="1" dirty="0"/>
-              </a:p>
-            </p:txBody>
-          </p:sp>
-        </mc:Choice>
-        <mc:Fallback>
-          <p:sp>
-            <p:nvSpPr>
-              <p:cNvPr id="120" name="Google Shape;8410;p96">
-                <a:extLst>
-                  <a:ext uri="{FF2B5EF4-FFF2-40B4-BE49-F238E27FC236}">
-                    <a16:creationId xmlns:a16="http://schemas.microsoft.com/office/drawing/2014/main" id="{FDBD8B0E-89C9-4192-A15A-C7BACF858213}"/>
-                  </a:ext>
-                </a:extLst>
-              </p:cNvPr>
-              <p:cNvSpPr txBox="1">
-                <a:spLocks noRot="1" noChangeAspect="1" noMove="1" noResize="1" noEditPoints="1" noAdjustHandles="1" noChangeArrowheads="1" noChangeShapeType="1" noTextEdit="1"/>
-              </p:cNvSpPr>
-              <p:nvPr/>
-            </p:nvSpPr>
-            <p:spPr>
-              <a:xfrm>
-                <a:off x="1308563" y="2083557"/>
-                <a:ext cx="1293611" cy="361667"/>
-              </a:xfrm>
-              <a:prstGeom prst="rect">
-                <a:avLst/>
-              </a:prstGeom>
-              <a:blipFill>
-                <a:blip r:embed="rId12"/>
-                <a:stretch>
-                  <a:fillRect b="-13115"/>
-                </a:stretch>
-              </a:blipFill>
-              <a:ln w="12700">
-                <a:solidFill>
-                  <a:schemeClr val="tx1"/>
-                </a:solidFill>
-                <a:prstDash val="sysDash"/>
-              </a:ln>
-            </p:spPr>
-            <p:txBody>
-              <a:bodyPr/>
-              <a:lstStyle/>
-              <a:p>
-                <a:r>
-                  <a:rPr lang="zh-CN" altLang="en-US">
-                    <a:noFill/>
-                  </a:rPr>
-                  <a:t> </a:t>
-                </a:r>
-              </a:p>
-            </p:txBody>
-          </p:sp>
-        </mc:Fallback>
-      </mc:AlternateContent>
-      <mc:AlternateContent xmlns:mc="http://schemas.openxmlformats.org/markup-compatibility/2006">
-        <mc:Choice xmlns:a14="http://schemas.microsoft.com/office/drawing/2010/main" Requires="a14">
-          <p:sp>
-            <p:nvSpPr>
-              <p:cNvPr id="124" name="Google Shape;8410;p96">
-                <a:extLst>
-                  <a:ext uri="{FF2B5EF4-FFF2-40B4-BE49-F238E27FC236}">
-                    <a16:creationId xmlns:a16="http://schemas.microsoft.com/office/drawing/2014/main" id="{2494A43D-74BF-4757-A23F-DADBD2328D75}"/>
-                  </a:ext>
-                </a:extLst>
-              </p:cNvPr>
-              <p:cNvSpPr txBox="1"/>
-              <p:nvPr/>
-            </p:nvSpPr>
-            <p:spPr>
-              <a:xfrm>
-                <a:off x="9312974" y="293427"/>
-                <a:ext cx="1293611" cy="388962"/>
-              </a:xfrm>
-              <a:prstGeom prst="rect">
-                <a:avLst/>
-              </a:prstGeom>
-              <a:noFill/>
-              <a:ln w="12700">
-                <a:solidFill>
-                  <a:schemeClr val="tx1"/>
-                </a:solidFill>
-                <a:prstDash val="sysDash"/>
-              </a:ln>
-            </p:spPr>
-            <p:txBody>
-              <a:bodyPr spcFirstLastPara="1" wrap="square" lIns="91425" tIns="91425" rIns="91425" bIns="91425" anchor="t" anchorCtr="0">
-                <a:noAutofit/>
-              </a:bodyPr>
-              <a:lstStyle/>
-              <a:p>
-                <a:pPr lvl="0"/>
-                <a14:m>
-                  <m:oMathPara xmlns:m="http://schemas.openxmlformats.org/officeDocument/2006/math">
-                    <m:oMathParaPr>
-                      <m:jc m:val="centerGroup"/>
-                    </m:oMathParaPr>
-                    <m:oMath xmlns:m="http://schemas.openxmlformats.org/officeDocument/2006/math">
-                      <m:r>
-                        <a:rPr lang="en-US" sz="1600" b="1" i="1" smtClean="0">
-                          <a:latin typeface="Cambria Math" panose="02040503050406030204" pitchFamily="18" charset="0"/>
-                        </a:rPr>
-                        <m:t>𝑳</m:t>
-                      </m:r>
-                      <m:d>
-                        <m:dPr>
-                          <m:ctrlPr>
-                            <a:rPr lang="pt-BR" sz="1600" b="1" i="1" smtClean="0">
-                              <a:latin typeface="Cambria Math" panose="02040503050406030204" pitchFamily="18" charset="0"/>
-                            </a:rPr>
-                          </m:ctrlPr>
-                        </m:dPr>
-                        <m:e>
-                          <m:sSub>
-                            <m:sSubPr>
-                              <m:ctrlPr>
-                                <a:rPr lang="pt-BR" altLang="zh-CN" sz="1600" b="1" i="1">
-                                  <a:latin typeface="Cambria Math" panose="02040503050406030204" pitchFamily="18" charset="0"/>
-                                </a:rPr>
-                              </m:ctrlPr>
-                            </m:sSubPr>
-                            <m:e>
-                              <m:r>
-                                <a:rPr lang="en-US" altLang="zh-CN" sz="1600" b="1" i="1" smtClean="0">
-                                  <a:latin typeface="Cambria Math" panose="02040503050406030204" pitchFamily="18" charset="0"/>
-                                </a:rPr>
-                                <m:t>𝒇</m:t>
-                              </m:r>
-                            </m:e>
-                            <m:sub>
-                              <m:r>
-                                <a:rPr lang="en-US" altLang="zh-CN" sz="1600" b="1" i="1" smtClean="0">
-                                  <a:latin typeface="Cambria Math" panose="02040503050406030204" pitchFamily="18" charset="0"/>
-                                </a:rPr>
-                                <m:t>𝒕</m:t>
-                              </m:r>
-                            </m:sub>
-                          </m:sSub>
-                          <m:r>
-                            <a:rPr lang="en-US" altLang="zh-CN" sz="1600" b="1" i="1" smtClean="0">
-                              <a:latin typeface="Cambria Math" panose="02040503050406030204" pitchFamily="18" charset="0"/>
-                            </a:rPr>
-                            <m:t>,</m:t>
-                          </m:r>
-                          <m:acc>
-                            <m:accPr>
-                              <m:chr m:val="̂"/>
-                              <m:ctrlPr>
-                                <a:rPr lang="en-US" altLang="zh-CN" sz="1600" b="1" i="1" smtClean="0">
-                                  <a:latin typeface="Cambria Math" panose="02040503050406030204" pitchFamily="18" charset="0"/>
-                                </a:rPr>
-                              </m:ctrlPr>
-                            </m:accPr>
-                            <m:e>
-                              <m:sSub>
-                                <m:sSubPr>
-                                  <m:ctrlPr>
-                                    <a:rPr lang="pt-BR" altLang="zh-CN" sz="1600" b="1" i="1">
-                                      <a:latin typeface="Cambria Math" panose="02040503050406030204" pitchFamily="18" charset="0"/>
-                                    </a:rPr>
-                                  </m:ctrlPr>
-                                </m:sSubPr>
-                                <m:e>
-                                  <m:r>
-                                    <a:rPr lang="en-US" altLang="zh-CN" sz="1600" b="1" i="1">
-                                      <a:latin typeface="Cambria Math" panose="02040503050406030204" pitchFamily="18" charset="0"/>
-                                    </a:rPr>
-                                    <m:t>𝒇</m:t>
-                                  </m:r>
-                                </m:e>
-                                <m:sub>
-                                  <m:r>
-                                    <a:rPr lang="en-US" altLang="zh-CN" sz="1600" b="1" i="1">
-                                      <a:latin typeface="Cambria Math" panose="02040503050406030204" pitchFamily="18" charset="0"/>
-                                    </a:rPr>
-                                    <m:t>𝒕</m:t>
-                                  </m:r>
-                                </m:sub>
-                              </m:sSub>
-                            </m:e>
-                          </m:acc>
-                        </m:e>
-                      </m:d>
-                    </m:oMath>
-                  </m:oMathPara>
-                </a14:m>
-                <a:endParaRPr sz="1600" b="1" dirty="0"/>
-              </a:p>
-            </p:txBody>
-          </p:sp>
-        </mc:Choice>
-        <mc:Fallback>
-          <p:sp>
-            <p:nvSpPr>
-              <p:cNvPr id="124" name="Google Shape;8410;p96">
-                <a:extLst>
-                  <a:ext uri="{FF2B5EF4-FFF2-40B4-BE49-F238E27FC236}">
-                    <a16:creationId xmlns:a16="http://schemas.microsoft.com/office/drawing/2014/main" id="{2494A43D-74BF-4757-A23F-DADBD2328D75}"/>
-                  </a:ext>
-                </a:extLst>
-              </p:cNvPr>
-              <p:cNvSpPr txBox="1">
-                <a:spLocks noRot="1" noChangeAspect="1" noMove="1" noResize="1" noEditPoints="1" noAdjustHandles="1" noChangeArrowheads="1" noChangeShapeType="1" noTextEdit="1"/>
-              </p:cNvSpPr>
-              <p:nvPr/>
-            </p:nvSpPr>
-            <p:spPr>
-              <a:xfrm>
-                <a:off x="9312974" y="293427"/>
-                <a:ext cx="1293611" cy="388962"/>
-              </a:xfrm>
-              <a:prstGeom prst="rect">
-                <a:avLst/>
-              </a:prstGeom>
-              <a:blipFill>
-                <a:blip r:embed="rId13"/>
-                <a:stretch>
-                  <a:fillRect r="-467" b="-12121"/>
-                </a:stretch>
-              </a:blipFill>
-              <a:ln w="12700">
-                <a:solidFill>
-                  <a:schemeClr val="tx1"/>
-                </a:solidFill>
-                <a:prstDash val="sysDash"/>
-              </a:ln>
-            </p:spPr>
-            <p:txBody>
-              <a:bodyPr/>
-              <a:lstStyle/>
-              <a:p>
-                <a:r>
-                  <a:rPr lang="zh-CN" altLang="en-US">
-                    <a:noFill/>
-                  </a:rPr>
-                  <a:t> </a:t>
-                </a:r>
-              </a:p>
-            </p:txBody>
-          </p:sp>
-        </mc:Fallback>
-      </mc:AlternateContent>
-      <p:cxnSp>
-        <p:nvCxnSpPr>
-          <p:cNvPr id="129" name="直接连接符 128">
-            <a:extLst>
-              <a:ext uri="{FF2B5EF4-FFF2-40B4-BE49-F238E27FC236}">
-                <a16:creationId xmlns:a16="http://schemas.microsoft.com/office/drawing/2014/main" id="{619ECDE8-12C0-4955-BB4A-524A43495A7E}"/>
-              </a:ext>
-            </a:extLst>
-          </p:cNvPr>
-          <p:cNvCxnSpPr>
-            <a:cxnSpLocks/>
-          </p:cNvCxnSpPr>
-          <p:nvPr/>
-        </p:nvCxnSpPr>
-        <p:spPr>
-          <a:xfrm flipH="1">
-            <a:off x="348018" y="1617260"/>
-            <a:ext cx="1146412" cy="1289713"/>
-          </a:xfrm>
-          <a:prstGeom prst="line">
-            <a:avLst/>
-          </a:prstGeom>
-          <a:ln w="12700">
-            <a:solidFill>
-              <a:schemeClr val="tx1"/>
-            </a:solidFill>
-            <a:prstDash val="sysDash"/>
-          </a:ln>
-        </p:spPr>
-        <p:style>
-          <a:lnRef idx="1">
-            <a:schemeClr val="accent1"/>
-          </a:lnRef>
-          <a:fillRef idx="0">
-            <a:schemeClr val="accent1"/>
-          </a:fillRef>
-          <a:effectRef idx="0">
-            <a:schemeClr val="accent1"/>
-          </a:effectRef>
-          <a:fontRef idx="minor">
-            <a:schemeClr val="tx1"/>
-          </a:fontRef>
-        </p:style>
-      </p:cxnSp>
-      <p:cxnSp>
-        <p:nvCxnSpPr>
-          <p:cNvPr id="132" name="直接连接符 131">
-            <a:extLst>
-              <a:ext uri="{FF2B5EF4-FFF2-40B4-BE49-F238E27FC236}">
-                <a16:creationId xmlns:a16="http://schemas.microsoft.com/office/drawing/2014/main" id="{A6C0638D-0D68-413E-86F3-EBEB8DE58196}"/>
-              </a:ext>
-            </a:extLst>
-          </p:cNvPr>
-          <p:cNvCxnSpPr>
-            <a:cxnSpLocks/>
-          </p:cNvCxnSpPr>
-          <p:nvPr/>
-        </p:nvCxnSpPr>
-        <p:spPr>
-          <a:xfrm>
-            <a:off x="2347415" y="1603612"/>
-            <a:ext cx="3295935" cy="1235122"/>
-          </a:xfrm>
-          <a:prstGeom prst="line">
-            <a:avLst/>
-          </a:prstGeom>
-          <a:ln w="12700">
-            <a:solidFill>
-              <a:schemeClr val="tx1"/>
-            </a:solidFill>
-            <a:prstDash val="sysDash"/>
-          </a:ln>
-        </p:spPr>
-        <p:style>
-          <a:lnRef idx="1">
-            <a:schemeClr val="accent1"/>
-          </a:lnRef>
-          <a:fillRef idx="0">
-            <a:schemeClr val="accent1"/>
-          </a:fillRef>
-          <a:effectRef idx="0">
-            <a:schemeClr val="accent1"/>
-          </a:effectRef>
-          <a:fontRef idx="minor">
-            <a:schemeClr val="tx1"/>
-          </a:fontRef>
-        </p:style>
-      </p:cxnSp>
-      <p:cxnSp>
-        <p:nvCxnSpPr>
-          <p:cNvPr id="135" name="直接连接符 134">
-            <a:extLst>
-              <a:ext uri="{FF2B5EF4-FFF2-40B4-BE49-F238E27FC236}">
-                <a16:creationId xmlns:a16="http://schemas.microsoft.com/office/drawing/2014/main" id="{DDE68BB5-415F-4793-8DBE-C08B39FC1C4D}"/>
-              </a:ext>
-            </a:extLst>
-          </p:cNvPr>
-          <p:cNvCxnSpPr>
-            <a:cxnSpLocks/>
-          </p:cNvCxnSpPr>
-          <p:nvPr/>
-        </p:nvCxnSpPr>
-        <p:spPr>
-          <a:xfrm flipH="1">
-            <a:off x="6721522" y="1972101"/>
-            <a:ext cx="682388" cy="1071350"/>
-          </a:xfrm>
-          <a:prstGeom prst="line">
-            <a:avLst/>
-          </a:prstGeom>
-          <a:ln w="12700">
-            <a:solidFill>
-              <a:schemeClr val="tx1"/>
-            </a:solidFill>
-            <a:prstDash val="sysDash"/>
-          </a:ln>
-        </p:spPr>
-        <p:style>
-          <a:lnRef idx="1">
-            <a:schemeClr val="accent1"/>
-          </a:lnRef>
-          <a:fillRef idx="0">
-            <a:schemeClr val="accent1"/>
-          </a:fillRef>
-          <a:effectRef idx="0">
-            <a:schemeClr val="accent1"/>
-          </a:effectRef>
-          <a:fontRef idx="minor">
-            <a:schemeClr val="tx1"/>
-          </a:fontRef>
-        </p:style>
-      </p:cxnSp>
-      <p:cxnSp>
-        <p:nvCxnSpPr>
-          <p:cNvPr id="136" name="直接连接符 135">
-            <a:extLst>
-              <a:ext uri="{FF2B5EF4-FFF2-40B4-BE49-F238E27FC236}">
-                <a16:creationId xmlns:a16="http://schemas.microsoft.com/office/drawing/2014/main" id="{E7D1CB2D-FFC8-42FF-9616-634BC26642D3}"/>
-              </a:ext>
-            </a:extLst>
-          </p:cNvPr>
-          <p:cNvCxnSpPr>
-            <a:cxnSpLocks/>
-          </p:cNvCxnSpPr>
-          <p:nvPr/>
-        </p:nvCxnSpPr>
-        <p:spPr>
-          <a:xfrm>
-            <a:off x="8188657" y="1924334"/>
-            <a:ext cx="1924334" cy="1084997"/>
-          </a:xfrm>
-          <a:prstGeom prst="line">
-            <a:avLst/>
-          </a:prstGeom>
-          <a:ln w="12700">
-            <a:solidFill>
-              <a:schemeClr val="tx1"/>
-            </a:solidFill>
-            <a:prstDash val="sysDash"/>
-          </a:ln>
-        </p:spPr>
-        <p:style>
-          <a:lnRef idx="1">
-            <a:schemeClr val="accent1"/>
-          </a:lnRef>
-          <a:fillRef idx="0">
-            <a:schemeClr val="accent1"/>
-          </a:fillRef>
-          <a:effectRef idx="0">
-            <a:schemeClr val="accent1"/>
-          </a:effectRef>
-          <a:fontRef idx="minor">
-            <a:schemeClr val="tx1"/>
-          </a:fontRef>
-        </p:style>
-      </p:cxnSp>
+              <a:rPr lang="en" sz="1200" b="1" dirty="0">
+                <a:latin typeface="Times New Roman"/>
+                <a:ea typeface="Times New Roman"/>
+                <a:cs typeface="Times New Roman"/>
+                <a:sym typeface="Times New Roman"/>
+              </a:rPr>
+              <a:t>Image Augumen</a:t>
+            </a:r>
+          </a:p>
+          <a:p>
+            <a:pPr marL="0" lvl="0" indent="0" algn="ctr" rtl="0">
+              <a:spcBef>
+                <a:spcPts val="0"/>
+              </a:spcBef>
+              <a:spcAft>
+                <a:spcPts val="0"/>
+              </a:spcAft>
+              <a:buNone/>
+            </a:pPr>
+            <a:r>
+              <a:rPr lang="en" sz="1200" b="1" dirty="0">
+                <a:latin typeface="Times New Roman"/>
+                <a:ea typeface="Times New Roman"/>
+                <a:cs typeface="Times New Roman"/>
+                <a:sym typeface="Times New Roman"/>
+              </a:rPr>
+              <a:t>-tion</a:t>
+            </a:r>
+            <a:r>
+              <a:rPr lang="en" sz="1200" dirty="0">
+                <a:latin typeface="Times New Roman"/>
+                <a:ea typeface="Times New Roman"/>
+                <a:cs typeface="Times New Roman"/>
+                <a:sym typeface="Times New Roman"/>
+              </a:rPr>
+              <a:t>(flip</a:t>
+            </a:r>
+            <a:r>
+              <a:rPr lang="zh-CN" altLang="en-US" sz="1200" dirty="0">
+                <a:latin typeface="Times New Roman"/>
+                <a:ea typeface="Times New Roman"/>
+                <a:cs typeface="Times New Roman"/>
+                <a:sym typeface="Times New Roman"/>
+              </a:rPr>
+              <a:t>，</a:t>
+            </a:r>
+            <a:r>
+              <a:rPr lang="en" sz="1200" dirty="0">
+                <a:latin typeface="Times New Roman"/>
+                <a:ea typeface="Times New Roman"/>
+                <a:cs typeface="Times New Roman"/>
+                <a:sym typeface="Times New Roman"/>
+              </a:rPr>
+              <a:t>rotation</a:t>
+            </a:r>
+            <a:r>
+              <a:rPr lang="en-US" sz="1200" dirty="0">
+                <a:latin typeface="Times New Roman"/>
+                <a:ea typeface="Times New Roman"/>
+                <a:cs typeface="Times New Roman"/>
+                <a:sym typeface="Times New Roman"/>
+              </a:rPr>
+              <a:t>…</a:t>
+            </a:r>
+            <a:r>
+              <a:rPr lang="en" sz="1200" dirty="0">
+                <a:latin typeface="Times New Roman"/>
+                <a:ea typeface="Times New Roman"/>
+                <a:cs typeface="Times New Roman"/>
+                <a:sym typeface="Times New Roman"/>
+              </a:rPr>
+              <a:t>)</a:t>
+            </a:r>
+            <a:endParaRPr sz="1200" dirty="0">
+              <a:latin typeface="Times New Roman"/>
+              <a:ea typeface="Times New Roman"/>
+              <a:cs typeface="Times New Roman"/>
+              <a:sym typeface="Times New Roman"/>
+            </a:endParaRPr>
+          </a:p>
+        </p:txBody>
+      </p:sp>
       <p:pic>
         <p:nvPicPr>
-          <p:cNvPr id="149" name="图片 148">
+          <p:cNvPr id="96" name="图片 95">
             <a:extLst>
               <a:ext uri="{FF2B5EF4-FFF2-40B4-BE49-F238E27FC236}">
-                <a16:creationId xmlns:a16="http://schemas.microsoft.com/office/drawing/2014/main" id="{3CA32640-0A16-4B86-97C2-E3CBFFCAC9F7}"/>
+                <a16:creationId xmlns:a16="http://schemas.microsoft.com/office/drawing/2014/main" id="{95705656-D3BD-4ADF-87F3-DF236D62FB1A}"/>
               </a:ext>
             </a:extLst>
           </p:cNvPr>
@@ -6762,15 +5524,21 @@
           <p:nvPr/>
         </p:nvPicPr>
         <p:blipFill>
-          <a:blip r:embed="rId14"/>
+          <a:blip r:embed="rId2" cstate="print">
+            <a:extLst>
+              <a:ext uri="{28A0092B-C50C-407E-A947-70E740481C1C}">
+                <a14:useLocalDpi xmlns:a14="http://schemas.microsoft.com/office/drawing/2010/main" val="0"/>
+              </a:ext>
+            </a:extLst>
+          </a:blip>
           <a:stretch>
             <a:fillRect/>
           </a:stretch>
         </p:blipFill>
         <p:spPr>
           <a:xfrm>
-            <a:off x="6897741" y="2927445"/>
-            <a:ext cx="2973006" cy="1897038"/>
+            <a:off x="2667289" y="389107"/>
+            <a:ext cx="883404" cy="749248"/>
           </a:xfrm>
           <a:prstGeom prst="rect">
             <a:avLst/>
@@ -11355,8 +10123,8 @@
           </a:p>
         </p:txBody>
       </p:sp>
-      <mc:AlternateContent xmlns:mc="http://schemas.openxmlformats.org/markup-compatibility/2006">
-        <mc:Choice xmlns:a14="http://schemas.microsoft.com/office/drawing/2010/main" Requires="a14">
+      <mc:AlternateContent xmlns:mc="http://schemas.openxmlformats.org/markup-compatibility/2006" xmlns:a14="http://schemas.microsoft.com/office/drawing/2010/main">
+        <mc:Choice Requires="a14">
           <p:sp>
             <p:nvSpPr>
               <p:cNvPr id="125" name="文本框 124">
@@ -11464,7 +10232,7 @@
             </p:txBody>
           </p:sp>
         </mc:Choice>
-        <mc:Fallback>
+        <mc:Fallback xmlns="">
           <p:sp>
             <p:nvSpPr>
               <p:cNvPr id="125" name="文本框 124">
@@ -11750,16 +10518,7 @@
                 <a:cs typeface="Times New Roman"/>
                 <a:sym typeface="Times New Roman"/>
               </a:rPr>
-              <a:t>HVI T</a:t>
-            </a:r>
-            <a:r>
-              <a:rPr lang="en-US" altLang="zh-CN" sz="1600" dirty="0">
-                <a:latin typeface="Times New Roman"/>
-                <a:ea typeface="Times New Roman"/>
-                <a:cs typeface="Times New Roman"/>
-                <a:sym typeface="Times New Roman"/>
-              </a:rPr>
-              <a:t>rans</a:t>
+              <a:t>HSV-FFT Feature</a:t>
             </a:r>
             <a:endParaRPr sz="1600" dirty="0">
               <a:latin typeface="Times New Roman"/>

</xml_diff>

<commit_message>
Signed-off-by: liyi002  <liyi002@bitbucket.org> ·24
</commit_message>
<xml_diff>
--- a/Papers/基于频域的红外可见光融合/images/频域融合.pptx
+++ b/Papers/基于频域的红外可见光融合/images/频域融合.pptx
@@ -200,7 +200,7 @@
           <a:p>
             <a:fld id="{730F7C05-AD7F-4FFA-A0C0-1536BA5A251F}" type="datetimeFigureOut">
               <a:rPr lang="zh-CN" altLang="en-US" smtClean="0"/>
-              <a:t>2025/9/4</a:t>
+              <a:t>2025/9/8</a:t>
             </a:fld>
             <a:endParaRPr lang="zh-CN" altLang="en-US"/>
           </a:p>
@@ -1076,7 +1076,7 @@
           <a:p>
             <a:fld id="{978008A0-1351-474F-B2A3-B5A922791B5E}" type="datetimeFigureOut">
               <a:rPr lang="zh-CN" altLang="en-US" smtClean="0"/>
-              <a:t>2025/9/4</a:t>
+              <a:t>2025/9/8</a:t>
             </a:fld>
             <a:endParaRPr lang="zh-CN" altLang="en-US"/>
           </a:p>
@@ -1244,7 +1244,7 @@
           <a:p>
             <a:fld id="{978008A0-1351-474F-B2A3-B5A922791B5E}" type="datetimeFigureOut">
               <a:rPr lang="zh-CN" altLang="en-US" smtClean="0"/>
-              <a:t>2025/9/4</a:t>
+              <a:t>2025/9/8</a:t>
             </a:fld>
             <a:endParaRPr lang="zh-CN" altLang="en-US"/>
           </a:p>
@@ -1422,7 +1422,7 @@
           <a:p>
             <a:fld id="{978008A0-1351-474F-B2A3-B5A922791B5E}" type="datetimeFigureOut">
               <a:rPr lang="zh-CN" altLang="en-US" smtClean="0"/>
-              <a:t>2025/9/4</a:t>
+              <a:t>2025/9/8</a:t>
             </a:fld>
             <a:endParaRPr lang="zh-CN" altLang="en-US"/>
           </a:p>
@@ -1949,7 +1949,7 @@
           <a:p>
             <a:fld id="{978008A0-1351-474F-B2A3-B5A922791B5E}" type="datetimeFigureOut">
               <a:rPr lang="zh-CN" altLang="en-US" smtClean="0"/>
-              <a:t>2025/9/4</a:t>
+              <a:t>2025/9/8</a:t>
             </a:fld>
             <a:endParaRPr lang="zh-CN" altLang="en-US"/>
           </a:p>
@@ -2194,7 +2194,7 @@
           <a:p>
             <a:fld id="{978008A0-1351-474F-B2A3-B5A922791B5E}" type="datetimeFigureOut">
               <a:rPr lang="zh-CN" altLang="en-US" smtClean="0"/>
-              <a:t>2025/9/4</a:t>
+              <a:t>2025/9/8</a:t>
             </a:fld>
             <a:endParaRPr lang="zh-CN" altLang="en-US"/>
           </a:p>
@@ -2423,7 +2423,7 @@
           <a:p>
             <a:fld id="{978008A0-1351-474F-B2A3-B5A922791B5E}" type="datetimeFigureOut">
               <a:rPr lang="zh-CN" altLang="en-US" smtClean="0"/>
-              <a:t>2025/9/4</a:t>
+              <a:t>2025/9/8</a:t>
             </a:fld>
             <a:endParaRPr lang="zh-CN" altLang="en-US"/>
           </a:p>
@@ -2787,7 +2787,7 @@
           <a:p>
             <a:fld id="{978008A0-1351-474F-B2A3-B5A922791B5E}" type="datetimeFigureOut">
               <a:rPr lang="zh-CN" altLang="en-US" smtClean="0"/>
-              <a:t>2025/9/4</a:t>
+              <a:t>2025/9/8</a:t>
             </a:fld>
             <a:endParaRPr lang="zh-CN" altLang="en-US"/>
           </a:p>
@@ -2904,7 +2904,7 @@
           <a:p>
             <a:fld id="{978008A0-1351-474F-B2A3-B5A922791B5E}" type="datetimeFigureOut">
               <a:rPr lang="zh-CN" altLang="en-US" smtClean="0"/>
-              <a:t>2025/9/4</a:t>
+              <a:t>2025/9/8</a:t>
             </a:fld>
             <a:endParaRPr lang="zh-CN" altLang="en-US"/>
           </a:p>
@@ -2999,7 +2999,7 @@
           <a:p>
             <a:fld id="{978008A0-1351-474F-B2A3-B5A922791B5E}" type="datetimeFigureOut">
               <a:rPr lang="zh-CN" altLang="en-US" smtClean="0"/>
-              <a:t>2025/9/4</a:t>
+              <a:t>2025/9/8</a:t>
             </a:fld>
             <a:endParaRPr lang="zh-CN" altLang="en-US"/>
           </a:p>
@@ -3274,7 +3274,7 @@
           <a:p>
             <a:fld id="{978008A0-1351-474F-B2A3-B5A922791B5E}" type="datetimeFigureOut">
               <a:rPr lang="zh-CN" altLang="en-US" smtClean="0"/>
-              <a:t>2025/9/4</a:t>
+              <a:t>2025/9/8</a:t>
             </a:fld>
             <a:endParaRPr lang="zh-CN" altLang="en-US"/>
           </a:p>
@@ -3526,7 +3526,7 @@
           <a:p>
             <a:fld id="{978008A0-1351-474F-B2A3-B5A922791B5E}" type="datetimeFigureOut">
               <a:rPr lang="zh-CN" altLang="en-US" smtClean="0"/>
-              <a:t>2025/9/4</a:t>
+              <a:t>2025/9/8</a:t>
             </a:fld>
             <a:endParaRPr lang="zh-CN" altLang="en-US"/>
           </a:p>
@@ -3737,7 +3737,7 @@
           <a:p>
             <a:fld id="{978008A0-1351-474F-B2A3-B5A922791B5E}" type="datetimeFigureOut">
               <a:rPr lang="zh-CN" altLang="en-US" smtClean="0"/>
-              <a:t>2025/9/4</a:t>
+              <a:t>2025/9/8</a:t>
             </a:fld>
             <a:endParaRPr lang="zh-CN" altLang="en-US"/>
           </a:p>
@@ -4158,7 +4158,7 @@
         <p:spPr>
           <a:xfrm>
             <a:off x="0" y="0"/>
-            <a:ext cx="12084682" cy="2523193"/>
+            <a:ext cx="12084682" cy="3106271"/>
           </a:xfrm>
           <a:prstGeom prst="roundRect">
             <a:avLst/>
@@ -4209,7 +4209,7 @@
         </p:nvSpPr>
         <p:spPr>
           <a:xfrm>
-            <a:off x="4019712" y="939761"/>
+            <a:off x="3865070" y="1248003"/>
             <a:ext cx="1007232" cy="634500"/>
           </a:xfrm>
           <a:prstGeom prst="roundRect">
@@ -4272,131 +4272,6 @@
           </a:p>
         </p:txBody>
       </p:sp>
-      <p:sp>
-        <p:nvSpPr>
-          <p:cNvPr id="34" name="Google Shape;10204;p134"/>
-          <p:cNvSpPr/>
-          <p:nvPr/>
-        </p:nvSpPr>
-        <p:spPr>
-          <a:xfrm>
-            <a:off x="1306120" y="1449933"/>
-            <a:ext cx="1034472" cy="972546"/>
-          </a:xfrm>
-          <a:prstGeom prst="roundRect">
-            <a:avLst>
-              <a:gd name="adj" fmla="val 16667"/>
-            </a:avLst>
-          </a:prstGeom>
-          <a:noFill/>
-          <a:ln w="9525" cap="flat" cmpd="sng">
-            <a:solidFill>
-              <a:schemeClr val="dk1"/>
-            </a:solidFill>
-            <a:prstDash val="lgDash"/>
-            <a:round/>
-            <a:headEnd type="none" w="sm" len="sm"/>
-            <a:tailEnd type="none" w="sm" len="sm"/>
-          </a:ln>
-        </p:spPr>
-        <p:txBody>
-          <a:bodyPr spcFirstLastPara="1" wrap="square" lIns="91425" tIns="91425" rIns="91425" bIns="91425" anchor="ctr" anchorCtr="0">
-            <a:noAutofit/>
-          </a:bodyPr>
-          <a:lstStyle/>
-          <a:p>
-            <a:pPr marL="0" lvl="0" indent="0" algn="ctr" rtl="0">
-              <a:spcBef>
-                <a:spcPts val="0"/>
-              </a:spcBef>
-              <a:spcAft>
-                <a:spcPts val="0"/>
-              </a:spcAft>
-              <a:buNone/>
-            </a:pPr>
-            <a:r>
-              <a:rPr lang="en" sz="1200" b="1" dirty="0">
-                <a:latin typeface="Times New Roman"/>
-                <a:ea typeface="Times New Roman"/>
-                <a:cs typeface="Times New Roman"/>
-                <a:sym typeface="Times New Roman"/>
-              </a:rPr>
-              <a:t>Image Augumen</a:t>
-            </a:r>
-          </a:p>
-          <a:p>
-            <a:pPr marL="0" lvl="0" indent="0" algn="ctr" rtl="0">
-              <a:spcBef>
-                <a:spcPts val="0"/>
-              </a:spcBef>
-              <a:spcAft>
-                <a:spcPts val="0"/>
-              </a:spcAft>
-              <a:buNone/>
-            </a:pPr>
-            <a:r>
-              <a:rPr lang="en" sz="1200" b="1" dirty="0">
-                <a:latin typeface="Times New Roman"/>
-                <a:ea typeface="Times New Roman"/>
-                <a:cs typeface="Times New Roman"/>
-                <a:sym typeface="Times New Roman"/>
-              </a:rPr>
-              <a:t>-tion</a:t>
-            </a:r>
-            <a:r>
-              <a:rPr lang="en" sz="1200" dirty="0">
-                <a:latin typeface="Times New Roman"/>
-                <a:ea typeface="Times New Roman"/>
-                <a:cs typeface="Times New Roman"/>
-                <a:sym typeface="Times New Roman"/>
-              </a:rPr>
-              <a:t>(flip</a:t>
-            </a:r>
-            <a:r>
-              <a:rPr lang="zh-CN" altLang="en-US" sz="1200" dirty="0">
-                <a:latin typeface="Times New Roman"/>
-                <a:ea typeface="Times New Roman"/>
-                <a:cs typeface="Times New Roman"/>
-                <a:sym typeface="Times New Roman"/>
-              </a:rPr>
-              <a:t>，</a:t>
-            </a:r>
-            <a:r>
-              <a:rPr lang="en" sz="1200" dirty="0">
-                <a:latin typeface="Times New Roman"/>
-                <a:ea typeface="Times New Roman"/>
-                <a:cs typeface="Times New Roman"/>
-                <a:sym typeface="Times New Roman"/>
-              </a:rPr>
-              <a:t>rotation</a:t>
-            </a:r>
-            <a:r>
-              <a:rPr lang="en-US" sz="1200" dirty="0">
-                <a:latin typeface="Times New Roman"/>
-                <a:ea typeface="Times New Roman"/>
-                <a:cs typeface="Times New Roman"/>
-                <a:sym typeface="Times New Roman"/>
-              </a:rPr>
-              <a:t>…</a:t>
-            </a:r>
-            <a:r>
-              <a:rPr lang="en" sz="1200" dirty="0">
-                <a:latin typeface="Times New Roman"/>
-                <a:ea typeface="Times New Roman"/>
-                <a:cs typeface="Times New Roman"/>
-                <a:sym typeface="Times New Roman"/>
-              </a:rPr>
-              <a:t>)</a:t>
-            </a:r>
-            <a:endParaRPr sz="1200" dirty="0">
-              <a:latin typeface="Times New Roman"/>
-              <a:ea typeface="Times New Roman"/>
-              <a:cs typeface="Times New Roman"/>
-              <a:sym typeface="Times New Roman"/>
-            </a:endParaRPr>
-          </a:p>
-        </p:txBody>
-      </p:sp>
       <p:pic>
         <p:nvPicPr>
           <p:cNvPr id="3" name="图片 2">
@@ -4425,7 +4300,7 @@
         </p:blipFill>
         <p:spPr>
           <a:xfrm>
-            <a:off x="2712782" y="1621955"/>
+            <a:off x="2658994" y="1890899"/>
             <a:ext cx="883404" cy="749248"/>
           </a:xfrm>
           <a:prstGeom prst="rect">
@@ -4461,7 +4336,7 @@
         </p:blipFill>
         <p:spPr>
           <a:xfrm>
-            <a:off x="5257894" y="894681"/>
+            <a:off x="5264617" y="1203963"/>
             <a:ext cx="852643" cy="722579"/>
           </a:xfrm>
           <a:prstGeom prst="rect">
@@ -4497,7 +4372,7 @@
         </p:blipFill>
         <p:spPr>
           <a:xfrm>
-            <a:off x="120251" y="525380"/>
+            <a:off x="120251" y="955689"/>
             <a:ext cx="807194" cy="684063"/>
           </a:xfrm>
           <a:prstGeom prst="rect">
@@ -4533,7 +4408,7 @@
         </p:blipFill>
         <p:spPr>
           <a:xfrm>
-            <a:off x="120855" y="1371943"/>
+            <a:off x="120855" y="1802252"/>
             <a:ext cx="807194" cy="684063"/>
           </a:xfrm>
           <a:prstGeom prst="rect">
@@ -4569,7 +4444,7 @@
         </p:blipFill>
         <p:spPr>
           <a:xfrm>
-            <a:off x="11258010" y="908326"/>
+            <a:off x="11136987" y="478021"/>
             <a:ext cx="788228" cy="667990"/>
           </a:xfrm>
           <a:prstGeom prst="rect">
@@ -4670,7 +4545,7 @@
         </p:nvSpPr>
         <p:spPr>
           <a:xfrm>
-            <a:off x="143823" y="276971"/>
+            <a:off x="143823" y="707280"/>
             <a:ext cx="929666" cy="229951"/>
           </a:xfrm>
           <a:prstGeom prst="rect">
@@ -4721,9 +4596,9 @@
           <p:nvPr/>
         </p:nvCxnSpPr>
         <p:spPr>
-          <a:xfrm flipV="1">
-            <a:off x="5026944" y="1255971"/>
-            <a:ext cx="230950" cy="1040"/>
+          <a:xfrm>
+            <a:off x="4872302" y="1565253"/>
+            <a:ext cx="392315" cy="0"/>
           </a:xfrm>
           <a:prstGeom prst="straightConnector1">
             <a:avLst/>
@@ -4740,40 +4615,6 @@
           </a:ln>
         </p:spPr>
       </p:cxnSp>
-      <p:cxnSp>
-        <p:nvCxnSpPr>
-          <p:cNvPr id="85" name="Google Shape;10001;p124">
-            <a:extLst>
-              <a:ext uri="{FF2B5EF4-FFF2-40B4-BE49-F238E27FC236}">
-                <a16:creationId xmlns:a16="http://schemas.microsoft.com/office/drawing/2014/main" id="{BFA43D49-AE42-46E9-9750-E7AA0438CDBE}"/>
-              </a:ext>
-            </a:extLst>
-          </p:cNvPr>
-          <p:cNvCxnSpPr>
-            <a:cxnSpLocks/>
-          </p:cNvCxnSpPr>
-          <p:nvPr/>
-        </p:nvCxnSpPr>
-        <p:spPr>
-          <a:xfrm>
-            <a:off x="6104415" y="1253020"/>
-            <a:ext cx="282737" cy="0"/>
-          </a:xfrm>
-          <a:prstGeom prst="straightConnector1">
-            <a:avLst/>
-          </a:prstGeom>
-          <a:noFill/>
-          <a:ln w="19050" cap="flat" cmpd="sng">
-            <a:solidFill>
-              <a:srgbClr val="000000"/>
-            </a:solidFill>
-            <a:prstDash val="solid"/>
-            <a:round/>
-            <a:headEnd type="none" w="med" len="med"/>
-            <a:tailEnd type="triangle" w="med" len="med"/>
-          </a:ln>
-        </p:spPr>
-      </p:cxnSp>
       <p:sp>
         <p:nvSpPr>
           <p:cNvPr id="5" name="梯形 4">
@@ -4788,8 +4629,8 @@
         </p:nvSpPr>
         <p:spPr>
           <a:xfrm rot="5400000">
-            <a:off x="6619163" y="757450"/>
-            <a:ext cx="613400" cy="997037"/>
+            <a:off x="6673126" y="1712366"/>
+            <a:ext cx="613400" cy="808429"/>
           </a:xfrm>
           <a:prstGeom prst="trapezoid">
             <a:avLst/>
@@ -4844,8 +4685,8 @@
         </p:nvSpPr>
         <p:spPr>
           <a:xfrm rot="16200000">
-            <a:off x="10273351" y="756310"/>
-            <a:ext cx="549710" cy="967468"/>
+            <a:off x="10932947" y="1710365"/>
+            <a:ext cx="549710" cy="780581"/>
           </a:xfrm>
           <a:prstGeom prst="trapezoid">
             <a:avLst/>
@@ -4896,7 +4737,7 @@
         </p:nvSpPr>
         <p:spPr>
           <a:xfrm>
-            <a:off x="6516805" y="1098644"/>
+            <a:off x="6530252" y="1952532"/>
             <a:ext cx="843501" cy="307777"/>
           </a:xfrm>
           <a:prstGeom prst="rect">
@@ -4932,7 +4773,7 @@
         </p:nvSpPr>
         <p:spPr>
           <a:xfrm>
-            <a:off x="10119814" y="1094095"/>
+            <a:off x="10798894" y="1927812"/>
             <a:ext cx="870751" cy="307777"/>
           </a:xfrm>
           <a:prstGeom prst="rect">
@@ -4968,7 +4809,7 @@
         </p:nvSpPr>
         <p:spPr>
           <a:xfrm>
-            <a:off x="7833814" y="673562"/>
+            <a:off x="7793473" y="1534174"/>
             <a:ext cx="1501255" cy="382357"/>
           </a:xfrm>
           <a:prstGeom prst="roundRect">
@@ -5037,7 +4878,7 @@
         </p:nvSpPr>
         <p:spPr>
           <a:xfrm>
-            <a:off x="7842911" y="1483057"/>
+            <a:off x="7802570" y="2343669"/>
             <a:ext cx="1501255" cy="382357"/>
           </a:xfrm>
           <a:prstGeom prst="roundRect">
@@ -5110,7 +4951,7 @@
         </p:nvCxnSpPr>
         <p:spPr>
           <a:xfrm flipV="1">
-            <a:off x="7424382" y="864741"/>
+            <a:off x="7384041" y="1725353"/>
             <a:ext cx="409432" cy="391228"/>
           </a:xfrm>
           <a:prstGeom prst="bentConnector3">
@@ -5156,7 +4997,7 @@
         </p:nvCxnSpPr>
         <p:spPr>
           <a:xfrm>
-            <a:off x="7424382" y="1255969"/>
+            <a:off x="7384041" y="2116581"/>
             <a:ext cx="418529" cy="418267"/>
           </a:xfrm>
           <a:prstGeom prst="bentConnector3">
@@ -5186,40 +5027,6 @@
       </p:cxnSp>
       <p:cxnSp>
         <p:nvCxnSpPr>
-          <p:cNvPr id="80" name="Google Shape;10001;p124">
-            <a:extLst>
-              <a:ext uri="{FF2B5EF4-FFF2-40B4-BE49-F238E27FC236}">
-                <a16:creationId xmlns:a16="http://schemas.microsoft.com/office/drawing/2014/main" id="{270D4591-66AA-4A87-8F48-CEB95F28C40C}"/>
-              </a:ext>
-            </a:extLst>
-          </p:cNvPr>
-          <p:cNvCxnSpPr>
-            <a:cxnSpLocks/>
-          </p:cNvCxnSpPr>
-          <p:nvPr/>
-        </p:nvCxnSpPr>
-        <p:spPr>
-          <a:xfrm>
-            <a:off x="11016608" y="1215534"/>
-            <a:ext cx="282737" cy="0"/>
-          </a:xfrm>
-          <a:prstGeom prst="straightConnector1">
-            <a:avLst/>
-          </a:prstGeom>
-          <a:noFill/>
-          <a:ln w="19050" cap="flat" cmpd="sng">
-            <a:solidFill>
-              <a:srgbClr val="000000"/>
-            </a:solidFill>
-            <a:prstDash val="solid"/>
-            <a:round/>
-            <a:headEnd type="none" w="med" len="med"/>
-            <a:tailEnd type="triangle" w="med" len="med"/>
-          </a:ln>
-        </p:spPr>
-      </p:cxnSp>
-      <p:cxnSp>
-        <p:nvCxnSpPr>
           <p:cNvPr id="82" name="连接符: 肘形 81">
             <a:extLst>
               <a:ext uri="{FF2B5EF4-FFF2-40B4-BE49-F238E27FC236}">
@@ -5236,12 +5043,12 @@
         </p:nvCxnSpPr>
         <p:spPr>
           <a:xfrm>
-            <a:off x="9335069" y="864741"/>
-            <a:ext cx="729403" cy="375303"/>
+            <a:off x="9294728" y="1725353"/>
+            <a:ext cx="1522784" cy="375303"/>
           </a:xfrm>
           <a:prstGeom prst="bentConnector3">
             <a:avLst>
-              <a:gd name="adj1" fmla="val 50000"/>
+              <a:gd name="adj1" fmla="val 30131"/>
             </a:avLst>
           </a:prstGeom>
           <a:ln w="19050">
@@ -5284,12 +5091,12 @@
         </p:nvCxnSpPr>
         <p:spPr>
           <a:xfrm flipV="1">
-            <a:off x="9344166" y="1240044"/>
-            <a:ext cx="720306" cy="434192"/>
+            <a:off x="9303825" y="2100656"/>
+            <a:ext cx="1513687" cy="434192"/>
           </a:xfrm>
           <a:prstGeom prst="bentConnector3">
             <a:avLst>
-              <a:gd name="adj1" fmla="val 50000"/>
+              <a:gd name="adj1" fmla="val 29568"/>
             </a:avLst>
           </a:prstGeom>
           <a:ln w="19050">
@@ -5328,7 +5135,7 @@
         </p:nvSpPr>
         <p:spPr>
           <a:xfrm>
-            <a:off x="9412670" y="1100167"/>
+            <a:off x="9439565" y="1980949"/>
             <a:ext cx="523355" cy="259968"/>
           </a:xfrm>
           <a:prstGeom prst="roundRect">
@@ -5392,8 +5199,8 @@
         </p:nvSpPr>
         <p:spPr>
           <a:xfrm>
-            <a:off x="1362987" y="223909"/>
-            <a:ext cx="1034472" cy="972546"/>
+            <a:off x="1295752" y="963500"/>
+            <a:ext cx="1104548" cy="1450249"/>
           </a:xfrm>
           <a:prstGeom prst="roundRect">
             <a:avLst>
@@ -5537,7 +5344,7 @@
         </p:blipFill>
         <p:spPr>
           <a:xfrm>
-            <a:off x="2667289" y="389107"/>
+            <a:off x="2667289" y="819416"/>
             <a:ext cx="883404" cy="749248"/>
           </a:xfrm>
           <a:prstGeom prst="rect">
@@ -5545,6 +5352,293 @@
           </a:prstGeom>
         </p:spPr>
       </p:pic>
+      <p:pic>
+        <p:nvPicPr>
+          <p:cNvPr id="35" name="图片 34">
+            <a:extLst>
+              <a:ext uri="{FF2B5EF4-FFF2-40B4-BE49-F238E27FC236}">
+                <a16:creationId xmlns:a16="http://schemas.microsoft.com/office/drawing/2014/main" id="{6268B8F7-9B7E-44A7-8E86-578CA4033073}"/>
+              </a:ext>
+            </a:extLst>
+          </p:cNvPr>
+          <p:cNvPicPr>
+            <a:picLocks noChangeAspect="1"/>
+          </p:cNvPicPr>
+          <p:nvPr/>
+        </p:nvPicPr>
+        <p:blipFill>
+          <a:blip r:embed="rId4" cstate="print">
+            <a:extLst>
+              <a:ext uri="{28A0092B-C50C-407E-A947-70E740481C1C}">
+                <a14:useLocalDpi xmlns:a14="http://schemas.microsoft.com/office/drawing/2010/main" val="0"/>
+              </a:ext>
+            </a:extLst>
+          </a:blip>
+          <a:stretch>
+            <a:fillRect/>
+          </a:stretch>
+        </p:blipFill>
+        <p:spPr>
+          <a:xfrm>
+            <a:off x="7856791" y="556756"/>
+            <a:ext cx="807194" cy="684063"/>
+          </a:xfrm>
+          <a:prstGeom prst="rect">
+            <a:avLst/>
+          </a:prstGeom>
+        </p:spPr>
+      </p:pic>
+      <p:cxnSp>
+        <p:nvCxnSpPr>
+          <p:cNvPr id="37" name="连接符: 肘形 36">
+            <a:extLst>
+              <a:ext uri="{FF2B5EF4-FFF2-40B4-BE49-F238E27FC236}">
+                <a16:creationId xmlns:a16="http://schemas.microsoft.com/office/drawing/2014/main" id="{F8330DB1-E209-41EC-B6D0-CFA73EEDD8EF}"/>
+              </a:ext>
+            </a:extLst>
+          </p:cNvPr>
+          <p:cNvCxnSpPr>
+            <a:cxnSpLocks/>
+            <a:stCxn id="31" idx="3"/>
+            <a:endCxn id="20" idx="1"/>
+          </p:cNvCxnSpPr>
+          <p:nvPr/>
+        </p:nvCxnSpPr>
+        <p:spPr>
+          <a:xfrm>
+            <a:off x="6117260" y="1565253"/>
+            <a:ext cx="412992" cy="541168"/>
+          </a:xfrm>
+          <a:prstGeom prst="bentConnector3">
+            <a:avLst/>
+          </a:prstGeom>
+          <a:ln w="19050">
+            <a:solidFill>
+              <a:schemeClr val="tx1"/>
+            </a:solidFill>
+            <a:tailEnd type="triangle"/>
+          </a:ln>
+        </p:spPr>
+        <p:style>
+          <a:lnRef idx="1">
+            <a:schemeClr val="accent1"/>
+          </a:lnRef>
+          <a:fillRef idx="0">
+            <a:schemeClr val="accent1"/>
+          </a:fillRef>
+          <a:effectRef idx="0">
+            <a:schemeClr val="accent1"/>
+          </a:effectRef>
+          <a:fontRef idx="minor">
+            <a:schemeClr val="tx1"/>
+          </a:fontRef>
+        </p:style>
+      </p:cxnSp>
+      <p:cxnSp>
+        <p:nvCxnSpPr>
+          <p:cNvPr id="41" name="连接符: 肘形 40">
+            <a:extLst>
+              <a:ext uri="{FF2B5EF4-FFF2-40B4-BE49-F238E27FC236}">
+                <a16:creationId xmlns:a16="http://schemas.microsoft.com/office/drawing/2014/main" id="{E5B70FD4-9B95-4AEF-9B1A-CF8721876726}"/>
+              </a:ext>
+            </a:extLst>
+          </p:cNvPr>
+          <p:cNvCxnSpPr>
+            <a:cxnSpLocks/>
+            <a:stCxn id="35" idx="3"/>
+            <a:endCxn id="43" idx="0"/>
+          </p:cNvCxnSpPr>
+          <p:nvPr/>
+        </p:nvCxnSpPr>
+        <p:spPr>
+          <a:xfrm>
+            <a:off x="8663985" y="898788"/>
+            <a:ext cx="1673752" cy="1066473"/>
+          </a:xfrm>
+          <a:prstGeom prst="bentConnector2">
+            <a:avLst/>
+          </a:prstGeom>
+          <a:ln w="19050">
+            <a:solidFill>
+              <a:schemeClr val="tx1"/>
+            </a:solidFill>
+            <a:tailEnd type="triangle"/>
+          </a:ln>
+        </p:spPr>
+        <p:style>
+          <a:lnRef idx="1">
+            <a:schemeClr val="accent1"/>
+          </a:lnRef>
+          <a:fillRef idx="0">
+            <a:schemeClr val="accent1"/>
+          </a:fillRef>
+          <a:effectRef idx="0">
+            <a:schemeClr val="accent1"/>
+          </a:effectRef>
+          <a:fontRef idx="minor">
+            <a:schemeClr val="tx1"/>
+          </a:fontRef>
+        </p:style>
+      </p:cxnSp>
+      <p:sp>
+        <p:nvSpPr>
+          <p:cNvPr id="43" name="Google Shape;9989;p124">
+            <a:extLst>
+              <a:ext uri="{FF2B5EF4-FFF2-40B4-BE49-F238E27FC236}">
+                <a16:creationId xmlns:a16="http://schemas.microsoft.com/office/drawing/2014/main" id="{E0281C35-1F03-49D4-9780-62688E2C8FBE}"/>
+              </a:ext>
+            </a:extLst>
+          </p:cNvPr>
+          <p:cNvSpPr/>
+          <p:nvPr/>
+        </p:nvSpPr>
+        <p:spPr>
+          <a:xfrm>
+            <a:off x="10076059" y="1965261"/>
+            <a:ext cx="523355" cy="259968"/>
+          </a:xfrm>
+          <a:prstGeom prst="roundRect">
+            <a:avLst>
+              <a:gd name="adj" fmla="val 16667"/>
+            </a:avLst>
+          </a:prstGeom>
+          <a:solidFill>
+            <a:schemeClr val="accent3">
+              <a:lumMod val="20000"/>
+              <a:lumOff val="80000"/>
+            </a:schemeClr>
+          </a:solidFill>
+          <a:ln w="12700" cap="flat" cmpd="sng">
+            <a:solidFill>
+              <a:schemeClr val="accent3">
+                <a:lumMod val="40000"/>
+                <a:lumOff val="60000"/>
+              </a:schemeClr>
+            </a:solidFill>
+            <a:prstDash val="solid"/>
+            <a:round/>
+            <a:headEnd type="none" w="sm" len="sm"/>
+            <a:tailEnd type="none" w="sm" len="sm"/>
+          </a:ln>
+        </p:spPr>
+        <p:txBody>
+          <a:bodyPr spcFirstLastPara="1" wrap="square" lIns="91425" tIns="91425" rIns="91425" bIns="91425" anchor="ctr" anchorCtr="0">
+            <a:noAutofit/>
+          </a:bodyPr>
+          <a:lstStyle/>
+          <a:p>
+            <a:pPr marL="0" lvl="0" indent="0" algn="ctr" rtl="0">
+              <a:spcBef>
+                <a:spcPts val="0"/>
+              </a:spcBef>
+              <a:spcAft>
+                <a:spcPts val="0"/>
+              </a:spcAft>
+              <a:buNone/>
+            </a:pPr>
+            <a:r>
+              <a:rPr lang="en-US" sz="1200" b="1" dirty="0"/>
+              <a:t>SNR</a:t>
+            </a:r>
+            <a:endParaRPr sz="1200" b="1" dirty="0"/>
+          </a:p>
+        </p:txBody>
+      </p:sp>
+      <p:cxnSp>
+        <p:nvCxnSpPr>
+          <p:cNvPr id="46" name="连接符: 肘形 45">
+            <a:extLst>
+              <a:ext uri="{FF2B5EF4-FFF2-40B4-BE49-F238E27FC236}">
+                <a16:creationId xmlns:a16="http://schemas.microsoft.com/office/drawing/2014/main" id="{2FDD378F-497B-4878-B871-1A172DCD147A}"/>
+              </a:ext>
+            </a:extLst>
+          </p:cNvPr>
+          <p:cNvCxnSpPr>
+            <a:cxnSpLocks/>
+            <a:stCxn id="66" idx="3"/>
+            <a:endCxn id="36" idx="2"/>
+          </p:cNvCxnSpPr>
+          <p:nvPr/>
+        </p:nvCxnSpPr>
+        <p:spPr>
+          <a:xfrm flipH="1" flipV="1">
+            <a:off x="11531101" y="1146011"/>
+            <a:ext cx="138544" cy="935690"/>
+          </a:xfrm>
+          <a:prstGeom prst="bentConnector4">
+            <a:avLst>
+              <a:gd name="adj1" fmla="val -165002"/>
+              <a:gd name="adj2" fmla="val 58223"/>
+            </a:avLst>
+          </a:prstGeom>
+          <a:ln w="19050">
+            <a:solidFill>
+              <a:schemeClr val="tx1"/>
+            </a:solidFill>
+            <a:tailEnd type="triangle"/>
+          </a:ln>
+        </p:spPr>
+        <p:style>
+          <a:lnRef idx="1">
+            <a:schemeClr val="accent1"/>
+          </a:lnRef>
+          <a:fillRef idx="0">
+            <a:schemeClr val="accent1"/>
+          </a:fillRef>
+          <a:effectRef idx="0">
+            <a:schemeClr val="accent1"/>
+          </a:effectRef>
+          <a:fontRef idx="minor">
+            <a:schemeClr val="tx1"/>
+          </a:fontRef>
+        </p:style>
+      </p:cxnSp>
+      <p:cxnSp>
+        <p:nvCxnSpPr>
+          <p:cNvPr id="54" name="连接符: 肘形 53">
+            <a:extLst>
+              <a:ext uri="{FF2B5EF4-FFF2-40B4-BE49-F238E27FC236}">
+                <a16:creationId xmlns:a16="http://schemas.microsoft.com/office/drawing/2014/main" id="{6E40DF5B-64DC-478A-979C-65396D796B9F}"/>
+              </a:ext>
+            </a:extLst>
+          </p:cNvPr>
+          <p:cNvCxnSpPr>
+            <a:cxnSpLocks/>
+            <a:stCxn id="31" idx="0"/>
+            <a:endCxn id="35" idx="1"/>
+          </p:cNvCxnSpPr>
+          <p:nvPr/>
+        </p:nvCxnSpPr>
+        <p:spPr>
+          <a:xfrm rot="5400000" flipH="1" flipV="1">
+            <a:off x="6621278" y="-31550"/>
+            <a:ext cx="305175" cy="2165852"/>
+          </a:xfrm>
+          <a:prstGeom prst="bentConnector2">
+            <a:avLst/>
+          </a:prstGeom>
+          <a:ln w="19050">
+            <a:solidFill>
+              <a:schemeClr val="tx1"/>
+            </a:solidFill>
+            <a:tailEnd type="triangle"/>
+          </a:ln>
+        </p:spPr>
+        <p:style>
+          <a:lnRef idx="1">
+            <a:schemeClr val="accent1"/>
+          </a:lnRef>
+          <a:fillRef idx="0">
+            <a:schemeClr val="accent1"/>
+          </a:fillRef>
+          <a:effectRef idx="0">
+            <a:schemeClr val="accent1"/>
+          </a:effectRef>
+          <a:fontRef idx="minor">
+            <a:schemeClr val="tx1"/>
+          </a:fontRef>
+        </p:style>
+      </p:cxnSp>
     </p:spTree>
     <p:extLst>
       <p:ext uri="{BB962C8B-B14F-4D97-AF65-F5344CB8AC3E}">
@@ -10307,6 +10401,78 @@
           <a:chExt cx="0" cy="0"/>
         </a:xfrm>
       </p:grpSpPr>
+      <p:pic>
+        <p:nvPicPr>
+          <p:cNvPr id="9" name="图片 8">
+            <a:extLst>
+              <a:ext uri="{FF2B5EF4-FFF2-40B4-BE49-F238E27FC236}">
+                <a16:creationId xmlns:a16="http://schemas.microsoft.com/office/drawing/2014/main" id="{9DFE6C22-A48C-480A-A5FC-A8236376B9BC}"/>
+              </a:ext>
+            </a:extLst>
+          </p:cNvPr>
+          <p:cNvPicPr>
+            <a:picLocks noChangeAspect="1"/>
+          </p:cNvPicPr>
+          <p:nvPr/>
+        </p:nvPicPr>
+        <p:blipFill>
+          <a:blip r:embed="rId3" cstate="print">
+            <a:extLst>
+              <a:ext uri="{28A0092B-C50C-407E-A947-70E740481C1C}">
+                <a14:useLocalDpi xmlns:a14="http://schemas.microsoft.com/office/drawing/2010/main" val="0"/>
+              </a:ext>
+            </a:extLst>
+          </a:blip>
+          <a:stretch>
+            <a:fillRect/>
+          </a:stretch>
+        </p:blipFill>
+        <p:spPr>
+          <a:xfrm>
+            <a:off x="0" y="1568908"/>
+            <a:ext cx="1525181" cy="1292527"/>
+          </a:xfrm>
+          <a:prstGeom prst="rect">
+            <a:avLst/>
+          </a:prstGeom>
+        </p:spPr>
+      </p:pic>
+      <p:pic>
+        <p:nvPicPr>
+          <p:cNvPr id="11" name="图片 10">
+            <a:extLst>
+              <a:ext uri="{FF2B5EF4-FFF2-40B4-BE49-F238E27FC236}">
+                <a16:creationId xmlns:a16="http://schemas.microsoft.com/office/drawing/2014/main" id="{C8ACD14F-7E59-4476-8DBA-94B6B36AC6E7}"/>
+              </a:ext>
+            </a:extLst>
+          </p:cNvPr>
+          <p:cNvPicPr>
+            <a:picLocks noChangeAspect="1"/>
+          </p:cNvPicPr>
+          <p:nvPr/>
+        </p:nvPicPr>
+        <p:blipFill>
+          <a:blip r:embed="rId4" cstate="print">
+            <a:extLst>
+              <a:ext uri="{28A0092B-C50C-407E-A947-70E740481C1C}">
+                <a14:useLocalDpi xmlns:a14="http://schemas.microsoft.com/office/drawing/2010/main" val="0"/>
+              </a:ext>
+            </a:extLst>
+          </a:blip>
+          <a:stretch>
+            <a:fillRect/>
+          </a:stretch>
+        </p:blipFill>
+        <p:spPr>
+          <a:xfrm>
+            <a:off x="0" y="3304796"/>
+            <a:ext cx="1525181" cy="1292527"/>
+          </a:xfrm>
+          <a:prstGeom prst="rect">
+            <a:avLst/>
+          </a:prstGeom>
+        </p:spPr>
+      </p:pic>
       <p:cxnSp>
         <p:nvCxnSpPr>
           <p:cNvPr id="136" name="Google Shape;10001;p124">
@@ -10518,7 +10684,7 @@
                 <a:cs typeface="Times New Roman"/>
                 <a:sym typeface="Times New Roman"/>
               </a:rPr>
-              <a:t>HSV-FFT Feature</a:t>
+              <a:t>FFT Feature</a:t>
             </a:r>
             <a:endParaRPr sz="1600" dirty="0">
               <a:latin typeface="Times New Roman"/>
@@ -10842,8 +11008,8 @@
         </p:nvSpPr>
         <p:spPr>
           <a:xfrm>
-            <a:off x="329453" y="2758915"/>
-            <a:ext cx="929666" cy="229951"/>
+            <a:off x="0" y="2543762"/>
+            <a:ext cx="1082488" cy="229951"/>
           </a:xfrm>
           <a:prstGeom prst="rect">
             <a:avLst/>
@@ -10869,10 +11035,18 @@
               <a:buNone/>
             </a:pPr>
             <a:r>
-              <a:rPr lang="en" sz="1000" b="1" dirty="0"/>
+              <a:rPr lang="en" sz="1200" b="1" dirty="0">
+                <a:solidFill>
+                  <a:schemeClr val="bg1"/>
+                </a:solidFill>
+              </a:rPr>
               <a:t>Input visible</a:t>
             </a:r>
-            <a:endParaRPr sz="1000" b="1" dirty="0"/>
+            <a:endParaRPr sz="1200" b="1" dirty="0">
+              <a:solidFill>
+                <a:schemeClr val="bg1"/>
+              </a:solidFill>
+            </a:endParaRPr>
           </a:p>
         </p:txBody>
       </p:sp>
@@ -10884,8 +11058,8 @@
         </p:nvSpPr>
         <p:spPr>
           <a:xfrm>
-            <a:off x="308393" y="4453953"/>
-            <a:ext cx="1057053" cy="265823"/>
+            <a:off x="0" y="4252248"/>
+            <a:ext cx="1304365" cy="265823"/>
           </a:xfrm>
           <a:prstGeom prst="rect">
             <a:avLst/>
@@ -10911,14 +11085,26 @@
               <a:buNone/>
             </a:pPr>
             <a:r>
-              <a:rPr lang="en" sz="1000" b="1" dirty="0"/>
+              <a:rPr lang="en" sz="1200" b="1" dirty="0">
+                <a:solidFill>
+                  <a:schemeClr val="bg1"/>
+                </a:solidFill>
+              </a:rPr>
               <a:t>Input I</a:t>
             </a:r>
             <a:r>
-              <a:rPr lang="en-US" altLang="zh-CN" sz="1000" b="1" dirty="0" err="1"/>
+              <a:rPr lang="en-US" altLang="zh-CN" sz="1200" b="1" dirty="0" err="1">
+                <a:solidFill>
+                  <a:schemeClr val="bg1"/>
+                </a:solidFill>
+              </a:rPr>
               <a:t>nfrared</a:t>
             </a:r>
-            <a:endParaRPr sz="1000" b="1" dirty="0"/>
+            <a:endParaRPr sz="1200" b="1" dirty="0">
+              <a:solidFill>
+                <a:schemeClr val="bg1"/>
+              </a:solidFill>
+            </a:endParaRPr>
           </a:p>
         </p:txBody>
       </p:sp>
@@ -11006,7 +11192,7 @@
         </p:nvSpPr>
         <p:spPr>
           <a:xfrm>
-            <a:off x="3748223" y="2171319"/>
+            <a:off x="3748223" y="2339407"/>
             <a:ext cx="1091910" cy="272565"/>
           </a:xfrm>
           <a:prstGeom prst="rect">
@@ -11037,13 +11223,13 @@
       </p:sp>
       <p:sp>
         <p:nvSpPr>
-          <p:cNvPr id="170" name="Google Shape;8410;p96"/>
+          <p:cNvPr id="172" name="Google Shape;8410;p96"/>
           <p:cNvSpPr txBox="1"/>
           <p:nvPr/>
         </p:nvSpPr>
         <p:spPr>
           <a:xfrm>
-            <a:off x="1922354" y="3091364"/>
+            <a:off x="1882013" y="4293613"/>
             <a:ext cx="1443889" cy="272565"/>
           </a:xfrm>
           <a:prstGeom prst="rect">
@@ -11062,43 +11248,6 @@
           <a:p>
             <a:r>
               <a:rPr lang="en-US" altLang="zh-CN" sz="1000" b="1" dirty="0"/>
-              <a:t>Visible </a:t>
-            </a:r>
-            <a:r>
-              <a:rPr lang="en" sz="1000" b="1" dirty="0"/>
-              <a:t>Itensity Map</a:t>
-            </a:r>
-            <a:endParaRPr sz="1000" b="1" dirty="0"/>
-          </a:p>
-        </p:txBody>
-      </p:sp>
-      <p:sp>
-        <p:nvSpPr>
-          <p:cNvPr id="172" name="Google Shape;8410;p96"/>
-          <p:cNvSpPr txBox="1"/>
-          <p:nvPr/>
-        </p:nvSpPr>
-        <p:spPr>
-          <a:xfrm>
-            <a:off x="1882013" y="4293613"/>
-            <a:ext cx="1443889" cy="272565"/>
-          </a:xfrm>
-          <a:prstGeom prst="rect">
-            <a:avLst/>
-          </a:prstGeom>
-          <a:noFill/>
-          <a:ln>
-            <a:noFill/>
-          </a:ln>
-        </p:spPr>
-        <p:txBody>
-          <a:bodyPr spcFirstLastPara="1" wrap="square" lIns="91425" tIns="91425" rIns="91425" bIns="91425" anchor="t" anchorCtr="0">
-            <a:noAutofit/>
-          </a:bodyPr>
-          <a:lstStyle/>
-          <a:p>
-            <a:r>
-              <a:rPr lang="en-US" altLang="zh-CN" sz="1000" b="1" dirty="0"/>
               <a:t>Infrared </a:t>
             </a:r>
             <a:r>
@@ -11123,7 +11272,7 @@
         </p:nvCxnSpPr>
         <p:spPr>
           <a:xfrm>
-            <a:off x="1488081" y="1910186"/>
+            <a:off x="1535145" y="2273256"/>
             <a:ext cx="533269" cy="0"/>
           </a:xfrm>
           <a:prstGeom prst="straightConnector1">
@@ -11156,7 +11305,7 @@
           <p:nvPr/>
         </p:nvPicPr>
         <p:blipFill>
-          <a:blip r:embed="rId3" cstate="print">
+          <a:blip r:embed="rId5" cstate="print">
             <a:extLst>
               <a:ext uri="{28A0092B-C50C-407E-A947-70E740481C1C}">
                 <a14:useLocalDpi xmlns:a14="http://schemas.microsoft.com/office/drawing/2010/main" val="0"/>
@@ -11171,78 +11320,6 @@
           <a:xfrm>
             <a:off x="11161058" y="2403005"/>
             <a:ext cx="1030942" cy="873680"/>
-          </a:xfrm>
-          <a:prstGeom prst="rect">
-            <a:avLst/>
-          </a:prstGeom>
-        </p:spPr>
-      </p:pic>
-      <p:pic>
-        <p:nvPicPr>
-          <p:cNvPr id="9" name="图片 8">
-            <a:extLst>
-              <a:ext uri="{FF2B5EF4-FFF2-40B4-BE49-F238E27FC236}">
-                <a16:creationId xmlns:a16="http://schemas.microsoft.com/office/drawing/2014/main" id="{9DFE6C22-A48C-480A-A5FC-A8236376B9BC}"/>
-              </a:ext>
-            </a:extLst>
-          </p:cNvPr>
-          <p:cNvPicPr>
-            <a:picLocks noChangeAspect="1"/>
-          </p:cNvPicPr>
-          <p:nvPr/>
-        </p:nvPicPr>
-        <p:blipFill>
-          <a:blip r:embed="rId4" cstate="print">
-            <a:extLst>
-              <a:ext uri="{28A0092B-C50C-407E-A947-70E740481C1C}">
-                <a14:useLocalDpi xmlns:a14="http://schemas.microsoft.com/office/drawing/2010/main" val="0"/>
-              </a:ext>
-            </a:extLst>
-          </a:blip>
-          <a:stretch>
-            <a:fillRect/>
-          </a:stretch>
-        </p:blipFill>
-        <p:spPr>
-          <a:xfrm>
-            <a:off x="0" y="1568908"/>
-            <a:ext cx="1525181" cy="1292527"/>
-          </a:xfrm>
-          <a:prstGeom prst="rect">
-            <a:avLst/>
-          </a:prstGeom>
-        </p:spPr>
-      </p:pic>
-      <p:pic>
-        <p:nvPicPr>
-          <p:cNvPr id="11" name="图片 10">
-            <a:extLst>
-              <a:ext uri="{FF2B5EF4-FFF2-40B4-BE49-F238E27FC236}">
-                <a16:creationId xmlns:a16="http://schemas.microsoft.com/office/drawing/2014/main" id="{C8ACD14F-7E59-4476-8DBA-94B6B36AC6E7}"/>
-              </a:ext>
-            </a:extLst>
-          </p:cNvPr>
-          <p:cNvPicPr>
-            <a:picLocks noChangeAspect="1"/>
-          </p:cNvPicPr>
-          <p:nvPr/>
-        </p:nvPicPr>
-        <p:blipFill>
-          <a:blip r:embed="rId5" cstate="print">
-            <a:extLst>
-              <a:ext uri="{28A0092B-C50C-407E-A947-70E740481C1C}">
-                <a14:useLocalDpi xmlns:a14="http://schemas.microsoft.com/office/drawing/2010/main" val="0"/>
-              </a:ext>
-            </a:extLst>
-          </a:blip>
-          <a:stretch>
-            <a:fillRect/>
-          </a:stretch>
-        </p:blipFill>
-        <p:spPr>
-          <a:xfrm>
-            <a:off x="0" y="3271178"/>
-            <a:ext cx="1525181" cy="1292527"/>
           </a:xfrm>
           <a:prstGeom prst="rect">
             <a:avLst/>
@@ -12019,44 +12096,12 @@
           </a:p>
         </p:txBody>
       </p:sp>
-      <p:cxnSp>
-        <p:nvCxnSpPr>
-          <p:cNvPr id="72" name="Google Shape;10001;p124">
-            <a:extLst>
-              <a:ext uri="{FF2B5EF4-FFF2-40B4-BE49-F238E27FC236}">
-                <a16:creationId xmlns:a16="http://schemas.microsoft.com/office/drawing/2014/main" id="{D591D5C1-EF21-4CC9-9D11-CDE5C0094465}"/>
-              </a:ext>
-            </a:extLst>
-          </p:cNvPr>
-          <p:cNvCxnSpPr/>
-          <p:nvPr/>
-        </p:nvCxnSpPr>
-        <p:spPr>
-          <a:xfrm>
-            <a:off x="1530174" y="2776038"/>
-            <a:ext cx="533269" cy="0"/>
-          </a:xfrm>
-          <a:prstGeom prst="straightConnector1">
-            <a:avLst/>
-          </a:prstGeom>
-          <a:noFill/>
-          <a:ln w="19050" cap="flat" cmpd="sng">
-            <a:solidFill>
-              <a:srgbClr val="000000"/>
-            </a:solidFill>
-            <a:prstDash val="solid"/>
-            <a:round/>
-            <a:headEnd type="none" w="med" len="med"/>
-            <a:tailEnd type="triangle" w="med" len="med"/>
-          </a:ln>
-        </p:spPr>
-      </p:cxnSp>
       <p:pic>
         <p:nvPicPr>
-          <p:cNvPr id="3" name="图片 2">
+          <p:cNvPr id="8" name="图片 7">
             <a:extLst>
               <a:ext uri="{FF2B5EF4-FFF2-40B4-BE49-F238E27FC236}">
-                <a16:creationId xmlns:a16="http://schemas.microsoft.com/office/drawing/2014/main" id="{1DDF607C-F461-48A9-B026-0660DBB99BD9}"/>
+                <a16:creationId xmlns:a16="http://schemas.microsoft.com/office/drawing/2014/main" id="{5113216E-08BA-472C-A732-320C637E2C9A}"/>
               </a:ext>
             </a:extLst>
           </p:cNvPr>
@@ -12079,8 +12124,8 @@
         </p:blipFill>
         <p:spPr>
           <a:xfrm>
-            <a:off x="2092698" y="2493030"/>
-            <a:ext cx="811866" cy="685085"/>
+            <a:off x="3845973" y="1603516"/>
+            <a:ext cx="810499" cy="683931"/>
           </a:xfrm>
           <a:prstGeom prst="rect">
             <a:avLst/>
@@ -12089,10 +12134,10 @@
       </p:pic>
       <p:pic>
         <p:nvPicPr>
-          <p:cNvPr id="8" name="图片 7">
+          <p:cNvPr id="73" name="图片 72">
             <a:extLst>
               <a:ext uri="{FF2B5EF4-FFF2-40B4-BE49-F238E27FC236}">
-                <a16:creationId xmlns:a16="http://schemas.microsoft.com/office/drawing/2014/main" id="{5113216E-08BA-472C-A732-320C637E2C9A}"/>
+                <a16:creationId xmlns:a16="http://schemas.microsoft.com/office/drawing/2014/main" id="{F9E64D7E-16D2-476E-846E-C85ADD869340}"/>
               </a:ext>
             </a:extLst>
           </p:cNvPr>
@@ -12102,7 +12147,7 @@
           <p:nvPr/>
         </p:nvPicPr>
         <p:blipFill>
-          <a:blip r:embed="rId7" cstate="print">
+          <a:blip r:embed="rId6" cstate="print">
             <a:extLst>
               <a:ext uri="{28A0092B-C50C-407E-A947-70E740481C1C}">
                 <a14:useLocalDpi xmlns:a14="http://schemas.microsoft.com/office/drawing/2010/main" val="0"/>
@@ -12115,20 +12160,25 @@
         </p:blipFill>
         <p:spPr>
           <a:xfrm>
-            <a:off x="3825803" y="1516110"/>
+            <a:off x="5332564" y="1641615"/>
             <a:ext cx="810499" cy="683931"/>
           </a:xfrm>
           <a:prstGeom prst="rect">
             <a:avLst/>
           </a:prstGeom>
+          <a:ln>
+            <a:solidFill>
+              <a:schemeClr val="tx1"/>
+            </a:solidFill>
+          </a:ln>
         </p:spPr>
       </p:pic>
       <p:pic>
         <p:nvPicPr>
-          <p:cNvPr id="16" name="图片 15">
+          <p:cNvPr id="74" name="图片 73">
             <a:extLst>
               <a:ext uri="{FF2B5EF4-FFF2-40B4-BE49-F238E27FC236}">
-                <a16:creationId xmlns:a16="http://schemas.microsoft.com/office/drawing/2014/main" id="{33E80C49-87AC-4E50-8823-64AE52D25568}"/>
+                <a16:creationId xmlns:a16="http://schemas.microsoft.com/office/drawing/2014/main" id="{BDFBFC11-9071-4932-A424-7AD7CA4D2156}"/>
               </a:ext>
             </a:extLst>
           </p:cNvPr>
@@ -12138,7 +12188,7 @@
           <p:nvPr/>
         </p:nvPicPr>
         <p:blipFill>
-          <a:blip r:embed="rId8" cstate="print">
+          <a:blip r:embed="rId6" cstate="print">
             <a:extLst>
               <a:ext uri="{28A0092B-C50C-407E-A947-70E740481C1C}">
                 <a14:useLocalDpi xmlns:a14="http://schemas.microsoft.com/office/drawing/2010/main" val="0"/>
@@ -12151,20 +12201,25 @@
         </p:blipFill>
         <p:spPr>
           <a:xfrm>
-            <a:off x="2091859" y="3690660"/>
-            <a:ext cx="804968" cy="672912"/>
+            <a:off x="5417728" y="1706608"/>
+            <a:ext cx="810499" cy="683931"/>
           </a:xfrm>
           <a:prstGeom prst="rect">
             <a:avLst/>
           </a:prstGeom>
+          <a:ln>
+            <a:solidFill>
+              <a:schemeClr val="tx1"/>
+            </a:solidFill>
+          </a:ln>
         </p:spPr>
       </p:pic>
       <p:pic>
         <p:nvPicPr>
-          <p:cNvPr id="73" name="图片 72">
+          <p:cNvPr id="75" name="图片 74">
             <a:extLst>
               <a:ext uri="{FF2B5EF4-FFF2-40B4-BE49-F238E27FC236}">
-                <a16:creationId xmlns:a16="http://schemas.microsoft.com/office/drawing/2014/main" id="{F9E64D7E-16D2-476E-846E-C85ADD869340}"/>
+                <a16:creationId xmlns:a16="http://schemas.microsoft.com/office/drawing/2014/main" id="{841444AF-3A9B-4736-9F21-39357F94210B}"/>
               </a:ext>
             </a:extLst>
           </p:cNvPr>
@@ -12174,7 +12229,7 @@
           <p:nvPr/>
         </p:nvPicPr>
         <p:blipFill>
-          <a:blip r:embed="rId7" cstate="print">
+          <a:blip r:embed="rId6" cstate="print">
             <a:extLst>
               <a:ext uri="{28A0092B-C50C-407E-A947-70E740481C1C}">
                 <a14:useLocalDpi xmlns:a14="http://schemas.microsoft.com/office/drawing/2010/main" val="0"/>
@@ -12187,7 +12242,7 @@
         </p:blipFill>
         <p:spPr>
           <a:xfrm>
-            <a:off x="5332564" y="1641615"/>
+            <a:off x="5529787" y="1778326"/>
             <a:ext cx="810499" cy="683931"/>
           </a:xfrm>
           <a:prstGeom prst="rect">
@@ -12202,10 +12257,10 @@
       </p:pic>
       <p:pic>
         <p:nvPicPr>
-          <p:cNvPr id="74" name="图片 73">
+          <p:cNvPr id="76" name="图片 75">
             <a:extLst>
               <a:ext uri="{FF2B5EF4-FFF2-40B4-BE49-F238E27FC236}">
-                <a16:creationId xmlns:a16="http://schemas.microsoft.com/office/drawing/2014/main" id="{BDFBFC11-9071-4932-A424-7AD7CA4D2156}"/>
+                <a16:creationId xmlns:a16="http://schemas.microsoft.com/office/drawing/2014/main" id="{6954A22E-2D90-4022-BE20-125FE027EB07}"/>
               </a:ext>
             </a:extLst>
           </p:cNvPr>
@@ -12228,309 +12283,14 @@
         </p:blipFill>
         <p:spPr>
           <a:xfrm>
-            <a:off x="5417728" y="1706608"/>
-            <a:ext cx="810499" cy="683931"/>
+            <a:off x="3925981" y="1751198"/>
+            <a:ext cx="811866" cy="685085"/>
           </a:xfrm>
           <a:prstGeom prst="rect">
             <a:avLst/>
           </a:prstGeom>
-          <a:ln>
-            <a:solidFill>
-              <a:schemeClr val="tx1"/>
-            </a:solidFill>
-          </a:ln>
         </p:spPr>
       </p:pic>
-      <p:pic>
-        <p:nvPicPr>
-          <p:cNvPr id="75" name="图片 74">
-            <a:extLst>
-              <a:ext uri="{FF2B5EF4-FFF2-40B4-BE49-F238E27FC236}">
-                <a16:creationId xmlns:a16="http://schemas.microsoft.com/office/drawing/2014/main" id="{841444AF-3A9B-4736-9F21-39357F94210B}"/>
-              </a:ext>
-            </a:extLst>
-          </p:cNvPr>
-          <p:cNvPicPr>
-            <a:picLocks noChangeAspect="1"/>
-          </p:cNvPicPr>
-          <p:nvPr/>
-        </p:nvPicPr>
-        <p:blipFill>
-          <a:blip r:embed="rId7" cstate="print">
-            <a:extLst>
-              <a:ext uri="{28A0092B-C50C-407E-A947-70E740481C1C}">
-                <a14:useLocalDpi xmlns:a14="http://schemas.microsoft.com/office/drawing/2010/main" val="0"/>
-              </a:ext>
-            </a:extLst>
-          </a:blip>
-          <a:stretch>
-            <a:fillRect/>
-          </a:stretch>
-        </p:blipFill>
-        <p:spPr>
-          <a:xfrm>
-            <a:off x="5529787" y="1778326"/>
-            <a:ext cx="810499" cy="683931"/>
-          </a:xfrm>
-          <a:prstGeom prst="rect">
-            <a:avLst/>
-          </a:prstGeom>
-          <a:ln>
-            <a:solidFill>
-              <a:schemeClr val="tx1"/>
-            </a:solidFill>
-          </a:ln>
-        </p:spPr>
-      </p:pic>
-      <p:pic>
-        <p:nvPicPr>
-          <p:cNvPr id="76" name="图片 75">
-            <a:extLst>
-              <a:ext uri="{FF2B5EF4-FFF2-40B4-BE49-F238E27FC236}">
-                <a16:creationId xmlns:a16="http://schemas.microsoft.com/office/drawing/2014/main" id="{6954A22E-2D90-4022-BE20-125FE027EB07}"/>
-              </a:ext>
-            </a:extLst>
-          </p:cNvPr>
-          <p:cNvPicPr>
-            <a:picLocks noChangeAspect="1"/>
-          </p:cNvPicPr>
-          <p:nvPr/>
-        </p:nvPicPr>
-        <p:blipFill>
-          <a:blip r:embed="rId6" cstate="print">
-            <a:extLst>
-              <a:ext uri="{28A0092B-C50C-407E-A947-70E740481C1C}">
-                <a14:useLocalDpi xmlns:a14="http://schemas.microsoft.com/office/drawing/2010/main" val="0"/>
-              </a:ext>
-            </a:extLst>
-          </a:blip>
-          <a:stretch>
-            <a:fillRect/>
-          </a:stretch>
-        </p:blipFill>
-        <p:spPr>
-          <a:xfrm>
-            <a:off x="3825128" y="3183311"/>
-            <a:ext cx="811866" cy="685085"/>
-          </a:xfrm>
-          <a:prstGeom prst="rect">
-            <a:avLst/>
-          </a:prstGeom>
-        </p:spPr>
-      </p:pic>
-      <p:pic>
-        <p:nvPicPr>
-          <p:cNvPr id="77" name="图片 76">
-            <a:extLst>
-              <a:ext uri="{FF2B5EF4-FFF2-40B4-BE49-F238E27FC236}">
-                <a16:creationId xmlns:a16="http://schemas.microsoft.com/office/drawing/2014/main" id="{A219B492-DCC6-4934-93BB-10E1B7CEE909}"/>
-              </a:ext>
-            </a:extLst>
-          </p:cNvPr>
-          <p:cNvPicPr>
-            <a:picLocks noChangeAspect="1"/>
-          </p:cNvPicPr>
-          <p:nvPr/>
-        </p:nvPicPr>
-        <p:blipFill>
-          <a:blip r:embed="rId8" cstate="print">
-            <a:extLst>
-              <a:ext uri="{28A0092B-C50C-407E-A947-70E740481C1C}">
-                <a14:useLocalDpi xmlns:a14="http://schemas.microsoft.com/office/drawing/2010/main" val="0"/>
-              </a:ext>
-            </a:extLst>
-          </a:blip>
-          <a:stretch>
-            <a:fillRect/>
-          </a:stretch>
-        </p:blipFill>
-        <p:spPr>
-          <a:xfrm>
-            <a:off x="3891524" y="3264835"/>
-            <a:ext cx="804968" cy="672912"/>
-          </a:xfrm>
-          <a:prstGeom prst="rect">
-            <a:avLst/>
-          </a:prstGeom>
-        </p:spPr>
-      </p:pic>
-      <p:cxnSp>
-        <p:nvCxnSpPr>
-          <p:cNvPr id="22" name="连接符: 肘形 21">
-            <a:extLst>
-              <a:ext uri="{FF2B5EF4-FFF2-40B4-BE49-F238E27FC236}">
-                <a16:creationId xmlns:a16="http://schemas.microsoft.com/office/drawing/2014/main" id="{64D4FF35-C5B0-401C-8903-07BC75495C32}"/>
-              </a:ext>
-            </a:extLst>
-          </p:cNvPr>
-          <p:cNvCxnSpPr>
-            <a:cxnSpLocks/>
-            <a:stCxn id="3" idx="3"/>
-            <a:endCxn id="76" idx="1"/>
-          </p:cNvCxnSpPr>
-          <p:nvPr/>
-        </p:nvCxnSpPr>
-        <p:spPr>
-          <a:xfrm>
-            <a:off x="2904564" y="2835573"/>
-            <a:ext cx="920564" cy="690281"/>
-          </a:xfrm>
-          <a:prstGeom prst="bentConnector3">
-            <a:avLst/>
-          </a:prstGeom>
-          <a:ln w="19050">
-            <a:solidFill>
-              <a:schemeClr val="tx1"/>
-            </a:solidFill>
-            <a:tailEnd type="triangle"/>
-          </a:ln>
-        </p:spPr>
-        <p:style>
-          <a:lnRef idx="1">
-            <a:schemeClr val="accent1"/>
-          </a:lnRef>
-          <a:fillRef idx="0">
-            <a:schemeClr val="accent1"/>
-          </a:fillRef>
-          <a:effectRef idx="0">
-            <a:schemeClr val="accent1"/>
-          </a:effectRef>
-          <a:fontRef idx="minor">
-            <a:schemeClr val="tx1"/>
-          </a:fontRef>
-        </p:style>
-      </p:cxnSp>
-      <p:cxnSp>
-        <p:nvCxnSpPr>
-          <p:cNvPr id="82" name="连接符: 肘形 81">
-            <a:extLst>
-              <a:ext uri="{FF2B5EF4-FFF2-40B4-BE49-F238E27FC236}">
-                <a16:creationId xmlns:a16="http://schemas.microsoft.com/office/drawing/2014/main" id="{5D7F983F-31A7-413D-9846-23285C277E26}"/>
-              </a:ext>
-            </a:extLst>
-          </p:cNvPr>
-          <p:cNvCxnSpPr>
-            <a:cxnSpLocks/>
-            <a:stCxn id="16" idx="3"/>
-            <a:endCxn id="76" idx="1"/>
-          </p:cNvCxnSpPr>
-          <p:nvPr/>
-        </p:nvCxnSpPr>
-        <p:spPr>
-          <a:xfrm flipV="1">
-            <a:off x="2896827" y="3525854"/>
-            <a:ext cx="928301" cy="501262"/>
-          </a:xfrm>
-          <a:prstGeom prst="bentConnector3">
-            <a:avLst/>
-          </a:prstGeom>
-          <a:ln w="19050">
-            <a:solidFill>
-              <a:schemeClr val="tx1"/>
-            </a:solidFill>
-            <a:tailEnd type="triangle"/>
-          </a:ln>
-        </p:spPr>
-        <p:style>
-          <a:lnRef idx="1">
-            <a:schemeClr val="accent1"/>
-          </a:lnRef>
-          <a:fillRef idx="0">
-            <a:schemeClr val="accent1"/>
-          </a:fillRef>
-          <a:effectRef idx="0">
-            <a:schemeClr val="accent1"/>
-          </a:effectRef>
-          <a:fontRef idx="minor">
-            <a:schemeClr val="tx1"/>
-          </a:fontRef>
-        </p:style>
-      </p:cxnSp>
-      <p:sp>
-        <p:nvSpPr>
-          <p:cNvPr id="91" name="Google Shape;6734;p68">
-            <a:extLst>
-              <a:ext uri="{FF2B5EF4-FFF2-40B4-BE49-F238E27FC236}">
-                <a16:creationId xmlns:a16="http://schemas.microsoft.com/office/drawing/2014/main" id="{74FAC3FE-7310-46B0-B14B-04BE4920AB8D}"/>
-              </a:ext>
-            </a:extLst>
-          </p:cNvPr>
-          <p:cNvSpPr/>
-          <p:nvPr/>
-        </p:nvSpPr>
-        <p:spPr>
-          <a:xfrm>
-            <a:off x="2029039" y="1631760"/>
-            <a:ext cx="1110850" cy="526493"/>
-          </a:xfrm>
-          <a:prstGeom prst="cube">
-            <a:avLst>
-              <a:gd name="adj" fmla="val 43894"/>
-            </a:avLst>
-          </a:prstGeom>
-          <a:gradFill flip="none" rotWithShape="1">
-            <a:gsLst>
-              <a:gs pos="0">
-                <a:schemeClr val="accent4">
-                  <a:lumMod val="40000"/>
-                  <a:lumOff val="60000"/>
-                  <a:shade val="30000"/>
-                  <a:satMod val="115000"/>
-                </a:schemeClr>
-              </a:gs>
-              <a:gs pos="50000">
-                <a:schemeClr val="accent4">
-                  <a:lumMod val="40000"/>
-                  <a:lumOff val="60000"/>
-                  <a:shade val="67500"/>
-                  <a:satMod val="115000"/>
-                </a:schemeClr>
-              </a:gs>
-              <a:gs pos="100000">
-                <a:schemeClr val="accent4">
-                  <a:lumMod val="40000"/>
-                  <a:lumOff val="60000"/>
-                  <a:shade val="100000"/>
-                  <a:satMod val="115000"/>
-                </a:schemeClr>
-              </a:gs>
-            </a:gsLst>
-            <a:lin ang="16200000" scaled="1"/>
-            <a:tileRect/>
-          </a:gradFill>
-          <a:ln w="9525" cap="flat" cmpd="sng">
-            <a:solidFill>
-              <a:schemeClr val="tx1"/>
-            </a:solidFill>
-            <a:prstDash val="solid"/>
-            <a:round/>
-            <a:headEnd type="none" w="sm" len="sm"/>
-            <a:tailEnd type="none" w="sm" len="sm"/>
-          </a:ln>
-        </p:spPr>
-        <p:txBody>
-          <a:bodyPr spcFirstLastPara="1" wrap="square" lIns="91425" tIns="91425" rIns="91425" bIns="91425" anchor="ctr" anchorCtr="0">
-            <a:noAutofit/>
-          </a:bodyPr>
-          <a:lstStyle/>
-          <a:p>
-            <a:pPr marL="0" lvl="0" indent="0" algn="ctr" rtl="0">
-              <a:spcBef>
-                <a:spcPts val="0"/>
-              </a:spcBef>
-              <a:spcAft>
-                <a:spcPts val="0"/>
-              </a:spcAft>
-              <a:buNone/>
-            </a:pPr>
-            <a:r>
-              <a:rPr lang="en-US" sz="1400" b="1" dirty="0"/>
-              <a:t>HVT</a:t>
-            </a:r>
-            <a:endParaRPr sz="1400" b="1" dirty="0"/>
-          </a:p>
-        </p:txBody>
-      </p:sp>
       <p:cxnSp>
         <p:nvCxnSpPr>
           <p:cNvPr id="92" name="Google Shape;10001;p124">
@@ -12577,7 +12337,7 @@
         </p:nvCxnSpPr>
         <p:spPr>
           <a:xfrm>
-            <a:off x="3220509" y="1854157"/>
+            <a:off x="3314639" y="1833987"/>
             <a:ext cx="533269" cy="0"/>
           </a:xfrm>
           <a:prstGeom prst="straightConnector1">
@@ -12736,62 +12496,6 @@
               <a:buNone/>
             </a:pPr>
             <a:endParaRPr/>
-          </a:p>
-        </p:txBody>
-      </p:sp>
-      <p:sp>
-        <p:nvSpPr>
-          <p:cNvPr id="104" name="Google Shape;8975;p108">
-            <a:extLst>
-              <a:ext uri="{FF2B5EF4-FFF2-40B4-BE49-F238E27FC236}">
-                <a16:creationId xmlns:a16="http://schemas.microsoft.com/office/drawing/2014/main" id="{4C18CA16-5A0E-496D-95F4-834601ECFF59}"/>
-              </a:ext>
-            </a:extLst>
-          </p:cNvPr>
-          <p:cNvSpPr/>
-          <p:nvPr/>
-        </p:nvSpPr>
-        <p:spPr>
-          <a:xfrm rot="5400000">
-            <a:off x="10328218" y="2710459"/>
-            <a:ext cx="1000058" cy="262214"/>
-          </a:xfrm>
-          <a:prstGeom prst="rect">
-            <a:avLst/>
-          </a:prstGeom>
-          <a:solidFill>
-            <a:schemeClr val="bg2"/>
-          </a:solidFill>
-          <a:ln w="9525" cap="flat" cmpd="sng">
-            <a:solidFill>
-              <a:schemeClr val="tx1"/>
-            </a:solidFill>
-            <a:prstDash val="solid"/>
-            <a:round/>
-            <a:headEnd type="none" w="sm" len="sm"/>
-            <a:tailEnd type="none" w="sm" len="sm"/>
-          </a:ln>
-        </p:spPr>
-        <p:txBody>
-          <a:bodyPr spcFirstLastPara="1" wrap="square" lIns="91425" tIns="91425" rIns="91425" bIns="91425" anchor="ctr" anchorCtr="0">
-            <a:noAutofit/>
-          </a:bodyPr>
-          <a:lstStyle/>
-          <a:p>
-            <a:pPr marL="0" lvl="0" indent="0" algn="ctr" rtl="0">
-              <a:spcBef>
-                <a:spcPts val="0"/>
-              </a:spcBef>
-              <a:spcAft>
-                <a:spcPts val="0"/>
-              </a:spcAft>
-              <a:buNone/>
-            </a:pPr>
-            <a:r>
-              <a:rPr lang="en" sz="1200" b="1" dirty="0"/>
-              <a:t>PHVIT</a:t>
-            </a:r>
-            <a:endParaRPr sz="1200" b="1" dirty="0"/>
           </a:p>
         </p:txBody>
       </p:sp>
@@ -13094,12 +12798,241 @@
           </a:p>
         </p:txBody>
       </p:sp>
-      <p:sp>
-        <p:nvSpPr>
-          <p:cNvPr id="141" name="流程图: 接点 140">
+      <p:cxnSp>
+        <p:nvCxnSpPr>
+          <p:cNvPr id="142" name="Google Shape;10001;p124">
             <a:extLst>
               <a:ext uri="{FF2B5EF4-FFF2-40B4-BE49-F238E27FC236}">
-                <a16:creationId xmlns:a16="http://schemas.microsoft.com/office/drawing/2014/main" id="{DE5C5D5A-8C2F-4FFB-B5FB-2EABF61E5044}"/>
+                <a16:creationId xmlns:a16="http://schemas.microsoft.com/office/drawing/2014/main" id="{71BF0E6C-66A6-486D-BEAE-EA87DB3A8510}"/>
+              </a:ext>
+            </a:extLst>
+          </p:cNvPr>
+          <p:cNvCxnSpPr>
+            <a:cxnSpLocks/>
+          </p:cNvCxnSpPr>
+          <p:nvPr/>
+        </p:nvCxnSpPr>
+        <p:spPr>
+          <a:xfrm>
+            <a:off x="10822641" y="2021541"/>
+            <a:ext cx="5606" cy="319996"/>
+          </a:xfrm>
+          <a:prstGeom prst="straightConnector1">
+            <a:avLst/>
+          </a:prstGeom>
+          <a:noFill/>
+          <a:ln w="19050" cap="flat" cmpd="sng">
+            <a:solidFill>
+              <a:srgbClr val="000000"/>
+            </a:solidFill>
+            <a:prstDash val="solid"/>
+            <a:round/>
+            <a:headEnd type="none" w="med" len="med"/>
+            <a:tailEnd type="triangle" w="med" len="med"/>
+          </a:ln>
+        </p:spPr>
+      </p:cxnSp>
+      <p:sp>
+        <p:nvSpPr>
+          <p:cNvPr id="145" name="Google Shape;8410;p96">
+            <a:extLst>
+              <a:ext uri="{FF2B5EF4-FFF2-40B4-BE49-F238E27FC236}">
+                <a16:creationId xmlns:a16="http://schemas.microsoft.com/office/drawing/2014/main" id="{5EDEFAEB-2F91-4A58-B63F-6523C41E314C}"/>
+              </a:ext>
+            </a:extLst>
+          </p:cNvPr>
+          <p:cNvSpPr txBox="1"/>
+          <p:nvPr/>
+        </p:nvSpPr>
+        <p:spPr>
+          <a:xfrm>
+            <a:off x="11144796" y="3202160"/>
+            <a:ext cx="1125645" cy="272565"/>
+          </a:xfrm>
+          <a:prstGeom prst="rect">
+            <a:avLst/>
+          </a:prstGeom>
+          <a:noFill/>
+          <a:ln>
+            <a:noFill/>
+          </a:ln>
+        </p:spPr>
+        <p:txBody>
+          <a:bodyPr spcFirstLastPara="1" wrap="square" lIns="91425" tIns="91425" rIns="91425" bIns="91425" anchor="t" anchorCtr="0">
+            <a:noAutofit/>
+          </a:bodyPr>
+          <a:lstStyle/>
+          <a:p>
+            <a:r>
+              <a:rPr lang="en-US" sz="1000" b="1" dirty="0" err="1"/>
+              <a:t>Fusioned</a:t>
+            </a:r>
+            <a:r>
+              <a:rPr lang="en-US" sz="1000" b="1" dirty="0"/>
+              <a:t> Image</a:t>
+            </a:r>
+            <a:endParaRPr sz="1000" b="1" dirty="0"/>
+          </a:p>
+        </p:txBody>
+      </p:sp>
+      <p:sp>
+        <p:nvSpPr>
+          <p:cNvPr id="148" name="Google Shape;8410;p96">
+            <a:extLst>
+              <a:ext uri="{FF2B5EF4-FFF2-40B4-BE49-F238E27FC236}">
+                <a16:creationId xmlns:a16="http://schemas.microsoft.com/office/drawing/2014/main" id="{D7BAEA4C-DD2D-4F8C-96CA-EA578EF74C28}"/>
+              </a:ext>
+            </a:extLst>
+          </p:cNvPr>
+          <p:cNvSpPr txBox="1"/>
+          <p:nvPr/>
+        </p:nvSpPr>
+        <p:spPr>
+          <a:xfrm>
+            <a:off x="11321722" y="2109387"/>
+            <a:ext cx="668409" cy="272565"/>
+          </a:xfrm>
+          <a:prstGeom prst="rect">
+            <a:avLst/>
+          </a:prstGeom>
+          <a:noFill/>
+          <a:ln>
+            <a:noFill/>
+          </a:ln>
+        </p:spPr>
+        <p:txBody>
+          <a:bodyPr spcFirstLastPara="1" wrap="square" lIns="91425" tIns="91425" rIns="91425" bIns="91425" anchor="t" anchorCtr="0">
+            <a:noAutofit/>
+          </a:bodyPr>
+          <a:lstStyle/>
+          <a:p>
+            <a:pPr lvl="0"/>
+            <a:r>
+              <a:rPr lang="en" sz="1000" b="1" dirty="0"/>
+              <a:t>H</a:t>
+            </a:r>
+            <a:r>
+              <a:rPr lang="en-US" altLang="zh-CN" sz="1000" b="1" dirty="0"/>
+              <a:t>×W×3</a:t>
+            </a:r>
+            <a:endParaRPr sz="1000" b="1" dirty="0"/>
+          </a:p>
+        </p:txBody>
+      </p:sp>
+      <p:pic>
+        <p:nvPicPr>
+          <p:cNvPr id="152" name="图片 151">
+            <a:extLst>
+              <a:ext uri="{FF2B5EF4-FFF2-40B4-BE49-F238E27FC236}">
+                <a16:creationId xmlns:a16="http://schemas.microsoft.com/office/drawing/2014/main" id="{2E4E379E-3E62-41E2-9637-2DD774E33448}"/>
+              </a:ext>
+            </a:extLst>
+          </p:cNvPr>
+          <p:cNvPicPr>
+            <a:picLocks noChangeAspect="1"/>
+          </p:cNvPicPr>
+          <p:nvPr/>
+        </p:nvPicPr>
+        <p:blipFill>
+          <a:blip r:embed="rId7" cstate="print">
+            <a:extLst>
+              <a:ext uri="{28A0092B-C50C-407E-A947-70E740481C1C}">
+                <a14:useLocalDpi xmlns:a14="http://schemas.microsoft.com/office/drawing/2010/main" val="0"/>
+              </a:ext>
+            </a:extLst>
+          </a:blip>
+          <a:stretch>
+            <a:fillRect/>
+          </a:stretch>
+        </p:blipFill>
+        <p:spPr>
+          <a:xfrm>
+            <a:off x="5376022" y="3248305"/>
+            <a:ext cx="811866" cy="685085"/>
+          </a:xfrm>
+          <a:prstGeom prst="rect">
+            <a:avLst/>
+          </a:prstGeom>
+        </p:spPr>
+      </p:pic>
+      <p:pic>
+        <p:nvPicPr>
+          <p:cNvPr id="153" name="图片 152">
+            <a:extLst>
+              <a:ext uri="{FF2B5EF4-FFF2-40B4-BE49-F238E27FC236}">
+                <a16:creationId xmlns:a16="http://schemas.microsoft.com/office/drawing/2014/main" id="{6B42CEF5-434E-4258-9255-4F96419A8307}"/>
+              </a:ext>
+            </a:extLst>
+          </p:cNvPr>
+          <p:cNvPicPr>
+            <a:picLocks noChangeAspect="1"/>
+          </p:cNvPicPr>
+          <p:nvPr/>
+        </p:nvPicPr>
+        <p:blipFill>
+          <a:blip r:embed="rId8" cstate="print">
+            <a:extLst>
+              <a:ext uri="{28A0092B-C50C-407E-A947-70E740481C1C}">
+                <a14:useLocalDpi xmlns:a14="http://schemas.microsoft.com/office/drawing/2010/main" val="0"/>
+              </a:ext>
+            </a:extLst>
+          </a:blip>
+          <a:stretch>
+            <a:fillRect/>
+          </a:stretch>
+        </p:blipFill>
+        <p:spPr>
+          <a:xfrm>
+            <a:off x="5442418" y="3329829"/>
+            <a:ext cx="804968" cy="672912"/>
+          </a:xfrm>
+          <a:prstGeom prst="rect">
+            <a:avLst/>
+          </a:prstGeom>
+        </p:spPr>
+      </p:pic>
+      <p:pic>
+        <p:nvPicPr>
+          <p:cNvPr id="154" name="图片 153">
+            <a:extLst>
+              <a:ext uri="{FF2B5EF4-FFF2-40B4-BE49-F238E27FC236}">
+                <a16:creationId xmlns:a16="http://schemas.microsoft.com/office/drawing/2014/main" id="{C42196E0-679A-45FA-BC94-173932A826D2}"/>
+              </a:ext>
+            </a:extLst>
+          </p:cNvPr>
+          <p:cNvPicPr>
+            <a:picLocks noChangeAspect="1"/>
+          </p:cNvPicPr>
+          <p:nvPr/>
+        </p:nvPicPr>
+        <p:blipFill>
+          <a:blip r:embed="rId8" cstate="print">
+            <a:extLst>
+              <a:ext uri="{28A0092B-C50C-407E-A947-70E740481C1C}">
+                <a14:useLocalDpi xmlns:a14="http://schemas.microsoft.com/office/drawing/2010/main" val="0"/>
+              </a:ext>
+            </a:extLst>
+          </a:blip>
+          <a:stretch>
+            <a:fillRect/>
+          </a:stretch>
+        </p:blipFill>
+        <p:spPr>
+          <a:xfrm>
+            <a:off x="5514135" y="3414993"/>
+            <a:ext cx="804968" cy="672912"/>
+          </a:xfrm>
+          <a:prstGeom prst="rect">
+            <a:avLst/>
+          </a:prstGeom>
+        </p:spPr>
+      </p:pic>
+      <p:sp>
+        <p:nvSpPr>
+          <p:cNvPr id="155" name="矩形: 圆角 154">
+            <a:extLst>
+              <a:ext uri="{FF2B5EF4-FFF2-40B4-BE49-F238E27FC236}">
+                <a16:creationId xmlns:a16="http://schemas.microsoft.com/office/drawing/2014/main" id="{EAA1F407-1023-47CF-9EE7-3C90FD85AD88}"/>
               </a:ext>
             </a:extLst>
           </p:cNvPr>
@@ -13108,19 +13041,20 @@
         </p:nvSpPr>
         <p:spPr>
           <a:xfrm>
-            <a:off x="10708341" y="1792941"/>
-            <a:ext cx="228600" cy="228600"/>
-          </a:xfrm>
-          <a:prstGeom prst="flowChartConnector">
+            <a:off x="1862829" y="4780428"/>
+            <a:ext cx="8544740" cy="575233"/>
+          </a:xfrm>
+          <a:prstGeom prst="roundRect">
             <a:avLst/>
           </a:prstGeom>
           <a:solidFill>
-            <a:schemeClr val="tx1"/>
+            <a:schemeClr val="bg1"/>
           </a:solidFill>
-          <a:ln>
+          <a:ln w="19050">
             <a:solidFill>
               <a:schemeClr val="tx1"/>
             </a:solidFill>
+            <a:prstDash val="sysDash"/>
           </a:ln>
         </p:spPr>
         <p:style>
@@ -13144,251 +13078,16 @@
           <a:lstStyle/>
           <a:p>
             <a:pPr algn="ctr"/>
-            <a:r>
-              <a:rPr lang="en-US" altLang="zh-CN" b="1" dirty="0"/>
-              <a:t>K</a:t>
-            </a:r>
-            <a:endParaRPr lang="zh-CN" altLang="en-US" b="1" dirty="0"/>
-          </a:p>
-        </p:txBody>
-      </p:sp>
-      <p:cxnSp>
-        <p:nvCxnSpPr>
-          <p:cNvPr id="142" name="Google Shape;10001;p124">
+            <a:endParaRPr lang="zh-CN" altLang="en-US"/>
+          </a:p>
+        </p:txBody>
+      </p:sp>
+      <p:sp>
+        <p:nvSpPr>
+          <p:cNvPr id="156" name="流程图: 接点 155">
             <a:extLst>
               <a:ext uri="{FF2B5EF4-FFF2-40B4-BE49-F238E27FC236}">
-                <a16:creationId xmlns:a16="http://schemas.microsoft.com/office/drawing/2014/main" id="{71BF0E6C-66A6-486D-BEAE-EA87DB3A8510}"/>
-              </a:ext>
-            </a:extLst>
-          </p:cNvPr>
-          <p:cNvCxnSpPr>
-            <a:cxnSpLocks/>
-            <a:stCxn id="141" idx="4"/>
-            <a:endCxn id="104" idx="1"/>
-          </p:cNvCxnSpPr>
-          <p:nvPr/>
-        </p:nvCxnSpPr>
-        <p:spPr>
-          <a:xfrm>
-            <a:off x="10822641" y="2021541"/>
-            <a:ext cx="5606" cy="319996"/>
-          </a:xfrm>
-          <a:prstGeom prst="straightConnector1">
-            <a:avLst/>
-          </a:prstGeom>
-          <a:noFill/>
-          <a:ln w="19050" cap="flat" cmpd="sng">
-            <a:solidFill>
-              <a:srgbClr val="000000"/>
-            </a:solidFill>
-            <a:prstDash val="solid"/>
-            <a:round/>
-            <a:headEnd type="none" w="med" len="med"/>
-            <a:tailEnd type="triangle" w="med" len="med"/>
-          </a:ln>
-        </p:spPr>
-      </p:cxnSp>
-      <p:sp>
-        <p:nvSpPr>
-          <p:cNvPr id="145" name="Google Shape;8410;p96">
-            <a:extLst>
-              <a:ext uri="{FF2B5EF4-FFF2-40B4-BE49-F238E27FC236}">
-                <a16:creationId xmlns:a16="http://schemas.microsoft.com/office/drawing/2014/main" id="{5EDEFAEB-2F91-4A58-B63F-6523C41E314C}"/>
-              </a:ext>
-            </a:extLst>
-          </p:cNvPr>
-          <p:cNvSpPr txBox="1"/>
-          <p:nvPr/>
-        </p:nvSpPr>
-        <p:spPr>
-          <a:xfrm>
-            <a:off x="11144796" y="3202160"/>
-            <a:ext cx="1125645" cy="272565"/>
-          </a:xfrm>
-          <a:prstGeom prst="rect">
-            <a:avLst/>
-          </a:prstGeom>
-          <a:noFill/>
-          <a:ln>
-            <a:noFill/>
-          </a:ln>
-        </p:spPr>
-        <p:txBody>
-          <a:bodyPr spcFirstLastPara="1" wrap="square" lIns="91425" tIns="91425" rIns="91425" bIns="91425" anchor="t" anchorCtr="0">
-            <a:noAutofit/>
-          </a:bodyPr>
-          <a:lstStyle/>
-          <a:p>
-            <a:r>
-              <a:rPr lang="en-US" sz="1000" b="1" dirty="0" err="1"/>
-              <a:t>Fusioned</a:t>
-            </a:r>
-            <a:r>
-              <a:rPr lang="en-US" sz="1000" b="1" dirty="0"/>
-              <a:t> Image</a:t>
-            </a:r>
-            <a:endParaRPr sz="1000" b="1" dirty="0"/>
-          </a:p>
-        </p:txBody>
-      </p:sp>
-      <p:sp>
-        <p:nvSpPr>
-          <p:cNvPr id="148" name="Google Shape;8410;p96">
-            <a:extLst>
-              <a:ext uri="{FF2B5EF4-FFF2-40B4-BE49-F238E27FC236}">
-                <a16:creationId xmlns:a16="http://schemas.microsoft.com/office/drawing/2014/main" id="{D7BAEA4C-DD2D-4F8C-96CA-EA578EF74C28}"/>
-              </a:ext>
-            </a:extLst>
-          </p:cNvPr>
-          <p:cNvSpPr txBox="1"/>
-          <p:nvPr/>
-        </p:nvSpPr>
-        <p:spPr>
-          <a:xfrm>
-            <a:off x="11321722" y="2109387"/>
-            <a:ext cx="668409" cy="272565"/>
-          </a:xfrm>
-          <a:prstGeom prst="rect">
-            <a:avLst/>
-          </a:prstGeom>
-          <a:noFill/>
-          <a:ln>
-            <a:noFill/>
-          </a:ln>
-        </p:spPr>
-        <p:txBody>
-          <a:bodyPr spcFirstLastPara="1" wrap="square" lIns="91425" tIns="91425" rIns="91425" bIns="91425" anchor="t" anchorCtr="0">
-            <a:noAutofit/>
-          </a:bodyPr>
-          <a:lstStyle/>
-          <a:p>
-            <a:pPr lvl="0"/>
-            <a:r>
-              <a:rPr lang="en" sz="1000" b="1" dirty="0"/>
-              <a:t>H</a:t>
-            </a:r>
-            <a:r>
-              <a:rPr lang="en-US" altLang="zh-CN" sz="1000" b="1" dirty="0"/>
-              <a:t>×W×3</a:t>
-            </a:r>
-            <a:endParaRPr sz="1000" b="1" dirty="0"/>
-          </a:p>
-        </p:txBody>
-      </p:sp>
-      <p:pic>
-        <p:nvPicPr>
-          <p:cNvPr id="152" name="图片 151">
-            <a:extLst>
-              <a:ext uri="{FF2B5EF4-FFF2-40B4-BE49-F238E27FC236}">
-                <a16:creationId xmlns:a16="http://schemas.microsoft.com/office/drawing/2014/main" id="{2E4E379E-3E62-41E2-9637-2DD774E33448}"/>
-              </a:ext>
-            </a:extLst>
-          </p:cNvPr>
-          <p:cNvPicPr>
-            <a:picLocks noChangeAspect="1"/>
-          </p:cNvPicPr>
-          <p:nvPr/>
-        </p:nvPicPr>
-        <p:blipFill>
-          <a:blip r:embed="rId6" cstate="print">
-            <a:extLst>
-              <a:ext uri="{28A0092B-C50C-407E-A947-70E740481C1C}">
-                <a14:useLocalDpi xmlns:a14="http://schemas.microsoft.com/office/drawing/2010/main" val="0"/>
-              </a:ext>
-            </a:extLst>
-          </a:blip>
-          <a:stretch>
-            <a:fillRect/>
-          </a:stretch>
-        </p:blipFill>
-        <p:spPr>
-          <a:xfrm>
-            <a:off x="5376022" y="3248305"/>
-            <a:ext cx="811866" cy="685085"/>
-          </a:xfrm>
-          <a:prstGeom prst="rect">
-            <a:avLst/>
-          </a:prstGeom>
-        </p:spPr>
-      </p:pic>
-      <p:pic>
-        <p:nvPicPr>
-          <p:cNvPr id="153" name="图片 152">
-            <a:extLst>
-              <a:ext uri="{FF2B5EF4-FFF2-40B4-BE49-F238E27FC236}">
-                <a16:creationId xmlns:a16="http://schemas.microsoft.com/office/drawing/2014/main" id="{6B42CEF5-434E-4258-9255-4F96419A8307}"/>
-              </a:ext>
-            </a:extLst>
-          </p:cNvPr>
-          <p:cNvPicPr>
-            <a:picLocks noChangeAspect="1"/>
-          </p:cNvPicPr>
-          <p:nvPr/>
-        </p:nvPicPr>
-        <p:blipFill>
-          <a:blip r:embed="rId8" cstate="print">
-            <a:extLst>
-              <a:ext uri="{28A0092B-C50C-407E-A947-70E740481C1C}">
-                <a14:useLocalDpi xmlns:a14="http://schemas.microsoft.com/office/drawing/2010/main" val="0"/>
-              </a:ext>
-            </a:extLst>
-          </a:blip>
-          <a:stretch>
-            <a:fillRect/>
-          </a:stretch>
-        </p:blipFill>
-        <p:spPr>
-          <a:xfrm>
-            <a:off x="5442418" y="3329829"/>
-            <a:ext cx="804968" cy="672912"/>
-          </a:xfrm>
-          <a:prstGeom prst="rect">
-            <a:avLst/>
-          </a:prstGeom>
-        </p:spPr>
-      </p:pic>
-      <p:pic>
-        <p:nvPicPr>
-          <p:cNvPr id="154" name="图片 153">
-            <a:extLst>
-              <a:ext uri="{FF2B5EF4-FFF2-40B4-BE49-F238E27FC236}">
-                <a16:creationId xmlns:a16="http://schemas.microsoft.com/office/drawing/2014/main" id="{C42196E0-679A-45FA-BC94-173932A826D2}"/>
-              </a:ext>
-            </a:extLst>
-          </p:cNvPr>
-          <p:cNvPicPr>
-            <a:picLocks noChangeAspect="1"/>
-          </p:cNvPicPr>
-          <p:nvPr/>
-        </p:nvPicPr>
-        <p:blipFill>
-          <a:blip r:embed="rId8" cstate="print">
-            <a:extLst>
-              <a:ext uri="{28A0092B-C50C-407E-A947-70E740481C1C}">
-                <a14:useLocalDpi xmlns:a14="http://schemas.microsoft.com/office/drawing/2010/main" val="0"/>
-              </a:ext>
-            </a:extLst>
-          </a:blip>
-          <a:stretch>
-            <a:fillRect/>
-          </a:stretch>
-        </p:blipFill>
-        <p:spPr>
-          <a:xfrm>
-            <a:off x="5514135" y="3414993"/>
-            <a:ext cx="804968" cy="672912"/>
-          </a:xfrm>
-          <a:prstGeom prst="rect">
-            <a:avLst/>
-          </a:prstGeom>
-        </p:spPr>
-      </p:pic>
-      <p:sp>
-        <p:nvSpPr>
-          <p:cNvPr id="155" name="矩形: 圆角 154">
-            <a:extLst>
-              <a:ext uri="{FF2B5EF4-FFF2-40B4-BE49-F238E27FC236}">
-                <a16:creationId xmlns:a16="http://schemas.microsoft.com/office/drawing/2014/main" id="{EAA1F407-1023-47CF-9EE7-3C90FD85AD88}"/>
+                <a16:creationId xmlns:a16="http://schemas.microsoft.com/office/drawing/2014/main" id="{89479A0B-FBF7-46E2-9E41-DC65B0870A6D}"/>
               </a:ext>
             </a:extLst>
           </p:cNvPr>
@@ -13397,20 +13096,19 @@
         </p:nvSpPr>
         <p:spPr>
           <a:xfrm>
-            <a:off x="1862829" y="4780428"/>
-            <a:ext cx="8544740" cy="575233"/>
-          </a:xfrm>
-          <a:prstGeom prst="roundRect">
+            <a:off x="3292289" y="4955875"/>
+            <a:ext cx="228600" cy="228600"/>
+          </a:xfrm>
+          <a:prstGeom prst="flowChartConnector">
             <a:avLst/>
           </a:prstGeom>
           <a:solidFill>
-            <a:schemeClr val="bg1"/>
+            <a:schemeClr val="tx1"/>
           </a:solidFill>
-          <a:ln w="19050">
+          <a:ln>
             <a:solidFill>
               <a:schemeClr val="tx1"/>
             </a:solidFill>
-            <a:prstDash val="sysDash"/>
           </a:ln>
         </p:spPr>
         <p:style>
@@ -13434,16 +13132,20 @@
           <a:lstStyle/>
           <a:p>
             <a:pPr algn="ctr"/>
-            <a:endParaRPr lang="zh-CN" altLang="en-US"/>
-          </a:p>
-        </p:txBody>
-      </p:sp>
-      <p:sp>
-        <p:nvSpPr>
-          <p:cNvPr id="156" name="流程图: 接点 155">
+            <a:r>
+              <a:rPr lang="en-US" altLang="zh-CN" b="1" dirty="0"/>
+              <a:t>C</a:t>
+            </a:r>
+            <a:endParaRPr lang="zh-CN" altLang="en-US" b="1" dirty="0"/>
+          </a:p>
+        </p:txBody>
+      </p:sp>
+      <p:sp>
+        <p:nvSpPr>
+          <p:cNvPr id="157" name="流程图: 接点 156">
             <a:extLst>
               <a:ext uri="{FF2B5EF4-FFF2-40B4-BE49-F238E27FC236}">
-                <a16:creationId xmlns:a16="http://schemas.microsoft.com/office/drawing/2014/main" id="{89479A0B-FBF7-46E2-9E41-DC65B0870A6D}"/>
+                <a16:creationId xmlns:a16="http://schemas.microsoft.com/office/drawing/2014/main" id="{280560A0-CF64-40DA-9B9C-9E2149700E49}"/>
               </a:ext>
             </a:extLst>
           </p:cNvPr>
@@ -13452,7 +13154,7 @@
         </p:nvSpPr>
         <p:spPr>
           <a:xfrm>
-            <a:off x="3292289" y="4955875"/>
+            <a:off x="4552098" y="4976501"/>
             <a:ext cx="228600" cy="228600"/>
           </a:xfrm>
           <a:prstGeom prst="flowChartConnector">
@@ -13490,7 +13192,7 @@
             <a:pPr algn="ctr"/>
             <a:r>
               <a:rPr lang="en-US" altLang="zh-CN" b="1" dirty="0"/>
-              <a:t>C</a:t>
+              <a:t>K</a:t>
             </a:r>
             <a:endParaRPr lang="zh-CN" altLang="en-US" b="1" dirty="0"/>
           </a:p>
@@ -13498,10 +13200,10 @@
       </p:sp>
       <p:sp>
         <p:nvSpPr>
-          <p:cNvPr id="157" name="流程图: 接点 156">
+          <p:cNvPr id="158" name="Google Shape;6733;p68">
             <a:extLst>
               <a:ext uri="{FF2B5EF4-FFF2-40B4-BE49-F238E27FC236}">
-                <a16:creationId xmlns:a16="http://schemas.microsoft.com/office/drawing/2014/main" id="{280560A0-CF64-40DA-9B9C-9E2149700E49}"/>
+                <a16:creationId xmlns:a16="http://schemas.microsoft.com/office/drawing/2014/main" id="{EBA5C81C-8793-4464-B970-FF8F1C9CA496}"/>
               </a:ext>
             </a:extLst>
           </p:cNvPr>
@@ -13510,18 +13212,77 @@
         </p:nvSpPr>
         <p:spPr>
           <a:xfrm>
-            <a:off x="4552098" y="4976501"/>
-            <a:ext cx="228600" cy="228600"/>
-          </a:xfrm>
-          <a:prstGeom prst="flowChartConnector">
-            <a:avLst/>
+            <a:off x="6118918" y="4804620"/>
+            <a:ext cx="192487" cy="482400"/>
+          </a:xfrm>
+          <a:prstGeom prst="cube">
+            <a:avLst>
+              <a:gd name="adj" fmla="val 78947"/>
+            </a:avLst>
           </a:prstGeom>
           <a:solidFill>
-            <a:schemeClr val="tx1"/>
+            <a:srgbClr val="C9DAF8">
+              <a:alpha val="39660"/>
+            </a:srgbClr>
+          </a:solidFill>
+          <a:ln w="9525" cap="flat" cmpd="sng">
+            <a:solidFill>
+              <a:srgbClr val="0000FF"/>
+            </a:solidFill>
+            <a:prstDash val="solid"/>
+            <a:round/>
+            <a:headEnd type="none" w="sm" len="sm"/>
+            <a:tailEnd type="none" w="sm" len="sm"/>
+          </a:ln>
+        </p:spPr>
+        <p:txBody>
+          <a:bodyPr spcFirstLastPara="1" wrap="square" lIns="91425" tIns="91425" rIns="91425" bIns="91425" anchor="ctr" anchorCtr="0">
+            <a:noAutofit/>
+          </a:bodyPr>
+          <a:lstStyle/>
+          <a:p>
+            <a:pPr marL="0" lvl="0" indent="0" algn="l" rtl="0">
+              <a:spcBef>
+                <a:spcPts val="0"/>
+              </a:spcBef>
+              <a:spcAft>
+                <a:spcPts val="0"/>
+              </a:spcAft>
+              <a:buNone/>
+            </a:pPr>
+            <a:endParaRPr/>
+          </a:p>
+        </p:txBody>
+      </p:sp>
+      <p:sp>
+        <p:nvSpPr>
+          <p:cNvPr id="159" name="箭头: 右 158">
+            <a:extLst>
+              <a:ext uri="{FF2B5EF4-FFF2-40B4-BE49-F238E27FC236}">
+                <a16:creationId xmlns:a16="http://schemas.microsoft.com/office/drawing/2014/main" id="{E78C9161-4D3E-45E8-BBDE-08DCDCBD3A8D}"/>
+              </a:ext>
+            </a:extLst>
+          </p:cNvPr>
+          <p:cNvSpPr/>
+          <p:nvPr/>
+        </p:nvSpPr>
+        <p:spPr>
+          <a:xfrm>
+            <a:off x="9026693" y="5017751"/>
+            <a:ext cx="311296" cy="158918"/>
+          </a:xfrm>
+          <a:prstGeom prst="rightArrow">
+            <a:avLst/>
+          </a:prstGeom>
+          <a:solidFill>
+            <a:schemeClr val="accent2">
+              <a:lumMod val="60000"/>
+              <a:lumOff val="40000"/>
+            </a:schemeClr>
           </a:solidFill>
           <a:ln>
             <a:solidFill>
-              <a:schemeClr val="tx1"/>
+              <a:schemeClr val="accent2"/>
             </a:solidFill>
           </a:ln>
         </p:spPr>
@@ -13546,20 +13307,16 @@
           <a:lstStyle/>
           <a:p>
             <a:pPr algn="ctr"/>
-            <a:r>
-              <a:rPr lang="en-US" altLang="zh-CN" b="1" dirty="0"/>
-              <a:t>K</a:t>
-            </a:r>
-            <a:endParaRPr lang="zh-CN" altLang="en-US" b="1" dirty="0"/>
-          </a:p>
-        </p:txBody>
-      </p:sp>
-      <p:sp>
-        <p:nvSpPr>
-          <p:cNvPr id="158" name="Google Shape;6733;p68">
+            <a:endParaRPr lang="zh-CN" altLang="en-US"/>
+          </a:p>
+        </p:txBody>
+      </p:sp>
+      <p:sp>
+        <p:nvSpPr>
+          <p:cNvPr id="164" name="箭头: 右 163">
             <a:extLst>
               <a:ext uri="{FF2B5EF4-FFF2-40B4-BE49-F238E27FC236}">
-                <a16:creationId xmlns:a16="http://schemas.microsoft.com/office/drawing/2014/main" id="{EBA5C81C-8793-4464-B970-FF8F1C9CA496}"/>
+                <a16:creationId xmlns:a16="http://schemas.microsoft.com/office/drawing/2014/main" id="{4E9935B1-C8F1-4A4E-9F65-412A23C2E149}"/>
               </a:ext>
             </a:extLst>
           </p:cNvPr>
@@ -13568,77 +13325,21 @@
         </p:nvSpPr>
         <p:spPr>
           <a:xfrm>
-            <a:off x="6118918" y="4804620"/>
-            <a:ext cx="192487" cy="482400"/>
-          </a:xfrm>
-          <a:prstGeom prst="cube">
-            <a:avLst>
-              <a:gd name="adj" fmla="val 78947"/>
-            </a:avLst>
+            <a:off x="7431228" y="5024625"/>
+            <a:ext cx="311296" cy="158918"/>
+          </a:xfrm>
+          <a:prstGeom prst="rightArrow">
+            <a:avLst/>
           </a:prstGeom>
           <a:solidFill>
-            <a:srgbClr val="C9DAF8">
-              <a:alpha val="39660"/>
-            </a:srgbClr>
-          </a:solidFill>
-          <a:ln w="9525" cap="flat" cmpd="sng">
-            <a:solidFill>
-              <a:srgbClr val="0000FF"/>
-            </a:solidFill>
-            <a:prstDash val="solid"/>
-            <a:round/>
-            <a:headEnd type="none" w="sm" len="sm"/>
-            <a:tailEnd type="none" w="sm" len="sm"/>
-          </a:ln>
-        </p:spPr>
-        <p:txBody>
-          <a:bodyPr spcFirstLastPara="1" wrap="square" lIns="91425" tIns="91425" rIns="91425" bIns="91425" anchor="ctr" anchorCtr="0">
-            <a:noAutofit/>
-          </a:bodyPr>
-          <a:lstStyle/>
-          <a:p>
-            <a:pPr marL="0" lvl="0" indent="0" algn="l" rtl="0">
-              <a:spcBef>
-                <a:spcPts val="0"/>
-              </a:spcBef>
-              <a:spcAft>
-                <a:spcPts val="0"/>
-              </a:spcAft>
-              <a:buNone/>
-            </a:pPr>
-            <a:endParaRPr/>
-          </a:p>
-        </p:txBody>
-      </p:sp>
-      <p:sp>
-        <p:nvSpPr>
-          <p:cNvPr id="159" name="箭头: 右 158">
-            <a:extLst>
-              <a:ext uri="{FF2B5EF4-FFF2-40B4-BE49-F238E27FC236}">
-                <a16:creationId xmlns:a16="http://schemas.microsoft.com/office/drawing/2014/main" id="{E78C9161-4D3E-45E8-BBDE-08DCDCBD3A8D}"/>
-              </a:ext>
-            </a:extLst>
-          </p:cNvPr>
-          <p:cNvSpPr/>
-          <p:nvPr/>
-        </p:nvSpPr>
-        <p:spPr>
-          <a:xfrm>
-            <a:off x="9026693" y="5017751"/>
-            <a:ext cx="311296" cy="158918"/>
-          </a:xfrm>
-          <a:prstGeom prst="rightArrow">
-            <a:avLst/>
-          </a:prstGeom>
-          <a:solidFill>
-            <a:schemeClr val="accent2">
-              <a:lumMod val="60000"/>
-              <a:lumOff val="40000"/>
+            <a:schemeClr val="accent6">
+              <a:lumMod val="40000"/>
+              <a:lumOff val="60000"/>
             </a:schemeClr>
           </a:solidFill>
           <a:ln>
             <a:solidFill>
-              <a:schemeClr val="accent2"/>
+              <a:schemeClr val="accent6"/>
             </a:solidFill>
           </a:ln>
         </p:spPr>
@@ -13669,63 +13370,6 @@
       </p:sp>
       <p:sp>
         <p:nvSpPr>
-          <p:cNvPr id="164" name="箭头: 右 163">
-            <a:extLst>
-              <a:ext uri="{FF2B5EF4-FFF2-40B4-BE49-F238E27FC236}">
-                <a16:creationId xmlns:a16="http://schemas.microsoft.com/office/drawing/2014/main" id="{4E9935B1-C8F1-4A4E-9F65-412A23C2E149}"/>
-              </a:ext>
-            </a:extLst>
-          </p:cNvPr>
-          <p:cNvSpPr/>
-          <p:nvPr/>
-        </p:nvSpPr>
-        <p:spPr>
-          <a:xfrm>
-            <a:off x="7431228" y="5024625"/>
-            <a:ext cx="311296" cy="158918"/>
-          </a:xfrm>
-          <a:prstGeom prst="rightArrow">
-            <a:avLst/>
-          </a:prstGeom>
-          <a:solidFill>
-            <a:schemeClr val="accent6">
-              <a:lumMod val="40000"/>
-              <a:lumOff val="60000"/>
-            </a:schemeClr>
-          </a:solidFill>
-          <a:ln>
-            <a:solidFill>
-              <a:schemeClr val="accent6"/>
-            </a:solidFill>
-          </a:ln>
-        </p:spPr>
-        <p:style>
-          <a:lnRef idx="2">
-            <a:schemeClr val="accent1">
-              <a:shade val="50000"/>
-            </a:schemeClr>
-          </a:lnRef>
-          <a:fillRef idx="1">
-            <a:schemeClr val="accent1"/>
-          </a:fillRef>
-          <a:effectRef idx="0">
-            <a:schemeClr val="accent1"/>
-          </a:effectRef>
-          <a:fontRef idx="minor">
-            <a:schemeClr val="lt1"/>
-          </a:fontRef>
-        </p:style>
-        <p:txBody>
-          <a:bodyPr rtlCol="0" anchor="ctr"/>
-          <a:lstStyle/>
-          <a:p>
-            <a:pPr algn="ctr"/>
-            <a:endParaRPr lang="zh-CN" altLang="en-US"/>
-          </a:p>
-        </p:txBody>
-      </p:sp>
-      <p:sp>
-        <p:nvSpPr>
           <p:cNvPr id="165" name="Google Shape;8975;p108">
             <a:extLst>
               <a:ext uri="{FF2B5EF4-FFF2-40B4-BE49-F238E27FC236}">
@@ -13780,64 +13424,6 @@
                 <a:srgbClr val="FF0000"/>
               </a:solidFill>
             </a:endParaRPr>
-          </a:p>
-        </p:txBody>
-      </p:sp>
-      <p:sp>
-        <p:nvSpPr>
-          <p:cNvPr id="173" name="流程图: 接点 172">
-            <a:extLst>
-              <a:ext uri="{FF2B5EF4-FFF2-40B4-BE49-F238E27FC236}">
-                <a16:creationId xmlns:a16="http://schemas.microsoft.com/office/drawing/2014/main" id="{CDF2E6B4-52B2-4944-BB0B-A10DAFF9A3C2}"/>
-              </a:ext>
-            </a:extLst>
-          </p:cNvPr>
-          <p:cNvSpPr/>
-          <p:nvPr/>
-        </p:nvSpPr>
-        <p:spPr>
-          <a:xfrm>
-            <a:off x="3437814" y="3416977"/>
-            <a:ext cx="228600" cy="228600"/>
-          </a:xfrm>
-          <a:prstGeom prst="flowChartConnector">
-            <a:avLst/>
-          </a:prstGeom>
-          <a:solidFill>
-            <a:schemeClr val="tx1"/>
-          </a:solidFill>
-          <a:ln>
-            <a:solidFill>
-              <a:schemeClr val="tx1"/>
-            </a:solidFill>
-          </a:ln>
-        </p:spPr>
-        <p:style>
-          <a:lnRef idx="2">
-            <a:schemeClr val="accent1">
-              <a:shade val="50000"/>
-            </a:schemeClr>
-          </a:lnRef>
-          <a:fillRef idx="1">
-            <a:schemeClr val="accent1"/>
-          </a:fillRef>
-          <a:effectRef idx="0">
-            <a:schemeClr val="accent1"/>
-          </a:effectRef>
-          <a:fontRef idx="minor">
-            <a:schemeClr val="lt1"/>
-          </a:fontRef>
-        </p:style>
-        <p:txBody>
-          <a:bodyPr rtlCol="0" anchor="ctr"/>
-          <a:lstStyle/>
-          <a:p>
-            <a:pPr algn="ctr"/>
-            <a:r>
-              <a:rPr lang="en-US" altLang="zh-CN" b="1" dirty="0"/>
-              <a:t>C</a:t>
-            </a:r>
-            <a:endParaRPr lang="zh-CN" altLang="en-US" b="1" dirty="0"/>
           </a:p>
         </p:txBody>
       </p:sp>
@@ -14301,6 +13887,542 @@
           </a:fontRef>
         </p:style>
       </p:cxnSp>
+      <p:sp>
+        <p:nvSpPr>
+          <p:cNvPr id="88" name="Google Shape;8975;p108">
+            <a:extLst>
+              <a:ext uri="{FF2B5EF4-FFF2-40B4-BE49-F238E27FC236}">
+                <a16:creationId xmlns:a16="http://schemas.microsoft.com/office/drawing/2014/main" id="{A1260E2C-53CB-4595-84A1-67E5BB9EC3B8}"/>
+              </a:ext>
+            </a:extLst>
+          </p:cNvPr>
+          <p:cNvSpPr/>
+          <p:nvPr/>
+        </p:nvSpPr>
+        <p:spPr>
+          <a:xfrm rot="5400000">
+            <a:off x="1913201" y="2195590"/>
+            <a:ext cx="528505" cy="203643"/>
+          </a:xfrm>
+          <a:prstGeom prst="rect">
+            <a:avLst/>
+          </a:prstGeom>
+          <a:solidFill>
+            <a:schemeClr val="accent5">
+              <a:lumMod val="40000"/>
+              <a:lumOff val="60000"/>
+            </a:schemeClr>
+          </a:solidFill>
+          <a:ln w="9525" cap="flat" cmpd="sng">
+            <a:solidFill>
+              <a:schemeClr val="dk2"/>
+            </a:solidFill>
+            <a:prstDash val="solid"/>
+            <a:round/>
+            <a:headEnd type="none" w="sm" len="sm"/>
+            <a:tailEnd type="none" w="sm" len="sm"/>
+          </a:ln>
+        </p:spPr>
+        <p:txBody>
+          <a:bodyPr spcFirstLastPara="1" wrap="square" lIns="91425" tIns="91425" rIns="91425" bIns="91425" anchor="ctr" anchorCtr="0">
+            <a:noAutofit/>
+          </a:bodyPr>
+          <a:lstStyle/>
+          <a:p>
+            <a:pPr marL="0" lvl="0" indent="0" algn="ctr" rtl="0">
+              <a:spcBef>
+                <a:spcPts val="0"/>
+              </a:spcBef>
+              <a:spcAft>
+                <a:spcPts val="0"/>
+              </a:spcAft>
+              <a:buNone/>
+            </a:pPr>
+            <a:r>
+              <a:rPr lang="en" sz="1200" b="1" dirty="0"/>
+              <a:t>FFT</a:t>
+            </a:r>
+            <a:endParaRPr sz="1200" b="1" dirty="0"/>
+          </a:p>
+        </p:txBody>
+      </p:sp>
+      <p:sp>
+        <p:nvSpPr>
+          <p:cNvPr id="89" name="Google Shape;8975;p108">
+            <a:extLst>
+              <a:ext uri="{FF2B5EF4-FFF2-40B4-BE49-F238E27FC236}">
+                <a16:creationId xmlns:a16="http://schemas.microsoft.com/office/drawing/2014/main" id="{8C3EBD62-FA7F-4BA0-8E37-64CCB5561A75}"/>
+              </a:ext>
+            </a:extLst>
+          </p:cNvPr>
+          <p:cNvSpPr/>
+          <p:nvPr/>
+        </p:nvSpPr>
+        <p:spPr>
+          <a:xfrm rot="5400000">
+            <a:off x="1951301" y="3860784"/>
+            <a:ext cx="528505" cy="203643"/>
+          </a:xfrm>
+          <a:prstGeom prst="rect">
+            <a:avLst/>
+          </a:prstGeom>
+          <a:solidFill>
+            <a:schemeClr val="accent5">
+              <a:lumMod val="40000"/>
+              <a:lumOff val="60000"/>
+            </a:schemeClr>
+          </a:solidFill>
+          <a:ln w="9525" cap="flat" cmpd="sng">
+            <a:solidFill>
+              <a:schemeClr val="dk2"/>
+            </a:solidFill>
+            <a:prstDash val="solid"/>
+            <a:round/>
+            <a:headEnd type="none" w="sm" len="sm"/>
+            <a:tailEnd type="none" w="sm" len="sm"/>
+          </a:ln>
+        </p:spPr>
+        <p:txBody>
+          <a:bodyPr spcFirstLastPara="1" wrap="square" lIns="91425" tIns="91425" rIns="91425" bIns="91425" anchor="ctr" anchorCtr="0">
+            <a:noAutofit/>
+          </a:bodyPr>
+          <a:lstStyle/>
+          <a:p>
+            <a:pPr marL="0" lvl="0" indent="0" algn="ctr" rtl="0">
+              <a:spcBef>
+                <a:spcPts val="0"/>
+              </a:spcBef>
+              <a:spcAft>
+                <a:spcPts val="0"/>
+              </a:spcAft>
+              <a:buNone/>
+            </a:pPr>
+            <a:r>
+              <a:rPr lang="en" sz="1200" b="1" dirty="0"/>
+              <a:t>FFT</a:t>
+            </a:r>
+            <a:endParaRPr sz="1200" b="1" dirty="0"/>
+          </a:p>
+        </p:txBody>
+      </p:sp>
+      <p:sp>
+        <p:nvSpPr>
+          <p:cNvPr id="90" name="Google Shape;8975;p108">
+            <a:extLst>
+              <a:ext uri="{FF2B5EF4-FFF2-40B4-BE49-F238E27FC236}">
+                <a16:creationId xmlns:a16="http://schemas.microsoft.com/office/drawing/2014/main" id="{5289F2B5-5FEC-4FFB-B9EC-29367C47875C}"/>
+              </a:ext>
+            </a:extLst>
+          </p:cNvPr>
+          <p:cNvSpPr/>
+          <p:nvPr/>
+        </p:nvSpPr>
+        <p:spPr>
+          <a:xfrm rot="5400000">
+            <a:off x="10537248" y="2751402"/>
+            <a:ext cx="528505" cy="203643"/>
+          </a:xfrm>
+          <a:prstGeom prst="rect">
+            <a:avLst/>
+          </a:prstGeom>
+          <a:solidFill>
+            <a:schemeClr val="accent5">
+              <a:lumMod val="40000"/>
+              <a:lumOff val="60000"/>
+            </a:schemeClr>
+          </a:solidFill>
+          <a:ln w="9525" cap="flat" cmpd="sng">
+            <a:solidFill>
+              <a:schemeClr val="dk2"/>
+            </a:solidFill>
+            <a:prstDash val="solid"/>
+            <a:round/>
+            <a:headEnd type="none" w="sm" len="sm"/>
+            <a:tailEnd type="none" w="sm" len="sm"/>
+          </a:ln>
+        </p:spPr>
+        <p:txBody>
+          <a:bodyPr spcFirstLastPara="1" wrap="square" lIns="91425" tIns="91425" rIns="91425" bIns="91425" anchor="ctr" anchorCtr="0">
+            <a:noAutofit/>
+          </a:bodyPr>
+          <a:lstStyle/>
+          <a:p>
+            <a:pPr marL="0" lvl="0" indent="0" algn="ctr" rtl="0">
+              <a:spcBef>
+                <a:spcPts val="0"/>
+              </a:spcBef>
+              <a:spcAft>
+                <a:spcPts val="0"/>
+              </a:spcAft>
+              <a:buNone/>
+            </a:pPr>
+            <a:r>
+              <a:rPr lang="en" sz="1200" b="1" dirty="0"/>
+              <a:t>IFFT</a:t>
+            </a:r>
+            <a:endParaRPr sz="1200" b="1" dirty="0"/>
+          </a:p>
+        </p:txBody>
+      </p:sp>
+      <p:pic>
+        <p:nvPicPr>
+          <p:cNvPr id="94" name="图片 93">
+            <a:extLst>
+              <a:ext uri="{FF2B5EF4-FFF2-40B4-BE49-F238E27FC236}">
+                <a16:creationId xmlns:a16="http://schemas.microsoft.com/office/drawing/2014/main" id="{9E67F6E8-2753-4C2C-AB02-3EE61405E7EF}"/>
+              </a:ext>
+            </a:extLst>
+          </p:cNvPr>
+          <p:cNvPicPr>
+            <a:picLocks noChangeAspect="1"/>
+          </p:cNvPicPr>
+          <p:nvPr/>
+        </p:nvPicPr>
+        <p:blipFill>
+          <a:blip r:embed="rId6" cstate="print">
+            <a:extLst>
+              <a:ext uri="{28A0092B-C50C-407E-A947-70E740481C1C}">
+                <a14:useLocalDpi xmlns:a14="http://schemas.microsoft.com/office/drawing/2010/main" val="0"/>
+              </a:ext>
+            </a:extLst>
+          </a:blip>
+          <a:stretch>
+            <a:fillRect/>
+          </a:stretch>
+        </p:blipFill>
+        <p:spPr>
+          <a:xfrm>
+            <a:off x="2525920" y="1520594"/>
+            <a:ext cx="810499" cy="683931"/>
+          </a:xfrm>
+          <a:prstGeom prst="rect">
+            <a:avLst/>
+          </a:prstGeom>
+        </p:spPr>
+      </p:pic>
+      <p:pic>
+        <p:nvPicPr>
+          <p:cNvPr id="97" name="图片 96">
+            <a:extLst>
+              <a:ext uri="{FF2B5EF4-FFF2-40B4-BE49-F238E27FC236}">
+                <a16:creationId xmlns:a16="http://schemas.microsoft.com/office/drawing/2014/main" id="{8BE85143-FEEE-467D-9216-68F7BEDD965C}"/>
+              </a:ext>
+            </a:extLst>
+          </p:cNvPr>
+          <p:cNvPicPr>
+            <a:picLocks noChangeAspect="1"/>
+          </p:cNvPicPr>
+          <p:nvPr/>
+        </p:nvPicPr>
+        <p:blipFill>
+          <a:blip r:embed="rId8" cstate="print">
+            <a:extLst>
+              <a:ext uri="{28A0092B-C50C-407E-A947-70E740481C1C}">
+                <a14:useLocalDpi xmlns:a14="http://schemas.microsoft.com/office/drawing/2010/main" val="0"/>
+              </a:ext>
+            </a:extLst>
+          </a:blip>
+          <a:stretch>
+            <a:fillRect/>
+          </a:stretch>
+        </p:blipFill>
+        <p:spPr>
+          <a:xfrm>
+            <a:off x="2558023" y="4002181"/>
+            <a:ext cx="804968" cy="672912"/>
+          </a:xfrm>
+          <a:prstGeom prst="rect">
+            <a:avLst/>
+          </a:prstGeom>
+        </p:spPr>
+      </p:pic>
+      <p:pic>
+        <p:nvPicPr>
+          <p:cNvPr id="98" name="图片 97">
+            <a:extLst>
+              <a:ext uri="{FF2B5EF4-FFF2-40B4-BE49-F238E27FC236}">
+                <a16:creationId xmlns:a16="http://schemas.microsoft.com/office/drawing/2014/main" id="{013FF3C0-0B68-4BD5-804D-1E6C08429CD5}"/>
+              </a:ext>
+            </a:extLst>
+          </p:cNvPr>
+          <p:cNvPicPr>
+            <a:picLocks noChangeAspect="1"/>
+          </p:cNvPicPr>
+          <p:nvPr/>
+        </p:nvPicPr>
+        <p:blipFill>
+          <a:blip r:embed="rId6" cstate="print">
+            <a:extLst>
+              <a:ext uri="{28A0092B-C50C-407E-A947-70E740481C1C}">
+                <a14:useLocalDpi xmlns:a14="http://schemas.microsoft.com/office/drawing/2010/main" val="0"/>
+              </a:ext>
+            </a:extLst>
+          </a:blip>
+          <a:stretch>
+            <a:fillRect/>
+          </a:stretch>
+        </p:blipFill>
+        <p:spPr>
+          <a:xfrm>
+            <a:off x="2559537" y="2340862"/>
+            <a:ext cx="810499" cy="683931"/>
+          </a:xfrm>
+          <a:prstGeom prst="rect">
+            <a:avLst/>
+          </a:prstGeom>
+        </p:spPr>
+      </p:pic>
+      <p:pic>
+        <p:nvPicPr>
+          <p:cNvPr id="99" name="图片 98">
+            <a:extLst>
+              <a:ext uri="{FF2B5EF4-FFF2-40B4-BE49-F238E27FC236}">
+                <a16:creationId xmlns:a16="http://schemas.microsoft.com/office/drawing/2014/main" id="{9BC7A63D-27BC-4BCE-B3D7-79839699D4E2}"/>
+              </a:ext>
+            </a:extLst>
+          </p:cNvPr>
+          <p:cNvPicPr>
+            <a:picLocks noChangeAspect="1"/>
+          </p:cNvPicPr>
+          <p:nvPr/>
+        </p:nvPicPr>
+        <p:blipFill>
+          <a:blip r:embed="rId7" cstate="print">
+            <a:extLst>
+              <a:ext uri="{28A0092B-C50C-407E-A947-70E740481C1C}">
+                <a14:useLocalDpi xmlns:a14="http://schemas.microsoft.com/office/drawing/2010/main" val="0"/>
+              </a:ext>
+            </a:extLst>
+          </a:blip>
+          <a:stretch>
+            <a:fillRect/>
+          </a:stretch>
+        </p:blipFill>
+        <p:spPr>
+          <a:xfrm>
+            <a:off x="2558863" y="3221410"/>
+            <a:ext cx="811866" cy="685085"/>
+          </a:xfrm>
+          <a:prstGeom prst="rect">
+            <a:avLst/>
+          </a:prstGeom>
+        </p:spPr>
+      </p:pic>
+      <p:pic>
+        <p:nvPicPr>
+          <p:cNvPr id="102" name="图片 101">
+            <a:extLst>
+              <a:ext uri="{FF2B5EF4-FFF2-40B4-BE49-F238E27FC236}">
+                <a16:creationId xmlns:a16="http://schemas.microsoft.com/office/drawing/2014/main" id="{0D32042D-29F5-456E-B7DF-E31ADFAFDE7B}"/>
+              </a:ext>
+            </a:extLst>
+          </p:cNvPr>
+          <p:cNvPicPr>
+            <a:picLocks noChangeAspect="1"/>
+          </p:cNvPicPr>
+          <p:nvPr/>
+        </p:nvPicPr>
+        <p:blipFill>
+          <a:blip r:embed="rId6" cstate="print">
+            <a:extLst>
+              <a:ext uri="{28A0092B-C50C-407E-A947-70E740481C1C}">
+                <a14:useLocalDpi xmlns:a14="http://schemas.microsoft.com/office/drawing/2010/main" val="0"/>
+              </a:ext>
+            </a:extLst>
+          </a:blip>
+          <a:stretch>
+            <a:fillRect/>
+          </a:stretch>
+        </p:blipFill>
+        <p:spPr>
+          <a:xfrm>
+            <a:off x="3902003" y="3347152"/>
+            <a:ext cx="810499" cy="683931"/>
+          </a:xfrm>
+          <a:prstGeom prst="rect">
+            <a:avLst/>
+          </a:prstGeom>
+        </p:spPr>
+      </p:pic>
+      <p:cxnSp>
+        <p:nvCxnSpPr>
+          <p:cNvPr id="103" name="连接符: 肘形 102">
+            <a:extLst>
+              <a:ext uri="{FF2B5EF4-FFF2-40B4-BE49-F238E27FC236}">
+                <a16:creationId xmlns:a16="http://schemas.microsoft.com/office/drawing/2014/main" id="{23A48AAB-11C5-4DB6-B70E-0C5D23C2CC7E}"/>
+              </a:ext>
+            </a:extLst>
+          </p:cNvPr>
+          <p:cNvCxnSpPr>
+            <a:cxnSpLocks/>
+            <a:stCxn id="99" idx="3"/>
+            <a:endCxn id="76" idx="1"/>
+          </p:cNvCxnSpPr>
+          <p:nvPr/>
+        </p:nvCxnSpPr>
+        <p:spPr>
+          <a:xfrm flipV="1">
+            <a:off x="3370729" y="2093741"/>
+            <a:ext cx="555252" cy="1470212"/>
+          </a:xfrm>
+          <a:prstGeom prst="bentConnector3">
+            <a:avLst>
+              <a:gd name="adj1" fmla="val 50000"/>
+            </a:avLst>
+          </a:prstGeom>
+          <a:ln w="12700">
+            <a:solidFill>
+              <a:schemeClr val="tx1"/>
+            </a:solidFill>
+            <a:tailEnd type="triangle"/>
+          </a:ln>
+        </p:spPr>
+        <p:style>
+          <a:lnRef idx="1">
+            <a:schemeClr val="accent1"/>
+          </a:lnRef>
+          <a:fillRef idx="0">
+            <a:schemeClr val="accent1"/>
+          </a:fillRef>
+          <a:effectRef idx="0">
+            <a:schemeClr val="accent1"/>
+          </a:effectRef>
+          <a:fontRef idx="minor">
+            <a:schemeClr val="tx1"/>
+          </a:fontRef>
+        </p:style>
+      </p:cxnSp>
+      <p:cxnSp>
+        <p:nvCxnSpPr>
+          <p:cNvPr id="105" name="连接符: 肘形 104">
+            <a:extLst>
+              <a:ext uri="{FF2B5EF4-FFF2-40B4-BE49-F238E27FC236}">
+                <a16:creationId xmlns:a16="http://schemas.microsoft.com/office/drawing/2014/main" id="{0692BA38-D900-4A86-989C-C633930DDF13}"/>
+              </a:ext>
+            </a:extLst>
+          </p:cNvPr>
+          <p:cNvCxnSpPr>
+            <a:cxnSpLocks/>
+            <a:stCxn id="98" idx="3"/>
+            <a:endCxn id="102" idx="0"/>
+          </p:cNvCxnSpPr>
+          <p:nvPr/>
+        </p:nvCxnSpPr>
+        <p:spPr>
+          <a:xfrm>
+            <a:off x="3370036" y="2682828"/>
+            <a:ext cx="937217" cy="664324"/>
+          </a:xfrm>
+          <a:prstGeom prst="bentConnector2">
+            <a:avLst/>
+          </a:prstGeom>
+          <a:ln w="12700">
+            <a:solidFill>
+              <a:schemeClr val="tx1"/>
+            </a:solidFill>
+            <a:tailEnd type="triangle"/>
+          </a:ln>
+        </p:spPr>
+        <p:style>
+          <a:lnRef idx="1">
+            <a:schemeClr val="accent1"/>
+          </a:lnRef>
+          <a:fillRef idx="0">
+            <a:schemeClr val="accent1"/>
+          </a:fillRef>
+          <a:effectRef idx="0">
+            <a:schemeClr val="accent1"/>
+          </a:effectRef>
+          <a:fontRef idx="minor">
+            <a:schemeClr val="tx1"/>
+          </a:fontRef>
+        </p:style>
+      </p:cxnSp>
+      <p:cxnSp>
+        <p:nvCxnSpPr>
+          <p:cNvPr id="106" name="连接符: 肘形 105">
+            <a:extLst>
+              <a:ext uri="{FF2B5EF4-FFF2-40B4-BE49-F238E27FC236}">
+                <a16:creationId xmlns:a16="http://schemas.microsoft.com/office/drawing/2014/main" id="{3EE8B38F-87E7-4123-8580-D562141B8759}"/>
+              </a:ext>
+            </a:extLst>
+          </p:cNvPr>
+          <p:cNvCxnSpPr>
+            <a:cxnSpLocks/>
+            <a:stCxn id="97" idx="3"/>
+            <a:endCxn id="77" idx="2"/>
+          </p:cNvCxnSpPr>
+          <p:nvPr/>
+        </p:nvCxnSpPr>
+        <p:spPr>
+          <a:xfrm>
+            <a:off x="3362991" y="4338637"/>
+            <a:ext cx="1078934" cy="22693"/>
+          </a:xfrm>
+          <a:prstGeom prst="bentConnector4">
+            <a:avLst>
+              <a:gd name="adj1" fmla="val 20754"/>
+              <a:gd name="adj2" fmla="val 1018477"/>
+            </a:avLst>
+          </a:prstGeom>
+          <a:ln w="12700">
+            <a:solidFill>
+              <a:schemeClr val="tx1"/>
+            </a:solidFill>
+            <a:tailEnd type="triangle"/>
+          </a:ln>
+        </p:spPr>
+        <p:style>
+          <a:lnRef idx="1">
+            <a:schemeClr val="accent1"/>
+          </a:lnRef>
+          <a:fillRef idx="0">
+            <a:schemeClr val="accent1"/>
+          </a:fillRef>
+          <a:effectRef idx="0">
+            <a:schemeClr val="accent1"/>
+          </a:effectRef>
+          <a:fontRef idx="minor">
+            <a:schemeClr val="tx1"/>
+          </a:fontRef>
+        </p:style>
+      </p:cxnSp>
+      <p:pic>
+        <p:nvPicPr>
+          <p:cNvPr id="77" name="图片 76">
+            <a:extLst>
+              <a:ext uri="{FF2B5EF4-FFF2-40B4-BE49-F238E27FC236}">
+                <a16:creationId xmlns:a16="http://schemas.microsoft.com/office/drawing/2014/main" id="{A219B492-DCC6-4934-93BB-10E1B7CEE909}"/>
+              </a:ext>
+            </a:extLst>
+          </p:cNvPr>
+          <p:cNvPicPr>
+            <a:picLocks noChangeAspect="1"/>
+          </p:cNvPicPr>
+          <p:nvPr/>
+        </p:nvPicPr>
+        <p:blipFill>
+          <a:blip r:embed="rId8" cstate="print">
+            <a:extLst>
+              <a:ext uri="{28A0092B-C50C-407E-A947-70E740481C1C}">
+                <a14:useLocalDpi xmlns:a14="http://schemas.microsoft.com/office/drawing/2010/main" val="0"/>
+              </a:ext>
+            </a:extLst>
+          </a:blip>
+          <a:stretch>
+            <a:fillRect/>
+          </a:stretch>
+        </p:blipFill>
+        <p:spPr>
+          <a:xfrm>
+            <a:off x="4039441" y="3688418"/>
+            <a:ext cx="804968" cy="672912"/>
+          </a:xfrm>
+          <a:prstGeom prst="rect">
+            <a:avLst/>
+          </a:prstGeom>
+        </p:spPr>
+      </p:pic>
     </p:spTree>
     <p:extLst>
       <p:ext uri="{BB962C8B-B14F-4D97-AF65-F5344CB8AC3E}">

</xml_diff>

<commit_message>
Signed-off-by: liyi002  <liyi002@bitbucket.org> 3145
</commit_message>
<xml_diff>
--- a/Papers/基于频域的红外可见光融合/images/频域融合.pptx
+++ b/Papers/基于频域的红外可见光融合/images/频域融合.pptx
@@ -202,7 +202,7 @@
           <a:p>
             <a:fld id="{730F7C05-AD7F-4FFA-A0C0-1536BA5A251F}" type="datetimeFigureOut">
               <a:rPr lang="zh-CN" altLang="en-US" smtClean="0"/>
-              <a:t>2025/9/9</a:t>
+              <a:t>2025/9/10</a:t>
             </a:fld>
             <a:endParaRPr lang="zh-CN" altLang="en-US"/>
           </a:p>
@@ -470,6 +470,90 @@
 </file>
 
 <file path=ppt/notesSlides/notesSlide1.xml><?xml version="1.0" encoding="utf-8"?>
+<p:notes xmlns:a="http://schemas.openxmlformats.org/drawingml/2006/main" xmlns:r="http://schemas.openxmlformats.org/officeDocument/2006/relationships" xmlns:p="http://schemas.openxmlformats.org/presentationml/2006/main">
+  <p:cSld>
+    <p:spTree>
+      <p:nvGrpSpPr>
+        <p:cNvPr id="1" name=""/>
+        <p:cNvGrpSpPr/>
+        <p:nvPr/>
+      </p:nvGrpSpPr>
+      <p:grpSpPr>
+        <a:xfrm>
+          <a:off x="0" y="0"/>
+          <a:ext cx="0" cy="0"/>
+          <a:chOff x="0" y="0"/>
+          <a:chExt cx="0" cy="0"/>
+        </a:xfrm>
+      </p:grpSpPr>
+      <p:sp>
+        <p:nvSpPr>
+          <p:cNvPr id="2" name="幻灯片图像占位符 1"/>
+          <p:cNvSpPr>
+            <a:spLocks noGrp="1" noRot="1" noChangeAspect="1"/>
+          </p:cNvSpPr>
+          <p:nvPr>
+            <p:ph type="sldImg"/>
+          </p:nvPr>
+        </p:nvSpPr>
+        <p:spPr/>
+      </p:sp>
+      <p:sp>
+        <p:nvSpPr>
+          <p:cNvPr id="3" name="备注占位符 2"/>
+          <p:cNvSpPr>
+            <a:spLocks noGrp="1"/>
+          </p:cNvSpPr>
+          <p:nvPr>
+            <p:ph type="body" idx="1"/>
+          </p:nvPr>
+        </p:nvSpPr>
+        <p:spPr/>
+        <p:txBody>
+          <a:bodyPr/>
+          <a:lstStyle/>
+          <a:p>
+            <a:endParaRPr lang="zh-CN" altLang="en-US" dirty="0"/>
+          </a:p>
+        </p:txBody>
+      </p:sp>
+      <p:sp>
+        <p:nvSpPr>
+          <p:cNvPr id="4" name="灯片编号占位符 3"/>
+          <p:cNvSpPr>
+            <a:spLocks noGrp="1"/>
+          </p:cNvSpPr>
+          <p:nvPr>
+            <p:ph type="sldNum" sz="quarter" idx="5"/>
+          </p:nvPr>
+        </p:nvSpPr>
+        <p:spPr/>
+        <p:txBody>
+          <a:bodyPr/>
+          <a:lstStyle/>
+          <a:p>
+            <a:fld id="{1B8AE2B5-2FEB-4525-9184-99D996DDFD2F}" type="slidenum">
+              <a:rPr lang="zh-CN" altLang="en-US" smtClean="0"/>
+              <a:t>2</a:t>
+            </a:fld>
+            <a:endParaRPr lang="zh-CN" altLang="en-US"/>
+          </a:p>
+        </p:txBody>
+      </p:sp>
+    </p:spTree>
+    <p:extLst>
+      <p:ext uri="{BB962C8B-B14F-4D97-AF65-F5344CB8AC3E}">
+        <p14:creationId xmlns:p14="http://schemas.microsoft.com/office/powerpoint/2010/main" val="1021450265"/>
+      </p:ext>
+    </p:extLst>
+  </p:cSld>
+  <p:clrMapOvr>
+    <a:masterClrMapping/>
+  </p:clrMapOvr>
+</p:notes>
+</file>
+
+<file path=ppt/notesSlides/notesSlide2.xml><?xml version="1.0" encoding="utf-8"?>
 <p:notes xmlns:a="http://schemas.openxmlformats.org/drawingml/2006/main" xmlns:r="http://schemas.openxmlformats.org/officeDocument/2006/relationships" xmlns:p="http://schemas.openxmlformats.org/presentationml/2006/main" showMasterSp="0" showMasterPhAnim="0">
   <p:cSld>
     <p:spTree>
@@ -582,185 +666,6 @@
     <p:extLst>
       <p:ext uri="{BB962C8B-B14F-4D97-AF65-F5344CB8AC3E}">
         <p14:creationId xmlns:p14="http://schemas.microsoft.com/office/powerpoint/2010/main" val="328437494"/>
-      </p:ext>
-    </p:extLst>
-  </p:cSld>
-  <p:clrMapOvr>
-    <a:masterClrMapping/>
-  </p:clrMapOvr>
-</p:notes>
-</file>
-
-<file path=ppt/notesSlides/notesSlide2.xml><?xml version="1.0" encoding="utf-8"?>
-<p:notes xmlns:a="http://schemas.openxmlformats.org/drawingml/2006/main" xmlns:r="http://schemas.openxmlformats.org/officeDocument/2006/relationships" xmlns:p="http://schemas.openxmlformats.org/presentationml/2006/main" showMasterSp="0" showMasterPhAnim="0">
-  <p:cSld>
-    <p:spTree>
-      <p:nvGrpSpPr>
-        <p:cNvPr id="1" name="Shape 8019"/>
-        <p:cNvGrpSpPr/>
-        <p:nvPr/>
-      </p:nvGrpSpPr>
-      <p:grpSpPr>
-        <a:xfrm>
-          <a:off x="0" y="0"/>
-          <a:ext cx="0" cy="0"/>
-          <a:chOff x="0" y="0"/>
-          <a:chExt cx="0" cy="0"/>
-        </a:xfrm>
-      </p:grpSpPr>
-      <p:sp>
-        <p:nvSpPr>
-          <p:cNvPr id="8020" name="Google Shape;8020;ga4a25ee607_0_11:notes"/>
-          <p:cNvSpPr>
-            <a:spLocks noGrp="1" noRot="1" noChangeAspect="1"/>
-          </p:cNvSpPr>
-          <p:nvPr>
-            <p:ph type="sldImg" idx="2"/>
-          </p:nvPr>
-        </p:nvSpPr>
-        <p:spPr>
-          <a:xfrm>
-            <a:off x="381000" y="685800"/>
-            <a:ext cx="6096000" cy="3429000"/>
-          </a:xfrm>
-          <a:custGeom>
-            <a:avLst/>
-            <a:gdLst/>
-            <a:ahLst/>
-            <a:cxnLst/>
-            <a:rect l="l" t="t" r="r" b="b"/>
-            <a:pathLst>
-              <a:path w="120000" h="120000" extrusionOk="0">
-                <a:moveTo>
-                  <a:pt x="0" y="0"/>
-                </a:moveTo>
-                <a:lnTo>
-                  <a:pt x="120000" y="0"/>
-                </a:lnTo>
-                <a:lnTo>
-                  <a:pt x="120000" y="120000"/>
-                </a:lnTo>
-                <a:lnTo>
-                  <a:pt x="0" y="120000"/>
-                </a:lnTo>
-                <a:close/>
-              </a:path>
-            </a:pathLst>
-          </a:custGeom>
-        </p:spPr>
-      </p:sp>
-      <p:sp>
-        <p:nvSpPr>
-          <p:cNvPr id="8021" name="Google Shape;8021;ga4a25ee607_0_11:notes"/>
-          <p:cNvSpPr txBox="1">
-            <a:spLocks noGrp="1"/>
-          </p:cNvSpPr>
-          <p:nvPr>
-            <p:ph type="body" idx="1"/>
-          </p:nvPr>
-        </p:nvSpPr>
-        <p:spPr>
-          <a:xfrm>
-            <a:off x="685800" y="4343400"/>
-            <a:ext cx="5486400" cy="4114800"/>
-          </a:xfrm>
-          <a:prstGeom prst="rect">
-            <a:avLst/>
-          </a:prstGeom>
-        </p:spPr>
-        <p:txBody>
-          <a:bodyPr spcFirstLastPara="1" wrap="square" lIns="91425" tIns="91425" rIns="91425" bIns="91425" anchor="t" anchorCtr="0">
-            <a:noAutofit/>
-          </a:bodyPr>
-          <a:lstStyle/>
-          <a:p>
-            <a:pPr marL="0" lvl="0" indent="0" algn="l" rtl="0">
-              <a:spcBef>
-                <a:spcPts val="0"/>
-              </a:spcBef>
-              <a:spcAft>
-                <a:spcPts val="0"/>
-              </a:spcAft>
-              <a:buNone/>
-            </a:pPr>
-            <a:r>
-              <a:rPr lang="en"/>
-              <a:t>Note: </a:t>
-            </a:r>
-            <a:endParaRPr/>
-          </a:p>
-          <a:p>
-            <a:pPr marL="0" lvl="0" indent="0" algn="l" rtl="0">
-              <a:spcBef>
-                <a:spcPts val="0"/>
-              </a:spcBef>
-              <a:spcAft>
-                <a:spcPts val="0"/>
-              </a:spcAft>
-              <a:buNone/>
-            </a:pPr>
-            <a:endParaRPr/>
-          </a:p>
-          <a:p>
-            <a:pPr marL="457200" lvl="0" indent="-298450" algn="l" rtl="0">
-              <a:spcBef>
-                <a:spcPts val="0"/>
-              </a:spcBef>
-              <a:spcAft>
-                <a:spcPts val="0"/>
-              </a:spcAft>
-              <a:buSzPts val="1100"/>
-              <a:buChar char="-"/>
-            </a:pPr>
-            <a:r>
-              <a:rPr lang="en"/>
-              <a:t>These visuals can represent a multi-directional array (3D)</a:t>
-            </a:r>
-            <a:endParaRPr/>
-          </a:p>
-          <a:p>
-            <a:pPr marL="0" lvl="0" indent="0" algn="l" rtl="0">
-              <a:spcBef>
-                <a:spcPts val="0"/>
-              </a:spcBef>
-              <a:spcAft>
-                <a:spcPts val="0"/>
-              </a:spcAft>
-              <a:buNone/>
-            </a:pPr>
-            <a:endParaRPr/>
-          </a:p>
-          <a:p>
-            <a:pPr marL="0" lvl="0" indent="0" algn="l" rtl="0">
-              <a:spcBef>
-                <a:spcPts val="0"/>
-              </a:spcBef>
-              <a:spcAft>
-                <a:spcPts val="0"/>
-              </a:spcAft>
-              <a:buClr>
-                <a:schemeClr val="dk1"/>
-              </a:buClr>
-              <a:buSzPts val="1100"/>
-              <a:buFont typeface="Arial"/>
-              <a:buNone/>
-            </a:pPr>
-            <a:r>
-              <a:rPr lang="en">
-                <a:solidFill>
-                  <a:schemeClr val="dk1"/>
-                </a:solidFill>
-              </a:rPr>
-              <a:t>Author: Elvis Saravia (ellfae@gmail.com)</a:t>
-            </a:r>
-            <a:endParaRPr/>
-          </a:p>
-        </p:txBody>
-      </p:sp>
-    </p:spTree>
-    <p:extLst>
-      <p:ext uri="{BB962C8B-B14F-4D97-AF65-F5344CB8AC3E}">
-        <p14:creationId xmlns:p14="http://schemas.microsoft.com/office/powerpoint/2010/main" val="545560921"/>
       </p:ext>
     </p:extLst>
   </p:cSld>
@@ -939,6 +844,185 @@
     </p:spTree>
     <p:extLst>
       <p:ext uri="{BB962C8B-B14F-4D97-AF65-F5344CB8AC3E}">
+        <p14:creationId xmlns:p14="http://schemas.microsoft.com/office/powerpoint/2010/main" val="545560921"/>
+      </p:ext>
+    </p:extLst>
+  </p:cSld>
+  <p:clrMapOvr>
+    <a:masterClrMapping/>
+  </p:clrMapOvr>
+</p:notes>
+</file>
+
+<file path=ppt/notesSlides/notesSlide4.xml><?xml version="1.0" encoding="utf-8"?>
+<p:notes xmlns:a="http://schemas.openxmlformats.org/drawingml/2006/main" xmlns:r="http://schemas.openxmlformats.org/officeDocument/2006/relationships" xmlns:p="http://schemas.openxmlformats.org/presentationml/2006/main" showMasterSp="0" showMasterPhAnim="0">
+  <p:cSld>
+    <p:spTree>
+      <p:nvGrpSpPr>
+        <p:cNvPr id="1" name="Shape 8019"/>
+        <p:cNvGrpSpPr/>
+        <p:nvPr/>
+      </p:nvGrpSpPr>
+      <p:grpSpPr>
+        <a:xfrm>
+          <a:off x="0" y="0"/>
+          <a:ext cx="0" cy="0"/>
+          <a:chOff x="0" y="0"/>
+          <a:chExt cx="0" cy="0"/>
+        </a:xfrm>
+      </p:grpSpPr>
+      <p:sp>
+        <p:nvSpPr>
+          <p:cNvPr id="8020" name="Google Shape;8020;ga4a25ee607_0_11:notes"/>
+          <p:cNvSpPr>
+            <a:spLocks noGrp="1" noRot="1" noChangeAspect="1"/>
+          </p:cNvSpPr>
+          <p:nvPr>
+            <p:ph type="sldImg" idx="2"/>
+          </p:nvPr>
+        </p:nvSpPr>
+        <p:spPr>
+          <a:xfrm>
+            <a:off x="381000" y="685800"/>
+            <a:ext cx="6096000" cy="3429000"/>
+          </a:xfrm>
+          <a:custGeom>
+            <a:avLst/>
+            <a:gdLst/>
+            <a:ahLst/>
+            <a:cxnLst/>
+            <a:rect l="l" t="t" r="r" b="b"/>
+            <a:pathLst>
+              <a:path w="120000" h="120000" extrusionOk="0">
+                <a:moveTo>
+                  <a:pt x="0" y="0"/>
+                </a:moveTo>
+                <a:lnTo>
+                  <a:pt x="120000" y="0"/>
+                </a:lnTo>
+                <a:lnTo>
+                  <a:pt x="120000" y="120000"/>
+                </a:lnTo>
+                <a:lnTo>
+                  <a:pt x="0" y="120000"/>
+                </a:lnTo>
+                <a:close/>
+              </a:path>
+            </a:pathLst>
+          </a:custGeom>
+        </p:spPr>
+      </p:sp>
+      <p:sp>
+        <p:nvSpPr>
+          <p:cNvPr id="8021" name="Google Shape;8021;ga4a25ee607_0_11:notes"/>
+          <p:cNvSpPr txBox="1">
+            <a:spLocks noGrp="1"/>
+          </p:cNvSpPr>
+          <p:nvPr>
+            <p:ph type="body" idx="1"/>
+          </p:nvPr>
+        </p:nvSpPr>
+        <p:spPr>
+          <a:xfrm>
+            <a:off x="685800" y="4343400"/>
+            <a:ext cx="5486400" cy="4114800"/>
+          </a:xfrm>
+          <a:prstGeom prst="rect">
+            <a:avLst/>
+          </a:prstGeom>
+        </p:spPr>
+        <p:txBody>
+          <a:bodyPr spcFirstLastPara="1" wrap="square" lIns="91425" tIns="91425" rIns="91425" bIns="91425" anchor="t" anchorCtr="0">
+            <a:noAutofit/>
+          </a:bodyPr>
+          <a:lstStyle/>
+          <a:p>
+            <a:pPr marL="0" lvl="0" indent="0" algn="l" rtl="0">
+              <a:spcBef>
+                <a:spcPts val="0"/>
+              </a:spcBef>
+              <a:spcAft>
+                <a:spcPts val="0"/>
+              </a:spcAft>
+              <a:buNone/>
+            </a:pPr>
+            <a:r>
+              <a:rPr lang="en"/>
+              <a:t>Note: </a:t>
+            </a:r>
+            <a:endParaRPr/>
+          </a:p>
+          <a:p>
+            <a:pPr marL="0" lvl="0" indent="0" algn="l" rtl="0">
+              <a:spcBef>
+                <a:spcPts val="0"/>
+              </a:spcBef>
+              <a:spcAft>
+                <a:spcPts val="0"/>
+              </a:spcAft>
+              <a:buNone/>
+            </a:pPr>
+            <a:endParaRPr/>
+          </a:p>
+          <a:p>
+            <a:pPr marL="457200" lvl="0" indent="-298450" algn="l" rtl="0">
+              <a:spcBef>
+                <a:spcPts val="0"/>
+              </a:spcBef>
+              <a:spcAft>
+                <a:spcPts val="0"/>
+              </a:spcAft>
+              <a:buSzPts val="1100"/>
+              <a:buChar char="-"/>
+            </a:pPr>
+            <a:r>
+              <a:rPr lang="en"/>
+              <a:t>These visuals can represent a multi-directional array (3D)</a:t>
+            </a:r>
+            <a:endParaRPr/>
+          </a:p>
+          <a:p>
+            <a:pPr marL="0" lvl="0" indent="0" algn="l" rtl="0">
+              <a:spcBef>
+                <a:spcPts val="0"/>
+              </a:spcBef>
+              <a:spcAft>
+                <a:spcPts val="0"/>
+              </a:spcAft>
+              <a:buNone/>
+            </a:pPr>
+            <a:endParaRPr/>
+          </a:p>
+          <a:p>
+            <a:pPr marL="0" lvl="0" indent="0" algn="l" rtl="0">
+              <a:spcBef>
+                <a:spcPts val="0"/>
+              </a:spcBef>
+              <a:spcAft>
+                <a:spcPts val="0"/>
+              </a:spcAft>
+              <a:buClr>
+                <a:schemeClr val="dk1"/>
+              </a:buClr>
+              <a:buSzPts val="1100"/>
+              <a:buFont typeface="Arial"/>
+              <a:buNone/>
+            </a:pPr>
+            <a:r>
+              <a:rPr lang="en">
+                <a:solidFill>
+                  <a:schemeClr val="dk1"/>
+                </a:solidFill>
+              </a:rPr>
+              <a:t>Author: Elvis Saravia (ellfae@gmail.com)</a:t>
+            </a:r>
+            <a:endParaRPr/>
+          </a:p>
+        </p:txBody>
+      </p:sp>
+    </p:spTree>
+    <p:extLst>
+      <p:ext uri="{BB962C8B-B14F-4D97-AF65-F5344CB8AC3E}">
         <p14:creationId xmlns:p14="http://schemas.microsoft.com/office/powerpoint/2010/main" val="2601011239"/>
       </p:ext>
     </p:extLst>
@@ -949,7 +1033,7 @@
 </p:notes>
 </file>
 
-<file path=ppt/notesSlides/notesSlide4.xml><?xml version="1.0" encoding="utf-8"?>
+<file path=ppt/notesSlides/notesSlide5.xml><?xml version="1.0" encoding="utf-8"?>
 <p:notes xmlns:a="http://schemas.openxmlformats.org/drawingml/2006/main" xmlns:r="http://schemas.openxmlformats.org/officeDocument/2006/relationships" xmlns:p="http://schemas.openxmlformats.org/presentationml/2006/main" showMasterSp="0" showMasterPhAnim="0">
   <p:cSld>
     <p:spTree>
@@ -1257,7 +1341,7 @@
           <a:p>
             <a:fld id="{978008A0-1351-474F-B2A3-B5A922791B5E}" type="datetimeFigureOut">
               <a:rPr lang="zh-CN" altLang="en-US" smtClean="0"/>
-              <a:t>2025/9/9</a:t>
+              <a:t>2025/9/10</a:t>
             </a:fld>
             <a:endParaRPr lang="zh-CN" altLang="en-US"/>
           </a:p>
@@ -1425,7 +1509,7 @@
           <a:p>
             <a:fld id="{978008A0-1351-474F-B2A3-B5A922791B5E}" type="datetimeFigureOut">
               <a:rPr lang="zh-CN" altLang="en-US" smtClean="0"/>
-              <a:t>2025/9/9</a:t>
+              <a:t>2025/9/10</a:t>
             </a:fld>
             <a:endParaRPr lang="zh-CN" altLang="en-US"/>
           </a:p>
@@ -1603,7 +1687,7 @@
           <a:p>
             <a:fld id="{978008A0-1351-474F-B2A3-B5A922791B5E}" type="datetimeFigureOut">
               <a:rPr lang="zh-CN" altLang="en-US" smtClean="0"/>
-              <a:t>2025/9/9</a:t>
+              <a:t>2025/9/10</a:t>
             </a:fld>
             <a:endParaRPr lang="zh-CN" altLang="en-US"/>
           </a:p>
@@ -2130,7 +2214,7 @@
           <a:p>
             <a:fld id="{978008A0-1351-474F-B2A3-B5A922791B5E}" type="datetimeFigureOut">
               <a:rPr lang="zh-CN" altLang="en-US" smtClean="0"/>
-              <a:t>2025/9/9</a:t>
+              <a:t>2025/9/10</a:t>
             </a:fld>
             <a:endParaRPr lang="zh-CN" altLang="en-US"/>
           </a:p>
@@ -2375,7 +2459,7 @@
           <a:p>
             <a:fld id="{978008A0-1351-474F-B2A3-B5A922791B5E}" type="datetimeFigureOut">
               <a:rPr lang="zh-CN" altLang="en-US" smtClean="0"/>
-              <a:t>2025/9/9</a:t>
+              <a:t>2025/9/10</a:t>
             </a:fld>
             <a:endParaRPr lang="zh-CN" altLang="en-US"/>
           </a:p>
@@ -2604,7 +2688,7 @@
           <a:p>
             <a:fld id="{978008A0-1351-474F-B2A3-B5A922791B5E}" type="datetimeFigureOut">
               <a:rPr lang="zh-CN" altLang="en-US" smtClean="0"/>
-              <a:t>2025/9/9</a:t>
+              <a:t>2025/9/10</a:t>
             </a:fld>
             <a:endParaRPr lang="zh-CN" altLang="en-US"/>
           </a:p>
@@ -2968,7 +3052,7 @@
           <a:p>
             <a:fld id="{978008A0-1351-474F-B2A3-B5A922791B5E}" type="datetimeFigureOut">
               <a:rPr lang="zh-CN" altLang="en-US" smtClean="0"/>
-              <a:t>2025/9/9</a:t>
+              <a:t>2025/9/10</a:t>
             </a:fld>
             <a:endParaRPr lang="zh-CN" altLang="en-US"/>
           </a:p>
@@ -3085,7 +3169,7 @@
           <a:p>
             <a:fld id="{978008A0-1351-474F-B2A3-B5A922791B5E}" type="datetimeFigureOut">
               <a:rPr lang="zh-CN" altLang="en-US" smtClean="0"/>
-              <a:t>2025/9/9</a:t>
+              <a:t>2025/9/10</a:t>
             </a:fld>
             <a:endParaRPr lang="zh-CN" altLang="en-US"/>
           </a:p>
@@ -3180,7 +3264,7 @@
           <a:p>
             <a:fld id="{978008A0-1351-474F-B2A3-B5A922791B5E}" type="datetimeFigureOut">
               <a:rPr lang="zh-CN" altLang="en-US" smtClean="0"/>
-              <a:t>2025/9/9</a:t>
+              <a:t>2025/9/10</a:t>
             </a:fld>
             <a:endParaRPr lang="zh-CN" altLang="en-US"/>
           </a:p>
@@ -3455,7 +3539,7 @@
           <a:p>
             <a:fld id="{978008A0-1351-474F-B2A3-B5A922791B5E}" type="datetimeFigureOut">
               <a:rPr lang="zh-CN" altLang="en-US" smtClean="0"/>
-              <a:t>2025/9/9</a:t>
+              <a:t>2025/9/10</a:t>
             </a:fld>
             <a:endParaRPr lang="zh-CN" altLang="en-US"/>
           </a:p>
@@ -3707,7 +3791,7 @@
           <a:p>
             <a:fld id="{978008A0-1351-474F-B2A3-B5A922791B5E}" type="datetimeFigureOut">
               <a:rPr lang="zh-CN" altLang="en-US" smtClean="0"/>
-              <a:t>2025/9/9</a:t>
+              <a:t>2025/9/10</a:t>
             </a:fld>
             <a:endParaRPr lang="zh-CN" altLang="en-US"/>
           </a:p>
@@ -3918,7 +4002,7 @@
           <a:p>
             <a:fld id="{978008A0-1351-474F-B2A3-B5A922791B5E}" type="datetimeFigureOut">
               <a:rPr lang="zh-CN" altLang="en-US" smtClean="0"/>
-              <a:t>2025/9/9</a:t>
+              <a:t>2025/9/10</a:t>
             </a:fld>
             <a:endParaRPr lang="zh-CN" altLang="en-US"/>
           </a:p>
@@ -5672,8 +5756,8 @@
         </p:nvSpPr>
         <p:spPr>
           <a:xfrm>
-            <a:off x="0" y="825022"/>
-            <a:ext cx="12141582" cy="4214491"/>
+            <a:off x="141198" y="833718"/>
+            <a:ext cx="11638429" cy="4000500"/>
           </a:xfrm>
           <a:prstGeom prst="roundRect">
             <a:avLst/>
@@ -5715,10 +5799,10 @@
       </p:sp>
       <p:sp>
         <p:nvSpPr>
-          <p:cNvPr id="88" name="矩形: 圆角 87">
-            <a:extLst>
-              <a:ext uri="{FF2B5EF4-FFF2-40B4-BE49-F238E27FC236}">
-                <a16:creationId xmlns:a16="http://schemas.microsoft.com/office/drawing/2014/main" id="{8B74A948-E5AB-48AA-998B-E9AF60B938A6}"/>
+          <p:cNvPr id="86" name="矩形: 圆角 85">
+            <a:extLst>
+              <a:ext uri="{FF2B5EF4-FFF2-40B4-BE49-F238E27FC236}">
+                <a16:creationId xmlns:a16="http://schemas.microsoft.com/office/drawing/2014/main" id="{204BDDB4-C010-48A0-9859-95D75DE8A441}"/>
               </a:ext>
             </a:extLst>
           </p:cNvPr>
@@ -5727,8 +5811,8 @@
         </p:nvSpPr>
         <p:spPr>
           <a:xfrm>
-            <a:off x="1122829" y="3650725"/>
-            <a:ext cx="5150004" cy="1241763"/>
+            <a:off x="5862922" y="894230"/>
+            <a:ext cx="5862917" cy="3859305"/>
           </a:xfrm>
           <a:prstGeom prst="roundRect">
             <a:avLst/>
@@ -5771,10 +5855,10 @@
       </p:sp>
       <p:sp>
         <p:nvSpPr>
-          <p:cNvPr id="86" name="矩形: 圆角 85">
-            <a:extLst>
-              <a:ext uri="{FF2B5EF4-FFF2-40B4-BE49-F238E27FC236}">
-                <a16:creationId xmlns:a16="http://schemas.microsoft.com/office/drawing/2014/main" id="{204BDDB4-C010-48A0-9859-95D75DE8A441}"/>
+          <p:cNvPr id="85" name="矩形: 圆角 84">
+            <a:extLst>
+              <a:ext uri="{FF2B5EF4-FFF2-40B4-BE49-F238E27FC236}">
+                <a16:creationId xmlns:a16="http://schemas.microsoft.com/office/drawing/2014/main" id="{8477C450-F01D-4825-BA60-4CA6BE98FBB8}"/>
               </a:ext>
             </a:extLst>
           </p:cNvPr>
@@ -5783,17 +5867,14 @@
         </p:nvSpPr>
         <p:spPr>
           <a:xfrm>
-            <a:off x="1122829" y="894229"/>
-            <a:ext cx="5143500" cy="1149724"/>
+            <a:off x="194982" y="880782"/>
+            <a:ext cx="5580534" cy="3879478"/>
           </a:xfrm>
           <a:prstGeom prst="roundRect">
             <a:avLst/>
           </a:prstGeom>
           <a:solidFill>
-            <a:schemeClr val="accent1">
-              <a:lumMod val="20000"/>
-              <a:lumOff val="80000"/>
-            </a:schemeClr>
+            <a:schemeClr val="bg2"/>
           </a:solidFill>
           <a:ln w="19050">
             <a:noFill/>
@@ -5825,12 +5906,156 @@
           </a:p>
         </p:txBody>
       </p:sp>
-      <p:sp>
-        <p:nvSpPr>
-          <p:cNvPr id="85" name="矩形: 圆角 84">
-            <a:extLst>
-              <a:ext uri="{FF2B5EF4-FFF2-40B4-BE49-F238E27FC236}">
-                <a16:creationId xmlns:a16="http://schemas.microsoft.com/office/drawing/2014/main" id="{8477C450-F01D-4825-BA60-4CA6BE98FBB8}"/>
+      <p:pic>
+        <p:nvPicPr>
+          <p:cNvPr id="31" name="图片 30">
+            <a:extLst>
+              <a:ext uri="{FF2B5EF4-FFF2-40B4-BE49-F238E27FC236}">
+                <a16:creationId xmlns:a16="http://schemas.microsoft.com/office/drawing/2014/main" id="{9B32B5D8-9E8E-4A69-827F-71FE5D6165F7}"/>
+              </a:ext>
+            </a:extLst>
+          </p:cNvPr>
+          <p:cNvPicPr>
+            <a:picLocks noChangeAspect="1"/>
+          </p:cNvPicPr>
+          <p:nvPr/>
+        </p:nvPicPr>
+        <p:blipFill>
+          <a:blip r:embed="rId3" cstate="print">
+            <a:extLst>
+              <a:ext uri="{28A0092B-C50C-407E-A947-70E740481C1C}">
+                <a14:useLocalDpi xmlns:a14="http://schemas.microsoft.com/office/drawing/2010/main" val="0"/>
+              </a:ext>
+            </a:extLst>
+          </a:blip>
+          <a:stretch>
+            <a:fillRect/>
+          </a:stretch>
+        </p:blipFill>
+        <p:spPr>
+          <a:xfrm>
+            <a:off x="5022461" y="2626348"/>
+            <a:ext cx="618565" cy="524208"/>
+          </a:xfrm>
+          <a:prstGeom prst="rect">
+            <a:avLst/>
+          </a:prstGeom>
+        </p:spPr>
+      </p:pic>
+      <p:pic>
+        <p:nvPicPr>
+          <p:cNvPr id="32" name="图片 31">
+            <a:extLst>
+              <a:ext uri="{FF2B5EF4-FFF2-40B4-BE49-F238E27FC236}">
+                <a16:creationId xmlns:a16="http://schemas.microsoft.com/office/drawing/2014/main" id="{84109C07-A6AD-4275-808E-7440F96C273C}"/>
+              </a:ext>
+            </a:extLst>
+          </p:cNvPr>
+          <p:cNvPicPr>
+            <a:picLocks noChangeAspect="1"/>
+          </p:cNvPicPr>
+          <p:nvPr/>
+        </p:nvPicPr>
+        <p:blipFill>
+          <a:blip r:embed="rId4" cstate="print">
+            <a:extLst>
+              <a:ext uri="{28A0092B-C50C-407E-A947-70E740481C1C}">
+                <a14:useLocalDpi xmlns:a14="http://schemas.microsoft.com/office/drawing/2010/main" val="0"/>
+              </a:ext>
+            </a:extLst>
+          </a:blip>
+          <a:stretch>
+            <a:fillRect/>
+          </a:stretch>
+        </p:blipFill>
+        <p:spPr>
+          <a:xfrm>
+            <a:off x="259998" y="2520000"/>
+            <a:ext cx="879523" cy="745359"/>
+          </a:xfrm>
+          <a:prstGeom prst="rect">
+            <a:avLst/>
+          </a:prstGeom>
+        </p:spPr>
+      </p:pic>
+      <p:pic>
+        <p:nvPicPr>
+          <p:cNvPr id="33" name="图片 32">
+            <a:extLst>
+              <a:ext uri="{FF2B5EF4-FFF2-40B4-BE49-F238E27FC236}">
+                <a16:creationId xmlns:a16="http://schemas.microsoft.com/office/drawing/2014/main" id="{7C3B6477-F527-47AB-9A97-4A25FB8EF3D9}"/>
+              </a:ext>
+            </a:extLst>
+          </p:cNvPr>
+          <p:cNvPicPr>
+            <a:picLocks noChangeAspect="1"/>
+          </p:cNvPicPr>
+          <p:nvPr/>
+        </p:nvPicPr>
+        <p:blipFill>
+          <a:blip r:embed="rId5" cstate="print">
+            <a:extLst>
+              <a:ext uri="{28A0092B-C50C-407E-A947-70E740481C1C}">
+                <a14:useLocalDpi xmlns:a14="http://schemas.microsoft.com/office/drawing/2010/main" val="0"/>
+              </a:ext>
+            </a:extLst>
+          </a:blip>
+          <a:stretch>
+            <a:fillRect/>
+          </a:stretch>
+        </p:blipFill>
+        <p:spPr>
+          <a:xfrm>
+            <a:off x="259998" y="3652660"/>
+            <a:ext cx="879523" cy="745359"/>
+          </a:xfrm>
+          <a:prstGeom prst="rect">
+            <a:avLst/>
+          </a:prstGeom>
+        </p:spPr>
+      </p:pic>
+      <p:pic>
+        <p:nvPicPr>
+          <p:cNvPr id="36" name="图片 35">
+            <a:extLst>
+              <a:ext uri="{FF2B5EF4-FFF2-40B4-BE49-F238E27FC236}">
+                <a16:creationId xmlns:a16="http://schemas.microsoft.com/office/drawing/2014/main" id="{4AB44BCA-2974-4017-80B6-212027DD82B8}"/>
+              </a:ext>
+            </a:extLst>
+          </p:cNvPr>
+          <p:cNvPicPr>
+            <a:picLocks noChangeAspect="1"/>
+          </p:cNvPicPr>
+          <p:nvPr/>
+        </p:nvPicPr>
+        <p:blipFill>
+          <a:blip r:embed="rId6" cstate="print">
+            <a:extLst>
+              <a:ext uri="{28A0092B-C50C-407E-A947-70E740481C1C}">
+                <a14:useLocalDpi xmlns:a14="http://schemas.microsoft.com/office/drawing/2010/main" val="0"/>
+              </a:ext>
+            </a:extLst>
+          </a:blip>
+          <a:stretch>
+            <a:fillRect/>
+          </a:stretch>
+        </p:blipFill>
+        <p:spPr>
+          <a:xfrm>
+            <a:off x="10731936" y="2501596"/>
+            <a:ext cx="919797" cy="779489"/>
+          </a:xfrm>
+          <a:prstGeom prst="rect">
+            <a:avLst/>
+          </a:prstGeom>
+        </p:spPr>
+      </p:pic>
+      <p:sp>
+        <p:nvSpPr>
+          <p:cNvPr id="5" name="梯形 4">
+            <a:extLst>
+              <a:ext uri="{FF2B5EF4-FFF2-40B4-BE49-F238E27FC236}">
+                <a16:creationId xmlns:a16="http://schemas.microsoft.com/office/drawing/2014/main" id="{C6FF907B-FCFB-414C-85C2-67432A535389}"/>
               </a:ext>
             </a:extLst>
           </p:cNvPr>
@@ -5838,20 +6063,19 @@
           <p:nvPr/>
         </p:nvSpPr>
         <p:spPr>
-          <a:xfrm>
-            <a:off x="1122829" y="2062557"/>
-            <a:ext cx="5091582" cy="1547675"/>
-          </a:xfrm>
-          <a:prstGeom prst="roundRect">
+          <a:xfrm rot="5400000">
+            <a:off x="6137446" y="2485772"/>
+            <a:ext cx="613400" cy="808429"/>
+          </a:xfrm>
+          <a:prstGeom prst="trapezoid">
             <a:avLst/>
           </a:prstGeom>
           <a:solidFill>
-            <a:schemeClr val="bg2"/>
+            <a:schemeClr val="accent3">
+              <a:lumMod val="40000"/>
+              <a:lumOff val="60000"/>
+            </a:schemeClr>
           </a:solidFill>
-          <a:ln w="19050">
-            <a:noFill/>
-            <a:prstDash val="sysDash"/>
-          </a:ln>
         </p:spPr>
         <p:style>
           <a:lnRef idx="2">
@@ -5870,164 +6094,31 @@
           </a:fontRef>
         </p:style>
         <p:txBody>
-          <a:bodyPr rtlCol="0" anchor="ctr"/>
-          <a:lstStyle/>
-          <a:p>
-            <a:pPr algn="ctr"/>
-            <a:endParaRPr lang="zh-CN" altLang="en-US"/>
-          </a:p>
-        </p:txBody>
-      </p:sp>
-      <p:pic>
-        <p:nvPicPr>
-          <p:cNvPr id="31" name="图片 30">
-            <a:extLst>
-              <a:ext uri="{FF2B5EF4-FFF2-40B4-BE49-F238E27FC236}">
-                <a16:creationId xmlns:a16="http://schemas.microsoft.com/office/drawing/2014/main" id="{9B32B5D8-9E8E-4A69-827F-71FE5D6165F7}"/>
-              </a:ext>
-            </a:extLst>
-          </p:cNvPr>
-          <p:cNvPicPr>
-            <a:picLocks noChangeAspect="1"/>
-          </p:cNvPicPr>
-          <p:nvPr/>
-        </p:nvPicPr>
-        <p:blipFill>
-          <a:blip r:embed="rId2" cstate="print">
-            <a:extLst>
-              <a:ext uri="{28A0092B-C50C-407E-A947-70E740481C1C}">
-                <a14:useLocalDpi xmlns:a14="http://schemas.microsoft.com/office/drawing/2010/main" val="0"/>
-              </a:ext>
-            </a:extLst>
-          </a:blip>
-          <a:stretch>
-            <a:fillRect/>
-          </a:stretch>
-        </p:blipFill>
-        <p:spPr>
-          <a:xfrm>
-            <a:off x="7061549" y="2529432"/>
-            <a:ext cx="857264" cy="726495"/>
-          </a:xfrm>
-          <a:prstGeom prst="rect">
-            <a:avLst/>
-          </a:prstGeom>
-        </p:spPr>
-      </p:pic>
-      <p:pic>
-        <p:nvPicPr>
-          <p:cNvPr id="32" name="图片 31">
-            <a:extLst>
-              <a:ext uri="{FF2B5EF4-FFF2-40B4-BE49-F238E27FC236}">
-                <a16:creationId xmlns:a16="http://schemas.microsoft.com/office/drawing/2014/main" id="{84109C07-A6AD-4275-808E-7440F96C273C}"/>
-              </a:ext>
-            </a:extLst>
-          </p:cNvPr>
-          <p:cNvPicPr>
-            <a:picLocks noChangeAspect="1"/>
-          </p:cNvPicPr>
-          <p:nvPr/>
-        </p:nvPicPr>
-        <p:blipFill>
-          <a:blip r:embed="rId3" cstate="print">
-            <a:extLst>
-              <a:ext uri="{28A0092B-C50C-407E-A947-70E740481C1C}">
-                <a14:useLocalDpi xmlns:a14="http://schemas.microsoft.com/office/drawing/2010/main" val="0"/>
-              </a:ext>
-            </a:extLst>
-          </a:blip>
-          <a:stretch>
-            <a:fillRect/>
-          </a:stretch>
-        </p:blipFill>
-        <p:spPr>
-          <a:xfrm>
-            <a:off x="118800" y="2520000"/>
-            <a:ext cx="879523" cy="745359"/>
-          </a:xfrm>
-          <a:prstGeom prst="rect">
-            <a:avLst/>
-          </a:prstGeom>
-        </p:spPr>
-      </p:pic>
-      <p:pic>
-        <p:nvPicPr>
-          <p:cNvPr id="33" name="图片 32">
-            <a:extLst>
-              <a:ext uri="{FF2B5EF4-FFF2-40B4-BE49-F238E27FC236}">
-                <a16:creationId xmlns:a16="http://schemas.microsoft.com/office/drawing/2014/main" id="{7C3B6477-F527-47AB-9A97-4A25FB8EF3D9}"/>
-              </a:ext>
-            </a:extLst>
-          </p:cNvPr>
-          <p:cNvPicPr>
-            <a:picLocks noChangeAspect="1"/>
-          </p:cNvPicPr>
-          <p:nvPr/>
-        </p:nvPicPr>
-        <p:blipFill>
-          <a:blip r:embed="rId4" cstate="print">
-            <a:extLst>
-              <a:ext uri="{28A0092B-C50C-407E-A947-70E740481C1C}">
-                <a14:useLocalDpi xmlns:a14="http://schemas.microsoft.com/office/drawing/2010/main" val="0"/>
-              </a:ext>
-            </a:extLst>
-          </a:blip>
-          <a:stretch>
-            <a:fillRect/>
-          </a:stretch>
-        </p:blipFill>
-        <p:spPr>
-          <a:xfrm>
-            <a:off x="118800" y="3888000"/>
-            <a:ext cx="879523" cy="745359"/>
-          </a:xfrm>
-          <a:prstGeom prst="rect">
-            <a:avLst/>
-          </a:prstGeom>
-        </p:spPr>
-      </p:pic>
-      <p:pic>
-        <p:nvPicPr>
-          <p:cNvPr id="36" name="图片 35">
-            <a:extLst>
-              <a:ext uri="{FF2B5EF4-FFF2-40B4-BE49-F238E27FC236}">
-                <a16:creationId xmlns:a16="http://schemas.microsoft.com/office/drawing/2014/main" id="{4AB44BCA-2974-4017-80B6-212027DD82B8}"/>
-              </a:ext>
-            </a:extLst>
-          </p:cNvPr>
-          <p:cNvPicPr>
-            <a:picLocks noChangeAspect="1"/>
-          </p:cNvPicPr>
-          <p:nvPr/>
-        </p:nvPicPr>
-        <p:blipFill>
-          <a:blip r:embed="rId5" cstate="print">
-            <a:extLst>
-              <a:ext uri="{28A0092B-C50C-407E-A947-70E740481C1C}">
-                <a14:useLocalDpi xmlns:a14="http://schemas.microsoft.com/office/drawing/2010/main" val="0"/>
-              </a:ext>
-            </a:extLst>
-          </a:blip>
-          <a:stretch>
-            <a:fillRect/>
-          </a:stretch>
-        </p:blipFill>
-        <p:spPr>
-          <a:xfrm>
-            <a:off x="8714898" y="4014388"/>
-            <a:ext cx="1054743" cy="893850"/>
-          </a:xfrm>
-          <a:prstGeom prst="rect">
-            <a:avLst/>
-          </a:prstGeom>
-        </p:spPr>
-      </p:pic>
-      <p:sp>
-        <p:nvSpPr>
-          <p:cNvPr id="5" name="梯形 4">
-            <a:extLst>
-              <a:ext uri="{FF2B5EF4-FFF2-40B4-BE49-F238E27FC236}">
-                <a16:creationId xmlns:a16="http://schemas.microsoft.com/office/drawing/2014/main" id="{C6FF907B-FCFB-414C-85C2-67432A535389}"/>
+          <a:bodyPr vert="vert270" rtlCol="0" anchor="ctr"/>
+          <a:lstStyle/>
+          <a:p>
+            <a:r>
+              <a:rPr lang="en-US" altLang="zh-CN" sz="1200" b="1" dirty="0">
+                <a:solidFill>
+                  <a:schemeClr val="tx1"/>
+                </a:solidFill>
+              </a:rPr>
+              <a:t>Encoder</a:t>
+            </a:r>
+            <a:endParaRPr lang="zh-CN" altLang="en-US" sz="1200" b="1" dirty="0">
+              <a:solidFill>
+                <a:schemeClr val="tx1"/>
+              </a:solidFill>
+            </a:endParaRPr>
+          </a:p>
+        </p:txBody>
+      </p:sp>
+      <p:sp>
+        <p:nvSpPr>
+          <p:cNvPr id="63" name="梯形 62">
+            <a:extLst>
+              <a:ext uri="{FF2B5EF4-FFF2-40B4-BE49-F238E27FC236}">
+                <a16:creationId xmlns:a16="http://schemas.microsoft.com/office/drawing/2014/main" id="{09916C4F-7D3F-49B6-805F-F1A478166C3B}"/>
               </a:ext>
             </a:extLst>
           </p:cNvPr>
@@ -6035,9 +6126,9 @@
           <p:nvPr/>
         </p:nvSpPr>
         <p:spPr>
-          <a:xfrm rot="5400000">
-            <a:off x="8483985" y="2485772"/>
-            <a:ext cx="613400" cy="808429"/>
+          <a:xfrm rot="16200000">
+            <a:off x="9740939" y="2484099"/>
+            <a:ext cx="549710" cy="817161"/>
           </a:xfrm>
           <a:prstGeom prst="trapezoid">
             <a:avLst/>
@@ -6066,69 +6157,6 @@
           </a:fontRef>
         </p:style>
         <p:txBody>
-          <a:bodyPr vert="vert270" rtlCol="0" anchor="ctr"/>
-          <a:lstStyle/>
-          <a:p>
-            <a:r>
-              <a:rPr lang="en-US" altLang="zh-CN" sz="1200" b="1" dirty="0">
-                <a:solidFill>
-                  <a:schemeClr val="tx1"/>
-                </a:solidFill>
-              </a:rPr>
-              <a:t>Encoder</a:t>
-            </a:r>
-            <a:endParaRPr lang="zh-CN" altLang="en-US" sz="1200" b="1" dirty="0">
-              <a:solidFill>
-                <a:schemeClr val="tx1"/>
-              </a:solidFill>
-            </a:endParaRPr>
-          </a:p>
-        </p:txBody>
-      </p:sp>
-      <p:sp>
-        <p:nvSpPr>
-          <p:cNvPr id="63" name="梯形 62">
-            <a:extLst>
-              <a:ext uri="{FF2B5EF4-FFF2-40B4-BE49-F238E27FC236}">
-                <a16:creationId xmlns:a16="http://schemas.microsoft.com/office/drawing/2014/main" id="{09916C4F-7D3F-49B6-805F-F1A478166C3B}"/>
-              </a:ext>
-            </a:extLst>
-          </p:cNvPr>
-          <p:cNvSpPr/>
-          <p:nvPr/>
-        </p:nvSpPr>
-        <p:spPr>
-          <a:xfrm rot="16200000">
-            <a:off x="11249913" y="2440868"/>
-            <a:ext cx="549710" cy="903623"/>
-          </a:xfrm>
-          <a:prstGeom prst="trapezoid">
-            <a:avLst/>
-          </a:prstGeom>
-          <a:solidFill>
-            <a:schemeClr val="accent3">
-              <a:lumMod val="40000"/>
-              <a:lumOff val="60000"/>
-            </a:schemeClr>
-          </a:solidFill>
-        </p:spPr>
-        <p:style>
-          <a:lnRef idx="2">
-            <a:schemeClr val="accent1">
-              <a:shade val="50000"/>
-            </a:schemeClr>
-          </a:lnRef>
-          <a:fillRef idx="1">
-            <a:schemeClr val="accent1"/>
-          </a:fillRef>
-          <a:effectRef idx="0">
-            <a:schemeClr val="accent1"/>
-          </a:effectRef>
-          <a:fontRef idx="minor">
-            <a:schemeClr val="lt1"/>
-          </a:fontRef>
-        </p:style>
-        <p:txBody>
           <a:bodyPr vert="vert" rtlCol="0" anchor="ctr"/>
           <a:lstStyle/>
           <a:p>
@@ -6179,8 +6207,8 @@
         </p:nvSpPr>
         <p:spPr>
           <a:xfrm>
-            <a:off x="8929406" y="2004718"/>
-            <a:ext cx="1501255" cy="382357"/>
+            <a:off x="7175735" y="2226604"/>
+            <a:ext cx="1357606" cy="382357"/>
           </a:xfrm>
           <a:prstGeom prst="roundRect">
             <a:avLst>
@@ -6188,9 +6216,9 @@
             </a:avLst>
           </a:prstGeom>
           <a:solidFill>
-            <a:schemeClr val="accent4">
-              <a:lumMod val="20000"/>
-              <a:lumOff val="80000"/>
+            <a:schemeClr val="accent1">
+              <a:lumMod val="60000"/>
+              <a:lumOff val="40000"/>
             </a:schemeClr>
           </a:solidFill>
           <a:ln w="12700" cap="flat" cmpd="sng">
@@ -6248,8 +6276,8 @@
         </p:nvSpPr>
         <p:spPr>
           <a:xfrm>
-            <a:off x="8938503" y="3392437"/>
-            <a:ext cx="1501255" cy="382357"/>
+            <a:off x="7175735" y="3150381"/>
+            <a:ext cx="1357606" cy="382357"/>
           </a:xfrm>
           <a:prstGeom prst="roundRect">
             <a:avLst>
@@ -6257,9 +6285,9 @@
             </a:avLst>
           </a:prstGeom>
           <a:solidFill>
-            <a:schemeClr val="accent4">
-              <a:lumMod val="20000"/>
-              <a:lumOff val="80000"/>
+            <a:schemeClr val="accent1">
+              <a:lumMod val="60000"/>
+              <a:lumOff val="40000"/>
             </a:schemeClr>
           </a:solidFill>
           <a:ln w="12700" cap="flat" cmpd="sng">
@@ -6317,8 +6345,8 @@
         </p:nvSpPr>
         <p:spPr>
           <a:xfrm>
-            <a:off x="10350077" y="2766647"/>
-            <a:ext cx="523355" cy="259968"/>
+            <a:off x="8823823" y="2766647"/>
+            <a:ext cx="548776" cy="259968"/>
           </a:xfrm>
           <a:prstGeom prst="roundRect">
             <a:avLst>
@@ -6381,7 +6409,7 @@
         </p:nvSpPr>
         <p:spPr>
           <a:xfrm rot="5400000">
-            <a:off x="1042295" y="4158000"/>
+            <a:off x="1183493" y="3922660"/>
             <a:ext cx="528505" cy="203643"/>
           </a:xfrm>
           <a:prstGeom prst="rect">
@@ -6440,7 +6468,7 @@
         </p:nvSpPr>
         <p:spPr>
           <a:xfrm>
-            <a:off x="3780000" y="4066978"/>
+            <a:off x="2905919" y="3831638"/>
             <a:ext cx="192487" cy="482400"/>
           </a:xfrm>
           <a:prstGeom prst="cube">
@@ -6500,7 +6528,7 @@
         </p:nvSpPr>
         <p:spPr>
           <a:xfrm rot="5400000">
-            <a:off x="1042295" y="2790858"/>
+            <a:off x="1183493" y="2790858"/>
             <a:ext cx="528505" cy="203643"/>
           </a:xfrm>
           <a:prstGeom prst="rect">
@@ -6559,7 +6587,7 @@
         </p:nvSpPr>
         <p:spPr>
           <a:xfrm>
-            <a:off x="3780000" y="3119263"/>
+            <a:off x="2905919" y="3065471"/>
             <a:ext cx="192487" cy="482400"/>
           </a:xfrm>
           <a:prstGeom prst="cube">
@@ -6623,8 +6651,8 @@
         </p:nvCxnSpPr>
         <p:spPr>
           <a:xfrm>
-            <a:off x="1408369" y="2892680"/>
-            <a:ext cx="1183631" cy="455131"/>
+            <a:off x="1549567" y="2892680"/>
+            <a:ext cx="618838" cy="401339"/>
           </a:xfrm>
           <a:prstGeom prst="bentConnector3">
             <a:avLst>
@@ -6664,13 +6692,14 @@
           </p:cNvPr>
           <p:cNvCxnSpPr>
             <a:cxnSpLocks/>
+            <a:stCxn id="61" idx="3"/>
           </p:cNvCxnSpPr>
           <p:nvPr/>
         </p:nvCxnSpPr>
         <p:spPr>
           <a:xfrm>
-            <a:off x="2979581" y="2355964"/>
-            <a:ext cx="800035" cy="6347"/>
+            <a:off x="2561715" y="2415485"/>
+            <a:ext cx="315952" cy="0"/>
           </a:xfrm>
           <a:prstGeom prst="straightConnector1">
             <a:avLst/>
@@ -6705,8 +6734,8 @@
         </p:nvCxnSpPr>
         <p:spPr>
           <a:xfrm flipV="1">
-            <a:off x="1408369" y="2361693"/>
-            <a:ext cx="1183631" cy="530987"/>
+            <a:off x="1549567" y="2415485"/>
+            <a:ext cx="618838" cy="477195"/>
           </a:xfrm>
           <a:prstGeom prst="bentConnector3">
             <a:avLst>
@@ -6749,8 +6778,8 @@
         </p:nvSpPr>
         <p:spPr>
           <a:xfrm>
-            <a:off x="1258889" y="1008000"/>
-            <a:ext cx="220290" cy="945200"/>
+            <a:off x="1211823" y="1250064"/>
+            <a:ext cx="139612" cy="834247"/>
           </a:xfrm>
           <a:prstGeom prst="rect">
             <a:avLst/>
@@ -6792,8 +6821,8 @@
         </p:nvSpPr>
         <p:spPr>
           <a:xfrm>
-            <a:off x="1651543" y="1008000"/>
-            <a:ext cx="220290" cy="945200"/>
+            <a:off x="1461424" y="1250064"/>
+            <a:ext cx="139612" cy="834247"/>
           </a:xfrm>
           <a:prstGeom prst="rect">
             <a:avLst/>
@@ -6835,8 +6864,8 @@
         </p:nvSpPr>
         <p:spPr>
           <a:xfrm>
-            <a:off x="2044197" y="1008000"/>
-            <a:ext cx="220290" cy="945200"/>
+            <a:off x="1711025" y="1250064"/>
+            <a:ext cx="139612" cy="834247"/>
           </a:xfrm>
           <a:prstGeom prst="rect">
             <a:avLst/>
@@ -6878,8 +6907,8 @@
         </p:nvSpPr>
         <p:spPr>
           <a:xfrm>
-            <a:off x="2436851" y="1008000"/>
-            <a:ext cx="220290" cy="945200"/>
+            <a:off x="1960626" y="1250064"/>
+            <a:ext cx="139612" cy="834247"/>
           </a:xfrm>
           <a:prstGeom prst="rect">
             <a:avLst/>
@@ -6921,8 +6950,8 @@
         </p:nvSpPr>
         <p:spPr>
           <a:xfrm>
-            <a:off x="2829505" y="1008000"/>
-            <a:ext cx="220290" cy="945200"/>
+            <a:off x="2210227" y="1250064"/>
+            <a:ext cx="139612" cy="834247"/>
           </a:xfrm>
           <a:prstGeom prst="rect">
             <a:avLst/>
@@ -6964,8 +6993,8 @@
         </p:nvSpPr>
         <p:spPr>
           <a:xfrm>
-            <a:off x="3222158" y="1008000"/>
-            <a:ext cx="220290" cy="945200"/>
+            <a:off x="2459829" y="1250064"/>
+            <a:ext cx="139612" cy="834247"/>
           </a:xfrm>
           <a:prstGeom prst="rect">
             <a:avLst/>
@@ -7008,7 +7037,7 @@
           <p:nvPr/>
         </p:nvPicPr>
         <p:blipFill>
-          <a:blip r:embed="rId6" cstate="print">
+          <a:blip r:embed="rId7" cstate="print">
             <a:extLst>
               <a:ext uri="{28A0092B-C50C-407E-A947-70E740481C1C}">
                 <a14:useLocalDpi xmlns:a14="http://schemas.microsoft.com/office/drawing/2010/main" val="0"/>
@@ -7021,7 +7050,7 @@
         </p:blipFill>
         <p:spPr>
           <a:xfrm>
-            <a:off x="4578961" y="1118259"/>
+            <a:off x="3402312" y="1326703"/>
             <a:ext cx="804968" cy="672912"/>
           </a:xfrm>
           <a:prstGeom prst="rect">
@@ -7043,7 +7072,7 @@
         </p:nvSpPr>
         <p:spPr>
           <a:xfrm>
-            <a:off x="3780000" y="2157798"/>
+            <a:off x="2905919" y="2211590"/>
             <a:ext cx="192487" cy="482400"/>
           </a:xfrm>
           <a:prstGeom prst="cube">
@@ -7103,7 +7132,7 @@
         </p:nvSpPr>
         <p:spPr>
           <a:xfrm>
-            <a:off x="3780000" y="1196333"/>
+            <a:off x="2905919" y="1404777"/>
             <a:ext cx="192487" cy="482400"/>
           </a:xfrm>
           <a:prstGeom prst="cube">
@@ -7163,7 +7192,7 @@
         </p:nvSpPr>
         <p:spPr>
           <a:xfrm>
-            <a:off x="4877469" y="2242184"/>
+            <a:off x="3700820" y="2295976"/>
             <a:ext cx="228600" cy="228600"/>
           </a:xfrm>
           <a:prstGeom prst="flowChartConnector">
@@ -7223,7 +7252,7 @@
             </p:nvSpPr>
             <p:spPr>
               <a:xfrm>
-                <a:off x="2592000" y="2202055"/>
+                <a:off x="2168405" y="2255847"/>
                 <a:ext cx="393310" cy="319275"/>
               </a:xfrm>
               <a:prstGeom prst="roundRect">
@@ -7318,7 +7347,7 @@
             </p:nvSpPr>
             <p:spPr>
               <a:xfrm>
-                <a:off x="2592000" y="2202055"/>
+                <a:off x="2168405" y="2255847"/>
                 <a:ext cx="393310" cy="319275"/>
               </a:xfrm>
               <a:prstGeom prst="roundRect">
@@ -7327,9 +7356,9 @@
                 </a:avLst>
               </a:prstGeom>
               <a:blipFill>
-                <a:blip r:embed="rId7"/>
+                <a:blip r:embed="rId8"/>
                 <a:stretch>
-                  <a:fillRect l="-8955" b="-1818"/>
+                  <a:fillRect l="-10606" b="-3704"/>
                 </a:stretch>
               </a:blipFill>
               <a:ln w="12700" cap="flat" cmpd="sng">
@@ -7373,7 +7402,7 @@
             </p:nvSpPr>
             <p:spPr>
               <a:xfrm>
-                <a:off x="2592000" y="3188173"/>
+                <a:off x="2168405" y="3134381"/>
                 <a:ext cx="393310" cy="319275"/>
               </a:xfrm>
               <a:prstGeom prst="roundRect">
@@ -7468,7 +7497,7 @@
             </p:nvSpPr>
             <p:spPr>
               <a:xfrm>
-                <a:off x="2592000" y="3188173"/>
+                <a:off x="2168405" y="3134381"/>
                 <a:ext cx="393310" cy="319275"/>
               </a:xfrm>
               <a:prstGeom prst="roundRect">
@@ -7477,9 +7506,9 @@
                 </a:avLst>
               </a:prstGeom>
               <a:blipFill>
-                <a:blip r:embed="rId8"/>
+                <a:blip r:embed="rId9"/>
                 <a:stretch>
-                  <a:fillRect l="-10448" b="-3704"/>
+                  <a:fillRect l="-10606" b="-1818"/>
                 </a:stretch>
               </a:blipFill>
               <a:ln w="12700" cap="flat" cmpd="sng">
@@ -7523,7 +7552,7 @@
             </p:nvSpPr>
             <p:spPr>
               <a:xfrm>
-                <a:off x="2592000" y="4100332"/>
+                <a:off x="2168405" y="3864992"/>
                 <a:ext cx="393310" cy="319275"/>
               </a:xfrm>
               <a:prstGeom prst="roundRect">
@@ -7621,7 +7650,7 @@
             </p:nvSpPr>
             <p:spPr>
               <a:xfrm>
-                <a:off x="2592000" y="4100332"/>
+                <a:off x="2168405" y="3864992"/>
                 <a:ext cx="393310" cy="319275"/>
               </a:xfrm>
               <a:prstGeom prst="roundRect">
@@ -7630,9 +7659,9 @@
                 </a:avLst>
               </a:prstGeom>
               <a:blipFill>
-                <a:blip r:embed="rId9"/>
+                <a:blip r:embed="rId10"/>
                 <a:stretch>
-                  <a:fillRect l="-4478" b="-9259"/>
+                  <a:fillRect l="-4545" b="-9259"/>
                 </a:stretch>
               </a:blipFill>
               <a:ln w="12700" cap="flat" cmpd="sng">
@@ -7674,7 +7703,7 @@
         </p:nvSpPr>
         <p:spPr>
           <a:xfrm>
-            <a:off x="4870594" y="3217429"/>
+            <a:off x="3693945" y="3163637"/>
             <a:ext cx="228600" cy="228600"/>
           </a:xfrm>
           <a:prstGeom prst="flowChartConnector">
@@ -7733,7 +7762,7 @@
           <p:nvPr/>
         </p:nvPicPr>
         <p:blipFill>
-          <a:blip r:embed="rId10" cstate="print">
+          <a:blip r:embed="rId11" cstate="print">
             <a:extLst>
               <a:ext uri="{28A0092B-C50C-407E-A947-70E740481C1C}">
                 <a14:useLocalDpi xmlns:a14="http://schemas.microsoft.com/office/drawing/2010/main" val="0"/>
@@ -7746,7 +7775,7 @@
         </p:blipFill>
         <p:spPr>
           <a:xfrm>
-            <a:off x="4578961" y="3931418"/>
+            <a:off x="3402312" y="3696078"/>
             <a:ext cx="811866" cy="685085"/>
           </a:xfrm>
           <a:prstGeom prst="rect">
@@ -7768,7 +7797,7 @@
         </p:nvSpPr>
         <p:spPr>
           <a:xfrm rot="5400000">
-            <a:off x="6179687" y="2790858"/>
+            <a:off x="4384451" y="2790858"/>
             <a:ext cx="528505" cy="203643"/>
           </a:xfrm>
           <a:prstGeom prst="rect">
@@ -7827,8 +7856,8 @@
         </p:nvSpPr>
         <p:spPr>
           <a:xfrm>
-            <a:off x="103127" y="5141836"/>
-            <a:ext cx="11928451" cy="575233"/>
+            <a:off x="221876" y="5141836"/>
+            <a:ext cx="11221571" cy="575233"/>
           </a:xfrm>
           <a:prstGeom prst="roundRect">
             <a:avLst/>
@@ -7882,7 +7911,7 @@
         </p:nvSpPr>
         <p:spPr>
           <a:xfrm>
-            <a:off x="2646832" y="5317283"/>
+            <a:off x="2788030" y="5317283"/>
             <a:ext cx="228600" cy="228600"/>
           </a:xfrm>
           <a:prstGeom prst="flowChartConnector">
@@ -7940,7 +7969,7 @@
         </p:nvSpPr>
         <p:spPr>
           <a:xfrm>
-            <a:off x="3906641" y="5337909"/>
+            <a:off x="4047839" y="5337909"/>
             <a:ext cx="228600" cy="228600"/>
           </a:xfrm>
           <a:prstGeom prst="flowChartConnector">
@@ -7998,7 +8027,7 @@
         </p:nvSpPr>
         <p:spPr>
           <a:xfrm>
-            <a:off x="5473461" y="5166028"/>
+            <a:off x="5614659" y="5166028"/>
             <a:ext cx="192487" cy="482400"/>
           </a:xfrm>
           <a:prstGeom prst="cube">
@@ -8054,7 +8083,7 @@
         </p:nvSpPr>
         <p:spPr>
           <a:xfrm>
-            <a:off x="8381236" y="5379159"/>
+            <a:off x="8522434" y="5379159"/>
             <a:ext cx="311296" cy="158918"/>
           </a:xfrm>
           <a:prstGeom prst="rightArrow">
@@ -8111,7 +8140,7 @@
         </p:nvSpPr>
         <p:spPr>
           <a:xfrm>
-            <a:off x="6785771" y="5386033"/>
+            <a:off x="6926969" y="5386033"/>
             <a:ext cx="311296" cy="158918"/>
           </a:xfrm>
           <a:prstGeom prst="rightArrow">
@@ -8168,7 +8197,7 @@
         </p:nvSpPr>
         <p:spPr>
           <a:xfrm rot="5400000">
-            <a:off x="1282491" y="5365408"/>
+            <a:off x="1423689" y="5365408"/>
             <a:ext cx="467883" cy="100302"/>
           </a:xfrm>
           <a:prstGeom prst="rect">
@@ -8227,7 +8256,7 @@
         </p:nvSpPr>
         <p:spPr>
           <a:xfrm>
-            <a:off x="1640643" y="5147405"/>
+            <a:off x="1781841" y="5147405"/>
             <a:ext cx="1041491" cy="272565"/>
           </a:xfrm>
           <a:prstGeom prst="rect">
@@ -8272,7 +8301,7 @@
         </p:nvSpPr>
         <p:spPr>
           <a:xfrm>
-            <a:off x="2920574" y="5257408"/>
+            <a:off x="3061772" y="5257408"/>
             <a:ext cx="938363" cy="272565"/>
           </a:xfrm>
           <a:prstGeom prst="rect">
@@ -8311,7 +8340,7 @@
         </p:nvSpPr>
         <p:spPr>
           <a:xfrm>
-            <a:off x="4242803" y="5257408"/>
+            <a:off x="4384001" y="5257408"/>
             <a:ext cx="1026694" cy="272565"/>
           </a:xfrm>
           <a:prstGeom prst="rect">
@@ -8330,7 +8359,7 @@
           <a:p>
             <a:r>
               <a:rPr lang="en-US" altLang="zh-CN" sz="1400" b="1" dirty="0"/>
-              <a:t>Density-k</a:t>
+              <a:t>Density-k1</a:t>
             </a:r>
             <a:endParaRPr sz="1400" b="1" dirty="0"/>
           </a:p>
@@ -8350,7 +8379,7 @@
         </p:nvSpPr>
         <p:spPr>
           <a:xfrm>
-            <a:off x="5739401" y="5257408"/>
+            <a:off x="5880599" y="5257408"/>
             <a:ext cx="938363" cy="272565"/>
           </a:xfrm>
           <a:prstGeom prst="rect">
@@ -8389,7 +8418,7 @@
         </p:nvSpPr>
         <p:spPr>
           <a:xfrm>
-            <a:off x="7163711" y="5154281"/>
+            <a:off x="7304909" y="5154281"/>
             <a:ext cx="1073575" cy="272565"/>
           </a:xfrm>
           <a:prstGeom prst="rect">
@@ -8434,7 +8463,7 @@
         </p:nvSpPr>
         <p:spPr>
           <a:xfrm>
-            <a:off x="8649897" y="5148552"/>
+            <a:off x="8791095" y="5148552"/>
             <a:ext cx="1073575" cy="272565"/>
           </a:xfrm>
           <a:prstGeom prst="rect">
@@ -8476,13 +8505,14 @@
           </p:cNvPr>
           <p:cNvCxnSpPr>
             <a:cxnSpLocks/>
+            <a:stCxn id="64" idx="3"/>
           </p:cNvCxnSpPr>
           <p:nvPr/>
         </p:nvCxnSpPr>
         <p:spPr>
           <a:xfrm>
-            <a:off x="2991889" y="4259970"/>
-            <a:ext cx="775418" cy="0"/>
+            <a:off x="2561715" y="4024630"/>
+            <a:ext cx="315952" cy="0"/>
           </a:xfrm>
           <a:prstGeom prst="straightConnector1">
             <a:avLst/>
@@ -8515,8 +8545,8 @@
         </p:nvCxnSpPr>
         <p:spPr>
           <a:xfrm>
-            <a:off x="2979581" y="3333387"/>
-            <a:ext cx="800035" cy="6347"/>
+            <a:off x="2568385" y="3285942"/>
+            <a:ext cx="302559" cy="0"/>
           </a:xfrm>
           <a:prstGeom prst="straightConnector1">
             <a:avLst/>
@@ -8550,8 +8580,8 @@
         </p:nvCxnSpPr>
         <p:spPr>
           <a:xfrm>
-            <a:off x="3987609" y="4273961"/>
-            <a:ext cx="591352" cy="0"/>
+            <a:off x="3106248" y="4038621"/>
+            <a:ext cx="296064" cy="0"/>
           </a:xfrm>
           <a:prstGeom prst="straightConnector1">
             <a:avLst/>
@@ -8585,8 +8615,8 @@
         </p:nvCxnSpPr>
         <p:spPr>
           <a:xfrm>
-            <a:off x="4008235" y="1454715"/>
-            <a:ext cx="570726" cy="0"/>
+            <a:off x="3186931" y="1663159"/>
+            <a:ext cx="215381" cy="0"/>
           </a:xfrm>
           <a:prstGeom prst="straightConnector1">
             <a:avLst/>
@@ -8619,9 +8649,9 @@
           <p:nvPr/>
         </p:nvCxnSpPr>
         <p:spPr>
-          <a:xfrm flipV="1">
-            <a:off x="3970754" y="2356484"/>
-            <a:ext cx="906715" cy="6356"/>
+          <a:xfrm>
+            <a:off x="3146590" y="2410276"/>
+            <a:ext cx="554230" cy="0"/>
           </a:xfrm>
           <a:prstGeom prst="straightConnector1">
             <a:avLst/>
@@ -8654,9 +8684,9 @@
           <p:nvPr/>
         </p:nvCxnSpPr>
         <p:spPr>
-          <a:xfrm flipV="1">
-            <a:off x="3992526" y="3331729"/>
-            <a:ext cx="878068" cy="1658"/>
+          <a:xfrm>
+            <a:off x="3160037" y="3277937"/>
+            <a:ext cx="533908" cy="0"/>
           </a:xfrm>
           <a:prstGeom prst="straightConnector1">
             <a:avLst/>
@@ -8691,8 +8721,8 @@
         </p:nvCxnSpPr>
         <p:spPr>
           <a:xfrm flipV="1">
-            <a:off x="5099194" y="2892680"/>
-            <a:ext cx="1242924" cy="439049"/>
+            <a:off x="3922545" y="2892680"/>
+            <a:ext cx="624337" cy="385257"/>
           </a:xfrm>
           <a:prstGeom prst="bentConnector3">
             <a:avLst>
@@ -8739,8 +8769,8 @@
         </p:nvCxnSpPr>
         <p:spPr>
           <a:xfrm>
-            <a:off x="5106069" y="2356484"/>
-            <a:ext cx="1236049" cy="536196"/>
+            <a:off x="3929420" y="2410276"/>
+            <a:ext cx="617462" cy="482404"/>
           </a:xfrm>
           <a:prstGeom prst="bentConnector3">
             <a:avLst>
@@ -8786,9 +8816,9 @@
           <p:nvPr/>
         </p:nvCxnSpPr>
         <p:spPr>
-          <a:xfrm>
-            <a:off x="6545761" y="2892680"/>
-            <a:ext cx="515788" cy="0"/>
+          <a:xfrm flipV="1">
+            <a:off x="4750525" y="2888452"/>
+            <a:ext cx="271936" cy="4228"/>
           </a:xfrm>
           <a:prstGeom prst="straightConnector1">
             <a:avLst/>
@@ -8822,9 +8852,678 @@
           <p:nvPr/>
         </p:nvCxnSpPr>
         <p:spPr>
+          <a:xfrm>
+            <a:off x="5641026" y="2888452"/>
+            <a:ext cx="398906" cy="1535"/>
+          </a:xfrm>
+          <a:prstGeom prst="straightConnector1">
+            <a:avLst/>
+          </a:prstGeom>
+          <a:noFill/>
+          <a:ln w="19050" cap="flat" cmpd="sng">
+            <a:solidFill>
+              <a:srgbClr val="000000"/>
+            </a:solidFill>
+            <a:prstDash val="solid"/>
+            <a:round/>
+            <a:headEnd type="none" w="med" len="med"/>
+            <a:tailEnd type="triangle" w="med" len="med"/>
+          </a:ln>
+        </p:spPr>
+      </p:cxnSp>
+      <p:cxnSp>
+        <p:nvCxnSpPr>
+          <p:cNvPr id="66" name="连接符: 肘形 65">
+            <a:extLst>
+              <a:ext uri="{FF2B5EF4-FFF2-40B4-BE49-F238E27FC236}">
+                <a16:creationId xmlns:a16="http://schemas.microsoft.com/office/drawing/2014/main" id="{18711951-5595-4165-A5B1-B7A677A56231}"/>
+              </a:ext>
+            </a:extLst>
+          </p:cNvPr>
+          <p:cNvCxnSpPr>
+            <a:cxnSpLocks/>
+            <a:stCxn id="49" idx="0"/>
+            <a:endCxn id="50" idx="0"/>
+          </p:cNvCxnSpPr>
+          <p:nvPr/>
+        </p:nvCxnSpPr>
+        <p:spPr>
+          <a:xfrm rot="5400000" flipH="1" flipV="1">
+            <a:off x="1905631" y="1125264"/>
+            <a:ext cx="12700" cy="249601"/>
+          </a:xfrm>
+          <a:prstGeom prst="bentConnector3">
+            <a:avLst>
+              <a:gd name="adj1" fmla="val 847039"/>
+            </a:avLst>
+          </a:prstGeom>
+          <a:ln w="19050">
+            <a:solidFill>
+              <a:schemeClr val="tx1"/>
+            </a:solidFill>
+            <a:tailEnd type="triangle"/>
+          </a:ln>
+        </p:spPr>
+        <p:style>
+          <a:lnRef idx="1">
+            <a:schemeClr val="accent1"/>
+          </a:lnRef>
+          <a:fillRef idx="0">
+            <a:schemeClr val="accent1"/>
+          </a:fillRef>
+          <a:effectRef idx="0">
+            <a:schemeClr val="accent1"/>
+          </a:effectRef>
+          <a:fontRef idx="minor">
+            <a:schemeClr val="tx1"/>
+          </a:fontRef>
+        </p:style>
+      </p:cxnSp>
+      <p:cxnSp>
+        <p:nvCxnSpPr>
+          <p:cNvPr id="67" name="连接符: 肘形 66">
+            <a:extLst>
+              <a:ext uri="{FF2B5EF4-FFF2-40B4-BE49-F238E27FC236}">
+                <a16:creationId xmlns:a16="http://schemas.microsoft.com/office/drawing/2014/main" id="{1603BA1E-0B2E-476C-9FE2-BF8ED6FAB99E}"/>
+              </a:ext>
+            </a:extLst>
+          </p:cNvPr>
+          <p:cNvCxnSpPr>
+            <a:cxnSpLocks/>
+            <a:stCxn id="48" idx="0"/>
+            <a:endCxn id="51" idx="0"/>
+          </p:cNvCxnSpPr>
+          <p:nvPr/>
+        </p:nvCxnSpPr>
+        <p:spPr>
+          <a:xfrm rot="5400000" flipH="1" flipV="1">
+            <a:off x="1905631" y="875663"/>
+            <a:ext cx="12700" cy="748803"/>
+          </a:xfrm>
+          <a:prstGeom prst="bentConnector3">
+            <a:avLst>
+              <a:gd name="adj1" fmla="val 1641150"/>
+            </a:avLst>
+          </a:prstGeom>
+          <a:ln w="19050">
+            <a:solidFill>
+              <a:schemeClr val="tx1"/>
+            </a:solidFill>
+            <a:tailEnd type="triangle"/>
+          </a:ln>
+        </p:spPr>
+        <p:style>
+          <a:lnRef idx="1">
+            <a:schemeClr val="accent1"/>
+          </a:lnRef>
+          <a:fillRef idx="0">
+            <a:schemeClr val="accent1"/>
+          </a:fillRef>
+          <a:effectRef idx="0">
+            <a:schemeClr val="accent1"/>
+          </a:effectRef>
+          <a:fontRef idx="minor">
+            <a:schemeClr val="tx1"/>
+          </a:fontRef>
+        </p:style>
+      </p:cxnSp>
+      <p:cxnSp>
+        <p:nvCxnSpPr>
+          <p:cNvPr id="69" name="连接符: 肘形 68">
+            <a:extLst>
+              <a:ext uri="{FF2B5EF4-FFF2-40B4-BE49-F238E27FC236}">
+                <a16:creationId xmlns:a16="http://schemas.microsoft.com/office/drawing/2014/main" id="{B5F2449D-7921-4802-A68E-562E825984B9}"/>
+              </a:ext>
+            </a:extLst>
+          </p:cNvPr>
+          <p:cNvCxnSpPr>
+            <a:cxnSpLocks/>
+            <a:stCxn id="47" idx="0"/>
+            <a:endCxn id="52" idx="0"/>
+          </p:cNvCxnSpPr>
+          <p:nvPr/>
+        </p:nvCxnSpPr>
+        <p:spPr>
+          <a:xfrm rot="5400000" flipH="1" flipV="1">
+            <a:off x="1905632" y="626061"/>
+            <a:ext cx="12700" cy="1248006"/>
+          </a:xfrm>
+          <a:prstGeom prst="bentConnector3">
+            <a:avLst>
+              <a:gd name="adj1" fmla="val 2382346"/>
+            </a:avLst>
+          </a:prstGeom>
+          <a:ln w="19050">
+            <a:solidFill>
+              <a:schemeClr val="tx1"/>
+            </a:solidFill>
+            <a:tailEnd type="triangle"/>
+          </a:ln>
+        </p:spPr>
+        <p:style>
+          <a:lnRef idx="1">
+            <a:schemeClr val="accent1"/>
+          </a:lnRef>
+          <a:fillRef idx="0">
+            <a:schemeClr val="accent1"/>
+          </a:fillRef>
+          <a:effectRef idx="0">
+            <a:schemeClr val="accent1"/>
+          </a:effectRef>
+          <a:fontRef idx="minor">
+            <a:schemeClr val="tx1"/>
+          </a:fontRef>
+        </p:style>
+      </p:cxnSp>
+      <p:cxnSp>
+        <p:nvCxnSpPr>
+          <p:cNvPr id="77" name="连接符: 肘形 76">
+            <a:extLst>
+              <a:ext uri="{FF2B5EF4-FFF2-40B4-BE49-F238E27FC236}">
+                <a16:creationId xmlns:a16="http://schemas.microsoft.com/office/drawing/2014/main" id="{CC33813E-D0CE-4888-8F29-F3448CFE68F2}"/>
+              </a:ext>
+            </a:extLst>
+          </p:cNvPr>
+          <p:cNvCxnSpPr>
+            <a:cxnSpLocks/>
+            <a:stCxn id="32" idx="0"/>
+            <a:endCxn id="47" idx="1"/>
+          </p:cNvCxnSpPr>
+          <p:nvPr/>
+        </p:nvCxnSpPr>
+        <p:spPr>
+          <a:xfrm rot="5400000" flipH="1" flipV="1">
+            <a:off x="529385" y="1837563"/>
+            <a:ext cx="852812" cy="512063"/>
+          </a:xfrm>
+          <a:prstGeom prst="bentConnector2">
+            <a:avLst/>
+          </a:prstGeom>
+          <a:ln w="19050">
+            <a:solidFill>
+              <a:schemeClr val="tx1"/>
+            </a:solidFill>
+            <a:tailEnd type="triangle"/>
+          </a:ln>
+        </p:spPr>
+        <p:style>
+          <a:lnRef idx="1">
+            <a:schemeClr val="accent1"/>
+          </a:lnRef>
+          <a:fillRef idx="0">
+            <a:schemeClr val="accent1"/>
+          </a:fillRef>
+          <a:effectRef idx="0">
+            <a:schemeClr val="accent1"/>
+          </a:effectRef>
+          <a:fontRef idx="minor">
+            <a:schemeClr val="tx1"/>
+          </a:fontRef>
+        </p:style>
+      </p:cxnSp>
+      <p:cxnSp>
+        <p:nvCxnSpPr>
+          <p:cNvPr id="78" name="Google Shape;10001;p124">
+            <a:extLst>
+              <a:ext uri="{FF2B5EF4-FFF2-40B4-BE49-F238E27FC236}">
+                <a16:creationId xmlns:a16="http://schemas.microsoft.com/office/drawing/2014/main" id="{0DACFF50-B31B-48FD-94AC-0C18E7F64A94}"/>
+              </a:ext>
+            </a:extLst>
+          </p:cNvPr>
+          <p:cNvCxnSpPr>
+            <a:cxnSpLocks/>
+            <a:stCxn id="32" idx="3"/>
+            <a:endCxn id="38" idx="2"/>
+          </p:cNvCxnSpPr>
+          <p:nvPr/>
+        </p:nvCxnSpPr>
+        <p:spPr>
+          <a:xfrm>
+            <a:off x="1139521" y="2892680"/>
+            <a:ext cx="206403" cy="0"/>
+          </a:xfrm>
+          <a:prstGeom prst="straightConnector1">
+            <a:avLst/>
+          </a:prstGeom>
+          <a:noFill/>
+          <a:ln w="19050" cap="flat" cmpd="sng">
+            <a:solidFill>
+              <a:srgbClr val="000000"/>
+            </a:solidFill>
+            <a:prstDash val="solid"/>
+            <a:round/>
+            <a:headEnd type="none" w="med" len="med"/>
+            <a:tailEnd type="triangle" w="med" len="med"/>
+          </a:ln>
+        </p:spPr>
+      </p:cxnSp>
+      <p:cxnSp>
+        <p:nvCxnSpPr>
+          <p:cNvPr id="81" name="Google Shape;10001;p124">
+            <a:extLst>
+              <a:ext uri="{FF2B5EF4-FFF2-40B4-BE49-F238E27FC236}">
+                <a16:creationId xmlns:a16="http://schemas.microsoft.com/office/drawing/2014/main" id="{1825C8A4-C02E-4FE2-B30B-71B5E268DD83}"/>
+              </a:ext>
+            </a:extLst>
+          </p:cNvPr>
+          <p:cNvCxnSpPr>
+            <a:cxnSpLocks/>
+            <a:stCxn id="33" idx="3"/>
+            <a:endCxn id="30" idx="2"/>
+          </p:cNvCxnSpPr>
+          <p:nvPr/>
+        </p:nvCxnSpPr>
+        <p:spPr>
           <a:xfrm flipV="1">
-            <a:off x="7918813" y="2889987"/>
-            <a:ext cx="467658" cy="2693"/>
+            <a:off x="1139521" y="4024482"/>
+            <a:ext cx="206403" cy="858"/>
+          </a:xfrm>
+          <a:prstGeom prst="straightConnector1">
+            <a:avLst/>
+          </a:prstGeom>
+          <a:noFill/>
+          <a:ln w="19050" cap="flat" cmpd="sng">
+            <a:solidFill>
+              <a:srgbClr val="000000"/>
+            </a:solidFill>
+            <a:prstDash val="solid"/>
+            <a:round/>
+            <a:headEnd type="none" w="med" len="med"/>
+            <a:tailEnd type="triangle" w="med" len="med"/>
+          </a:ln>
+        </p:spPr>
+      </p:cxnSp>
+      <p:cxnSp>
+        <p:nvCxnSpPr>
+          <p:cNvPr id="84" name="Google Shape;10001;p124">
+            <a:extLst>
+              <a:ext uri="{FF2B5EF4-FFF2-40B4-BE49-F238E27FC236}">
+                <a16:creationId xmlns:a16="http://schemas.microsoft.com/office/drawing/2014/main" id="{4BC9ECD9-1FF0-44D2-8D92-BBBB9EE5A3B0}"/>
+              </a:ext>
+            </a:extLst>
+          </p:cNvPr>
+          <p:cNvCxnSpPr>
+            <a:cxnSpLocks/>
+            <a:stCxn id="30" idx="0"/>
+            <a:endCxn id="64" idx="1"/>
+          </p:cNvCxnSpPr>
+          <p:nvPr/>
+        </p:nvCxnSpPr>
+        <p:spPr>
+          <a:xfrm>
+            <a:off x="1549567" y="4024482"/>
+            <a:ext cx="618838" cy="148"/>
+          </a:xfrm>
+          <a:prstGeom prst="straightConnector1">
+            <a:avLst/>
+          </a:prstGeom>
+          <a:noFill/>
+          <a:ln w="19050" cap="flat" cmpd="sng">
+            <a:solidFill>
+              <a:srgbClr val="000000"/>
+            </a:solidFill>
+            <a:prstDash val="solid"/>
+            <a:round/>
+            <a:headEnd type="none" w="med" len="med"/>
+            <a:tailEnd type="triangle" w="med" len="med"/>
+          </a:ln>
+        </p:spPr>
+      </p:cxnSp>
+      <p:cxnSp>
+        <p:nvCxnSpPr>
+          <p:cNvPr id="95" name="Google Shape;10001;p124">
+            <a:extLst>
+              <a:ext uri="{FF2B5EF4-FFF2-40B4-BE49-F238E27FC236}">
+                <a16:creationId xmlns:a16="http://schemas.microsoft.com/office/drawing/2014/main" id="{C08A325D-0F65-43B4-BF9E-F43DC7C4D1DE}"/>
+              </a:ext>
+            </a:extLst>
+          </p:cNvPr>
+          <p:cNvCxnSpPr>
+            <a:cxnSpLocks/>
+            <a:stCxn id="68" idx="0"/>
+            <a:endCxn id="65" idx="4"/>
+          </p:cNvCxnSpPr>
+          <p:nvPr/>
+        </p:nvCxnSpPr>
+        <p:spPr>
+          <a:xfrm flipV="1">
+            <a:off x="3808245" y="3392237"/>
+            <a:ext cx="0" cy="303841"/>
+          </a:xfrm>
+          <a:prstGeom prst="straightConnector1">
+            <a:avLst/>
+          </a:prstGeom>
+          <a:noFill/>
+          <a:ln w="19050" cap="flat" cmpd="sng">
+            <a:solidFill>
+              <a:srgbClr val="000000"/>
+            </a:solidFill>
+            <a:prstDash val="solid"/>
+            <a:round/>
+            <a:headEnd type="none" w="med" len="med"/>
+            <a:tailEnd type="triangle" w="med" len="med"/>
+          </a:ln>
+        </p:spPr>
+      </p:cxnSp>
+      <p:cxnSp>
+        <p:nvCxnSpPr>
+          <p:cNvPr id="96" name="Google Shape;10001;p124">
+            <a:extLst>
+              <a:ext uri="{FF2B5EF4-FFF2-40B4-BE49-F238E27FC236}">
+                <a16:creationId xmlns:a16="http://schemas.microsoft.com/office/drawing/2014/main" id="{8BF0CB7A-AC16-4A07-A65D-834A6CE7D337}"/>
+              </a:ext>
+            </a:extLst>
+          </p:cNvPr>
+          <p:cNvCxnSpPr>
+            <a:cxnSpLocks/>
+            <a:stCxn id="53" idx="2"/>
+            <a:endCxn id="59" idx="0"/>
+          </p:cNvCxnSpPr>
+          <p:nvPr/>
+        </p:nvCxnSpPr>
+        <p:spPr>
+          <a:xfrm>
+            <a:off x="3804796" y="1999615"/>
+            <a:ext cx="10324" cy="296361"/>
+          </a:xfrm>
+          <a:prstGeom prst="straightConnector1">
+            <a:avLst/>
+          </a:prstGeom>
+          <a:noFill/>
+          <a:ln w="19050" cap="flat" cmpd="sng">
+            <a:solidFill>
+              <a:srgbClr val="000000"/>
+            </a:solidFill>
+            <a:prstDash val="solid"/>
+            <a:round/>
+            <a:headEnd type="none" w="med" len="med"/>
+            <a:tailEnd type="triangle" w="med" len="med"/>
+          </a:ln>
+        </p:spPr>
+      </p:cxnSp>
+      <p:cxnSp>
+        <p:nvCxnSpPr>
+          <p:cNvPr id="104" name="Google Shape;10001;p124">
+            <a:extLst>
+              <a:ext uri="{FF2B5EF4-FFF2-40B4-BE49-F238E27FC236}">
+                <a16:creationId xmlns:a16="http://schemas.microsoft.com/office/drawing/2014/main" id="{791E466E-FF63-440F-9488-D3A998F8AA05}"/>
+              </a:ext>
+            </a:extLst>
+          </p:cNvPr>
+          <p:cNvCxnSpPr>
+            <a:cxnSpLocks/>
+            <a:stCxn id="52" idx="3"/>
+          </p:cNvCxnSpPr>
+          <p:nvPr/>
+        </p:nvCxnSpPr>
+        <p:spPr>
+          <a:xfrm flipV="1">
+            <a:off x="2599441" y="1660842"/>
+            <a:ext cx="309282" cy="6346"/>
+          </a:xfrm>
+          <a:prstGeom prst="straightConnector1">
+            <a:avLst/>
+          </a:prstGeom>
+          <a:noFill/>
+          <a:ln w="19050" cap="flat" cmpd="sng">
+            <a:solidFill>
+              <a:srgbClr val="000000"/>
+            </a:solidFill>
+            <a:prstDash val="solid"/>
+            <a:round/>
+            <a:headEnd type="none" w="med" len="med"/>
+            <a:tailEnd type="triangle" w="med" len="med"/>
+          </a:ln>
+        </p:spPr>
+      </p:cxnSp>
+      <p:cxnSp>
+        <p:nvCxnSpPr>
+          <p:cNvPr id="157" name="连接符: 肘形 156">
+            <a:extLst>
+              <a:ext uri="{FF2B5EF4-FFF2-40B4-BE49-F238E27FC236}">
+                <a16:creationId xmlns:a16="http://schemas.microsoft.com/office/drawing/2014/main" id="{BE1C58A1-A15B-4DE6-801C-D667376BB19A}"/>
+              </a:ext>
+            </a:extLst>
+          </p:cNvPr>
+          <p:cNvCxnSpPr>
+            <a:cxnSpLocks/>
+            <a:stCxn id="5" idx="0"/>
+            <a:endCxn id="76" idx="1"/>
+          </p:cNvCxnSpPr>
+          <p:nvPr/>
+        </p:nvCxnSpPr>
+        <p:spPr>
+          <a:xfrm>
+            <a:off x="6848361" y="2889987"/>
+            <a:ext cx="327374" cy="451573"/>
+          </a:xfrm>
+          <a:prstGeom prst="bentConnector3">
+            <a:avLst>
+              <a:gd name="adj1" fmla="val 50000"/>
+            </a:avLst>
+          </a:prstGeom>
+          <a:ln w="19050">
+            <a:solidFill>
+              <a:schemeClr val="tx1"/>
+            </a:solidFill>
+            <a:tailEnd type="triangle"/>
+          </a:ln>
+        </p:spPr>
+        <p:style>
+          <a:lnRef idx="1">
+            <a:schemeClr val="accent1"/>
+          </a:lnRef>
+          <a:fillRef idx="0">
+            <a:schemeClr val="accent1"/>
+          </a:fillRef>
+          <a:effectRef idx="0">
+            <a:schemeClr val="accent1"/>
+          </a:effectRef>
+          <a:fontRef idx="minor">
+            <a:schemeClr val="tx1"/>
+          </a:fontRef>
+        </p:style>
+      </p:cxnSp>
+      <p:cxnSp>
+        <p:nvCxnSpPr>
+          <p:cNvPr id="158" name="连接符: 肘形 157">
+            <a:extLst>
+              <a:ext uri="{FF2B5EF4-FFF2-40B4-BE49-F238E27FC236}">
+                <a16:creationId xmlns:a16="http://schemas.microsoft.com/office/drawing/2014/main" id="{7573343A-2B04-46DF-90A7-7C9282ECD03C}"/>
+              </a:ext>
+            </a:extLst>
+          </p:cNvPr>
+          <p:cNvCxnSpPr>
+            <a:cxnSpLocks/>
+            <a:stCxn id="5" idx="0"/>
+            <a:endCxn id="72" idx="1"/>
+          </p:cNvCxnSpPr>
+          <p:nvPr/>
+        </p:nvCxnSpPr>
+        <p:spPr>
+          <a:xfrm flipV="1">
+            <a:off x="6848361" y="2417783"/>
+            <a:ext cx="327374" cy="472204"/>
+          </a:xfrm>
+          <a:prstGeom prst="bentConnector3">
+            <a:avLst>
+              <a:gd name="adj1" fmla="val 50000"/>
+            </a:avLst>
+          </a:prstGeom>
+          <a:ln w="19050">
+            <a:solidFill>
+              <a:schemeClr val="tx1"/>
+            </a:solidFill>
+            <a:tailEnd type="triangle"/>
+          </a:ln>
+        </p:spPr>
+        <p:style>
+          <a:lnRef idx="1">
+            <a:schemeClr val="accent1"/>
+          </a:lnRef>
+          <a:fillRef idx="0">
+            <a:schemeClr val="accent1"/>
+          </a:fillRef>
+          <a:effectRef idx="0">
+            <a:schemeClr val="accent1"/>
+          </a:effectRef>
+          <a:fontRef idx="minor">
+            <a:schemeClr val="tx1"/>
+          </a:fontRef>
+        </p:style>
+      </p:cxnSp>
+      <p:cxnSp>
+        <p:nvCxnSpPr>
+          <p:cNvPr id="159" name="连接符: 肘形 158">
+            <a:extLst>
+              <a:ext uri="{FF2B5EF4-FFF2-40B4-BE49-F238E27FC236}">
+                <a16:creationId xmlns:a16="http://schemas.microsoft.com/office/drawing/2014/main" id="{70E25E07-FD03-4255-B1EB-CB05603A4EC9}"/>
+              </a:ext>
+            </a:extLst>
+          </p:cNvPr>
+          <p:cNvCxnSpPr>
+            <a:cxnSpLocks/>
+            <a:stCxn id="76" idx="3"/>
+            <a:endCxn id="87" idx="1"/>
+          </p:cNvCxnSpPr>
+          <p:nvPr/>
+        </p:nvCxnSpPr>
+        <p:spPr>
+          <a:xfrm flipV="1">
+            <a:off x="8533341" y="2896631"/>
+            <a:ext cx="290482" cy="444929"/>
+          </a:xfrm>
+          <a:prstGeom prst="bentConnector3">
+            <a:avLst>
+              <a:gd name="adj1" fmla="val 50000"/>
+            </a:avLst>
+          </a:prstGeom>
+          <a:ln w="19050">
+            <a:solidFill>
+              <a:schemeClr val="tx1"/>
+            </a:solidFill>
+            <a:tailEnd type="triangle"/>
+          </a:ln>
+        </p:spPr>
+        <p:style>
+          <a:lnRef idx="1">
+            <a:schemeClr val="accent1"/>
+          </a:lnRef>
+          <a:fillRef idx="0">
+            <a:schemeClr val="accent1"/>
+          </a:fillRef>
+          <a:effectRef idx="0">
+            <a:schemeClr val="accent1"/>
+          </a:effectRef>
+          <a:fontRef idx="minor">
+            <a:schemeClr val="tx1"/>
+          </a:fontRef>
+        </p:style>
+      </p:cxnSp>
+      <p:cxnSp>
+        <p:nvCxnSpPr>
+          <p:cNvPr id="160" name="连接符: 肘形 159">
+            <a:extLst>
+              <a:ext uri="{FF2B5EF4-FFF2-40B4-BE49-F238E27FC236}">
+                <a16:creationId xmlns:a16="http://schemas.microsoft.com/office/drawing/2014/main" id="{73B54961-0D12-483F-BF92-9CE41C8F5E74}"/>
+              </a:ext>
+            </a:extLst>
+          </p:cNvPr>
+          <p:cNvCxnSpPr>
+            <a:cxnSpLocks/>
+            <a:stCxn id="72" idx="3"/>
+            <a:endCxn id="87" idx="1"/>
+          </p:cNvCxnSpPr>
+          <p:nvPr/>
+        </p:nvCxnSpPr>
+        <p:spPr>
+          <a:xfrm>
+            <a:off x="8533341" y="2417783"/>
+            <a:ext cx="290482" cy="478848"/>
+          </a:xfrm>
+          <a:prstGeom prst="bentConnector3">
+            <a:avLst>
+              <a:gd name="adj1" fmla="val 50000"/>
+            </a:avLst>
+          </a:prstGeom>
+          <a:ln w="19050">
+            <a:solidFill>
+              <a:schemeClr val="tx1"/>
+            </a:solidFill>
+            <a:tailEnd type="triangle"/>
+          </a:ln>
+        </p:spPr>
+        <p:style>
+          <a:lnRef idx="1">
+            <a:schemeClr val="accent1"/>
+          </a:lnRef>
+          <a:fillRef idx="0">
+            <a:schemeClr val="accent1"/>
+          </a:fillRef>
+          <a:effectRef idx="0">
+            <a:schemeClr val="accent1"/>
+          </a:effectRef>
+          <a:fontRef idx="minor">
+            <a:schemeClr val="tx1"/>
+          </a:fontRef>
+        </p:style>
+      </p:cxnSp>
+      <p:cxnSp>
+        <p:nvCxnSpPr>
+          <p:cNvPr id="170" name="Google Shape;10001;p124">
+            <a:extLst>
+              <a:ext uri="{FF2B5EF4-FFF2-40B4-BE49-F238E27FC236}">
+                <a16:creationId xmlns:a16="http://schemas.microsoft.com/office/drawing/2014/main" id="{B287AB6D-78A5-4A1E-BA8B-53D15E298DB7}"/>
+              </a:ext>
+            </a:extLst>
+          </p:cNvPr>
+          <p:cNvCxnSpPr>
+            <a:cxnSpLocks/>
+            <a:stCxn id="87" idx="3"/>
+            <a:endCxn id="63" idx="0"/>
+          </p:cNvCxnSpPr>
+          <p:nvPr/>
+        </p:nvCxnSpPr>
+        <p:spPr>
+          <a:xfrm flipV="1">
+            <a:off x="9372599" y="2892680"/>
+            <a:ext cx="234615" cy="3951"/>
+          </a:xfrm>
+          <a:prstGeom prst="straightConnector1">
+            <a:avLst/>
+          </a:prstGeom>
+          <a:noFill/>
+          <a:ln w="19050" cap="flat" cmpd="sng">
+            <a:solidFill>
+              <a:srgbClr val="000000"/>
+            </a:solidFill>
+            <a:prstDash val="solid"/>
+            <a:round/>
+            <a:headEnd type="none" w="med" len="med"/>
+            <a:tailEnd type="triangle" w="med" len="med"/>
+          </a:ln>
+        </p:spPr>
+      </p:cxnSp>
+      <p:cxnSp>
+        <p:nvCxnSpPr>
+          <p:cNvPr id="171" name="Google Shape;10001;p124">
+            <a:extLst>
+              <a:ext uri="{FF2B5EF4-FFF2-40B4-BE49-F238E27FC236}">
+                <a16:creationId xmlns:a16="http://schemas.microsoft.com/office/drawing/2014/main" id="{B4065F3A-5ECE-449B-8E11-580677FD9D7F}"/>
+              </a:ext>
+            </a:extLst>
+          </p:cNvPr>
+          <p:cNvCxnSpPr>
+            <a:cxnSpLocks/>
+            <a:stCxn id="63" idx="2"/>
+            <a:endCxn id="36" idx="1"/>
+          </p:cNvCxnSpPr>
+          <p:nvPr/>
+        </p:nvCxnSpPr>
+        <p:spPr>
+          <a:xfrm flipV="1">
+            <a:off x="10424375" y="2891341"/>
+            <a:ext cx="307561" cy="1339"/>
           </a:xfrm>
           <a:prstGeom prst="straightConnector1">
             <a:avLst/>
@@ -15715,8 +16414,8 @@
           </a:fontRef>
         </p:style>
       </p:cxnSp>
-      <mc:AlternateContent xmlns:mc="http://schemas.openxmlformats.org/markup-compatibility/2006">
-        <mc:Choice xmlns:a14="http://schemas.microsoft.com/office/drawing/2010/main" Requires="a14">
+      <mc:AlternateContent xmlns:mc="http://schemas.openxmlformats.org/markup-compatibility/2006" xmlns:a14="http://schemas.microsoft.com/office/drawing/2010/main">
+        <mc:Choice Requires="a14">
           <p:sp>
             <p:nvSpPr>
               <p:cNvPr id="213" name="Google Shape;10169;p131">
@@ -15809,7 +16508,7 @@
             </p:txBody>
           </p:sp>
         </mc:Choice>
-        <mc:Fallback>
+        <mc:Fallback xmlns="">
           <p:sp>
             <p:nvSpPr>
               <p:cNvPr id="213" name="Google Shape;10169;p131">
@@ -15865,8 +16564,8 @@
           </p:sp>
         </mc:Fallback>
       </mc:AlternateContent>
-      <mc:AlternateContent xmlns:mc="http://schemas.openxmlformats.org/markup-compatibility/2006">
-        <mc:Choice xmlns:a14="http://schemas.microsoft.com/office/drawing/2010/main" Requires="a14">
+      <mc:AlternateContent xmlns:mc="http://schemas.openxmlformats.org/markup-compatibility/2006" xmlns:a14="http://schemas.microsoft.com/office/drawing/2010/main">
+        <mc:Choice Requires="a14">
           <p:sp>
             <p:nvSpPr>
               <p:cNvPr id="214" name="Google Shape;10169;p131">
@@ -15959,7 +16658,7 @@
             </p:txBody>
           </p:sp>
         </mc:Choice>
-        <mc:Fallback>
+        <mc:Fallback xmlns="">
           <p:sp>
             <p:nvSpPr>
               <p:cNvPr id="214" name="Google Shape;10169;p131">
@@ -16015,8 +16714,8 @@
           </p:sp>
         </mc:Fallback>
       </mc:AlternateContent>
-      <mc:AlternateContent xmlns:mc="http://schemas.openxmlformats.org/markup-compatibility/2006">
-        <mc:Choice xmlns:a14="http://schemas.microsoft.com/office/drawing/2010/main" Requires="a14">
+      <mc:AlternateContent xmlns:mc="http://schemas.openxmlformats.org/markup-compatibility/2006" xmlns:a14="http://schemas.microsoft.com/office/drawing/2010/main">
+        <mc:Choice Requires="a14">
           <p:sp>
             <p:nvSpPr>
               <p:cNvPr id="215" name="Google Shape;10169;p131">
@@ -16112,7 +16811,7 @@
             </p:txBody>
           </p:sp>
         </mc:Choice>
-        <mc:Fallback>
+        <mc:Fallback xmlns="">
           <p:sp>
             <p:nvSpPr>
               <p:cNvPr id="215" name="Google Shape;10169;p131">
@@ -18368,8 +19067,8 @@
           </a:fontRef>
         </p:style>
       </p:cxnSp>
-      <mc:AlternateContent xmlns:mc="http://schemas.openxmlformats.org/markup-compatibility/2006">
-        <mc:Choice xmlns:a14="http://schemas.microsoft.com/office/drawing/2010/main" Requires="a14">
+      <mc:AlternateContent xmlns:mc="http://schemas.openxmlformats.org/markup-compatibility/2006" xmlns:a14="http://schemas.microsoft.com/office/drawing/2010/main">
+        <mc:Choice Requires="a14">
           <p:sp>
             <p:nvSpPr>
               <p:cNvPr id="213" name="Google Shape;10169;p131">
@@ -18462,7 +19161,7 @@
             </p:txBody>
           </p:sp>
         </mc:Choice>
-        <mc:Fallback>
+        <mc:Fallback xmlns="">
           <p:sp>
             <p:nvSpPr>
               <p:cNvPr id="213" name="Google Shape;10169;p131">
@@ -18518,8 +19217,8 @@
           </p:sp>
         </mc:Fallback>
       </mc:AlternateContent>
-      <mc:AlternateContent xmlns:mc="http://schemas.openxmlformats.org/markup-compatibility/2006">
-        <mc:Choice xmlns:a14="http://schemas.microsoft.com/office/drawing/2010/main" Requires="a14">
+      <mc:AlternateContent xmlns:mc="http://schemas.openxmlformats.org/markup-compatibility/2006" xmlns:a14="http://schemas.microsoft.com/office/drawing/2010/main">
+        <mc:Choice Requires="a14">
           <p:sp>
             <p:nvSpPr>
               <p:cNvPr id="214" name="Google Shape;10169;p131">
@@ -18612,7 +19311,7 @@
             </p:txBody>
           </p:sp>
         </mc:Choice>
-        <mc:Fallback>
+        <mc:Fallback xmlns="">
           <p:sp>
             <p:nvSpPr>
               <p:cNvPr id="214" name="Google Shape;10169;p131">
@@ -18668,8 +19367,8 @@
           </p:sp>
         </mc:Fallback>
       </mc:AlternateContent>
-      <mc:AlternateContent xmlns:mc="http://schemas.openxmlformats.org/markup-compatibility/2006">
-        <mc:Choice xmlns:a14="http://schemas.microsoft.com/office/drawing/2010/main" Requires="a14">
+      <mc:AlternateContent xmlns:mc="http://schemas.openxmlformats.org/markup-compatibility/2006" xmlns:a14="http://schemas.microsoft.com/office/drawing/2010/main">
+        <mc:Choice Requires="a14">
           <p:sp>
             <p:nvSpPr>
               <p:cNvPr id="215" name="Google Shape;10169;p131">
@@ -18765,7 +19464,7 @@
             </p:txBody>
           </p:sp>
         </mc:Choice>
-        <mc:Fallback>
+        <mc:Fallback xmlns="">
           <p:sp>
             <p:nvSpPr>
               <p:cNvPr id="215" name="Google Shape;10169;p131">

</xml_diff>

<commit_message>
Signed-off-by: liyi002  <liyi002@bitbucket.org> 22
</commit_message>
<xml_diff>
--- a/Papers/基于频域的红外可见光融合/images/频域融合.pptx
+++ b/Papers/基于频域的红外可见光融合/images/频域融合.pptx
@@ -5,13 +5,14 @@
     <p:sldMasterId id="2147483648" r:id="rId1"/>
   </p:sldMasterIdLst>
   <p:notesMasterIdLst>
-    <p:notesMasterId r:id="rId6"/>
+    <p:notesMasterId r:id="rId7"/>
   </p:notesMasterIdLst>
   <p:sldIdLst>
     <p:sldId id="256" r:id="rId2"/>
     <p:sldId id="419" r:id="rId3"/>
-    <p:sldId id="417" r:id="rId4"/>
-    <p:sldId id="420" r:id="rId5"/>
+    <p:sldId id="421" r:id="rId4"/>
+    <p:sldId id="417" r:id="rId5"/>
+    <p:sldId id="420" r:id="rId6"/>
   </p:sldIdLst>
   <p:sldSz cx="12192000" cy="6858000"/>
   <p:notesSz cx="6858000" cy="9144000"/>
@@ -200,7 +201,7 @@
           <a:p>
             <a:fld id="{730F7C05-AD7F-4FFA-A0C0-1536BA5A251F}" type="datetimeFigureOut">
               <a:rPr lang="zh-CN" altLang="en-US" smtClean="0"/>
-              <a:t>2025/9/10</a:t>
+              <a:t>2025/9/15</a:t>
             </a:fld>
             <a:endParaRPr lang="zh-CN" altLang="en-US"/>
           </a:p>
@@ -552,6 +553,90 @@
 </file>
 
 <file path=ppt/notesSlides/notesSlide2.xml><?xml version="1.0" encoding="utf-8"?>
+<p:notes xmlns:a="http://schemas.openxmlformats.org/drawingml/2006/main" xmlns:r="http://schemas.openxmlformats.org/officeDocument/2006/relationships" xmlns:p="http://schemas.openxmlformats.org/presentationml/2006/main">
+  <p:cSld>
+    <p:spTree>
+      <p:nvGrpSpPr>
+        <p:cNvPr id="1" name=""/>
+        <p:cNvGrpSpPr/>
+        <p:nvPr/>
+      </p:nvGrpSpPr>
+      <p:grpSpPr>
+        <a:xfrm>
+          <a:off x="0" y="0"/>
+          <a:ext cx="0" cy="0"/>
+          <a:chOff x="0" y="0"/>
+          <a:chExt cx="0" cy="0"/>
+        </a:xfrm>
+      </p:grpSpPr>
+      <p:sp>
+        <p:nvSpPr>
+          <p:cNvPr id="2" name="幻灯片图像占位符 1"/>
+          <p:cNvSpPr>
+            <a:spLocks noGrp="1" noRot="1" noChangeAspect="1"/>
+          </p:cNvSpPr>
+          <p:nvPr>
+            <p:ph type="sldImg"/>
+          </p:nvPr>
+        </p:nvSpPr>
+        <p:spPr/>
+      </p:sp>
+      <p:sp>
+        <p:nvSpPr>
+          <p:cNvPr id="3" name="备注占位符 2"/>
+          <p:cNvSpPr>
+            <a:spLocks noGrp="1"/>
+          </p:cNvSpPr>
+          <p:nvPr>
+            <p:ph type="body" idx="1"/>
+          </p:nvPr>
+        </p:nvSpPr>
+        <p:spPr/>
+        <p:txBody>
+          <a:bodyPr/>
+          <a:lstStyle/>
+          <a:p>
+            <a:endParaRPr lang="zh-CN" altLang="en-US" dirty="0"/>
+          </a:p>
+        </p:txBody>
+      </p:sp>
+      <p:sp>
+        <p:nvSpPr>
+          <p:cNvPr id="4" name="灯片编号占位符 3"/>
+          <p:cNvSpPr>
+            <a:spLocks noGrp="1"/>
+          </p:cNvSpPr>
+          <p:nvPr>
+            <p:ph type="sldNum" sz="quarter" idx="5"/>
+          </p:nvPr>
+        </p:nvSpPr>
+        <p:spPr/>
+        <p:txBody>
+          <a:bodyPr/>
+          <a:lstStyle/>
+          <a:p>
+            <a:fld id="{1B8AE2B5-2FEB-4525-9184-99D996DDFD2F}" type="slidenum">
+              <a:rPr lang="zh-CN" altLang="en-US" smtClean="0"/>
+              <a:t>3</a:t>
+            </a:fld>
+            <a:endParaRPr lang="zh-CN" altLang="en-US"/>
+          </a:p>
+        </p:txBody>
+      </p:sp>
+    </p:spTree>
+    <p:extLst>
+      <p:ext uri="{BB962C8B-B14F-4D97-AF65-F5344CB8AC3E}">
+        <p14:creationId xmlns:p14="http://schemas.microsoft.com/office/powerpoint/2010/main" val="1952463934"/>
+      </p:ext>
+    </p:extLst>
+  </p:cSld>
+  <p:clrMapOvr>
+    <a:masterClrMapping/>
+  </p:clrMapOvr>
+</p:notes>
+</file>
+
+<file path=ppt/notesSlides/notesSlide3.xml><?xml version="1.0" encoding="utf-8"?>
 <p:notes xmlns:a="http://schemas.openxmlformats.org/drawingml/2006/main" xmlns:r="http://schemas.openxmlformats.org/officeDocument/2006/relationships" xmlns:p="http://schemas.openxmlformats.org/presentationml/2006/main" showMasterSp="0" showMasterPhAnim="0">
   <p:cSld>
     <p:spTree>
@@ -730,7 +815,7 @@
 </p:notes>
 </file>
 
-<file path=ppt/notesSlides/notesSlide3.xml><?xml version="1.0" encoding="utf-8"?>
+<file path=ppt/notesSlides/notesSlide4.xml><?xml version="1.0" encoding="utf-8"?>
 <p:notes xmlns:a="http://schemas.openxmlformats.org/drawingml/2006/main" xmlns:r="http://schemas.openxmlformats.org/officeDocument/2006/relationships" xmlns:p="http://schemas.openxmlformats.org/presentationml/2006/main" showMasterSp="0" showMasterPhAnim="0">
   <p:cSld>
     <p:spTree>
@@ -1038,7 +1123,7 @@
           <a:p>
             <a:fld id="{978008A0-1351-474F-B2A3-B5A922791B5E}" type="datetimeFigureOut">
               <a:rPr lang="zh-CN" altLang="en-US" smtClean="0"/>
-              <a:t>2025/9/10</a:t>
+              <a:t>2025/9/15</a:t>
             </a:fld>
             <a:endParaRPr lang="zh-CN" altLang="en-US"/>
           </a:p>
@@ -1206,7 +1291,7 @@
           <a:p>
             <a:fld id="{978008A0-1351-474F-B2A3-B5A922791B5E}" type="datetimeFigureOut">
               <a:rPr lang="zh-CN" altLang="en-US" smtClean="0"/>
-              <a:t>2025/9/10</a:t>
+              <a:t>2025/9/15</a:t>
             </a:fld>
             <a:endParaRPr lang="zh-CN" altLang="en-US"/>
           </a:p>
@@ -1384,7 +1469,7 @@
           <a:p>
             <a:fld id="{978008A0-1351-474F-B2A3-B5A922791B5E}" type="datetimeFigureOut">
               <a:rPr lang="zh-CN" altLang="en-US" smtClean="0"/>
-              <a:t>2025/9/10</a:t>
+              <a:t>2025/9/15</a:t>
             </a:fld>
             <a:endParaRPr lang="zh-CN" altLang="en-US"/>
           </a:p>
@@ -1911,7 +1996,7 @@
           <a:p>
             <a:fld id="{978008A0-1351-474F-B2A3-B5A922791B5E}" type="datetimeFigureOut">
               <a:rPr lang="zh-CN" altLang="en-US" smtClean="0"/>
-              <a:t>2025/9/10</a:t>
+              <a:t>2025/9/15</a:t>
             </a:fld>
             <a:endParaRPr lang="zh-CN" altLang="en-US"/>
           </a:p>
@@ -2156,7 +2241,7 @@
           <a:p>
             <a:fld id="{978008A0-1351-474F-B2A3-B5A922791B5E}" type="datetimeFigureOut">
               <a:rPr lang="zh-CN" altLang="en-US" smtClean="0"/>
-              <a:t>2025/9/10</a:t>
+              <a:t>2025/9/15</a:t>
             </a:fld>
             <a:endParaRPr lang="zh-CN" altLang="en-US"/>
           </a:p>
@@ -2385,7 +2470,7 @@
           <a:p>
             <a:fld id="{978008A0-1351-474F-B2A3-B5A922791B5E}" type="datetimeFigureOut">
               <a:rPr lang="zh-CN" altLang="en-US" smtClean="0"/>
-              <a:t>2025/9/10</a:t>
+              <a:t>2025/9/15</a:t>
             </a:fld>
             <a:endParaRPr lang="zh-CN" altLang="en-US"/>
           </a:p>
@@ -2749,7 +2834,7 @@
           <a:p>
             <a:fld id="{978008A0-1351-474F-B2A3-B5A922791B5E}" type="datetimeFigureOut">
               <a:rPr lang="zh-CN" altLang="en-US" smtClean="0"/>
-              <a:t>2025/9/10</a:t>
+              <a:t>2025/9/15</a:t>
             </a:fld>
             <a:endParaRPr lang="zh-CN" altLang="en-US"/>
           </a:p>
@@ -2866,7 +2951,7 @@
           <a:p>
             <a:fld id="{978008A0-1351-474F-B2A3-B5A922791B5E}" type="datetimeFigureOut">
               <a:rPr lang="zh-CN" altLang="en-US" smtClean="0"/>
-              <a:t>2025/9/10</a:t>
+              <a:t>2025/9/15</a:t>
             </a:fld>
             <a:endParaRPr lang="zh-CN" altLang="en-US"/>
           </a:p>
@@ -2961,7 +3046,7 @@
           <a:p>
             <a:fld id="{978008A0-1351-474F-B2A3-B5A922791B5E}" type="datetimeFigureOut">
               <a:rPr lang="zh-CN" altLang="en-US" smtClean="0"/>
-              <a:t>2025/9/10</a:t>
+              <a:t>2025/9/15</a:t>
             </a:fld>
             <a:endParaRPr lang="zh-CN" altLang="en-US"/>
           </a:p>
@@ -3236,7 +3321,7 @@
           <a:p>
             <a:fld id="{978008A0-1351-474F-B2A3-B5A922791B5E}" type="datetimeFigureOut">
               <a:rPr lang="zh-CN" altLang="en-US" smtClean="0"/>
-              <a:t>2025/9/10</a:t>
+              <a:t>2025/9/15</a:t>
             </a:fld>
             <a:endParaRPr lang="zh-CN" altLang="en-US"/>
           </a:p>
@@ -3488,7 +3573,7 @@
           <a:p>
             <a:fld id="{978008A0-1351-474F-B2A3-B5A922791B5E}" type="datetimeFigureOut">
               <a:rPr lang="zh-CN" altLang="en-US" smtClean="0"/>
-              <a:t>2025/9/10</a:t>
+              <a:t>2025/9/15</a:t>
             </a:fld>
             <a:endParaRPr lang="zh-CN" altLang="en-US"/>
           </a:p>
@@ -3699,7 +3784,7 @@
           <a:p>
             <a:fld id="{978008A0-1351-474F-B2A3-B5A922791B5E}" type="datetimeFigureOut">
               <a:rPr lang="zh-CN" altLang="en-US" smtClean="0"/>
-              <a:t>2025/9/10</a:t>
+              <a:t>2025/9/15</a:t>
             </a:fld>
             <a:endParaRPr lang="zh-CN" altLang="en-US"/>
           </a:p>
@@ -6597,8 +6682,8 @@
           </a:p>
         </p:txBody>
       </p:sp>
-      <mc:AlternateContent xmlns:mc="http://schemas.openxmlformats.org/markup-compatibility/2006">
-        <mc:Choice xmlns:a14="http://schemas.microsoft.com/office/drawing/2010/main" Requires="a14">
+      <mc:AlternateContent xmlns:mc="http://schemas.openxmlformats.org/markup-compatibility/2006" xmlns:a14="http://schemas.microsoft.com/office/drawing/2010/main">
+        <mc:Choice Requires="a14">
           <p:sp>
             <p:nvSpPr>
               <p:cNvPr id="61" name="Google Shape;10169;p131">
@@ -6691,7 +6776,7 @@
             </p:txBody>
           </p:sp>
         </mc:Choice>
-        <mc:Fallback>
+        <mc:Fallback xmlns="">
           <p:sp>
             <p:nvSpPr>
               <p:cNvPr id="61" name="Google Shape;10169;p131">
@@ -6747,8 +6832,8 @@
           </p:sp>
         </mc:Fallback>
       </mc:AlternateContent>
-      <mc:AlternateContent xmlns:mc="http://schemas.openxmlformats.org/markup-compatibility/2006">
-        <mc:Choice xmlns:a14="http://schemas.microsoft.com/office/drawing/2010/main" Requires="a14">
+      <mc:AlternateContent xmlns:mc="http://schemas.openxmlformats.org/markup-compatibility/2006" xmlns:a14="http://schemas.microsoft.com/office/drawing/2010/main">
+        <mc:Choice Requires="a14">
           <p:sp>
             <p:nvSpPr>
               <p:cNvPr id="62" name="Google Shape;10169;p131">
@@ -6841,7 +6926,7 @@
             </p:txBody>
           </p:sp>
         </mc:Choice>
-        <mc:Fallback>
+        <mc:Fallback xmlns="">
           <p:sp>
             <p:nvSpPr>
               <p:cNvPr id="62" name="Google Shape;10169;p131">
@@ -6897,8 +6982,8 @@
           </p:sp>
         </mc:Fallback>
       </mc:AlternateContent>
-      <mc:AlternateContent xmlns:mc="http://schemas.openxmlformats.org/markup-compatibility/2006">
-        <mc:Choice xmlns:a14="http://schemas.microsoft.com/office/drawing/2010/main" Requires="a14">
+      <mc:AlternateContent xmlns:mc="http://schemas.openxmlformats.org/markup-compatibility/2006" xmlns:a14="http://schemas.microsoft.com/office/drawing/2010/main">
+        <mc:Choice Requires="a14">
           <p:sp>
             <p:nvSpPr>
               <p:cNvPr id="64" name="Google Shape;10169;p131">
@@ -6994,7 +7079,7 @@
             </p:txBody>
           </p:sp>
         </mc:Choice>
-        <mc:Fallback>
+        <mc:Fallback xmlns="">
           <p:sp>
             <p:nvSpPr>
               <p:cNvPr id="64" name="Google Shape;10169;p131">
@@ -9735,6 +9820,4394 @@
   <p:cSld>
     <p:spTree>
       <p:nvGrpSpPr>
+        <p:cNvPr id="1" name=""/>
+        <p:cNvGrpSpPr/>
+        <p:nvPr/>
+      </p:nvGrpSpPr>
+      <p:grpSpPr>
+        <a:xfrm>
+          <a:off x="0" y="0"/>
+          <a:ext cx="0" cy="0"/>
+          <a:chOff x="0" y="0"/>
+          <a:chExt cx="0" cy="0"/>
+        </a:xfrm>
+      </p:grpSpPr>
+      <p:sp>
+        <p:nvSpPr>
+          <p:cNvPr id="85" name="矩形: 圆角 84">
+            <a:extLst>
+              <a:ext uri="{FF2B5EF4-FFF2-40B4-BE49-F238E27FC236}">
+                <a16:creationId xmlns:a16="http://schemas.microsoft.com/office/drawing/2014/main" id="{8477C450-F01D-4825-BA60-4CA6BE98FBB8}"/>
+              </a:ext>
+            </a:extLst>
+          </p:cNvPr>
+          <p:cNvSpPr/>
+          <p:nvPr/>
+        </p:nvSpPr>
+        <p:spPr>
+          <a:xfrm>
+            <a:off x="87406" y="839538"/>
+            <a:ext cx="5716877" cy="3772803"/>
+          </a:xfrm>
+          <a:prstGeom prst="roundRect">
+            <a:avLst/>
+          </a:prstGeom>
+          <a:solidFill>
+            <a:schemeClr val="bg2"/>
+          </a:solidFill>
+          <a:ln w="19050">
+            <a:noFill/>
+            <a:prstDash val="sysDash"/>
+          </a:ln>
+        </p:spPr>
+        <p:style>
+          <a:lnRef idx="2">
+            <a:schemeClr val="accent1">
+              <a:shade val="50000"/>
+            </a:schemeClr>
+          </a:lnRef>
+          <a:fillRef idx="1">
+            <a:schemeClr val="accent1"/>
+          </a:fillRef>
+          <a:effectRef idx="0">
+            <a:schemeClr val="accent1"/>
+          </a:effectRef>
+          <a:fontRef idx="minor">
+            <a:schemeClr val="lt1"/>
+          </a:fontRef>
+        </p:style>
+        <p:txBody>
+          <a:bodyPr rtlCol="0" anchor="ctr"/>
+          <a:lstStyle/>
+          <a:p>
+            <a:pPr algn="ctr"/>
+            <a:endParaRPr lang="zh-CN" altLang="en-US"/>
+          </a:p>
+        </p:txBody>
+      </p:sp>
+      <p:sp>
+        <p:nvSpPr>
+          <p:cNvPr id="86" name="矩形: 圆角 85">
+            <a:extLst>
+              <a:ext uri="{FF2B5EF4-FFF2-40B4-BE49-F238E27FC236}">
+                <a16:creationId xmlns:a16="http://schemas.microsoft.com/office/drawing/2014/main" id="{204BDDB4-C010-48A0-9859-95D75DE8A441}"/>
+              </a:ext>
+            </a:extLst>
+          </p:cNvPr>
+          <p:cNvSpPr/>
+          <p:nvPr/>
+        </p:nvSpPr>
+        <p:spPr>
+          <a:xfrm>
+            <a:off x="5769935" y="839338"/>
+            <a:ext cx="5912550" cy="3779727"/>
+          </a:xfrm>
+          <a:prstGeom prst="roundRect">
+            <a:avLst/>
+          </a:prstGeom>
+          <a:solidFill>
+            <a:schemeClr val="accent1">
+              <a:lumMod val="20000"/>
+              <a:lumOff val="80000"/>
+            </a:schemeClr>
+          </a:solidFill>
+          <a:ln w="19050">
+            <a:noFill/>
+            <a:prstDash val="sysDash"/>
+          </a:ln>
+        </p:spPr>
+        <p:style>
+          <a:lnRef idx="2">
+            <a:schemeClr val="accent1">
+              <a:shade val="50000"/>
+            </a:schemeClr>
+          </a:lnRef>
+          <a:fillRef idx="1">
+            <a:schemeClr val="accent1"/>
+          </a:fillRef>
+          <a:effectRef idx="0">
+            <a:schemeClr val="accent1"/>
+          </a:effectRef>
+          <a:fontRef idx="minor">
+            <a:schemeClr val="lt1"/>
+          </a:fontRef>
+        </p:style>
+        <p:txBody>
+          <a:bodyPr rtlCol="0" anchor="ctr"/>
+          <a:lstStyle/>
+          <a:p>
+            <a:pPr algn="ctr"/>
+            <a:endParaRPr lang="zh-CN" altLang="en-US"/>
+          </a:p>
+        </p:txBody>
+      </p:sp>
+      <p:sp>
+        <p:nvSpPr>
+          <p:cNvPr id="5" name="梯形 4">
+            <a:extLst>
+              <a:ext uri="{FF2B5EF4-FFF2-40B4-BE49-F238E27FC236}">
+                <a16:creationId xmlns:a16="http://schemas.microsoft.com/office/drawing/2014/main" id="{C6FF907B-FCFB-414C-85C2-67432A535389}"/>
+              </a:ext>
+            </a:extLst>
+          </p:cNvPr>
+          <p:cNvSpPr/>
+          <p:nvPr/>
+        </p:nvSpPr>
+        <p:spPr>
+          <a:xfrm rot="5400000">
+            <a:off x="6562422" y="2391691"/>
+            <a:ext cx="613400" cy="794877"/>
+          </a:xfrm>
+          <a:prstGeom prst="trapezoid">
+            <a:avLst/>
+          </a:prstGeom>
+          <a:solidFill>
+            <a:schemeClr val="accent3">
+              <a:lumMod val="40000"/>
+              <a:lumOff val="60000"/>
+            </a:schemeClr>
+          </a:solidFill>
+        </p:spPr>
+        <p:style>
+          <a:lnRef idx="2">
+            <a:schemeClr val="accent1">
+              <a:shade val="50000"/>
+            </a:schemeClr>
+          </a:lnRef>
+          <a:fillRef idx="1">
+            <a:schemeClr val="accent1"/>
+          </a:fillRef>
+          <a:effectRef idx="0">
+            <a:schemeClr val="accent1"/>
+          </a:effectRef>
+          <a:fontRef idx="minor">
+            <a:schemeClr val="lt1"/>
+          </a:fontRef>
+        </p:style>
+        <p:txBody>
+          <a:bodyPr vert="vert270" rtlCol="0" anchor="ctr"/>
+          <a:lstStyle/>
+          <a:p>
+            <a:r>
+              <a:rPr lang="en-US" altLang="zh-CN" sz="1200" b="1" dirty="0">
+                <a:solidFill>
+                  <a:schemeClr val="tx1"/>
+                </a:solidFill>
+              </a:rPr>
+              <a:t>Encoder</a:t>
+            </a:r>
+            <a:endParaRPr lang="zh-CN" altLang="en-US" sz="1200" b="1" dirty="0">
+              <a:solidFill>
+                <a:schemeClr val="tx1"/>
+              </a:solidFill>
+            </a:endParaRPr>
+          </a:p>
+        </p:txBody>
+      </p:sp>
+      <p:sp>
+        <p:nvSpPr>
+          <p:cNvPr id="63" name="梯形 62">
+            <a:extLst>
+              <a:ext uri="{FF2B5EF4-FFF2-40B4-BE49-F238E27FC236}">
+                <a16:creationId xmlns:a16="http://schemas.microsoft.com/office/drawing/2014/main" id="{09916C4F-7D3F-49B6-805F-F1A478166C3B}"/>
+              </a:ext>
+            </a:extLst>
+          </p:cNvPr>
+          <p:cNvSpPr/>
+          <p:nvPr/>
+        </p:nvSpPr>
+        <p:spPr>
+          <a:xfrm rot="16200000">
+            <a:off x="9789055" y="2383242"/>
+            <a:ext cx="549710" cy="817161"/>
+          </a:xfrm>
+          <a:prstGeom prst="trapezoid">
+            <a:avLst/>
+          </a:prstGeom>
+          <a:solidFill>
+            <a:schemeClr val="accent3">
+              <a:lumMod val="40000"/>
+              <a:lumOff val="60000"/>
+            </a:schemeClr>
+          </a:solidFill>
+        </p:spPr>
+        <p:style>
+          <a:lnRef idx="2">
+            <a:schemeClr val="accent1">
+              <a:shade val="50000"/>
+            </a:schemeClr>
+          </a:lnRef>
+          <a:fillRef idx="1">
+            <a:schemeClr val="accent1"/>
+          </a:fillRef>
+          <a:effectRef idx="0">
+            <a:schemeClr val="accent1"/>
+          </a:effectRef>
+          <a:fontRef idx="minor">
+            <a:schemeClr val="lt1"/>
+          </a:fontRef>
+        </p:style>
+        <p:txBody>
+          <a:bodyPr vert="vert" rtlCol="0" anchor="ctr"/>
+          <a:lstStyle/>
+          <a:p>
+            <a:pPr algn="ctr"/>
+            <a:endParaRPr lang="en-US" altLang="zh-CN" sz="1200" b="1" dirty="0">
+              <a:solidFill>
+                <a:schemeClr val="tx1"/>
+              </a:solidFill>
+            </a:endParaRPr>
+          </a:p>
+          <a:p>
+            <a:pPr algn="ctr"/>
+            <a:r>
+              <a:rPr lang="en-US" altLang="zh-CN" sz="1200" b="1" dirty="0">
+                <a:solidFill>
+                  <a:schemeClr val="tx1"/>
+                </a:solidFill>
+              </a:rPr>
+              <a:t>Decoder</a:t>
+            </a:r>
+            <a:endParaRPr lang="zh-CN" altLang="en-US" sz="1200" b="1" dirty="0">
+              <a:solidFill>
+                <a:schemeClr val="tx1"/>
+              </a:solidFill>
+            </a:endParaRPr>
+          </a:p>
+          <a:p>
+            <a:pPr algn="ctr"/>
+            <a:endParaRPr lang="zh-CN" altLang="en-US" sz="1200" dirty="0">
+              <a:solidFill>
+                <a:schemeClr val="tx1"/>
+              </a:solidFill>
+            </a:endParaRPr>
+          </a:p>
+        </p:txBody>
+      </p:sp>
+      <p:sp>
+        <p:nvSpPr>
+          <p:cNvPr id="72" name="Google Shape;9989;p124">
+            <a:extLst>
+              <a:ext uri="{FF2B5EF4-FFF2-40B4-BE49-F238E27FC236}">
+                <a16:creationId xmlns:a16="http://schemas.microsoft.com/office/drawing/2014/main" id="{ED44B48C-1DD6-4676-A181-5CAF8CA8A394}"/>
+              </a:ext>
+            </a:extLst>
+          </p:cNvPr>
+          <p:cNvSpPr/>
+          <p:nvPr/>
+        </p:nvSpPr>
+        <p:spPr>
+          <a:xfrm rot="16200000">
+            <a:off x="7306003" y="2117755"/>
+            <a:ext cx="954737" cy="306189"/>
+          </a:xfrm>
+          <a:prstGeom prst="roundRect">
+            <a:avLst>
+              <a:gd name="adj" fmla="val 16667"/>
+            </a:avLst>
+          </a:prstGeom>
+          <a:solidFill>
+            <a:schemeClr val="accent6"/>
+          </a:solidFill>
+          <a:ln w="12700" cap="flat" cmpd="sng">
+            <a:solidFill>
+              <a:srgbClr val="000000"/>
+            </a:solidFill>
+            <a:prstDash val="solid"/>
+            <a:round/>
+            <a:headEnd type="none" w="sm" len="sm"/>
+            <a:tailEnd type="none" w="sm" len="sm"/>
+          </a:ln>
+        </p:spPr>
+        <p:txBody>
+          <a:bodyPr spcFirstLastPara="1" vert="horz" wrap="square" lIns="91425" tIns="91425" rIns="91425" bIns="91425" anchor="ctr" anchorCtr="0">
+            <a:noAutofit/>
+          </a:bodyPr>
+          <a:lstStyle/>
+          <a:p>
+            <a:pPr marL="0" lvl="0" indent="0" algn="ctr" rtl="0">
+              <a:spcBef>
+                <a:spcPts val="0"/>
+              </a:spcBef>
+              <a:spcAft>
+                <a:spcPts val="0"/>
+              </a:spcAft>
+              <a:buNone/>
+            </a:pPr>
+            <a:r>
+              <a:rPr lang="en-US" sz="1000" b="1" dirty="0"/>
+              <a:t>Fourier </a:t>
+            </a:r>
+            <a:r>
+              <a:rPr lang="en-US" altLang="zh-CN" sz="1000" b="1" dirty="0"/>
+              <a:t>Processing</a:t>
+            </a:r>
+            <a:endParaRPr lang="en" sz="1000" b="1" dirty="0"/>
+          </a:p>
+        </p:txBody>
+      </p:sp>
+      <p:sp>
+        <p:nvSpPr>
+          <p:cNvPr id="38" name="Google Shape;8975;p108">
+            <a:extLst>
+              <a:ext uri="{FF2B5EF4-FFF2-40B4-BE49-F238E27FC236}">
+                <a16:creationId xmlns:a16="http://schemas.microsoft.com/office/drawing/2014/main" id="{85558664-F896-44F6-A0AB-5D14CAF53BA0}"/>
+              </a:ext>
+            </a:extLst>
+          </p:cNvPr>
+          <p:cNvSpPr/>
+          <p:nvPr/>
+        </p:nvSpPr>
+        <p:spPr>
+          <a:xfrm rot="16200000">
+            <a:off x="1183493" y="2690001"/>
+            <a:ext cx="528505" cy="203643"/>
+          </a:xfrm>
+          <a:prstGeom prst="rect">
+            <a:avLst/>
+          </a:prstGeom>
+          <a:solidFill>
+            <a:schemeClr val="accent5">
+              <a:lumMod val="40000"/>
+              <a:lumOff val="60000"/>
+            </a:schemeClr>
+          </a:solidFill>
+          <a:ln w="9525" cap="flat" cmpd="sng">
+            <a:solidFill>
+              <a:schemeClr val="dk2"/>
+            </a:solidFill>
+            <a:prstDash val="solid"/>
+            <a:round/>
+            <a:headEnd type="none" w="sm" len="sm"/>
+            <a:tailEnd type="none" w="sm" len="sm"/>
+          </a:ln>
+        </p:spPr>
+        <p:txBody>
+          <a:bodyPr spcFirstLastPara="1" wrap="square" lIns="91425" tIns="91425" rIns="91425" bIns="91425" anchor="ctr" anchorCtr="0">
+            <a:noAutofit/>
+          </a:bodyPr>
+          <a:lstStyle/>
+          <a:p>
+            <a:pPr marL="0" lvl="0" indent="0" algn="ctr" rtl="0">
+              <a:spcBef>
+                <a:spcPts val="0"/>
+              </a:spcBef>
+              <a:spcAft>
+                <a:spcPts val="0"/>
+              </a:spcAft>
+              <a:buNone/>
+            </a:pPr>
+            <a:r>
+              <a:rPr lang="en" sz="1200" b="1" dirty="0"/>
+              <a:t>FFT</a:t>
+            </a:r>
+            <a:endParaRPr sz="1200" b="1" dirty="0"/>
+          </a:p>
+        </p:txBody>
+      </p:sp>
+      <p:sp>
+        <p:nvSpPr>
+          <p:cNvPr id="39" name="Google Shape;6733;p68">
+            <a:extLst>
+              <a:ext uri="{FF2B5EF4-FFF2-40B4-BE49-F238E27FC236}">
+                <a16:creationId xmlns:a16="http://schemas.microsoft.com/office/drawing/2014/main" id="{63070C5A-CB31-4FB6-9D99-E7C556AAACF1}"/>
+              </a:ext>
+            </a:extLst>
+          </p:cNvPr>
+          <p:cNvSpPr/>
+          <p:nvPr/>
+        </p:nvSpPr>
+        <p:spPr>
+          <a:xfrm>
+            <a:off x="2905919" y="2964614"/>
+            <a:ext cx="192487" cy="482400"/>
+          </a:xfrm>
+          <a:prstGeom prst="cube">
+            <a:avLst>
+              <a:gd name="adj" fmla="val 78947"/>
+            </a:avLst>
+          </a:prstGeom>
+          <a:solidFill>
+            <a:schemeClr val="accent2">
+              <a:lumMod val="60000"/>
+              <a:lumOff val="40000"/>
+              <a:alpha val="39660"/>
+            </a:schemeClr>
+          </a:solidFill>
+          <a:ln w="9525" cap="flat" cmpd="sng">
+            <a:solidFill>
+              <a:schemeClr val="accent3">
+                <a:lumMod val="75000"/>
+              </a:schemeClr>
+            </a:solidFill>
+            <a:prstDash val="solid"/>
+            <a:round/>
+            <a:headEnd type="none" w="sm" len="sm"/>
+            <a:tailEnd type="none" w="sm" len="sm"/>
+          </a:ln>
+        </p:spPr>
+        <p:txBody>
+          <a:bodyPr spcFirstLastPara="1" wrap="square" lIns="91425" tIns="91425" rIns="91425" bIns="91425" anchor="ctr" anchorCtr="0">
+            <a:noAutofit/>
+          </a:bodyPr>
+          <a:lstStyle/>
+          <a:p>
+            <a:pPr marL="0" lvl="0" indent="0" algn="l" rtl="0">
+              <a:spcBef>
+                <a:spcPts val="0"/>
+              </a:spcBef>
+              <a:spcAft>
+                <a:spcPts val="0"/>
+              </a:spcAft>
+              <a:buNone/>
+            </a:pPr>
+            <a:endParaRPr/>
+          </a:p>
+        </p:txBody>
+      </p:sp>
+      <p:cxnSp>
+        <p:nvCxnSpPr>
+          <p:cNvPr id="41" name="连接符: 肘形 40">
+            <a:extLst>
+              <a:ext uri="{FF2B5EF4-FFF2-40B4-BE49-F238E27FC236}">
+                <a16:creationId xmlns:a16="http://schemas.microsoft.com/office/drawing/2014/main" id="{DCB54EF9-7F09-42F8-80C9-D2F5B76E6E70}"/>
+              </a:ext>
+            </a:extLst>
+          </p:cNvPr>
+          <p:cNvCxnSpPr>
+            <a:cxnSpLocks/>
+            <a:stCxn id="38" idx="2"/>
+            <a:endCxn id="62" idx="1"/>
+          </p:cNvCxnSpPr>
+          <p:nvPr/>
+        </p:nvCxnSpPr>
+        <p:spPr>
+          <a:xfrm>
+            <a:off x="1549567" y="2791822"/>
+            <a:ext cx="618838" cy="401340"/>
+          </a:xfrm>
+          <a:prstGeom prst="bentConnector3">
+            <a:avLst>
+              <a:gd name="adj1" fmla="val 50000"/>
+            </a:avLst>
+          </a:prstGeom>
+          <a:ln w="19050">
+            <a:solidFill>
+              <a:schemeClr val="tx1"/>
+            </a:solidFill>
+            <a:tailEnd type="triangle"/>
+          </a:ln>
+        </p:spPr>
+        <p:style>
+          <a:lnRef idx="1">
+            <a:schemeClr val="accent1"/>
+          </a:lnRef>
+          <a:fillRef idx="0">
+            <a:schemeClr val="accent1"/>
+          </a:fillRef>
+          <a:effectRef idx="0">
+            <a:schemeClr val="accent1"/>
+          </a:effectRef>
+          <a:fontRef idx="minor">
+            <a:schemeClr val="tx1"/>
+          </a:fontRef>
+        </p:style>
+      </p:cxnSp>
+      <p:cxnSp>
+        <p:nvCxnSpPr>
+          <p:cNvPr id="43" name="Google Shape;10001;p124">
+            <a:extLst>
+              <a:ext uri="{FF2B5EF4-FFF2-40B4-BE49-F238E27FC236}">
+                <a16:creationId xmlns:a16="http://schemas.microsoft.com/office/drawing/2014/main" id="{96355540-4ADD-4F1C-ACB3-873F36730603}"/>
+              </a:ext>
+            </a:extLst>
+          </p:cNvPr>
+          <p:cNvCxnSpPr>
+            <a:cxnSpLocks/>
+            <a:stCxn id="61" idx="3"/>
+          </p:cNvCxnSpPr>
+          <p:nvPr/>
+        </p:nvCxnSpPr>
+        <p:spPr>
+          <a:xfrm>
+            <a:off x="2561715" y="2314628"/>
+            <a:ext cx="315952" cy="0"/>
+          </a:xfrm>
+          <a:prstGeom prst="straightConnector1">
+            <a:avLst/>
+          </a:prstGeom>
+          <a:noFill/>
+          <a:ln w="19050" cap="flat" cmpd="sng">
+            <a:solidFill>
+              <a:srgbClr val="000000"/>
+            </a:solidFill>
+            <a:prstDash val="solid"/>
+            <a:round/>
+            <a:headEnd type="none" w="med" len="med"/>
+            <a:tailEnd type="triangle" w="med" len="med"/>
+          </a:ln>
+        </p:spPr>
+      </p:cxnSp>
+      <p:cxnSp>
+        <p:nvCxnSpPr>
+          <p:cNvPr id="44" name="连接符: 肘形 43">
+            <a:extLst>
+              <a:ext uri="{FF2B5EF4-FFF2-40B4-BE49-F238E27FC236}">
+                <a16:creationId xmlns:a16="http://schemas.microsoft.com/office/drawing/2014/main" id="{D19F2D1C-0023-4485-950C-68506DBFD51E}"/>
+              </a:ext>
+            </a:extLst>
+          </p:cNvPr>
+          <p:cNvCxnSpPr>
+            <a:cxnSpLocks/>
+            <a:stCxn id="38" idx="2"/>
+            <a:endCxn id="61" idx="1"/>
+          </p:cNvCxnSpPr>
+          <p:nvPr/>
+        </p:nvCxnSpPr>
+        <p:spPr>
+          <a:xfrm flipV="1">
+            <a:off x="1549567" y="2314628"/>
+            <a:ext cx="618838" cy="477194"/>
+          </a:xfrm>
+          <a:prstGeom prst="bentConnector3">
+            <a:avLst>
+              <a:gd name="adj1" fmla="val 50000"/>
+            </a:avLst>
+          </a:prstGeom>
+          <a:ln w="19050">
+            <a:solidFill>
+              <a:schemeClr val="tx1"/>
+            </a:solidFill>
+            <a:tailEnd type="triangle"/>
+          </a:ln>
+        </p:spPr>
+        <p:style>
+          <a:lnRef idx="1">
+            <a:schemeClr val="accent1"/>
+          </a:lnRef>
+          <a:fillRef idx="0">
+            <a:schemeClr val="accent1"/>
+          </a:fillRef>
+          <a:effectRef idx="0">
+            <a:schemeClr val="accent1"/>
+          </a:effectRef>
+          <a:fontRef idx="minor">
+            <a:schemeClr val="tx1"/>
+          </a:fontRef>
+        </p:style>
+      </p:cxnSp>
+      <p:sp>
+        <p:nvSpPr>
+          <p:cNvPr id="55" name="Google Shape;6733;p68">
+            <a:extLst>
+              <a:ext uri="{FF2B5EF4-FFF2-40B4-BE49-F238E27FC236}">
+                <a16:creationId xmlns:a16="http://schemas.microsoft.com/office/drawing/2014/main" id="{ADB00D5A-FA2F-4CF1-99A8-E78EFCD422D0}"/>
+              </a:ext>
+            </a:extLst>
+          </p:cNvPr>
+          <p:cNvSpPr/>
+          <p:nvPr/>
+        </p:nvSpPr>
+        <p:spPr>
+          <a:xfrm>
+            <a:off x="2905919" y="2110733"/>
+            <a:ext cx="192487" cy="482400"/>
+          </a:xfrm>
+          <a:prstGeom prst="cube">
+            <a:avLst>
+              <a:gd name="adj" fmla="val 78947"/>
+            </a:avLst>
+          </a:prstGeom>
+          <a:solidFill>
+            <a:schemeClr val="accent2">
+              <a:lumMod val="60000"/>
+              <a:lumOff val="40000"/>
+              <a:alpha val="39660"/>
+            </a:schemeClr>
+          </a:solidFill>
+          <a:ln w="9525" cap="flat" cmpd="sng">
+            <a:solidFill>
+              <a:schemeClr val="accent3">
+                <a:lumMod val="75000"/>
+              </a:schemeClr>
+            </a:solidFill>
+            <a:prstDash val="solid"/>
+            <a:round/>
+            <a:headEnd type="none" w="sm" len="sm"/>
+            <a:tailEnd type="none" w="sm" len="sm"/>
+          </a:ln>
+        </p:spPr>
+        <p:txBody>
+          <a:bodyPr spcFirstLastPara="1" wrap="square" lIns="91425" tIns="91425" rIns="91425" bIns="91425" anchor="ctr" anchorCtr="0">
+            <a:noAutofit/>
+          </a:bodyPr>
+          <a:lstStyle/>
+          <a:p>
+            <a:pPr marL="0" lvl="0" indent="0" algn="l" rtl="0">
+              <a:spcBef>
+                <a:spcPts val="0"/>
+              </a:spcBef>
+              <a:spcAft>
+                <a:spcPts val="0"/>
+              </a:spcAft>
+              <a:buNone/>
+            </a:pPr>
+            <a:endParaRPr/>
+          </a:p>
+        </p:txBody>
+      </p:sp>
+      <p:sp>
+        <p:nvSpPr>
+          <p:cNvPr id="59" name="流程图: 接点 58">
+            <a:extLst>
+              <a:ext uri="{FF2B5EF4-FFF2-40B4-BE49-F238E27FC236}">
+                <a16:creationId xmlns:a16="http://schemas.microsoft.com/office/drawing/2014/main" id="{D9EF1FC0-BD2C-4589-AC3D-8DF063BA5EB2}"/>
+              </a:ext>
+            </a:extLst>
+          </p:cNvPr>
+          <p:cNvSpPr/>
+          <p:nvPr/>
+        </p:nvSpPr>
+        <p:spPr>
+          <a:xfrm>
+            <a:off x="3459821" y="2195119"/>
+            <a:ext cx="228600" cy="228600"/>
+          </a:xfrm>
+          <a:prstGeom prst="flowChartConnector">
+            <a:avLst/>
+          </a:prstGeom>
+          <a:solidFill>
+            <a:schemeClr val="bg1"/>
+          </a:solidFill>
+          <a:ln>
+            <a:solidFill>
+              <a:schemeClr val="tx1"/>
+            </a:solidFill>
+          </a:ln>
+        </p:spPr>
+        <p:style>
+          <a:lnRef idx="2">
+            <a:schemeClr val="accent1">
+              <a:shade val="50000"/>
+            </a:schemeClr>
+          </a:lnRef>
+          <a:fillRef idx="1">
+            <a:schemeClr val="accent1"/>
+          </a:fillRef>
+          <a:effectRef idx="0">
+            <a:schemeClr val="accent1"/>
+          </a:effectRef>
+          <a:fontRef idx="minor">
+            <a:schemeClr val="lt1"/>
+          </a:fontRef>
+        </p:style>
+        <p:txBody>
+          <a:bodyPr rtlCol="0" anchor="ctr"/>
+          <a:lstStyle/>
+          <a:p>
+            <a:pPr algn="ctr"/>
+            <a:r>
+              <a:rPr lang="en-US" altLang="zh-CN" b="1" dirty="0">
+                <a:solidFill>
+                  <a:schemeClr val="tx1"/>
+                </a:solidFill>
+              </a:rPr>
+              <a:t>\</a:t>
+            </a:r>
+          </a:p>
+        </p:txBody>
+      </p:sp>
+      <mc:AlternateContent xmlns:mc="http://schemas.openxmlformats.org/markup-compatibility/2006">
+        <mc:Choice xmlns:a14="http://schemas.microsoft.com/office/drawing/2010/main" Requires="a14">
+          <p:sp>
+            <p:nvSpPr>
+              <p:cNvPr id="61" name="Google Shape;10169;p131">
+                <a:extLst>
+                  <a:ext uri="{FF2B5EF4-FFF2-40B4-BE49-F238E27FC236}">
+                    <a16:creationId xmlns:a16="http://schemas.microsoft.com/office/drawing/2014/main" id="{DC0C0326-0956-4F73-9A02-00C81D5EC4E3}"/>
+                  </a:ext>
+                </a:extLst>
+              </p:cNvPr>
+              <p:cNvSpPr/>
+              <p:nvPr/>
+            </p:nvSpPr>
+            <p:spPr>
+              <a:xfrm>
+                <a:off x="2168405" y="2154990"/>
+                <a:ext cx="393310" cy="319275"/>
+              </a:xfrm>
+              <a:prstGeom prst="roundRect">
+                <a:avLst>
+                  <a:gd name="adj" fmla="val 16667"/>
+                </a:avLst>
+              </a:prstGeom>
+              <a:noFill/>
+              <a:ln w="12700" cap="flat" cmpd="sng">
+                <a:solidFill>
+                  <a:schemeClr val="tx1"/>
+                </a:solidFill>
+                <a:prstDash val="solid"/>
+                <a:round/>
+                <a:headEnd type="none" w="sm" len="sm"/>
+                <a:tailEnd type="none" w="sm" len="sm"/>
+              </a:ln>
+            </p:spPr>
+            <p:txBody>
+              <a:bodyPr spcFirstLastPara="1" wrap="square" lIns="91425" tIns="91425" rIns="91425" bIns="91425" anchor="ctr" anchorCtr="0">
+                <a:noAutofit/>
+              </a:bodyPr>
+              <a:lstStyle/>
+              <a:p>
+                <a:pPr marL="0" lvl="0" indent="0" algn="ctr" rtl="0">
+                  <a:spcBef>
+                    <a:spcPts val="0"/>
+                  </a:spcBef>
+                  <a:spcAft>
+                    <a:spcPts val="0"/>
+                  </a:spcAft>
+                  <a:buNone/>
+                </a:pPr>
+                <a14:m>
+                  <m:oMathPara xmlns:m="http://schemas.openxmlformats.org/officeDocument/2006/math">
+                    <m:oMathParaPr>
+                      <m:jc m:val="centerGroup"/>
+                    </m:oMathParaPr>
+                    <m:oMath xmlns:m="http://schemas.openxmlformats.org/officeDocument/2006/math">
+                      <m:sSub>
+                        <m:sSubPr>
+                          <m:ctrlPr>
+                            <a:rPr lang="pt-BR" altLang="zh-CN" sz="1800" b="1" i="1" smtClean="0">
+                              <a:latin typeface="Cambria Math" panose="02040503050406030204" pitchFamily="18" charset="0"/>
+                            </a:rPr>
+                          </m:ctrlPr>
+                        </m:sSubPr>
+                        <m:e>
+                          <m:r>
+                            <a:rPr lang="en-US" altLang="zh-CN" sz="1800" b="1" i="1" smtClean="0">
+                              <a:latin typeface="Cambria Math" panose="02040503050406030204" pitchFamily="18" charset="0"/>
+                            </a:rPr>
+                            <m:t>𝑷</m:t>
+                          </m:r>
+                        </m:e>
+                        <m:sub>
+                          <m:r>
+                            <a:rPr lang="en-US" altLang="zh-CN" sz="1800" b="1" i="1" smtClean="0">
+                              <a:latin typeface="Cambria Math" panose="02040503050406030204" pitchFamily="18" charset="0"/>
+                            </a:rPr>
+                            <m:t>𝒗</m:t>
+                          </m:r>
+                        </m:sub>
+                      </m:sSub>
+                    </m:oMath>
+                  </m:oMathPara>
+                </a14:m>
+                <a:endParaRPr dirty="0">
+                  <a:latin typeface="Times New Roman"/>
+                  <a:ea typeface="Times New Roman"/>
+                  <a:cs typeface="Times New Roman"/>
+                  <a:sym typeface="Times New Roman"/>
+                </a:endParaRPr>
+              </a:p>
+            </p:txBody>
+          </p:sp>
+        </mc:Choice>
+        <mc:Fallback>
+          <p:sp>
+            <p:nvSpPr>
+              <p:cNvPr id="61" name="Google Shape;10169;p131">
+                <a:extLst>
+                  <a:ext uri="{FF2B5EF4-FFF2-40B4-BE49-F238E27FC236}">
+                    <a16:creationId xmlns:a16="http://schemas.microsoft.com/office/drawing/2014/main" id="{DC0C0326-0956-4F73-9A02-00C81D5EC4E3}"/>
+                  </a:ext>
+                </a:extLst>
+              </p:cNvPr>
+              <p:cNvSpPr>
+                <a:spLocks noRot="1" noChangeAspect="1" noMove="1" noResize="1" noEditPoints="1" noAdjustHandles="1" noChangeArrowheads="1" noChangeShapeType="1" noTextEdit="1"/>
+              </p:cNvSpPr>
+              <p:nvPr/>
+            </p:nvSpPr>
+            <p:spPr>
+              <a:xfrm>
+                <a:off x="2168405" y="2154990"/>
+                <a:ext cx="393310" cy="319275"/>
+              </a:xfrm>
+              <a:prstGeom prst="roundRect">
+                <a:avLst>
+                  <a:gd name="adj" fmla="val 16667"/>
+                </a:avLst>
+              </a:prstGeom>
+              <a:blipFill>
+                <a:blip r:embed="rId3"/>
+                <a:stretch>
+                  <a:fillRect l="-10606" b="-3704"/>
+                </a:stretch>
+              </a:blipFill>
+              <a:ln w="12700" cap="flat" cmpd="sng">
+                <a:solidFill>
+                  <a:schemeClr val="tx1"/>
+                </a:solidFill>
+                <a:prstDash val="solid"/>
+                <a:round/>
+                <a:headEnd type="none" w="sm" len="sm"/>
+                <a:tailEnd type="none" w="sm" len="sm"/>
+              </a:ln>
+            </p:spPr>
+            <p:txBody>
+              <a:bodyPr/>
+              <a:lstStyle/>
+              <a:p>
+                <a:r>
+                  <a:rPr lang="zh-CN" altLang="en-US">
+                    <a:noFill/>
+                  </a:rPr>
+                  <a:t> </a:t>
+                </a:r>
+              </a:p>
+            </p:txBody>
+          </p:sp>
+        </mc:Fallback>
+      </mc:AlternateContent>
+      <mc:AlternateContent xmlns:mc="http://schemas.openxmlformats.org/markup-compatibility/2006">
+        <mc:Choice xmlns:a14="http://schemas.microsoft.com/office/drawing/2010/main" Requires="a14">
+          <p:sp>
+            <p:nvSpPr>
+              <p:cNvPr id="62" name="Google Shape;10169;p131">
+                <a:extLst>
+                  <a:ext uri="{FF2B5EF4-FFF2-40B4-BE49-F238E27FC236}">
+                    <a16:creationId xmlns:a16="http://schemas.microsoft.com/office/drawing/2014/main" id="{92E804E2-FC85-4B25-A3C3-C103D00C9A49}"/>
+                  </a:ext>
+                </a:extLst>
+              </p:cNvPr>
+              <p:cNvSpPr/>
+              <p:nvPr/>
+            </p:nvSpPr>
+            <p:spPr>
+              <a:xfrm>
+                <a:off x="2168405" y="3033524"/>
+                <a:ext cx="393310" cy="319275"/>
+              </a:xfrm>
+              <a:prstGeom prst="roundRect">
+                <a:avLst>
+                  <a:gd name="adj" fmla="val 16667"/>
+                </a:avLst>
+              </a:prstGeom>
+              <a:noFill/>
+              <a:ln w="12700" cap="flat" cmpd="sng">
+                <a:solidFill>
+                  <a:schemeClr val="tx1"/>
+                </a:solidFill>
+                <a:prstDash val="solid"/>
+                <a:round/>
+                <a:headEnd type="none" w="sm" len="sm"/>
+                <a:tailEnd type="none" w="sm" len="sm"/>
+              </a:ln>
+            </p:spPr>
+            <p:txBody>
+              <a:bodyPr spcFirstLastPara="1" wrap="square" lIns="91425" tIns="91425" rIns="91425" bIns="91425" anchor="ctr" anchorCtr="0">
+                <a:noAutofit/>
+              </a:bodyPr>
+              <a:lstStyle/>
+              <a:p>
+                <a:pPr marL="0" lvl="0" indent="0" algn="ctr" rtl="0">
+                  <a:spcBef>
+                    <a:spcPts val="0"/>
+                  </a:spcBef>
+                  <a:spcAft>
+                    <a:spcPts val="0"/>
+                  </a:spcAft>
+                  <a:buNone/>
+                </a:pPr>
+                <a14:m>
+                  <m:oMathPara xmlns:m="http://schemas.openxmlformats.org/officeDocument/2006/math">
+                    <m:oMathParaPr>
+                      <m:jc m:val="centerGroup"/>
+                    </m:oMathParaPr>
+                    <m:oMath xmlns:m="http://schemas.openxmlformats.org/officeDocument/2006/math">
+                      <m:sSub>
+                        <m:sSubPr>
+                          <m:ctrlPr>
+                            <a:rPr lang="pt-BR" altLang="zh-CN" sz="1800" b="1" i="1" smtClean="0">
+                              <a:latin typeface="Cambria Math" panose="02040503050406030204" pitchFamily="18" charset="0"/>
+                            </a:rPr>
+                          </m:ctrlPr>
+                        </m:sSubPr>
+                        <m:e>
+                          <m:r>
+                            <a:rPr lang="en-US" altLang="zh-CN" sz="1800" b="1" i="1" smtClean="0">
+                              <a:latin typeface="Cambria Math" panose="02040503050406030204" pitchFamily="18" charset="0"/>
+                            </a:rPr>
+                            <m:t>𝑨</m:t>
+                          </m:r>
+                        </m:e>
+                        <m:sub>
+                          <m:r>
+                            <a:rPr lang="en-US" altLang="zh-CN" sz="1800" b="1" i="1" smtClean="0">
+                              <a:latin typeface="Cambria Math" panose="02040503050406030204" pitchFamily="18" charset="0"/>
+                            </a:rPr>
+                            <m:t>𝒗</m:t>
+                          </m:r>
+                        </m:sub>
+                      </m:sSub>
+                    </m:oMath>
+                  </m:oMathPara>
+                </a14:m>
+                <a:endParaRPr dirty="0">
+                  <a:latin typeface="Times New Roman"/>
+                  <a:ea typeface="Times New Roman"/>
+                  <a:cs typeface="Times New Roman"/>
+                  <a:sym typeface="Times New Roman"/>
+                </a:endParaRPr>
+              </a:p>
+            </p:txBody>
+          </p:sp>
+        </mc:Choice>
+        <mc:Fallback>
+          <p:sp>
+            <p:nvSpPr>
+              <p:cNvPr id="62" name="Google Shape;10169;p131">
+                <a:extLst>
+                  <a:ext uri="{FF2B5EF4-FFF2-40B4-BE49-F238E27FC236}">
+                    <a16:creationId xmlns:a16="http://schemas.microsoft.com/office/drawing/2014/main" id="{92E804E2-FC85-4B25-A3C3-C103D00C9A49}"/>
+                  </a:ext>
+                </a:extLst>
+              </p:cNvPr>
+              <p:cNvSpPr>
+                <a:spLocks noRot="1" noChangeAspect="1" noMove="1" noResize="1" noEditPoints="1" noAdjustHandles="1" noChangeArrowheads="1" noChangeShapeType="1" noTextEdit="1"/>
+              </p:cNvSpPr>
+              <p:nvPr/>
+            </p:nvSpPr>
+            <p:spPr>
+              <a:xfrm>
+                <a:off x="2168405" y="3033524"/>
+                <a:ext cx="393310" cy="319275"/>
+              </a:xfrm>
+              <a:prstGeom prst="roundRect">
+                <a:avLst>
+                  <a:gd name="adj" fmla="val 16667"/>
+                </a:avLst>
+              </a:prstGeom>
+              <a:blipFill>
+                <a:blip r:embed="rId4"/>
+                <a:stretch>
+                  <a:fillRect l="-10606" b="-3704"/>
+                </a:stretch>
+              </a:blipFill>
+              <a:ln w="12700" cap="flat" cmpd="sng">
+                <a:solidFill>
+                  <a:schemeClr val="tx1"/>
+                </a:solidFill>
+                <a:prstDash val="solid"/>
+                <a:round/>
+                <a:headEnd type="none" w="sm" len="sm"/>
+                <a:tailEnd type="none" w="sm" len="sm"/>
+              </a:ln>
+            </p:spPr>
+            <p:txBody>
+              <a:bodyPr/>
+              <a:lstStyle/>
+              <a:p>
+                <a:r>
+                  <a:rPr lang="zh-CN" altLang="en-US">
+                    <a:noFill/>
+                  </a:rPr>
+                  <a:t> </a:t>
+                </a:r>
+              </a:p>
+            </p:txBody>
+          </p:sp>
+        </mc:Fallback>
+      </mc:AlternateContent>
+      <p:sp>
+        <p:nvSpPr>
+          <p:cNvPr id="65" name="流程图: 接点 64">
+            <a:extLst>
+              <a:ext uri="{FF2B5EF4-FFF2-40B4-BE49-F238E27FC236}">
+                <a16:creationId xmlns:a16="http://schemas.microsoft.com/office/drawing/2014/main" id="{222B6188-BC94-4F3F-A41D-4C43246C09BB}"/>
+              </a:ext>
+            </a:extLst>
+          </p:cNvPr>
+          <p:cNvSpPr/>
+          <p:nvPr/>
+        </p:nvSpPr>
+        <p:spPr>
+          <a:xfrm>
+            <a:off x="3452946" y="3062780"/>
+            <a:ext cx="228600" cy="228600"/>
+          </a:xfrm>
+          <a:prstGeom prst="flowChartConnector">
+            <a:avLst/>
+          </a:prstGeom>
+          <a:solidFill>
+            <a:schemeClr val="bg1"/>
+          </a:solidFill>
+          <a:ln>
+            <a:solidFill>
+              <a:schemeClr val="tx1"/>
+            </a:solidFill>
+          </a:ln>
+        </p:spPr>
+        <p:style>
+          <a:lnRef idx="2">
+            <a:schemeClr val="accent1">
+              <a:shade val="50000"/>
+            </a:schemeClr>
+          </a:lnRef>
+          <a:fillRef idx="1">
+            <a:schemeClr val="accent1"/>
+          </a:fillRef>
+          <a:effectRef idx="0">
+            <a:schemeClr val="accent1"/>
+          </a:effectRef>
+          <a:fontRef idx="minor">
+            <a:schemeClr val="lt1"/>
+          </a:fontRef>
+        </p:style>
+        <p:txBody>
+          <a:bodyPr rtlCol="0" anchor="ctr"/>
+          <a:lstStyle/>
+          <a:p>
+            <a:pPr algn="ctr"/>
+            <a:r>
+              <a:rPr lang="en-US" altLang="zh-CN" b="1" dirty="0">
+                <a:solidFill>
+                  <a:schemeClr val="tx1"/>
+                </a:solidFill>
+              </a:rPr>
+              <a:t>X</a:t>
+            </a:r>
+            <a:endParaRPr lang="zh-CN" altLang="en-US" b="1" dirty="0">
+              <a:solidFill>
+                <a:schemeClr val="tx1"/>
+              </a:solidFill>
+            </a:endParaRPr>
+          </a:p>
+        </p:txBody>
+      </p:sp>
+      <p:sp>
+        <p:nvSpPr>
+          <p:cNvPr id="75" name="Google Shape;8975;p108">
+            <a:extLst>
+              <a:ext uri="{FF2B5EF4-FFF2-40B4-BE49-F238E27FC236}">
+                <a16:creationId xmlns:a16="http://schemas.microsoft.com/office/drawing/2014/main" id="{31F8834F-C871-47EF-9AE1-D865C1513C5F}"/>
+              </a:ext>
+            </a:extLst>
+          </p:cNvPr>
+          <p:cNvSpPr/>
+          <p:nvPr/>
+        </p:nvSpPr>
+        <p:spPr>
+          <a:xfrm rot="16200000">
+            <a:off x="4972775" y="2690001"/>
+            <a:ext cx="528505" cy="203643"/>
+          </a:xfrm>
+          <a:prstGeom prst="rect">
+            <a:avLst/>
+          </a:prstGeom>
+          <a:solidFill>
+            <a:schemeClr val="accent5">
+              <a:lumMod val="40000"/>
+              <a:lumOff val="60000"/>
+            </a:schemeClr>
+          </a:solidFill>
+          <a:ln w="9525" cap="flat" cmpd="sng">
+            <a:solidFill>
+              <a:schemeClr val="dk2"/>
+            </a:solidFill>
+            <a:prstDash val="solid"/>
+            <a:round/>
+            <a:headEnd type="none" w="sm" len="sm"/>
+            <a:tailEnd type="none" w="sm" len="sm"/>
+          </a:ln>
+        </p:spPr>
+        <p:txBody>
+          <a:bodyPr spcFirstLastPara="1" vert="horz" wrap="square" lIns="91425" tIns="91425" rIns="91425" bIns="91425" anchor="ctr" anchorCtr="0">
+            <a:noAutofit/>
+          </a:bodyPr>
+          <a:lstStyle/>
+          <a:p>
+            <a:pPr marL="0" lvl="0" indent="0" algn="ctr" rtl="0">
+              <a:spcBef>
+                <a:spcPts val="0"/>
+              </a:spcBef>
+              <a:spcAft>
+                <a:spcPts val="0"/>
+              </a:spcAft>
+              <a:buNone/>
+            </a:pPr>
+            <a:r>
+              <a:rPr lang="en" sz="1200" b="1" dirty="0"/>
+              <a:t>IFFT</a:t>
+            </a:r>
+            <a:endParaRPr sz="1200" b="1" dirty="0"/>
+          </a:p>
+        </p:txBody>
+      </p:sp>
+      <p:sp>
+        <p:nvSpPr>
+          <p:cNvPr id="89" name="矩形: 圆角 88">
+            <a:extLst>
+              <a:ext uri="{FF2B5EF4-FFF2-40B4-BE49-F238E27FC236}">
+                <a16:creationId xmlns:a16="http://schemas.microsoft.com/office/drawing/2014/main" id="{3F0D6672-D3CE-47EE-BFA2-87600B21D53B}"/>
+              </a:ext>
+            </a:extLst>
+          </p:cNvPr>
+          <p:cNvSpPr/>
+          <p:nvPr/>
+        </p:nvSpPr>
+        <p:spPr>
+          <a:xfrm>
+            <a:off x="5974080" y="3898833"/>
+            <a:ext cx="5547360" cy="504967"/>
+          </a:xfrm>
+          <a:prstGeom prst="roundRect">
+            <a:avLst/>
+          </a:prstGeom>
+          <a:solidFill>
+            <a:schemeClr val="accent1">
+              <a:lumMod val="40000"/>
+              <a:lumOff val="60000"/>
+            </a:schemeClr>
+          </a:solidFill>
+          <a:ln w="12700">
+            <a:solidFill>
+              <a:schemeClr val="tx1"/>
+            </a:solidFill>
+            <a:prstDash val="sysDot"/>
+          </a:ln>
+        </p:spPr>
+        <p:style>
+          <a:lnRef idx="2">
+            <a:schemeClr val="accent1">
+              <a:shade val="50000"/>
+            </a:schemeClr>
+          </a:lnRef>
+          <a:fillRef idx="1">
+            <a:schemeClr val="accent1"/>
+          </a:fillRef>
+          <a:effectRef idx="0">
+            <a:schemeClr val="accent1"/>
+          </a:effectRef>
+          <a:fontRef idx="minor">
+            <a:schemeClr val="lt1"/>
+          </a:fontRef>
+        </p:style>
+        <p:txBody>
+          <a:bodyPr rtlCol="0" anchor="ctr"/>
+          <a:lstStyle/>
+          <a:p>
+            <a:pPr algn="ctr"/>
+            <a:endParaRPr lang="zh-CN" altLang="en-US" dirty="0"/>
+          </a:p>
+        </p:txBody>
+      </p:sp>
+      <p:sp>
+        <p:nvSpPr>
+          <p:cNvPr id="90" name="流程图: 接点 89">
+            <a:extLst>
+              <a:ext uri="{FF2B5EF4-FFF2-40B4-BE49-F238E27FC236}">
+                <a16:creationId xmlns:a16="http://schemas.microsoft.com/office/drawing/2014/main" id="{8E75FF9F-0496-47B8-A335-FA9C13EF9DD4}"/>
+              </a:ext>
+            </a:extLst>
+          </p:cNvPr>
+          <p:cNvSpPr/>
+          <p:nvPr/>
+        </p:nvSpPr>
+        <p:spPr>
+          <a:xfrm>
+            <a:off x="9251872" y="2684767"/>
+            <a:ext cx="228600" cy="228600"/>
+          </a:xfrm>
+          <a:prstGeom prst="flowChartConnector">
+            <a:avLst/>
+          </a:prstGeom>
+          <a:solidFill>
+            <a:schemeClr val="bg1"/>
+          </a:solidFill>
+          <a:ln>
+            <a:solidFill>
+              <a:schemeClr val="tx1"/>
+            </a:solidFill>
+          </a:ln>
+        </p:spPr>
+        <p:style>
+          <a:lnRef idx="2">
+            <a:schemeClr val="accent1">
+              <a:shade val="50000"/>
+            </a:schemeClr>
+          </a:lnRef>
+          <a:fillRef idx="1">
+            <a:schemeClr val="accent1"/>
+          </a:fillRef>
+          <a:effectRef idx="0">
+            <a:schemeClr val="accent1"/>
+          </a:effectRef>
+          <a:fontRef idx="minor">
+            <a:schemeClr val="lt1"/>
+          </a:fontRef>
+        </p:style>
+        <p:txBody>
+          <a:bodyPr rtlCol="0" anchor="ctr"/>
+          <a:lstStyle/>
+          <a:p>
+            <a:pPr algn="ctr"/>
+            <a:r>
+              <a:rPr lang="en-US" altLang="zh-CN" b="1" dirty="0">
+                <a:solidFill>
+                  <a:schemeClr val="tx1"/>
+                </a:solidFill>
+              </a:rPr>
+              <a:t>C</a:t>
+            </a:r>
+            <a:endParaRPr lang="zh-CN" altLang="en-US" b="1" dirty="0">
+              <a:solidFill>
+                <a:schemeClr val="tx1"/>
+              </a:solidFill>
+            </a:endParaRPr>
+          </a:p>
+        </p:txBody>
+      </p:sp>
+      <p:sp>
+        <p:nvSpPr>
+          <p:cNvPr id="98" name="Google Shape;8410;p96">
+            <a:extLst>
+              <a:ext uri="{FF2B5EF4-FFF2-40B4-BE49-F238E27FC236}">
+                <a16:creationId xmlns:a16="http://schemas.microsoft.com/office/drawing/2014/main" id="{32B97A6A-9C8D-4307-8855-CD90F1E054C8}"/>
+              </a:ext>
+            </a:extLst>
+          </p:cNvPr>
+          <p:cNvSpPr txBox="1"/>
+          <p:nvPr/>
+        </p:nvSpPr>
+        <p:spPr>
+          <a:xfrm>
+            <a:off x="6200991" y="3992131"/>
+            <a:ext cx="1312329" cy="272565"/>
+          </a:xfrm>
+          <a:prstGeom prst="rect">
+            <a:avLst/>
+          </a:prstGeom>
+          <a:noFill/>
+          <a:ln>
+            <a:noFill/>
+          </a:ln>
+        </p:spPr>
+        <p:txBody>
+          <a:bodyPr spcFirstLastPara="1" wrap="square" lIns="91425" tIns="91425" rIns="91425" bIns="91425" anchor="t" anchorCtr="0">
+            <a:noAutofit/>
+          </a:bodyPr>
+          <a:lstStyle/>
+          <a:p>
+            <a:r>
+              <a:rPr lang="en-US" altLang="zh-CN" sz="1200" b="1" dirty="0"/>
+              <a:t>: Fourier Process</a:t>
+            </a:r>
+          </a:p>
+        </p:txBody>
+      </p:sp>
+      <p:sp>
+        <p:nvSpPr>
+          <p:cNvPr id="99" name="Google Shape;8410;p96">
+            <a:extLst>
+              <a:ext uri="{FF2B5EF4-FFF2-40B4-BE49-F238E27FC236}">
+                <a16:creationId xmlns:a16="http://schemas.microsoft.com/office/drawing/2014/main" id="{7E998DB0-8AD1-44F5-94E8-D908F0EDC416}"/>
+              </a:ext>
+            </a:extLst>
+          </p:cNvPr>
+          <p:cNvSpPr txBox="1"/>
+          <p:nvPr/>
+        </p:nvSpPr>
+        <p:spPr>
+          <a:xfrm>
+            <a:off x="9754747" y="3970092"/>
+            <a:ext cx="938363" cy="272565"/>
+          </a:xfrm>
+          <a:prstGeom prst="rect">
+            <a:avLst/>
+          </a:prstGeom>
+          <a:noFill/>
+          <a:ln>
+            <a:noFill/>
+          </a:ln>
+        </p:spPr>
+        <p:txBody>
+          <a:bodyPr spcFirstLastPara="1" wrap="square" lIns="91425" tIns="91425" rIns="91425" bIns="91425" anchor="t" anchorCtr="0">
+            <a:noAutofit/>
+          </a:bodyPr>
+          <a:lstStyle/>
+          <a:p>
+            <a:r>
+              <a:rPr lang="en-US" altLang="zh-CN" sz="1200" b="1" dirty="0"/>
+              <a:t>: </a:t>
+            </a:r>
+            <a:r>
+              <a:rPr lang="en-US" altLang="zh-CN" sz="1200" b="1" dirty="0" err="1"/>
+              <a:t>Concat</a:t>
+            </a:r>
+            <a:endParaRPr sz="1200" b="1" dirty="0"/>
+          </a:p>
+        </p:txBody>
+      </p:sp>
+      <p:sp>
+        <p:nvSpPr>
+          <p:cNvPr id="101" name="Google Shape;8410;p96">
+            <a:extLst>
+              <a:ext uri="{FF2B5EF4-FFF2-40B4-BE49-F238E27FC236}">
+                <a16:creationId xmlns:a16="http://schemas.microsoft.com/office/drawing/2014/main" id="{700649DC-6EB8-4F65-990A-A00AEF9E201B}"/>
+              </a:ext>
+            </a:extLst>
+          </p:cNvPr>
+          <p:cNvSpPr txBox="1"/>
+          <p:nvPr/>
+        </p:nvSpPr>
+        <p:spPr>
+          <a:xfrm>
+            <a:off x="10641272" y="3956444"/>
+            <a:ext cx="938363" cy="272565"/>
+          </a:xfrm>
+          <a:prstGeom prst="rect">
+            <a:avLst/>
+          </a:prstGeom>
+          <a:noFill/>
+          <a:ln>
+            <a:noFill/>
+          </a:ln>
+        </p:spPr>
+        <p:txBody>
+          <a:bodyPr spcFirstLastPara="1" wrap="square" lIns="91425" tIns="91425" rIns="91425" bIns="91425" anchor="t" anchorCtr="0">
+            <a:noAutofit/>
+          </a:bodyPr>
+          <a:lstStyle/>
+          <a:p>
+            <a:r>
+              <a:rPr lang="en-US" altLang="zh-CN" sz="1200" b="1" dirty="0"/>
+              <a:t>: Conv 3x3</a:t>
+            </a:r>
+            <a:endParaRPr sz="1200" b="1" dirty="0"/>
+          </a:p>
+        </p:txBody>
+      </p:sp>
+      <p:cxnSp>
+        <p:nvCxnSpPr>
+          <p:cNvPr id="126" name="Google Shape;10001;p124">
+            <a:extLst>
+              <a:ext uri="{FF2B5EF4-FFF2-40B4-BE49-F238E27FC236}">
+                <a16:creationId xmlns:a16="http://schemas.microsoft.com/office/drawing/2014/main" id="{D87AFD94-8E46-4049-AC71-76C42D229781}"/>
+              </a:ext>
+            </a:extLst>
+          </p:cNvPr>
+          <p:cNvCxnSpPr>
+            <a:cxnSpLocks/>
+          </p:cNvCxnSpPr>
+          <p:nvPr/>
+        </p:nvCxnSpPr>
+        <p:spPr>
+          <a:xfrm>
+            <a:off x="2568385" y="3185085"/>
+            <a:ext cx="302559" cy="0"/>
+          </a:xfrm>
+          <a:prstGeom prst="straightConnector1">
+            <a:avLst/>
+          </a:prstGeom>
+          <a:noFill/>
+          <a:ln w="19050" cap="flat" cmpd="sng">
+            <a:solidFill>
+              <a:srgbClr val="000000"/>
+            </a:solidFill>
+            <a:prstDash val="solid"/>
+            <a:round/>
+            <a:headEnd type="none" w="med" len="med"/>
+            <a:tailEnd type="triangle" w="med" len="med"/>
+          </a:ln>
+        </p:spPr>
+      </p:cxnSp>
+      <p:cxnSp>
+        <p:nvCxnSpPr>
+          <p:cNvPr id="140" name="Google Shape;10001;p124">
+            <a:extLst>
+              <a:ext uri="{FF2B5EF4-FFF2-40B4-BE49-F238E27FC236}">
+                <a16:creationId xmlns:a16="http://schemas.microsoft.com/office/drawing/2014/main" id="{E8BEBA3C-B0F7-4E09-BF40-4D6D6086B613}"/>
+              </a:ext>
+            </a:extLst>
+          </p:cNvPr>
+          <p:cNvCxnSpPr>
+            <a:cxnSpLocks/>
+            <a:endCxn id="65" idx="2"/>
+          </p:cNvCxnSpPr>
+          <p:nvPr/>
+        </p:nvCxnSpPr>
+        <p:spPr>
+          <a:xfrm>
+            <a:off x="3154326" y="3177080"/>
+            <a:ext cx="298620" cy="0"/>
+          </a:xfrm>
+          <a:prstGeom prst="straightConnector1">
+            <a:avLst/>
+          </a:prstGeom>
+          <a:noFill/>
+          <a:ln w="19050" cap="flat" cmpd="sng">
+            <a:solidFill>
+              <a:srgbClr val="000000"/>
+            </a:solidFill>
+            <a:prstDash val="solid"/>
+            <a:round/>
+            <a:headEnd type="none" w="med" len="med"/>
+            <a:tailEnd type="triangle" w="med" len="med"/>
+          </a:ln>
+        </p:spPr>
+      </p:cxnSp>
+      <p:cxnSp>
+        <p:nvCxnSpPr>
+          <p:cNvPr id="149" name="Google Shape;10001;p124">
+            <a:extLst>
+              <a:ext uri="{FF2B5EF4-FFF2-40B4-BE49-F238E27FC236}">
+                <a16:creationId xmlns:a16="http://schemas.microsoft.com/office/drawing/2014/main" id="{2FA42208-49FD-494F-89CC-9BEC41703C91}"/>
+              </a:ext>
+            </a:extLst>
+          </p:cNvPr>
+          <p:cNvCxnSpPr>
+            <a:cxnSpLocks/>
+            <a:stCxn id="75" idx="2"/>
+            <a:endCxn id="250" idx="1"/>
+          </p:cNvCxnSpPr>
+          <p:nvPr/>
+        </p:nvCxnSpPr>
+        <p:spPr>
+          <a:xfrm flipV="1">
+            <a:off x="5338849" y="2787011"/>
+            <a:ext cx="248732" cy="4811"/>
+          </a:xfrm>
+          <a:prstGeom prst="straightConnector1">
+            <a:avLst/>
+          </a:prstGeom>
+          <a:noFill/>
+          <a:ln w="19050" cap="flat" cmpd="sng">
+            <a:solidFill>
+              <a:srgbClr val="000000"/>
+            </a:solidFill>
+            <a:prstDash val="solid"/>
+            <a:round/>
+            <a:headEnd type="none" w="med" len="med"/>
+            <a:tailEnd type="triangle" w="med" len="med"/>
+          </a:ln>
+        </p:spPr>
+      </p:cxnSp>
+      <p:cxnSp>
+        <p:nvCxnSpPr>
+          <p:cNvPr id="152" name="Google Shape;10001;p124">
+            <a:extLst>
+              <a:ext uri="{FF2B5EF4-FFF2-40B4-BE49-F238E27FC236}">
+                <a16:creationId xmlns:a16="http://schemas.microsoft.com/office/drawing/2014/main" id="{71409FEC-ECF2-4090-B57B-1D79D871D0AF}"/>
+              </a:ext>
+            </a:extLst>
+          </p:cNvPr>
+          <p:cNvCxnSpPr>
+            <a:cxnSpLocks/>
+            <a:stCxn id="250" idx="3"/>
+            <a:endCxn id="5" idx="2"/>
+          </p:cNvCxnSpPr>
+          <p:nvPr/>
+        </p:nvCxnSpPr>
+        <p:spPr>
+          <a:xfrm>
+            <a:off x="6220041" y="2787011"/>
+            <a:ext cx="251643" cy="2119"/>
+          </a:xfrm>
+          <a:prstGeom prst="straightConnector1">
+            <a:avLst/>
+          </a:prstGeom>
+          <a:noFill/>
+          <a:ln w="19050" cap="flat" cmpd="sng">
+            <a:solidFill>
+              <a:srgbClr val="000000"/>
+            </a:solidFill>
+            <a:prstDash val="solid"/>
+            <a:round/>
+            <a:headEnd type="none" w="med" len="med"/>
+            <a:tailEnd type="triangle" w="med" len="med"/>
+          </a:ln>
+        </p:spPr>
+      </p:cxnSp>
+      <p:cxnSp>
+        <p:nvCxnSpPr>
+          <p:cNvPr id="78" name="Google Shape;10001;p124">
+            <a:extLst>
+              <a:ext uri="{FF2B5EF4-FFF2-40B4-BE49-F238E27FC236}">
+                <a16:creationId xmlns:a16="http://schemas.microsoft.com/office/drawing/2014/main" id="{0DACFF50-B31B-48FD-94AC-0C18E7F64A94}"/>
+              </a:ext>
+            </a:extLst>
+          </p:cNvPr>
+          <p:cNvCxnSpPr>
+            <a:cxnSpLocks/>
+            <a:endCxn id="38" idx="0"/>
+          </p:cNvCxnSpPr>
+          <p:nvPr/>
+        </p:nvCxnSpPr>
+        <p:spPr>
+          <a:xfrm flipV="1">
+            <a:off x="1139521" y="2791822"/>
+            <a:ext cx="206403" cy="2"/>
+          </a:xfrm>
+          <a:prstGeom prst="straightConnector1">
+            <a:avLst/>
+          </a:prstGeom>
+          <a:noFill/>
+          <a:ln w="19050" cap="flat" cmpd="sng">
+            <a:solidFill>
+              <a:srgbClr val="000000"/>
+            </a:solidFill>
+            <a:prstDash val="solid"/>
+            <a:round/>
+            <a:headEnd type="none" w="med" len="med"/>
+            <a:tailEnd type="triangle" w="med" len="med"/>
+          </a:ln>
+        </p:spPr>
+      </p:cxnSp>
+      <p:cxnSp>
+        <p:nvCxnSpPr>
+          <p:cNvPr id="157" name="连接符: 肘形 156">
+            <a:extLst>
+              <a:ext uri="{FF2B5EF4-FFF2-40B4-BE49-F238E27FC236}">
+                <a16:creationId xmlns:a16="http://schemas.microsoft.com/office/drawing/2014/main" id="{BE1C58A1-A15B-4DE6-801C-D667376BB19A}"/>
+              </a:ext>
+            </a:extLst>
+          </p:cNvPr>
+          <p:cNvCxnSpPr>
+            <a:cxnSpLocks/>
+            <a:stCxn id="5" idx="0"/>
+            <a:endCxn id="198" idx="0"/>
+          </p:cNvCxnSpPr>
+          <p:nvPr/>
+        </p:nvCxnSpPr>
+        <p:spPr>
+          <a:xfrm>
+            <a:off x="7266561" y="2789130"/>
+            <a:ext cx="363510" cy="494960"/>
+          </a:xfrm>
+          <a:prstGeom prst="bentConnector3">
+            <a:avLst>
+              <a:gd name="adj1" fmla="val 50000"/>
+            </a:avLst>
+          </a:prstGeom>
+          <a:ln w="19050">
+            <a:solidFill>
+              <a:schemeClr val="tx1"/>
+            </a:solidFill>
+            <a:tailEnd type="triangle"/>
+          </a:ln>
+        </p:spPr>
+        <p:style>
+          <a:lnRef idx="1">
+            <a:schemeClr val="accent1"/>
+          </a:lnRef>
+          <a:fillRef idx="0">
+            <a:schemeClr val="accent1"/>
+          </a:fillRef>
+          <a:effectRef idx="0">
+            <a:schemeClr val="accent1"/>
+          </a:effectRef>
+          <a:fontRef idx="minor">
+            <a:schemeClr val="tx1"/>
+          </a:fontRef>
+        </p:style>
+      </p:cxnSp>
+      <p:cxnSp>
+        <p:nvCxnSpPr>
+          <p:cNvPr id="158" name="连接符: 肘形 157">
+            <a:extLst>
+              <a:ext uri="{FF2B5EF4-FFF2-40B4-BE49-F238E27FC236}">
+                <a16:creationId xmlns:a16="http://schemas.microsoft.com/office/drawing/2014/main" id="{7573343A-2B04-46DF-90A7-7C9282ECD03C}"/>
+              </a:ext>
+            </a:extLst>
+          </p:cNvPr>
+          <p:cNvCxnSpPr>
+            <a:cxnSpLocks/>
+            <a:stCxn id="5" idx="0"/>
+            <a:endCxn id="72" idx="0"/>
+          </p:cNvCxnSpPr>
+          <p:nvPr/>
+        </p:nvCxnSpPr>
+        <p:spPr>
+          <a:xfrm flipV="1">
+            <a:off x="7266561" y="2270849"/>
+            <a:ext cx="363716" cy="518281"/>
+          </a:xfrm>
+          <a:prstGeom prst="bentConnector3">
+            <a:avLst>
+              <a:gd name="adj1" fmla="val 50000"/>
+            </a:avLst>
+          </a:prstGeom>
+          <a:ln w="19050">
+            <a:solidFill>
+              <a:schemeClr val="tx1"/>
+            </a:solidFill>
+            <a:tailEnd type="triangle"/>
+          </a:ln>
+        </p:spPr>
+        <p:style>
+          <a:lnRef idx="1">
+            <a:schemeClr val="accent1"/>
+          </a:lnRef>
+          <a:fillRef idx="0">
+            <a:schemeClr val="accent1"/>
+          </a:fillRef>
+          <a:effectRef idx="0">
+            <a:schemeClr val="accent1"/>
+          </a:effectRef>
+          <a:fontRef idx="minor">
+            <a:schemeClr val="tx1"/>
+          </a:fontRef>
+        </p:style>
+      </p:cxnSp>
+      <p:cxnSp>
+        <p:nvCxnSpPr>
+          <p:cNvPr id="159" name="连接符: 肘形 158">
+            <a:extLst>
+              <a:ext uri="{FF2B5EF4-FFF2-40B4-BE49-F238E27FC236}">
+                <a16:creationId xmlns:a16="http://schemas.microsoft.com/office/drawing/2014/main" id="{70E25E07-FD03-4255-B1EB-CB05603A4EC9}"/>
+              </a:ext>
+            </a:extLst>
+          </p:cNvPr>
+          <p:cNvCxnSpPr>
+            <a:cxnSpLocks/>
+            <a:stCxn id="200" idx="2"/>
+            <a:endCxn id="90" idx="2"/>
+          </p:cNvCxnSpPr>
+          <p:nvPr/>
+        </p:nvCxnSpPr>
+        <p:spPr>
+          <a:xfrm flipV="1">
+            <a:off x="8877474" y="2799067"/>
+            <a:ext cx="374398" cy="485023"/>
+          </a:xfrm>
+          <a:prstGeom prst="bentConnector3">
+            <a:avLst>
+              <a:gd name="adj1" fmla="val 50000"/>
+            </a:avLst>
+          </a:prstGeom>
+          <a:ln w="19050">
+            <a:solidFill>
+              <a:schemeClr val="tx1"/>
+            </a:solidFill>
+            <a:tailEnd type="triangle"/>
+          </a:ln>
+        </p:spPr>
+        <p:style>
+          <a:lnRef idx="1">
+            <a:schemeClr val="accent1"/>
+          </a:lnRef>
+          <a:fillRef idx="0">
+            <a:schemeClr val="accent1"/>
+          </a:fillRef>
+          <a:effectRef idx="0">
+            <a:schemeClr val="accent1"/>
+          </a:effectRef>
+          <a:fontRef idx="minor">
+            <a:schemeClr val="tx1"/>
+          </a:fontRef>
+        </p:style>
+      </p:cxnSp>
+      <p:cxnSp>
+        <p:nvCxnSpPr>
+          <p:cNvPr id="160" name="连接符: 肘形 159">
+            <a:extLst>
+              <a:ext uri="{FF2B5EF4-FFF2-40B4-BE49-F238E27FC236}">
+                <a16:creationId xmlns:a16="http://schemas.microsoft.com/office/drawing/2014/main" id="{73B54961-0D12-483F-BF92-9CE41C8F5E74}"/>
+              </a:ext>
+            </a:extLst>
+          </p:cNvPr>
+          <p:cNvCxnSpPr>
+            <a:cxnSpLocks/>
+            <a:stCxn id="191" idx="2"/>
+            <a:endCxn id="90" idx="2"/>
+          </p:cNvCxnSpPr>
+          <p:nvPr/>
+        </p:nvCxnSpPr>
+        <p:spPr>
+          <a:xfrm>
+            <a:off x="8877680" y="2270849"/>
+            <a:ext cx="374192" cy="528218"/>
+          </a:xfrm>
+          <a:prstGeom prst="bentConnector3">
+            <a:avLst>
+              <a:gd name="adj1" fmla="val 50000"/>
+            </a:avLst>
+          </a:prstGeom>
+          <a:ln w="19050">
+            <a:solidFill>
+              <a:schemeClr val="tx1"/>
+            </a:solidFill>
+            <a:tailEnd type="triangle"/>
+          </a:ln>
+        </p:spPr>
+        <p:style>
+          <a:lnRef idx="1">
+            <a:schemeClr val="accent1"/>
+          </a:lnRef>
+          <a:fillRef idx="0">
+            <a:schemeClr val="accent1"/>
+          </a:fillRef>
+          <a:effectRef idx="0">
+            <a:schemeClr val="accent1"/>
+          </a:effectRef>
+          <a:fontRef idx="minor">
+            <a:schemeClr val="tx1"/>
+          </a:fontRef>
+        </p:style>
+      </p:cxnSp>
+      <p:cxnSp>
+        <p:nvCxnSpPr>
+          <p:cNvPr id="170" name="Google Shape;10001;p124">
+            <a:extLst>
+              <a:ext uri="{FF2B5EF4-FFF2-40B4-BE49-F238E27FC236}">
+                <a16:creationId xmlns:a16="http://schemas.microsoft.com/office/drawing/2014/main" id="{B287AB6D-78A5-4A1E-BA8B-53D15E298DB7}"/>
+              </a:ext>
+            </a:extLst>
+          </p:cNvPr>
+          <p:cNvCxnSpPr>
+            <a:cxnSpLocks/>
+            <a:endCxn id="63" idx="0"/>
+          </p:cNvCxnSpPr>
+          <p:nvPr/>
+        </p:nvCxnSpPr>
+        <p:spPr>
+          <a:xfrm>
+            <a:off x="9484242" y="2791823"/>
+            <a:ext cx="171088" cy="0"/>
+          </a:xfrm>
+          <a:prstGeom prst="straightConnector1">
+            <a:avLst/>
+          </a:prstGeom>
+          <a:noFill/>
+          <a:ln w="19050" cap="flat" cmpd="sng">
+            <a:solidFill>
+              <a:srgbClr val="000000"/>
+            </a:solidFill>
+            <a:prstDash val="solid"/>
+            <a:round/>
+            <a:headEnd type="none" w="med" len="med"/>
+            <a:tailEnd type="triangle" w="med" len="med"/>
+          </a:ln>
+        </p:spPr>
+      </p:cxnSp>
+      <p:cxnSp>
+        <p:nvCxnSpPr>
+          <p:cNvPr id="171" name="Google Shape;10001;p124">
+            <a:extLst>
+              <a:ext uri="{FF2B5EF4-FFF2-40B4-BE49-F238E27FC236}">
+                <a16:creationId xmlns:a16="http://schemas.microsoft.com/office/drawing/2014/main" id="{B4065F3A-5ECE-449B-8E11-580677FD9D7F}"/>
+              </a:ext>
+            </a:extLst>
+          </p:cNvPr>
+          <p:cNvCxnSpPr>
+            <a:cxnSpLocks/>
+            <a:stCxn id="63" idx="2"/>
+            <a:endCxn id="249" idx="1"/>
+          </p:cNvCxnSpPr>
+          <p:nvPr/>
+        </p:nvCxnSpPr>
+        <p:spPr>
+          <a:xfrm>
+            <a:off x="10472491" y="2791823"/>
+            <a:ext cx="237503" cy="4602"/>
+          </a:xfrm>
+          <a:prstGeom prst="straightConnector1">
+            <a:avLst/>
+          </a:prstGeom>
+          <a:noFill/>
+          <a:ln w="19050" cap="flat" cmpd="sng">
+            <a:solidFill>
+              <a:srgbClr val="000000"/>
+            </a:solidFill>
+            <a:prstDash val="solid"/>
+            <a:round/>
+            <a:headEnd type="none" w="med" len="med"/>
+            <a:tailEnd type="triangle" w="med" len="med"/>
+          </a:ln>
+        </p:spPr>
+      </p:cxnSp>
+      <p:sp>
+        <p:nvSpPr>
+          <p:cNvPr id="190" name="Google Shape;9989;p124">
+            <a:extLst>
+              <a:ext uri="{FF2B5EF4-FFF2-40B4-BE49-F238E27FC236}">
+                <a16:creationId xmlns:a16="http://schemas.microsoft.com/office/drawing/2014/main" id="{DDB64D3A-8999-408B-BD10-9824D8DE6F65}"/>
+              </a:ext>
+            </a:extLst>
+          </p:cNvPr>
+          <p:cNvSpPr/>
+          <p:nvPr/>
+        </p:nvSpPr>
+        <p:spPr>
+          <a:xfrm rot="16200000">
+            <a:off x="7678409" y="2117755"/>
+            <a:ext cx="954737" cy="306189"/>
+          </a:xfrm>
+          <a:prstGeom prst="roundRect">
+            <a:avLst>
+              <a:gd name="adj" fmla="val 16667"/>
+            </a:avLst>
+          </a:prstGeom>
+          <a:solidFill>
+            <a:schemeClr val="accent6"/>
+          </a:solidFill>
+          <a:ln w="12700" cap="flat" cmpd="sng">
+            <a:solidFill>
+              <a:srgbClr val="000000"/>
+            </a:solidFill>
+            <a:prstDash val="solid"/>
+            <a:round/>
+            <a:headEnd type="none" w="sm" len="sm"/>
+            <a:tailEnd type="none" w="sm" len="sm"/>
+          </a:ln>
+        </p:spPr>
+        <p:txBody>
+          <a:bodyPr spcFirstLastPara="1" vert="horz" wrap="square" lIns="91425" tIns="91425" rIns="91425" bIns="91425" anchor="ctr" anchorCtr="0">
+            <a:noAutofit/>
+          </a:bodyPr>
+          <a:lstStyle/>
+          <a:p>
+            <a:pPr marL="0" lvl="0" indent="0" algn="ctr" rtl="0">
+              <a:spcBef>
+                <a:spcPts val="0"/>
+              </a:spcBef>
+              <a:spcAft>
+                <a:spcPts val="0"/>
+              </a:spcAft>
+              <a:buNone/>
+            </a:pPr>
+            <a:r>
+              <a:rPr lang="en-US" altLang="zh-CN" sz="1000" b="1" dirty="0"/>
+              <a:t>Fourier Processing</a:t>
+            </a:r>
+            <a:endParaRPr lang="en" altLang="zh-CN" sz="1000" b="1" dirty="0"/>
+          </a:p>
+        </p:txBody>
+      </p:sp>
+      <p:sp>
+        <p:nvSpPr>
+          <p:cNvPr id="191" name="Google Shape;9989;p124">
+            <a:extLst>
+              <a:ext uri="{FF2B5EF4-FFF2-40B4-BE49-F238E27FC236}">
+                <a16:creationId xmlns:a16="http://schemas.microsoft.com/office/drawing/2014/main" id="{3F067FD5-3562-4AB4-A49A-2AFC19D0B342}"/>
+              </a:ext>
+            </a:extLst>
+          </p:cNvPr>
+          <p:cNvSpPr/>
+          <p:nvPr/>
+        </p:nvSpPr>
+        <p:spPr>
+          <a:xfrm rot="16200000">
+            <a:off x="8247217" y="2117755"/>
+            <a:ext cx="954737" cy="306189"/>
+          </a:xfrm>
+          <a:prstGeom prst="roundRect">
+            <a:avLst>
+              <a:gd name="adj" fmla="val 16667"/>
+            </a:avLst>
+          </a:prstGeom>
+          <a:solidFill>
+            <a:schemeClr val="accent6"/>
+          </a:solidFill>
+          <a:ln w="12700" cap="flat" cmpd="sng">
+            <a:solidFill>
+              <a:srgbClr val="000000"/>
+            </a:solidFill>
+            <a:prstDash val="solid"/>
+            <a:round/>
+            <a:headEnd type="none" w="sm" len="sm"/>
+            <a:tailEnd type="none" w="sm" len="sm"/>
+          </a:ln>
+        </p:spPr>
+        <p:txBody>
+          <a:bodyPr spcFirstLastPara="1" vert="horz" wrap="square" lIns="91425" tIns="91425" rIns="91425" bIns="91425" anchor="ctr" anchorCtr="0">
+            <a:noAutofit/>
+          </a:bodyPr>
+          <a:lstStyle/>
+          <a:p>
+            <a:pPr marL="0" lvl="0" indent="0" algn="ctr" rtl="0">
+              <a:spcBef>
+                <a:spcPts val="0"/>
+              </a:spcBef>
+              <a:spcAft>
+                <a:spcPts val="0"/>
+              </a:spcAft>
+              <a:buNone/>
+            </a:pPr>
+            <a:r>
+              <a:rPr lang="en-US" altLang="zh-CN" sz="1000" b="1" dirty="0"/>
+              <a:t>Fourier Processing</a:t>
+            </a:r>
+            <a:endParaRPr lang="en" altLang="zh-CN" sz="1000" b="1" dirty="0"/>
+          </a:p>
+        </p:txBody>
+      </p:sp>
+      <p:cxnSp>
+        <p:nvCxnSpPr>
+          <p:cNvPr id="193" name="直接连接符 192">
+            <a:extLst>
+              <a:ext uri="{FF2B5EF4-FFF2-40B4-BE49-F238E27FC236}">
+                <a16:creationId xmlns:a16="http://schemas.microsoft.com/office/drawing/2014/main" id="{15D6C8DF-C186-4AA1-8726-3EE55437915F}"/>
+              </a:ext>
+            </a:extLst>
+          </p:cNvPr>
+          <p:cNvCxnSpPr>
+            <a:cxnSpLocks/>
+            <a:stCxn id="190" idx="2"/>
+            <a:endCxn id="191" idx="0"/>
+          </p:cNvCxnSpPr>
+          <p:nvPr/>
+        </p:nvCxnSpPr>
+        <p:spPr>
+          <a:xfrm>
+            <a:off x="8308872" y="2270849"/>
+            <a:ext cx="262619" cy="0"/>
+          </a:xfrm>
+          <a:prstGeom prst="line">
+            <a:avLst/>
+          </a:prstGeom>
+          <a:ln w="28575">
+            <a:solidFill>
+              <a:schemeClr val="tx1"/>
+            </a:solidFill>
+            <a:prstDash val="sysDot"/>
+          </a:ln>
+        </p:spPr>
+        <p:style>
+          <a:lnRef idx="1">
+            <a:schemeClr val="accent1"/>
+          </a:lnRef>
+          <a:fillRef idx="0">
+            <a:schemeClr val="accent1"/>
+          </a:fillRef>
+          <a:effectRef idx="0">
+            <a:schemeClr val="accent1"/>
+          </a:effectRef>
+          <a:fontRef idx="minor">
+            <a:schemeClr val="tx1"/>
+          </a:fontRef>
+        </p:style>
+      </p:cxnSp>
+      <p:sp>
+        <p:nvSpPr>
+          <p:cNvPr id="198" name="Google Shape;9989;p124">
+            <a:extLst>
+              <a:ext uri="{FF2B5EF4-FFF2-40B4-BE49-F238E27FC236}">
+                <a16:creationId xmlns:a16="http://schemas.microsoft.com/office/drawing/2014/main" id="{B4E5741A-CA45-40DF-B694-3559D2823A39}"/>
+              </a:ext>
+            </a:extLst>
+          </p:cNvPr>
+          <p:cNvSpPr/>
+          <p:nvPr/>
+        </p:nvSpPr>
+        <p:spPr>
+          <a:xfrm rot="16200000">
+            <a:off x="7305797" y="3130996"/>
+            <a:ext cx="954737" cy="306189"/>
+          </a:xfrm>
+          <a:prstGeom prst="roundRect">
+            <a:avLst>
+              <a:gd name="adj" fmla="val 16667"/>
+            </a:avLst>
+          </a:prstGeom>
+          <a:solidFill>
+            <a:schemeClr val="accent3">
+              <a:lumMod val="40000"/>
+              <a:lumOff val="60000"/>
+            </a:schemeClr>
+          </a:solidFill>
+          <a:ln w="12700" cap="flat" cmpd="sng">
+            <a:solidFill>
+              <a:srgbClr val="000000"/>
+            </a:solidFill>
+            <a:prstDash val="solid"/>
+            <a:round/>
+            <a:headEnd type="none" w="sm" len="sm"/>
+            <a:tailEnd type="none" w="sm" len="sm"/>
+          </a:ln>
+        </p:spPr>
+        <p:txBody>
+          <a:bodyPr spcFirstLastPara="1" vert="horz" wrap="square" lIns="91425" tIns="91425" rIns="91425" bIns="91425" anchor="ctr" anchorCtr="0">
+            <a:noAutofit/>
+          </a:bodyPr>
+          <a:lstStyle/>
+          <a:p>
+            <a:pPr marL="0" lvl="0" indent="0" algn="ctr" rtl="0">
+              <a:spcBef>
+                <a:spcPts val="0"/>
+              </a:spcBef>
+              <a:spcAft>
+                <a:spcPts val="0"/>
+              </a:spcAft>
+              <a:buNone/>
+            </a:pPr>
+            <a:r>
+              <a:rPr lang="en-US" sz="1000" b="1" dirty="0"/>
+              <a:t>Spatial Processing</a:t>
+            </a:r>
+            <a:endParaRPr lang="en" sz="1000" b="1" dirty="0"/>
+          </a:p>
+        </p:txBody>
+      </p:sp>
+      <p:sp>
+        <p:nvSpPr>
+          <p:cNvPr id="199" name="Google Shape;9989;p124">
+            <a:extLst>
+              <a:ext uri="{FF2B5EF4-FFF2-40B4-BE49-F238E27FC236}">
+                <a16:creationId xmlns:a16="http://schemas.microsoft.com/office/drawing/2014/main" id="{AEEA7209-6AD8-4577-AFBF-7640CF328644}"/>
+              </a:ext>
+            </a:extLst>
+          </p:cNvPr>
+          <p:cNvSpPr/>
+          <p:nvPr/>
+        </p:nvSpPr>
+        <p:spPr>
+          <a:xfrm rot="16200000">
+            <a:off x="7678203" y="3130996"/>
+            <a:ext cx="954737" cy="306189"/>
+          </a:xfrm>
+          <a:prstGeom prst="roundRect">
+            <a:avLst>
+              <a:gd name="adj" fmla="val 16667"/>
+            </a:avLst>
+          </a:prstGeom>
+          <a:solidFill>
+            <a:schemeClr val="accent3">
+              <a:lumMod val="40000"/>
+              <a:lumOff val="60000"/>
+            </a:schemeClr>
+          </a:solidFill>
+          <a:ln w="12700" cap="flat" cmpd="sng">
+            <a:solidFill>
+              <a:srgbClr val="000000"/>
+            </a:solidFill>
+            <a:prstDash val="solid"/>
+            <a:round/>
+            <a:headEnd type="none" w="sm" len="sm"/>
+            <a:tailEnd type="none" w="sm" len="sm"/>
+          </a:ln>
+        </p:spPr>
+        <p:txBody>
+          <a:bodyPr spcFirstLastPara="1" vert="horz" wrap="square" lIns="91425" tIns="91425" rIns="91425" bIns="91425" anchor="ctr" anchorCtr="0">
+            <a:noAutofit/>
+          </a:bodyPr>
+          <a:lstStyle/>
+          <a:p>
+            <a:pPr marL="0" lvl="0" indent="0" algn="ctr" rtl="0">
+              <a:spcBef>
+                <a:spcPts val="0"/>
+              </a:spcBef>
+              <a:spcAft>
+                <a:spcPts val="0"/>
+              </a:spcAft>
+              <a:buNone/>
+            </a:pPr>
+            <a:r>
+              <a:rPr lang="en-US" altLang="zh-CN" sz="1000" b="1" dirty="0"/>
+              <a:t>Spatial Processing</a:t>
+            </a:r>
+            <a:endParaRPr lang="en" sz="1000" b="1" dirty="0"/>
+          </a:p>
+        </p:txBody>
+      </p:sp>
+      <p:sp>
+        <p:nvSpPr>
+          <p:cNvPr id="200" name="Google Shape;9989;p124">
+            <a:extLst>
+              <a:ext uri="{FF2B5EF4-FFF2-40B4-BE49-F238E27FC236}">
+                <a16:creationId xmlns:a16="http://schemas.microsoft.com/office/drawing/2014/main" id="{AF3AC352-49FA-4814-A2C5-71701F165F78}"/>
+              </a:ext>
+            </a:extLst>
+          </p:cNvPr>
+          <p:cNvSpPr/>
+          <p:nvPr/>
+        </p:nvSpPr>
+        <p:spPr>
+          <a:xfrm rot="16200000">
+            <a:off x="8247011" y="3130996"/>
+            <a:ext cx="954737" cy="306189"/>
+          </a:xfrm>
+          <a:prstGeom prst="roundRect">
+            <a:avLst>
+              <a:gd name="adj" fmla="val 16667"/>
+            </a:avLst>
+          </a:prstGeom>
+          <a:solidFill>
+            <a:schemeClr val="accent3">
+              <a:lumMod val="40000"/>
+              <a:lumOff val="60000"/>
+            </a:schemeClr>
+          </a:solidFill>
+          <a:ln w="12700" cap="flat" cmpd="sng">
+            <a:solidFill>
+              <a:srgbClr val="000000"/>
+            </a:solidFill>
+            <a:prstDash val="solid"/>
+            <a:round/>
+            <a:headEnd type="none" w="sm" len="sm"/>
+            <a:tailEnd type="none" w="sm" len="sm"/>
+          </a:ln>
+        </p:spPr>
+        <p:txBody>
+          <a:bodyPr spcFirstLastPara="1" vert="horz" wrap="square" lIns="91425" tIns="91425" rIns="91425" bIns="91425" anchor="ctr" anchorCtr="0">
+            <a:noAutofit/>
+          </a:bodyPr>
+          <a:lstStyle/>
+          <a:p>
+            <a:pPr marL="0" lvl="0" indent="0" algn="ctr" rtl="0">
+              <a:spcBef>
+                <a:spcPts val="0"/>
+              </a:spcBef>
+              <a:spcAft>
+                <a:spcPts val="0"/>
+              </a:spcAft>
+              <a:buNone/>
+            </a:pPr>
+            <a:r>
+              <a:rPr lang="en-US" altLang="zh-CN" sz="1000" b="1" dirty="0"/>
+              <a:t>Spatial Processing</a:t>
+            </a:r>
+            <a:endParaRPr lang="en" sz="1000" b="1" dirty="0"/>
+          </a:p>
+        </p:txBody>
+      </p:sp>
+      <p:cxnSp>
+        <p:nvCxnSpPr>
+          <p:cNvPr id="201" name="直接连接符 200">
+            <a:extLst>
+              <a:ext uri="{FF2B5EF4-FFF2-40B4-BE49-F238E27FC236}">
+                <a16:creationId xmlns:a16="http://schemas.microsoft.com/office/drawing/2014/main" id="{35E302A2-8C11-4F4F-AE2E-156BFA7C98D3}"/>
+              </a:ext>
+            </a:extLst>
+          </p:cNvPr>
+          <p:cNvCxnSpPr>
+            <a:cxnSpLocks/>
+            <a:stCxn id="199" idx="2"/>
+            <a:endCxn id="200" idx="0"/>
+          </p:cNvCxnSpPr>
+          <p:nvPr/>
+        </p:nvCxnSpPr>
+        <p:spPr>
+          <a:xfrm>
+            <a:off x="8308666" y="3284090"/>
+            <a:ext cx="262619" cy="0"/>
+          </a:xfrm>
+          <a:prstGeom prst="line">
+            <a:avLst/>
+          </a:prstGeom>
+          <a:ln w="28575">
+            <a:solidFill>
+              <a:schemeClr val="tx1"/>
+            </a:solidFill>
+            <a:prstDash val="sysDot"/>
+          </a:ln>
+        </p:spPr>
+        <p:style>
+          <a:lnRef idx="1">
+            <a:schemeClr val="accent1"/>
+          </a:lnRef>
+          <a:fillRef idx="0">
+            <a:schemeClr val="accent1"/>
+          </a:fillRef>
+          <a:effectRef idx="0">
+            <a:schemeClr val="accent1"/>
+          </a:effectRef>
+          <a:fontRef idx="minor">
+            <a:schemeClr val="tx1"/>
+          </a:fontRef>
+        </p:style>
+      </p:cxnSp>
+      <p:sp>
+        <p:nvSpPr>
+          <p:cNvPr id="210" name="文本框 209">
+            <a:extLst>
+              <a:ext uri="{FF2B5EF4-FFF2-40B4-BE49-F238E27FC236}">
+                <a16:creationId xmlns:a16="http://schemas.microsoft.com/office/drawing/2014/main" id="{0A72C46D-7A45-47C3-853D-61CAC827F450}"/>
+              </a:ext>
+            </a:extLst>
+          </p:cNvPr>
+          <p:cNvSpPr txBox="1"/>
+          <p:nvPr/>
+        </p:nvSpPr>
+        <p:spPr>
+          <a:xfrm>
+            <a:off x="6970184" y="937489"/>
+            <a:ext cx="4034120" cy="307777"/>
+          </a:xfrm>
+          <a:prstGeom prst="rect">
+            <a:avLst/>
+          </a:prstGeom>
+          <a:noFill/>
+        </p:spPr>
+        <p:txBody>
+          <a:bodyPr wrap="square">
+            <a:spAutoFit/>
+          </a:bodyPr>
+          <a:lstStyle/>
+          <a:p>
+            <a:r>
+              <a:rPr lang="en-US" altLang="zh-CN" sz="1400" b="1" dirty="0">
+                <a:latin typeface="仿宋" panose="02010609060101010101" pitchFamily="49" charset="-122"/>
+                <a:ea typeface="仿宋" panose="02010609060101010101" pitchFamily="49" charset="-122"/>
+              </a:rPr>
+              <a:t>Spatial and Texture Reconstruction Stage</a:t>
+            </a:r>
+            <a:endParaRPr lang="zh-CN" altLang="en-US" sz="1400" b="1" dirty="0">
+              <a:latin typeface="仿宋" panose="02010609060101010101" pitchFamily="49" charset="-122"/>
+              <a:ea typeface="仿宋" panose="02010609060101010101" pitchFamily="49" charset="-122"/>
+            </a:endParaRPr>
+          </a:p>
+        </p:txBody>
+      </p:sp>
+      <p:sp>
+        <p:nvSpPr>
+          <p:cNvPr id="211" name="文本框 210">
+            <a:extLst>
+              <a:ext uri="{FF2B5EF4-FFF2-40B4-BE49-F238E27FC236}">
+                <a16:creationId xmlns:a16="http://schemas.microsoft.com/office/drawing/2014/main" id="{2C94A6D7-A74B-4990-8405-D445E35DECB3}"/>
+              </a:ext>
+            </a:extLst>
+          </p:cNvPr>
+          <p:cNvSpPr txBox="1"/>
+          <p:nvPr/>
+        </p:nvSpPr>
+        <p:spPr>
+          <a:xfrm>
+            <a:off x="1448331" y="942867"/>
+            <a:ext cx="3267574" cy="307777"/>
+          </a:xfrm>
+          <a:prstGeom prst="rect">
+            <a:avLst/>
+          </a:prstGeom>
+          <a:noFill/>
+        </p:spPr>
+        <p:txBody>
+          <a:bodyPr wrap="square">
+            <a:spAutoFit/>
+          </a:bodyPr>
+          <a:lstStyle/>
+          <a:p>
+            <a:r>
+              <a:rPr lang="en-US" altLang="zh-CN" sz="1400" b="1" dirty="0">
+                <a:latin typeface="仿宋" panose="02010609060101010101" pitchFamily="49" charset="-122"/>
+                <a:ea typeface="仿宋" panose="02010609060101010101" pitchFamily="49" charset="-122"/>
+              </a:rPr>
+              <a:t>Infrared and Visible Fusion Stage</a:t>
+            </a:r>
+            <a:endParaRPr lang="zh-CN" altLang="en-US" sz="1400" b="1" dirty="0">
+              <a:latin typeface="仿宋" panose="02010609060101010101" pitchFamily="49" charset="-122"/>
+              <a:ea typeface="仿宋" panose="02010609060101010101" pitchFamily="49" charset="-122"/>
+            </a:endParaRPr>
+          </a:p>
+        </p:txBody>
+      </p:sp>
+      <p:sp>
+        <p:nvSpPr>
+          <p:cNvPr id="111" name="矩形: 圆角 110">
+            <a:extLst>
+              <a:ext uri="{FF2B5EF4-FFF2-40B4-BE49-F238E27FC236}">
+                <a16:creationId xmlns:a16="http://schemas.microsoft.com/office/drawing/2014/main" id="{EDE8596B-16BE-40AD-8374-DC8DB2597DE0}"/>
+              </a:ext>
+            </a:extLst>
+          </p:cNvPr>
+          <p:cNvSpPr/>
+          <p:nvPr/>
+        </p:nvSpPr>
+        <p:spPr>
+          <a:xfrm>
+            <a:off x="87406" y="833719"/>
+            <a:ext cx="11595079" cy="3798794"/>
+          </a:xfrm>
+          <a:prstGeom prst="roundRect">
+            <a:avLst/>
+          </a:prstGeom>
+          <a:noFill/>
+          <a:ln w="19050">
+            <a:solidFill>
+              <a:schemeClr val="tx1"/>
+            </a:solidFill>
+            <a:prstDash val="sysDash"/>
+          </a:ln>
+        </p:spPr>
+        <p:style>
+          <a:lnRef idx="2">
+            <a:schemeClr val="accent1">
+              <a:shade val="50000"/>
+            </a:schemeClr>
+          </a:lnRef>
+          <a:fillRef idx="1">
+            <a:schemeClr val="accent1"/>
+          </a:fillRef>
+          <a:effectRef idx="0">
+            <a:schemeClr val="accent1"/>
+          </a:effectRef>
+          <a:fontRef idx="minor">
+            <a:schemeClr val="lt1"/>
+          </a:fontRef>
+        </p:style>
+        <p:txBody>
+          <a:bodyPr rtlCol="0" anchor="ctr"/>
+          <a:lstStyle/>
+          <a:p>
+            <a:pPr algn="ctr"/>
+            <a:endParaRPr lang="zh-CN" altLang="en-US"/>
+          </a:p>
+        </p:txBody>
+      </p:sp>
+      <p:sp>
+        <p:nvSpPr>
+          <p:cNvPr id="223" name="Google Shape;8856;p107">
+            <a:extLst>
+              <a:ext uri="{FF2B5EF4-FFF2-40B4-BE49-F238E27FC236}">
+                <a16:creationId xmlns:a16="http://schemas.microsoft.com/office/drawing/2014/main" id="{7F790993-9DAD-45D6-AE2F-255E140C3069}"/>
+              </a:ext>
+            </a:extLst>
+          </p:cNvPr>
+          <p:cNvSpPr/>
+          <p:nvPr/>
+        </p:nvSpPr>
+        <p:spPr>
+          <a:xfrm rot="10800000">
+            <a:off x="6113310" y="3912325"/>
+            <a:ext cx="131939" cy="480928"/>
+          </a:xfrm>
+          <a:prstGeom prst="rect">
+            <a:avLst/>
+          </a:prstGeom>
+          <a:solidFill>
+            <a:srgbClr val="6AA84F"/>
+          </a:solidFill>
+          <a:ln w="9525" cap="flat" cmpd="sng">
+            <a:solidFill>
+              <a:schemeClr val="dk2"/>
+            </a:solidFill>
+            <a:prstDash val="solid"/>
+            <a:round/>
+            <a:headEnd type="none" w="sm" len="sm"/>
+            <a:tailEnd type="none" w="sm" len="sm"/>
+          </a:ln>
+        </p:spPr>
+        <p:txBody>
+          <a:bodyPr spcFirstLastPara="1" wrap="square" lIns="121900" tIns="121900" rIns="121900" bIns="121900" anchor="ctr" anchorCtr="0">
+            <a:noAutofit/>
+          </a:bodyPr>
+          <a:lstStyle/>
+          <a:p>
+            <a:endParaRPr sz="2400"/>
+          </a:p>
+        </p:txBody>
+      </p:sp>
+      <p:sp>
+        <p:nvSpPr>
+          <p:cNvPr id="224" name="Google Shape;6733;p68">
+            <a:extLst>
+              <a:ext uri="{FF2B5EF4-FFF2-40B4-BE49-F238E27FC236}">
+                <a16:creationId xmlns:a16="http://schemas.microsoft.com/office/drawing/2014/main" id="{7E6BFECD-FD71-4B97-BF4E-83EE8C5EE7C9}"/>
+              </a:ext>
+            </a:extLst>
+          </p:cNvPr>
+          <p:cNvSpPr/>
+          <p:nvPr/>
+        </p:nvSpPr>
+        <p:spPr>
+          <a:xfrm>
+            <a:off x="10514424" y="3904548"/>
+            <a:ext cx="192487" cy="482400"/>
+          </a:xfrm>
+          <a:prstGeom prst="cube">
+            <a:avLst>
+              <a:gd name="adj" fmla="val 78947"/>
+            </a:avLst>
+          </a:prstGeom>
+          <a:solidFill>
+            <a:schemeClr val="accent2">
+              <a:lumMod val="60000"/>
+              <a:lumOff val="40000"/>
+              <a:alpha val="39660"/>
+            </a:schemeClr>
+          </a:solidFill>
+          <a:ln w="9525" cap="flat" cmpd="sng">
+            <a:solidFill>
+              <a:schemeClr val="accent3">
+                <a:lumMod val="75000"/>
+              </a:schemeClr>
+            </a:solidFill>
+            <a:prstDash val="solid"/>
+            <a:round/>
+            <a:headEnd type="none" w="sm" len="sm"/>
+            <a:tailEnd type="none" w="sm" len="sm"/>
+          </a:ln>
+        </p:spPr>
+        <p:txBody>
+          <a:bodyPr spcFirstLastPara="1" wrap="square" lIns="91425" tIns="91425" rIns="91425" bIns="91425" anchor="ctr" anchorCtr="0">
+            <a:noAutofit/>
+          </a:bodyPr>
+          <a:lstStyle/>
+          <a:p>
+            <a:pPr marL="0" lvl="0" indent="0" algn="l" rtl="0">
+              <a:spcBef>
+                <a:spcPts val="0"/>
+              </a:spcBef>
+              <a:spcAft>
+                <a:spcPts val="0"/>
+              </a:spcAft>
+              <a:buNone/>
+            </a:pPr>
+            <a:endParaRPr dirty="0"/>
+          </a:p>
+        </p:txBody>
+      </p:sp>
+      <p:sp>
+        <p:nvSpPr>
+          <p:cNvPr id="230" name="流程图: 接点 229">
+            <a:extLst>
+              <a:ext uri="{FF2B5EF4-FFF2-40B4-BE49-F238E27FC236}">
+                <a16:creationId xmlns:a16="http://schemas.microsoft.com/office/drawing/2014/main" id="{90A20C39-7635-4096-9CF4-CAF5FCEE8F82}"/>
+              </a:ext>
+            </a:extLst>
+          </p:cNvPr>
+          <p:cNvSpPr/>
+          <p:nvPr/>
+        </p:nvSpPr>
+        <p:spPr>
+          <a:xfrm>
+            <a:off x="9571991" y="4039066"/>
+            <a:ext cx="228600" cy="228600"/>
+          </a:xfrm>
+          <a:prstGeom prst="flowChartConnector">
+            <a:avLst/>
+          </a:prstGeom>
+          <a:solidFill>
+            <a:schemeClr val="bg1"/>
+          </a:solidFill>
+          <a:ln>
+            <a:solidFill>
+              <a:schemeClr val="tx1"/>
+            </a:solidFill>
+          </a:ln>
+        </p:spPr>
+        <p:style>
+          <a:lnRef idx="2">
+            <a:schemeClr val="accent1">
+              <a:shade val="50000"/>
+            </a:schemeClr>
+          </a:lnRef>
+          <a:fillRef idx="1">
+            <a:schemeClr val="accent1"/>
+          </a:fillRef>
+          <a:effectRef idx="0">
+            <a:schemeClr val="accent1"/>
+          </a:effectRef>
+          <a:fontRef idx="minor">
+            <a:schemeClr val="lt1"/>
+          </a:fontRef>
+        </p:style>
+        <p:txBody>
+          <a:bodyPr rtlCol="0" anchor="ctr"/>
+          <a:lstStyle/>
+          <a:p>
+            <a:pPr algn="ctr"/>
+            <a:r>
+              <a:rPr lang="en-US" altLang="zh-CN" b="1" dirty="0">
+                <a:solidFill>
+                  <a:schemeClr val="tx1"/>
+                </a:solidFill>
+              </a:rPr>
+              <a:t>C</a:t>
+            </a:r>
+            <a:endParaRPr lang="zh-CN" altLang="en-US" b="1" dirty="0">
+              <a:solidFill>
+                <a:schemeClr val="tx1"/>
+              </a:solidFill>
+            </a:endParaRPr>
+          </a:p>
+        </p:txBody>
+      </p:sp>
+      <p:sp>
+        <p:nvSpPr>
+          <p:cNvPr id="245" name="流程图: 接点 244">
+            <a:extLst>
+              <a:ext uri="{FF2B5EF4-FFF2-40B4-BE49-F238E27FC236}">
+                <a16:creationId xmlns:a16="http://schemas.microsoft.com/office/drawing/2014/main" id="{1C09DF61-E150-4857-B148-23C9C0D87B30}"/>
+              </a:ext>
+            </a:extLst>
+          </p:cNvPr>
+          <p:cNvSpPr/>
+          <p:nvPr/>
+        </p:nvSpPr>
+        <p:spPr>
+          <a:xfrm>
+            <a:off x="8661440" y="4054840"/>
+            <a:ext cx="228600" cy="228600"/>
+          </a:xfrm>
+          <a:prstGeom prst="flowChartConnector">
+            <a:avLst/>
+          </a:prstGeom>
+          <a:solidFill>
+            <a:schemeClr val="bg1"/>
+          </a:solidFill>
+          <a:ln>
+            <a:solidFill>
+              <a:schemeClr val="tx1"/>
+            </a:solidFill>
+          </a:ln>
+        </p:spPr>
+        <p:style>
+          <a:lnRef idx="2">
+            <a:schemeClr val="accent1">
+              <a:shade val="50000"/>
+            </a:schemeClr>
+          </a:lnRef>
+          <a:fillRef idx="1">
+            <a:schemeClr val="accent1"/>
+          </a:fillRef>
+          <a:effectRef idx="0">
+            <a:schemeClr val="accent1"/>
+          </a:effectRef>
+          <a:fontRef idx="minor">
+            <a:schemeClr val="lt1"/>
+          </a:fontRef>
+        </p:style>
+        <p:txBody>
+          <a:bodyPr rtlCol="0" anchor="ctr"/>
+          <a:lstStyle/>
+          <a:p>
+            <a:pPr algn="ctr"/>
+            <a:r>
+              <a:rPr lang="en-US" altLang="zh-CN" b="1" dirty="0">
+                <a:solidFill>
+                  <a:schemeClr val="tx1"/>
+                </a:solidFill>
+              </a:rPr>
+              <a:t>X</a:t>
+            </a:r>
+          </a:p>
+        </p:txBody>
+      </p:sp>
+      <p:sp>
+        <p:nvSpPr>
+          <p:cNvPr id="246" name="流程图: 接点 245">
+            <a:extLst>
+              <a:ext uri="{FF2B5EF4-FFF2-40B4-BE49-F238E27FC236}">
+                <a16:creationId xmlns:a16="http://schemas.microsoft.com/office/drawing/2014/main" id="{3408BEA9-833B-4163-9510-B35DD5BEF442}"/>
+              </a:ext>
+            </a:extLst>
+          </p:cNvPr>
+          <p:cNvSpPr/>
+          <p:nvPr/>
+        </p:nvSpPr>
+        <p:spPr>
+          <a:xfrm>
+            <a:off x="7549665" y="4069061"/>
+            <a:ext cx="228600" cy="228600"/>
+          </a:xfrm>
+          <a:prstGeom prst="flowChartConnector">
+            <a:avLst/>
+          </a:prstGeom>
+          <a:solidFill>
+            <a:schemeClr val="bg1"/>
+          </a:solidFill>
+          <a:ln>
+            <a:solidFill>
+              <a:schemeClr val="tx1"/>
+            </a:solidFill>
+          </a:ln>
+        </p:spPr>
+        <p:style>
+          <a:lnRef idx="2">
+            <a:schemeClr val="accent1">
+              <a:shade val="50000"/>
+            </a:schemeClr>
+          </a:lnRef>
+          <a:fillRef idx="1">
+            <a:schemeClr val="accent1"/>
+          </a:fillRef>
+          <a:effectRef idx="0">
+            <a:schemeClr val="accent1"/>
+          </a:effectRef>
+          <a:fontRef idx="minor">
+            <a:schemeClr val="lt1"/>
+          </a:fontRef>
+        </p:style>
+        <p:txBody>
+          <a:bodyPr rtlCol="0" anchor="ctr"/>
+          <a:lstStyle/>
+          <a:p>
+            <a:pPr algn="ctr"/>
+            <a:r>
+              <a:rPr lang="en-US" altLang="zh-CN" b="1" dirty="0">
+                <a:solidFill>
+                  <a:schemeClr val="tx1"/>
+                </a:solidFill>
+              </a:rPr>
+              <a:t>\</a:t>
+            </a:r>
+            <a:endParaRPr lang="zh-CN" altLang="en-US" b="1" dirty="0">
+              <a:solidFill>
+                <a:schemeClr val="tx1"/>
+              </a:solidFill>
+            </a:endParaRPr>
+          </a:p>
+        </p:txBody>
+      </p:sp>
+      <p:sp>
+        <p:nvSpPr>
+          <p:cNvPr id="247" name="Google Shape;8410;p96">
+            <a:extLst>
+              <a:ext uri="{FF2B5EF4-FFF2-40B4-BE49-F238E27FC236}">
+                <a16:creationId xmlns:a16="http://schemas.microsoft.com/office/drawing/2014/main" id="{2ECA1ED6-E278-41E8-8E6A-28A5F2034F59}"/>
+              </a:ext>
+            </a:extLst>
+          </p:cNvPr>
+          <p:cNvSpPr txBox="1"/>
+          <p:nvPr/>
+        </p:nvSpPr>
+        <p:spPr>
+          <a:xfrm>
+            <a:off x="8832727" y="3970092"/>
+            <a:ext cx="938363" cy="272565"/>
+          </a:xfrm>
+          <a:prstGeom prst="rect">
+            <a:avLst/>
+          </a:prstGeom>
+          <a:noFill/>
+          <a:ln>
+            <a:noFill/>
+          </a:ln>
+        </p:spPr>
+        <p:txBody>
+          <a:bodyPr spcFirstLastPara="1" wrap="square" lIns="91425" tIns="91425" rIns="91425" bIns="91425" anchor="t" anchorCtr="0">
+            <a:noAutofit/>
+          </a:bodyPr>
+          <a:lstStyle/>
+          <a:p>
+            <a:r>
+              <a:rPr lang="en-US" altLang="zh-CN" sz="1200" b="1" dirty="0"/>
+              <a:t>: Mul</a:t>
+            </a:r>
+            <a:endParaRPr sz="1200" b="1" dirty="0"/>
+          </a:p>
+        </p:txBody>
+      </p:sp>
+      <p:sp>
+        <p:nvSpPr>
+          <p:cNvPr id="248" name="Google Shape;8410;p96">
+            <a:extLst>
+              <a:ext uri="{FF2B5EF4-FFF2-40B4-BE49-F238E27FC236}">
+                <a16:creationId xmlns:a16="http://schemas.microsoft.com/office/drawing/2014/main" id="{32ABDC51-D656-4452-8A50-EF7B5EED242B}"/>
+              </a:ext>
+            </a:extLst>
+          </p:cNvPr>
+          <p:cNvSpPr txBox="1"/>
+          <p:nvPr/>
+        </p:nvSpPr>
+        <p:spPr>
+          <a:xfrm>
+            <a:off x="7781167" y="3992952"/>
+            <a:ext cx="890393" cy="272565"/>
+          </a:xfrm>
+          <a:prstGeom prst="rect">
+            <a:avLst/>
+          </a:prstGeom>
+          <a:noFill/>
+          <a:ln>
+            <a:noFill/>
+          </a:ln>
+        </p:spPr>
+        <p:txBody>
+          <a:bodyPr spcFirstLastPara="1" wrap="square" lIns="91425" tIns="91425" rIns="91425" bIns="91425" anchor="t" anchorCtr="0">
+            <a:noAutofit/>
+          </a:bodyPr>
+          <a:lstStyle/>
+          <a:p>
+            <a:r>
+              <a:rPr lang="en-US" altLang="zh-CN" sz="1200" b="1" dirty="0"/>
+              <a:t>: Division</a:t>
+            </a:r>
+            <a:endParaRPr sz="1200" b="1" dirty="0"/>
+          </a:p>
+        </p:txBody>
+      </p:sp>
+      <p:pic>
+        <p:nvPicPr>
+          <p:cNvPr id="249" name="图片 248">
+            <a:extLst>
+              <a:ext uri="{FF2B5EF4-FFF2-40B4-BE49-F238E27FC236}">
+                <a16:creationId xmlns:a16="http://schemas.microsoft.com/office/drawing/2014/main" id="{38861EA0-CF01-42FE-AF19-8906BBC88EBC}"/>
+              </a:ext>
+            </a:extLst>
+          </p:cNvPr>
+          <p:cNvPicPr>
+            <a:picLocks noChangeAspect="1"/>
+          </p:cNvPicPr>
+          <p:nvPr/>
+        </p:nvPicPr>
+        <p:blipFill>
+          <a:blip r:embed="rId5" cstate="print">
+            <a:extLst>
+              <a:ext uri="{28A0092B-C50C-407E-A947-70E740481C1C}">
+                <a14:useLocalDpi xmlns:a14="http://schemas.microsoft.com/office/drawing/2010/main" val="0"/>
+              </a:ext>
+            </a:extLst>
+          </a:blip>
+          <a:stretch>
+            <a:fillRect/>
+          </a:stretch>
+        </p:blipFill>
+        <p:spPr>
+          <a:xfrm>
+            <a:off x="10709994" y="2442095"/>
+            <a:ext cx="944880" cy="708660"/>
+          </a:xfrm>
+          <a:prstGeom prst="rect">
+            <a:avLst/>
+          </a:prstGeom>
+        </p:spPr>
+      </p:pic>
+      <p:pic>
+        <p:nvPicPr>
+          <p:cNvPr id="250" name="图片 249">
+            <a:extLst>
+              <a:ext uri="{FF2B5EF4-FFF2-40B4-BE49-F238E27FC236}">
+                <a16:creationId xmlns:a16="http://schemas.microsoft.com/office/drawing/2014/main" id="{51D0E558-38A0-405F-A354-C19CADF2C0F7}"/>
+              </a:ext>
+            </a:extLst>
+          </p:cNvPr>
+          <p:cNvPicPr>
+            <a:picLocks noChangeAspect="1"/>
+          </p:cNvPicPr>
+          <p:nvPr/>
+        </p:nvPicPr>
+        <p:blipFill>
+          <a:blip r:embed="rId6" cstate="print">
+            <a:extLst>
+              <a:ext uri="{28A0092B-C50C-407E-A947-70E740481C1C}">
+                <a14:useLocalDpi xmlns:a14="http://schemas.microsoft.com/office/drawing/2010/main" val="0"/>
+              </a:ext>
+            </a:extLst>
+          </a:blip>
+          <a:stretch>
+            <a:fillRect/>
+          </a:stretch>
+        </p:blipFill>
+        <p:spPr>
+          <a:xfrm>
+            <a:off x="5587581" y="2549838"/>
+            <a:ext cx="632460" cy="474345"/>
+          </a:xfrm>
+          <a:prstGeom prst="rect">
+            <a:avLst/>
+          </a:prstGeom>
+        </p:spPr>
+      </p:pic>
+      <p:cxnSp>
+        <p:nvCxnSpPr>
+          <p:cNvPr id="280" name="Google Shape;10001;p124">
+            <a:extLst>
+              <a:ext uri="{FF2B5EF4-FFF2-40B4-BE49-F238E27FC236}">
+                <a16:creationId xmlns:a16="http://schemas.microsoft.com/office/drawing/2014/main" id="{073DC5AF-5F7A-473A-A2B5-51DED29B7C4F}"/>
+              </a:ext>
+            </a:extLst>
+          </p:cNvPr>
+          <p:cNvCxnSpPr>
+            <a:cxnSpLocks/>
+            <a:endCxn id="59" idx="2"/>
+          </p:cNvCxnSpPr>
+          <p:nvPr/>
+        </p:nvCxnSpPr>
+        <p:spPr>
+          <a:xfrm flipV="1">
+            <a:off x="3147237" y="2309419"/>
+            <a:ext cx="312584" cy="6424"/>
+          </a:xfrm>
+          <a:prstGeom prst="straightConnector1">
+            <a:avLst/>
+          </a:prstGeom>
+          <a:noFill/>
+          <a:ln w="19050" cap="flat" cmpd="sng">
+            <a:solidFill>
+              <a:srgbClr val="000000"/>
+            </a:solidFill>
+            <a:prstDash val="solid"/>
+            <a:round/>
+            <a:headEnd type="none" w="med" len="med"/>
+            <a:tailEnd type="triangle" w="med" len="med"/>
+          </a:ln>
+        </p:spPr>
+      </p:cxnSp>
+      <p:cxnSp>
+        <p:nvCxnSpPr>
+          <p:cNvPr id="287" name="连接符: 肘形 286">
+            <a:extLst>
+              <a:ext uri="{FF2B5EF4-FFF2-40B4-BE49-F238E27FC236}">
+                <a16:creationId xmlns:a16="http://schemas.microsoft.com/office/drawing/2014/main" id="{DB3DD867-C0FF-40CD-B542-547431D0FDBB}"/>
+              </a:ext>
+            </a:extLst>
+          </p:cNvPr>
+          <p:cNvCxnSpPr>
+            <a:cxnSpLocks/>
+            <a:stCxn id="107" idx="5"/>
+            <a:endCxn id="65" idx="4"/>
+          </p:cNvCxnSpPr>
+          <p:nvPr/>
+        </p:nvCxnSpPr>
+        <p:spPr>
+          <a:xfrm flipV="1">
+            <a:off x="3233548" y="3291380"/>
+            <a:ext cx="333698" cy="755251"/>
+          </a:xfrm>
+          <a:prstGeom prst="bentConnector2">
+            <a:avLst/>
+          </a:prstGeom>
+          <a:ln w="19050">
+            <a:solidFill>
+              <a:schemeClr val="tx1"/>
+            </a:solidFill>
+            <a:tailEnd type="triangle"/>
+          </a:ln>
+        </p:spPr>
+        <p:style>
+          <a:lnRef idx="1">
+            <a:schemeClr val="accent1"/>
+          </a:lnRef>
+          <a:fillRef idx="0">
+            <a:schemeClr val="accent1"/>
+          </a:fillRef>
+          <a:effectRef idx="0">
+            <a:schemeClr val="accent1"/>
+          </a:effectRef>
+          <a:fontRef idx="minor">
+            <a:schemeClr val="tx1"/>
+          </a:fontRef>
+        </p:style>
+      </p:cxnSp>
+      <p:cxnSp>
+        <p:nvCxnSpPr>
+          <p:cNvPr id="314" name="连接符: 肘形 313">
+            <a:extLst>
+              <a:ext uri="{FF2B5EF4-FFF2-40B4-BE49-F238E27FC236}">
+                <a16:creationId xmlns:a16="http://schemas.microsoft.com/office/drawing/2014/main" id="{885C49C5-80D2-4C97-9F47-4E4D3376427C}"/>
+              </a:ext>
+            </a:extLst>
+          </p:cNvPr>
+          <p:cNvCxnSpPr>
+            <a:cxnSpLocks/>
+            <a:endCxn id="75" idx="0"/>
+          </p:cNvCxnSpPr>
+          <p:nvPr/>
+        </p:nvCxnSpPr>
+        <p:spPr>
+          <a:xfrm>
+            <a:off x="4817745" y="2301664"/>
+            <a:ext cx="317461" cy="490158"/>
+          </a:xfrm>
+          <a:prstGeom prst="bentConnector3">
+            <a:avLst>
+              <a:gd name="adj1" fmla="val 50000"/>
+            </a:avLst>
+          </a:prstGeom>
+          <a:ln w="19050">
+            <a:solidFill>
+              <a:schemeClr val="tx1"/>
+            </a:solidFill>
+            <a:tailEnd type="triangle"/>
+          </a:ln>
+        </p:spPr>
+        <p:style>
+          <a:lnRef idx="1">
+            <a:schemeClr val="accent1"/>
+          </a:lnRef>
+          <a:fillRef idx="0">
+            <a:schemeClr val="accent1"/>
+          </a:fillRef>
+          <a:effectRef idx="0">
+            <a:schemeClr val="accent1"/>
+          </a:effectRef>
+          <a:fontRef idx="minor">
+            <a:schemeClr val="tx1"/>
+          </a:fontRef>
+        </p:style>
+      </p:cxnSp>
+      <p:cxnSp>
+        <p:nvCxnSpPr>
+          <p:cNvPr id="317" name="连接符: 肘形 316">
+            <a:extLst>
+              <a:ext uri="{FF2B5EF4-FFF2-40B4-BE49-F238E27FC236}">
+                <a16:creationId xmlns:a16="http://schemas.microsoft.com/office/drawing/2014/main" id="{0339B55F-A3C9-4D0C-8F6E-CC96C59E2415}"/>
+              </a:ext>
+            </a:extLst>
+          </p:cNvPr>
+          <p:cNvCxnSpPr>
+            <a:cxnSpLocks/>
+            <a:endCxn id="75" idx="0"/>
+          </p:cNvCxnSpPr>
+          <p:nvPr/>
+        </p:nvCxnSpPr>
+        <p:spPr>
+          <a:xfrm flipV="1">
+            <a:off x="4820975" y="2791822"/>
+            <a:ext cx="314231" cy="390150"/>
+          </a:xfrm>
+          <a:prstGeom prst="bentConnector3">
+            <a:avLst>
+              <a:gd name="adj1" fmla="val 50000"/>
+            </a:avLst>
+          </a:prstGeom>
+          <a:ln w="19050">
+            <a:solidFill>
+              <a:schemeClr val="tx1"/>
+            </a:solidFill>
+            <a:tailEnd type="triangle"/>
+          </a:ln>
+        </p:spPr>
+        <p:style>
+          <a:lnRef idx="1">
+            <a:schemeClr val="accent1"/>
+          </a:lnRef>
+          <a:fillRef idx="0">
+            <a:schemeClr val="accent1"/>
+          </a:fillRef>
+          <a:effectRef idx="0">
+            <a:schemeClr val="accent1"/>
+          </a:effectRef>
+          <a:fontRef idx="minor">
+            <a:schemeClr val="tx1"/>
+          </a:fontRef>
+        </p:style>
+      </p:cxnSp>
+      <p:cxnSp>
+        <p:nvCxnSpPr>
+          <p:cNvPr id="320" name="Google Shape;10001;p124">
+            <a:extLst>
+              <a:ext uri="{FF2B5EF4-FFF2-40B4-BE49-F238E27FC236}">
+                <a16:creationId xmlns:a16="http://schemas.microsoft.com/office/drawing/2014/main" id="{C87A0794-7B68-42C7-8D1A-247A38D8CD56}"/>
+              </a:ext>
+            </a:extLst>
+          </p:cNvPr>
+          <p:cNvCxnSpPr>
+            <a:cxnSpLocks/>
+            <a:stCxn id="65" idx="6"/>
+          </p:cNvCxnSpPr>
+          <p:nvPr/>
+        </p:nvCxnSpPr>
+        <p:spPr>
+          <a:xfrm>
+            <a:off x="3681546" y="3177080"/>
+            <a:ext cx="253454" cy="4892"/>
+          </a:xfrm>
+          <a:prstGeom prst="straightConnector1">
+            <a:avLst/>
+          </a:prstGeom>
+          <a:noFill/>
+          <a:ln w="19050" cap="flat" cmpd="sng">
+            <a:solidFill>
+              <a:srgbClr val="000000"/>
+            </a:solidFill>
+            <a:prstDash val="solid"/>
+            <a:round/>
+            <a:headEnd type="none" w="med" len="med"/>
+            <a:tailEnd type="triangle" w="med" len="med"/>
+          </a:ln>
+        </p:spPr>
+      </p:cxnSp>
+      <p:cxnSp>
+        <p:nvCxnSpPr>
+          <p:cNvPr id="323" name="Google Shape;10001;p124">
+            <a:extLst>
+              <a:ext uri="{FF2B5EF4-FFF2-40B4-BE49-F238E27FC236}">
+                <a16:creationId xmlns:a16="http://schemas.microsoft.com/office/drawing/2014/main" id="{B1C0DE76-3C9B-4950-8A29-A1AD4640F86C}"/>
+              </a:ext>
+            </a:extLst>
+          </p:cNvPr>
+          <p:cNvCxnSpPr>
+            <a:cxnSpLocks/>
+            <a:stCxn id="59" idx="6"/>
+          </p:cNvCxnSpPr>
+          <p:nvPr/>
+        </p:nvCxnSpPr>
+        <p:spPr>
+          <a:xfrm flipV="1">
+            <a:off x="3688421" y="2301664"/>
+            <a:ext cx="239754" cy="7755"/>
+          </a:xfrm>
+          <a:prstGeom prst="straightConnector1">
+            <a:avLst/>
+          </a:prstGeom>
+          <a:noFill/>
+          <a:ln w="19050" cap="flat" cmpd="sng">
+            <a:solidFill>
+              <a:srgbClr val="000000"/>
+            </a:solidFill>
+            <a:prstDash val="solid"/>
+            <a:round/>
+            <a:headEnd type="none" w="med" len="med"/>
+            <a:tailEnd type="triangle" w="med" len="med"/>
+          </a:ln>
+        </p:spPr>
+      </p:cxnSp>
+      <p:pic>
+        <p:nvPicPr>
+          <p:cNvPr id="329" name="图片 328">
+            <a:extLst>
+              <a:ext uri="{FF2B5EF4-FFF2-40B4-BE49-F238E27FC236}">
+                <a16:creationId xmlns:a16="http://schemas.microsoft.com/office/drawing/2014/main" id="{494EAEDB-8C5F-4FB3-B0F9-49D296BE5F81}"/>
+              </a:ext>
+            </a:extLst>
+          </p:cNvPr>
+          <p:cNvPicPr>
+            <a:picLocks noChangeAspect="1"/>
+          </p:cNvPicPr>
+          <p:nvPr/>
+        </p:nvPicPr>
+        <p:blipFill>
+          <a:blip r:embed="rId7"/>
+          <a:stretch>
+            <a:fillRect/>
+          </a:stretch>
+        </p:blipFill>
+        <p:spPr>
+          <a:xfrm>
+            <a:off x="205563" y="2424375"/>
+            <a:ext cx="933303" cy="699977"/>
+          </a:xfrm>
+          <a:prstGeom prst="rect">
+            <a:avLst/>
+          </a:prstGeom>
+        </p:spPr>
+      </p:pic>
+      <p:sp>
+        <p:nvSpPr>
+          <p:cNvPr id="208" name="Google Shape;8410;p96">
+            <a:extLst>
+              <a:ext uri="{FF2B5EF4-FFF2-40B4-BE49-F238E27FC236}">
+                <a16:creationId xmlns:a16="http://schemas.microsoft.com/office/drawing/2014/main" id="{4ABCCF5C-4DAA-4D33-A53E-F0291BAAF770}"/>
+              </a:ext>
+            </a:extLst>
+          </p:cNvPr>
+          <p:cNvSpPr txBox="1"/>
+          <p:nvPr/>
+        </p:nvSpPr>
+        <p:spPr>
+          <a:xfrm>
+            <a:off x="231740" y="2821804"/>
+            <a:ext cx="929666" cy="229951"/>
+          </a:xfrm>
+          <a:prstGeom prst="rect">
+            <a:avLst/>
+          </a:prstGeom>
+          <a:noFill/>
+          <a:ln>
+            <a:noFill/>
+          </a:ln>
+        </p:spPr>
+        <p:txBody>
+          <a:bodyPr spcFirstLastPara="1" wrap="square" lIns="91425" tIns="91425" rIns="91425" bIns="91425" anchor="t" anchorCtr="0">
+            <a:noAutofit/>
+          </a:bodyPr>
+          <a:lstStyle/>
+          <a:p>
+            <a:pPr marL="0" lvl="0" indent="0" algn="l" rtl="0">
+              <a:spcBef>
+                <a:spcPts val="0"/>
+              </a:spcBef>
+              <a:spcAft>
+                <a:spcPts val="0"/>
+              </a:spcAft>
+              <a:buNone/>
+            </a:pPr>
+            <a:r>
+              <a:rPr lang="en" sz="1000" b="1" dirty="0">
+                <a:solidFill>
+                  <a:schemeClr val="bg1"/>
+                </a:solidFill>
+              </a:rPr>
+              <a:t>Input visible</a:t>
+            </a:r>
+            <a:endParaRPr sz="1000" b="1" dirty="0">
+              <a:solidFill>
+                <a:schemeClr val="bg1"/>
+              </a:solidFill>
+            </a:endParaRPr>
+          </a:p>
+        </p:txBody>
+      </p:sp>
+      <p:pic>
+        <p:nvPicPr>
+          <p:cNvPr id="87" name="图片 86">
+            <a:extLst>
+              <a:ext uri="{FF2B5EF4-FFF2-40B4-BE49-F238E27FC236}">
+                <a16:creationId xmlns:a16="http://schemas.microsoft.com/office/drawing/2014/main" id="{035651A4-7014-4533-8354-DC46F961C59B}"/>
+              </a:ext>
+            </a:extLst>
+          </p:cNvPr>
+          <p:cNvPicPr>
+            <a:picLocks noChangeAspect="1"/>
+          </p:cNvPicPr>
+          <p:nvPr/>
+        </p:nvPicPr>
+        <p:blipFill>
+          <a:blip r:embed="rId8" cstate="print">
+            <a:extLst>
+              <a:ext uri="{28A0092B-C50C-407E-A947-70E740481C1C}">
+                <a14:useLocalDpi xmlns:a14="http://schemas.microsoft.com/office/drawing/2010/main" val="0"/>
+              </a:ext>
+            </a:extLst>
+          </a:blip>
+          <a:stretch>
+            <a:fillRect/>
+          </a:stretch>
+        </p:blipFill>
+        <p:spPr>
+          <a:xfrm>
+            <a:off x="207025" y="1164237"/>
+            <a:ext cx="930323" cy="697742"/>
+          </a:xfrm>
+          <a:prstGeom prst="rect">
+            <a:avLst/>
+          </a:prstGeom>
+        </p:spPr>
+      </p:pic>
+      <p:sp>
+        <p:nvSpPr>
+          <p:cNvPr id="88" name="Google Shape;8975;p108">
+            <a:extLst>
+              <a:ext uri="{FF2B5EF4-FFF2-40B4-BE49-F238E27FC236}">
+                <a16:creationId xmlns:a16="http://schemas.microsoft.com/office/drawing/2014/main" id="{204AAD3D-FBE2-452C-A0A5-055307CC184A}"/>
+              </a:ext>
+            </a:extLst>
+          </p:cNvPr>
+          <p:cNvSpPr/>
+          <p:nvPr/>
+        </p:nvSpPr>
+        <p:spPr>
+          <a:xfrm rot="16200000">
+            <a:off x="1181252" y="1432709"/>
+            <a:ext cx="528505" cy="203643"/>
+          </a:xfrm>
+          <a:prstGeom prst="rect">
+            <a:avLst/>
+          </a:prstGeom>
+          <a:solidFill>
+            <a:schemeClr val="accent5">
+              <a:lumMod val="40000"/>
+              <a:lumOff val="60000"/>
+            </a:schemeClr>
+          </a:solidFill>
+          <a:ln w="9525" cap="flat" cmpd="sng">
+            <a:solidFill>
+              <a:schemeClr val="dk2"/>
+            </a:solidFill>
+            <a:prstDash val="solid"/>
+            <a:round/>
+            <a:headEnd type="none" w="sm" len="sm"/>
+            <a:tailEnd type="none" w="sm" len="sm"/>
+          </a:ln>
+        </p:spPr>
+        <p:txBody>
+          <a:bodyPr spcFirstLastPara="1" wrap="square" lIns="91425" tIns="91425" rIns="91425" bIns="91425" anchor="ctr" anchorCtr="0">
+            <a:noAutofit/>
+          </a:bodyPr>
+          <a:lstStyle/>
+          <a:p>
+            <a:pPr marL="0" lvl="0" indent="0" algn="ctr" rtl="0">
+              <a:spcBef>
+                <a:spcPts val="0"/>
+              </a:spcBef>
+              <a:spcAft>
+                <a:spcPts val="0"/>
+              </a:spcAft>
+              <a:buNone/>
+            </a:pPr>
+            <a:r>
+              <a:rPr lang="en" sz="1200" b="1" dirty="0"/>
+              <a:t>FFT</a:t>
+            </a:r>
+            <a:endParaRPr sz="1200" b="1" dirty="0"/>
+          </a:p>
+        </p:txBody>
+      </p:sp>
+      <p:sp>
+        <p:nvSpPr>
+          <p:cNvPr id="91" name="Google Shape;6733;p68">
+            <a:extLst>
+              <a:ext uri="{FF2B5EF4-FFF2-40B4-BE49-F238E27FC236}">
+                <a16:creationId xmlns:a16="http://schemas.microsoft.com/office/drawing/2014/main" id="{A9EDF56E-F89F-49F6-B315-9DF9F5901FA5}"/>
+              </a:ext>
+            </a:extLst>
+          </p:cNvPr>
+          <p:cNvSpPr/>
+          <p:nvPr/>
+        </p:nvSpPr>
+        <p:spPr>
+          <a:xfrm>
+            <a:off x="2903678" y="1341687"/>
+            <a:ext cx="192487" cy="482400"/>
+          </a:xfrm>
+          <a:prstGeom prst="cube">
+            <a:avLst>
+              <a:gd name="adj" fmla="val 78947"/>
+            </a:avLst>
+          </a:prstGeom>
+          <a:solidFill>
+            <a:schemeClr val="accent2">
+              <a:lumMod val="60000"/>
+              <a:lumOff val="40000"/>
+              <a:alpha val="39660"/>
+            </a:schemeClr>
+          </a:solidFill>
+          <a:ln w="9525" cap="flat" cmpd="sng">
+            <a:solidFill>
+              <a:schemeClr val="accent3">
+                <a:lumMod val="75000"/>
+              </a:schemeClr>
+            </a:solidFill>
+            <a:prstDash val="solid"/>
+            <a:round/>
+            <a:headEnd type="none" w="sm" len="sm"/>
+            <a:tailEnd type="none" w="sm" len="sm"/>
+          </a:ln>
+        </p:spPr>
+        <p:txBody>
+          <a:bodyPr spcFirstLastPara="1" wrap="square" lIns="91425" tIns="91425" rIns="91425" bIns="91425" anchor="ctr" anchorCtr="0">
+            <a:noAutofit/>
+          </a:bodyPr>
+          <a:lstStyle/>
+          <a:p>
+            <a:pPr marL="0" lvl="0" indent="0" algn="l" rtl="0">
+              <a:spcBef>
+                <a:spcPts val="0"/>
+              </a:spcBef>
+              <a:spcAft>
+                <a:spcPts val="0"/>
+              </a:spcAft>
+              <a:buNone/>
+            </a:pPr>
+            <a:endParaRPr dirty="0"/>
+          </a:p>
+        </p:txBody>
+      </p:sp>
+      <mc:AlternateContent xmlns:mc="http://schemas.openxmlformats.org/markup-compatibility/2006">
+        <mc:Choice xmlns:a14="http://schemas.microsoft.com/office/drawing/2010/main" Requires="a14">
+          <p:sp>
+            <p:nvSpPr>
+              <p:cNvPr id="92" name="Google Shape;10169;p131">
+                <a:extLst>
+                  <a:ext uri="{FF2B5EF4-FFF2-40B4-BE49-F238E27FC236}">
+                    <a16:creationId xmlns:a16="http://schemas.microsoft.com/office/drawing/2014/main" id="{AE2AE121-F00A-4615-8CDD-3D97F2D6C7BF}"/>
+                  </a:ext>
+                </a:extLst>
+              </p:cNvPr>
+              <p:cNvSpPr/>
+              <p:nvPr/>
+            </p:nvSpPr>
+            <p:spPr>
+              <a:xfrm>
+                <a:off x="2166164" y="1375041"/>
+                <a:ext cx="393310" cy="319275"/>
+              </a:xfrm>
+              <a:prstGeom prst="roundRect">
+                <a:avLst>
+                  <a:gd name="adj" fmla="val 16667"/>
+                </a:avLst>
+              </a:prstGeom>
+              <a:noFill/>
+              <a:ln w="12700" cap="flat" cmpd="sng">
+                <a:solidFill>
+                  <a:schemeClr val="tx1"/>
+                </a:solidFill>
+                <a:prstDash val="solid"/>
+                <a:round/>
+                <a:headEnd type="none" w="sm" len="sm"/>
+                <a:tailEnd type="none" w="sm" len="sm"/>
+              </a:ln>
+            </p:spPr>
+            <p:txBody>
+              <a:bodyPr spcFirstLastPara="1" wrap="square" lIns="91425" tIns="91425" rIns="91425" bIns="91425" anchor="ctr" anchorCtr="0">
+                <a:noAutofit/>
+              </a:bodyPr>
+              <a:lstStyle/>
+              <a:p>
+                <a:pPr marL="0" lvl="0" indent="0" algn="ctr" rtl="0">
+                  <a:spcBef>
+                    <a:spcPts val="0"/>
+                  </a:spcBef>
+                  <a:spcAft>
+                    <a:spcPts val="0"/>
+                  </a:spcAft>
+                  <a:buNone/>
+                </a:pPr>
+                <a14:m>
+                  <m:oMathPara xmlns:m="http://schemas.openxmlformats.org/officeDocument/2006/math">
+                    <m:oMathParaPr>
+                      <m:jc m:val="centerGroup"/>
+                    </m:oMathParaPr>
+                    <m:oMath xmlns:m="http://schemas.openxmlformats.org/officeDocument/2006/math">
+                      <m:sSub>
+                        <m:sSubPr>
+                          <m:ctrlPr>
+                            <a:rPr lang="pt-BR" altLang="zh-CN" sz="1800" b="1" i="1" smtClean="0">
+                              <a:latin typeface="Cambria Math" panose="02040503050406030204" pitchFamily="18" charset="0"/>
+                            </a:rPr>
+                          </m:ctrlPr>
+                        </m:sSubPr>
+                        <m:e>
+                          <m:r>
+                            <a:rPr lang="en-US" altLang="zh-CN" sz="1800" b="1" i="1" smtClean="0">
+                              <a:latin typeface="Cambria Math" panose="02040503050406030204" pitchFamily="18" charset="0"/>
+                            </a:rPr>
+                            <m:t>𝑷</m:t>
+                          </m:r>
+                        </m:e>
+                        <m:sub>
+                          <m:r>
+                            <m:rPr>
+                              <m:sty m:val="p"/>
+                            </m:rPr>
+                            <a:rPr lang="en-US" altLang="zh-CN" b="1" i="1">
+                              <a:latin typeface="Cambria Math" panose="02040503050406030204" pitchFamily="18" charset="0"/>
+                            </a:rPr>
+                            <m:t>i</m:t>
+                          </m:r>
+                        </m:sub>
+                      </m:sSub>
+                    </m:oMath>
+                  </m:oMathPara>
+                </a14:m>
+                <a:endParaRPr dirty="0">
+                  <a:latin typeface="Times New Roman"/>
+                  <a:ea typeface="Times New Roman"/>
+                  <a:cs typeface="Times New Roman"/>
+                  <a:sym typeface="Times New Roman"/>
+                </a:endParaRPr>
+              </a:p>
+            </p:txBody>
+          </p:sp>
+        </mc:Choice>
+        <mc:Fallback>
+          <p:sp>
+            <p:nvSpPr>
+              <p:cNvPr id="92" name="Google Shape;10169;p131">
+                <a:extLst>
+                  <a:ext uri="{FF2B5EF4-FFF2-40B4-BE49-F238E27FC236}">
+                    <a16:creationId xmlns:a16="http://schemas.microsoft.com/office/drawing/2014/main" id="{AE2AE121-F00A-4615-8CDD-3D97F2D6C7BF}"/>
+                  </a:ext>
+                </a:extLst>
+              </p:cNvPr>
+              <p:cNvSpPr>
+                <a:spLocks noRot="1" noChangeAspect="1" noMove="1" noResize="1" noEditPoints="1" noAdjustHandles="1" noChangeArrowheads="1" noChangeShapeType="1" noTextEdit="1"/>
+              </p:cNvSpPr>
+              <p:nvPr/>
+            </p:nvSpPr>
+            <p:spPr>
+              <a:xfrm>
+                <a:off x="2166164" y="1375041"/>
+                <a:ext cx="393310" cy="319275"/>
+              </a:xfrm>
+              <a:prstGeom prst="roundRect">
+                <a:avLst>
+                  <a:gd name="adj" fmla="val 16667"/>
+                </a:avLst>
+              </a:prstGeom>
+              <a:blipFill>
+                <a:blip r:embed="rId9"/>
+                <a:stretch>
+                  <a:fillRect l="-4478" b="-9259"/>
+                </a:stretch>
+              </a:blipFill>
+              <a:ln w="12700" cap="flat" cmpd="sng">
+                <a:solidFill>
+                  <a:schemeClr val="tx1"/>
+                </a:solidFill>
+                <a:prstDash val="solid"/>
+                <a:round/>
+                <a:headEnd type="none" w="sm" len="sm"/>
+                <a:tailEnd type="none" w="sm" len="sm"/>
+              </a:ln>
+            </p:spPr>
+            <p:txBody>
+              <a:bodyPr/>
+              <a:lstStyle/>
+              <a:p>
+                <a:r>
+                  <a:rPr lang="zh-CN" altLang="en-US">
+                    <a:noFill/>
+                  </a:rPr>
+                  <a:t> </a:t>
+                </a:r>
+              </a:p>
+            </p:txBody>
+          </p:sp>
+        </mc:Fallback>
+      </mc:AlternateContent>
+      <p:cxnSp>
+        <p:nvCxnSpPr>
+          <p:cNvPr id="93" name="Google Shape;10001;p124">
+            <a:extLst>
+              <a:ext uri="{FF2B5EF4-FFF2-40B4-BE49-F238E27FC236}">
+                <a16:creationId xmlns:a16="http://schemas.microsoft.com/office/drawing/2014/main" id="{8EEEA357-4CEF-4114-BD25-379D0234E99D}"/>
+              </a:ext>
+            </a:extLst>
+          </p:cNvPr>
+          <p:cNvCxnSpPr>
+            <a:cxnSpLocks/>
+            <a:stCxn id="92" idx="3"/>
+          </p:cNvCxnSpPr>
+          <p:nvPr/>
+        </p:nvCxnSpPr>
+        <p:spPr>
+          <a:xfrm>
+            <a:off x="2559474" y="1534679"/>
+            <a:ext cx="315952" cy="0"/>
+          </a:xfrm>
+          <a:prstGeom prst="straightConnector1">
+            <a:avLst/>
+          </a:prstGeom>
+          <a:noFill/>
+          <a:ln w="19050" cap="flat" cmpd="sng">
+            <a:solidFill>
+              <a:srgbClr val="000000"/>
+            </a:solidFill>
+            <a:prstDash val="solid"/>
+            <a:round/>
+            <a:headEnd type="none" w="med" len="med"/>
+            <a:tailEnd type="triangle" w="med" len="med"/>
+          </a:ln>
+        </p:spPr>
+      </p:cxnSp>
+      <p:cxnSp>
+        <p:nvCxnSpPr>
+          <p:cNvPr id="94" name="Google Shape;10001;p124">
+            <a:extLst>
+              <a:ext uri="{FF2B5EF4-FFF2-40B4-BE49-F238E27FC236}">
+                <a16:creationId xmlns:a16="http://schemas.microsoft.com/office/drawing/2014/main" id="{7B333EBF-978F-43FE-8637-6DC4F72564C8}"/>
+              </a:ext>
+            </a:extLst>
+          </p:cNvPr>
+          <p:cNvCxnSpPr>
+            <a:cxnSpLocks/>
+            <a:endCxn id="88" idx="0"/>
+          </p:cNvCxnSpPr>
+          <p:nvPr/>
+        </p:nvCxnSpPr>
+        <p:spPr>
+          <a:xfrm flipV="1">
+            <a:off x="1137280" y="1534530"/>
+            <a:ext cx="206403" cy="860"/>
+          </a:xfrm>
+          <a:prstGeom prst="straightConnector1">
+            <a:avLst/>
+          </a:prstGeom>
+          <a:noFill/>
+          <a:ln w="19050" cap="flat" cmpd="sng">
+            <a:solidFill>
+              <a:srgbClr val="000000"/>
+            </a:solidFill>
+            <a:prstDash val="solid"/>
+            <a:round/>
+            <a:headEnd type="none" w="med" len="med"/>
+            <a:tailEnd type="triangle" w="med" len="med"/>
+          </a:ln>
+        </p:spPr>
+      </p:cxnSp>
+      <p:cxnSp>
+        <p:nvCxnSpPr>
+          <p:cNvPr id="95" name="Google Shape;10001;p124">
+            <a:extLst>
+              <a:ext uri="{FF2B5EF4-FFF2-40B4-BE49-F238E27FC236}">
+                <a16:creationId xmlns:a16="http://schemas.microsoft.com/office/drawing/2014/main" id="{B405EA45-734D-413D-9981-5B9F957DF37C}"/>
+              </a:ext>
+            </a:extLst>
+          </p:cNvPr>
+          <p:cNvCxnSpPr>
+            <a:cxnSpLocks/>
+            <a:stCxn id="88" idx="2"/>
+            <a:endCxn id="92" idx="1"/>
+          </p:cNvCxnSpPr>
+          <p:nvPr/>
+        </p:nvCxnSpPr>
+        <p:spPr>
+          <a:xfrm>
+            <a:off x="1547326" y="1534530"/>
+            <a:ext cx="618838" cy="149"/>
+          </a:xfrm>
+          <a:prstGeom prst="straightConnector1">
+            <a:avLst/>
+          </a:prstGeom>
+          <a:noFill/>
+          <a:ln w="19050" cap="flat" cmpd="sng">
+            <a:solidFill>
+              <a:srgbClr val="000000"/>
+            </a:solidFill>
+            <a:prstDash val="solid"/>
+            <a:round/>
+            <a:headEnd type="none" w="med" len="med"/>
+            <a:tailEnd type="triangle" w="med" len="med"/>
+          </a:ln>
+        </p:spPr>
+      </p:cxnSp>
+      <p:sp>
+        <p:nvSpPr>
+          <p:cNvPr id="96" name="Google Shape;8410;p96">
+            <a:extLst>
+              <a:ext uri="{FF2B5EF4-FFF2-40B4-BE49-F238E27FC236}">
+                <a16:creationId xmlns:a16="http://schemas.microsoft.com/office/drawing/2014/main" id="{EFCE6FCF-1A25-47CD-A4D6-A9A5354872F0}"/>
+              </a:ext>
+            </a:extLst>
+          </p:cNvPr>
+          <p:cNvSpPr txBox="1"/>
+          <p:nvPr/>
+        </p:nvSpPr>
+        <p:spPr>
+          <a:xfrm>
+            <a:off x="184800" y="1563435"/>
+            <a:ext cx="1027610" cy="229822"/>
+          </a:xfrm>
+          <a:prstGeom prst="rect">
+            <a:avLst/>
+          </a:prstGeom>
+          <a:noFill/>
+          <a:ln>
+            <a:noFill/>
+          </a:ln>
+        </p:spPr>
+        <p:txBody>
+          <a:bodyPr spcFirstLastPara="1" wrap="square" lIns="91425" tIns="91425" rIns="91425" bIns="91425" anchor="t" anchorCtr="0">
+            <a:noAutofit/>
+          </a:bodyPr>
+          <a:lstStyle/>
+          <a:p>
+            <a:pPr marL="0" lvl="0" indent="0" algn="l" rtl="0">
+              <a:spcBef>
+                <a:spcPts val="0"/>
+              </a:spcBef>
+              <a:spcAft>
+                <a:spcPts val="0"/>
+              </a:spcAft>
+              <a:buNone/>
+            </a:pPr>
+            <a:r>
+              <a:rPr lang="en" sz="1000" b="1" dirty="0">
+                <a:solidFill>
+                  <a:schemeClr val="bg1"/>
+                </a:solidFill>
+              </a:rPr>
+              <a:t>Input Infrared</a:t>
+            </a:r>
+            <a:endParaRPr sz="1000" b="1" dirty="0">
+              <a:solidFill>
+                <a:schemeClr val="bg1"/>
+              </a:solidFill>
+            </a:endParaRPr>
+          </a:p>
+        </p:txBody>
+      </p:sp>
+      <p:sp>
+        <p:nvSpPr>
+          <p:cNvPr id="107" name="Google Shape;6733;p68">
+            <a:extLst>
+              <a:ext uri="{FF2B5EF4-FFF2-40B4-BE49-F238E27FC236}">
+                <a16:creationId xmlns:a16="http://schemas.microsoft.com/office/drawing/2014/main" id="{DE5E4403-69F9-4A56-A94F-996F3F63212D}"/>
+              </a:ext>
+            </a:extLst>
+          </p:cNvPr>
+          <p:cNvSpPr/>
+          <p:nvPr/>
+        </p:nvSpPr>
+        <p:spPr>
+          <a:xfrm>
+            <a:off x="3041061" y="3881412"/>
+            <a:ext cx="192487" cy="482400"/>
+          </a:xfrm>
+          <a:prstGeom prst="cube">
+            <a:avLst>
+              <a:gd name="adj" fmla="val 78947"/>
+            </a:avLst>
+          </a:prstGeom>
+          <a:solidFill>
+            <a:schemeClr val="accent2">
+              <a:lumMod val="60000"/>
+              <a:lumOff val="40000"/>
+              <a:alpha val="39660"/>
+            </a:schemeClr>
+          </a:solidFill>
+          <a:ln w="9525" cap="flat" cmpd="sng">
+            <a:solidFill>
+              <a:schemeClr val="accent3">
+                <a:lumMod val="75000"/>
+              </a:schemeClr>
+            </a:solidFill>
+            <a:prstDash val="solid"/>
+            <a:round/>
+            <a:headEnd type="none" w="sm" len="sm"/>
+            <a:tailEnd type="none" w="sm" len="sm"/>
+          </a:ln>
+        </p:spPr>
+        <p:txBody>
+          <a:bodyPr spcFirstLastPara="1" wrap="square" lIns="91425" tIns="91425" rIns="91425" bIns="91425" anchor="ctr" anchorCtr="0">
+            <a:noAutofit/>
+          </a:bodyPr>
+          <a:lstStyle/>
+          <a:p>
+            <a:pPr marL="0" lvl="0" indent="0" algn="l" rtl="0">
+              <a:spcBef>
+                <a:spcPts val="0"/>
+              </a:spcBef>
+              <a:spcAft>
+                <a:spcPts val="0"/>
+              </a:spcAft>
+              <a:buNone/>
+            </a:pPr>
+            <a:endParaRPr/>
+          </a:p>
+        </p:txBody>
+      </p:sp>
+      <p:sp>
+        <p:nvSpPr>
+          <p:cNvPr id="113" name="Google Shape;8410;p96">
+            <a:extLst>
+              <a:ext uri="{FF2B5EF4-FFF2-40B4-BE49-F238E27FC236}">
+                <a16:creationId xmlns:a16="http://schemas.microsoft.com/office/drawing/2014/main" id="{2DA835C3-9D78-4DA2-8E29-20CE07590EE0}"/>
+              </a:ext>
+            </a:extLst>
+          </p:cNvPr>
+          <p:cNvSpPr txBox="1"/>
+          <p:nvPr/>
+        </p:nvSpPr>
+        <p:spPr>
+          <a:xfrm rot="16200000">
+            <a:off x="3272413" y="3487809"/>
+            <a:ext cx="685927" cy="272565"/>
+          </a:xfrm>
+          <a:prstGeom prst="rect">
+            <a:avLst/>
+          </a:prstGeom>
+          <a:noFill/>
+          <a:ln>
+            <a:noFill/>
+          </a:ln>
+        </p:spPr>
+        <p:txBody>
+          <a:bodyPr spcFirstLastPara="1" wrap="square" lIns="91425" tIns="91425" rIns="91425" bIns="91425" anchor="t" anchorCtr="0">
+            <a:noAutofit/>
+          </a:bodyPr>
+          <a:lstStyle/>
+          <a:p>
+            <a:r>
+              <a:rPr lang="en-US" altLang="zh-CN" sz="1200" b="1" dirty="0">
+                <a:latin typeface="华文隶书" panose="02010800040101010101" pitchFamily="2" charset="-122"/>
+                <a:ea typeface="华文隶书" panose="02010800040101010101" pitchFamily="2" charset="-122"/>
+              </a:rPr>
+              <a:t>sigmoid</a:t>
+            </a:r>
+            <a:endParaRPr sz="1200" b="1" dirty="0">
+              <a:latin typeface="华文隶书" panose="02010800040101010101" pitchFamily="2" charset="-122"/>
+              <a:ea typeface="华文隶书" panose="02010800040101010101" pitchFamily="2" charset="-122"/>
+            </a:endParaRPr>
+          </a:p>
+        </p:txBody>
+      </p:sp>
+      <p:pic>
+        <p:nvPicPr>
+          <p:cNvPr id="114" name="图片 113">
+            <a:extLst>
+              <a:ext uri="{FF2B5EF4-FFF2-40B4-BE49-F238E27FC236}">
+                <a16:creationId xmlns:a16="http://schemas.microsoft.com/office/drawing/2014/main" id="{6C7B8274-4245-44F4-BD94-AB20EC44758F}"/>
+              </a:ext>
+            </a:extLst>
+          </p:cNvPr>
+          <p:cNvPicPr>
+            <a:picLocks noChangeAspect="1"/>
+          </p:cNvPicPr>
+          <p:nvPr/>
+        </p:nvPicPr>
+        <p:blipFill>
+          <a:blip r:embed="rId10" cstate="print">
+            <a:extLst>
+              <a:ext uri="{28A0092B-C50C-407E-A947-70E740481C1C}">
+                <a14:useLocalDpi xmlns:a14="http://schemas.microsoft.com/office/drawing/2010/main" val="0"/>
+              </a:ext>
+            </a:extLst>
+          </a:blip>
+          <a:stretch>
+            <a:fillRect/>
+          </a:stretch>
+        </p:blipFill>
+        <p:spPr>
+          <a:xfrm>
+            <a:off x="3959551" y="2819723"/>
+            <a:ext cx="889570" cy="667178"/>
+          </a:xfrm>
+          <a:prstGeom prst="rect">
+            <a:avLst/>
+          </a:prstGeom>
+        </p:spPr>
+      </p:pic>
+      <p:pic>
+        <p:nvPicPr>
+          <p:cNvPr id="115" name="图片 114">
+            <a:extLst>
+              <a:ext uri="{FF2B5EF4-FFF2-40B4-BE49-F238E27FC236}">
+                <a16:creationId xmlns:a16="http://schemas.microsoft.com/office/drawing/2014/main" id="{C4DFBF88-FE41-45F6-9708-6C69D4FD4D5F}"/>
+              </a:ext>
+            </a:extLst>
+          </p:cNvPr>
+          <p:cNvPicPr>
+            <a:picLocks noChangeAspect="1"/>
+          </p:cNvPicPr>
+          <p:nvPr/>
+        </p:nvPicPr>
+        <p:blipFill>
+          <a:blip r:embed="rId11" cstate="print">
+            <a:extLst>
+              <a:ext uri="{28A0092B-C50C-407E-A947-70E740481C1C}">
+                <a14:useLocalDpi xmlns:a14="http://schemas.microsoft.com/office/drawing/2010/main" val="0"/>
+              </a:ext>
+            </a:extLst>
+          </a:blip>
+          <a:stretch>
+            <a:fillRect/>
+          </a:stretch>
+        </p:blipFill>
+        <p:spPr>
+          <a:xfrm>
+            <a:off x="3926036" y="1953259"/>
+            <a:ext cx="885975" cy="664481"/>
+          </a:xfrm>
+          <a:prstGeom prst="rect">
+            <a:avLst/>
+          </a:prstGeom>
+        </p:spPr>
+      </p:pic>
+      <p:sp>
+        <p:nvSpPr>
+          <p:cNvPr id="116" name="Google Shape;8975;p108">
+            <a:extLst>
+              <a:ext uri="{FF2B5EF4-FFF2-40B4-BE49-F238E27FC236}">
+                <a16:creationId xmlns:a16="http://schemas.microsoft.com/office/drawing/2014/main" id="{A5679E3B-99DC-445B-99DC-05D93C8F44F6}"/>
+              </a:ext>
+            </a:extLst>
+          </p:cNvPr>
+          <p:cNvSpPr/>
+          <p:nvPr/>
+        </p:nvSpPr>
+        <p:spPr>
+          <a:xfrm rot="16200000">
+            <a:off x="1771578" y="4032466"/>
+            <a:ext cx="528505" cy="203643"/>
+          </a:xfrm>
+          <a:prstGeom prst="rect">
+            <a:avLst/>
+          </a:prstGeom>
+          <a:solidFill>
+            <a:schemeClr val="accent5">
+              <a:lumMod val="40000"/>
+              <a:lumOff val="60000"/>
+            </a:schemeClr>
+          </a:solidFill>
+          <a:ln w="9525" cap="flat" cmpd="sng">
+            <a:solidFill>
+              <a:schemeClr val="dk2"/>
+            </a:solidFill>
+            <a:prstDash val="solid"/>
+            <a:round/>
+            <a:headEnd type="none" w="sm" len="sm"/>
+            <a:tailEnd type="none" w="sm" len="sm"/>
+          </a:ln>
+        </p:spPr>
+        <p:txBody>
+          <a:bodyPr spcFirstLastPara="1" wrap="square" lIns="91425" tIns="91425" rIns="91425" bIns="91425" anchor="ctr" anchorCtr="0">
+            <a:noAutofit/>
+          </a:bodyPr>
+          <a:lstStyle/>
+          <a:p>
+            <a:pPr marL="0" lvl="0" indent="0" algn="ctr" rtl="0">
+              <a:spcBef>
+                <a:spcPts val="0"/>
+              </a:spcBef>
+              <a:spcAft>
+                <a:spcPts val="0"/>
+              </a:spcAft>
+              <a:buNone/>
+            </a:pPr>
+            <a:r>
+              <a:rPr lang="en" sz="1200" b="1" dirty="0"/>
+              <a:t>FFT</a:t>
+            </a:r>
+            <a:endParaRPr sz="1200" b="1" dirty="0"/>
+          </a:p>
+        </p:txBody>
+      </p:sp>
+      <mc:AlternateContent xmlns:mc="http://schemas.openxmlformats.org/markup-compatibility/2006">
+        <mc:Choice xmlns:a14="http://schemas.microsoft.com/office/drawing/2010/main" Requires="a14">
+          <p:sp>
+            <p:nvSpPr>
+              <p:cNvPr id="117" name="Google Shape;10169;p131">
+                <a:extLst>
+                  <a:ext uri="{FF2B5EF4-FFF2-40B4-BE49-F238E27FC236}">
+                    <a16:creationId xmlns:a16="http://schemas.microsoft.com/office/drawing/2014/main" id="{55FFA95A-6487-40BD-88FF-685CCB629647}"/>
+                  </a:ext>
+                </a:extLst>
+              </p:cNvPr>
+              <p:cNvSpPr/>
+              <p:nvPr/>
+            </p:nvSpPr>
+            <p:spPr>
+              <a:xfrm>
+                <a:off x="2416279" y="3971905"/>
+                <a:ext cx="393310" cy="319275"/>
+              </a:xfrm>
+              <a:prstGeom prst="roundRect">
+                <a:avLst>
+                  <a:gd name="adj" fmla="val 16667"/>
+                </a:avLst>
+              </a:prstGeom>
+              <a:noFill/>
+              <a:ln w="12700" cap="flat" cmpd="sng">
+                <a:solidFill>
+                  <a:schemeClr val="tx1"/>
+                </a:solidFill>
+                <a:prstDash val="solid"/>
+                <a:round/>
+                <a:headEnd type="none" w="sm" len="sm"/>
+                <a:tailEnd type="none" w="sm" len="sm"/>
+              </a:ln>
+            </p:spPr>
+            <p:txBody>
+              <a:bodyPr spcFirstLastPara="1" wrap="square" lIns="91425" tIns="91425" rIns="91425" bIns="91425" anchor="ctr" anchorCtr="0">
+                <a:noAutofit/>
+              </a:bodyPr>
+              <a:lstStyle/>
+              <a:p>
+                <a:pPr marL="0" lvl="0" indent="0" algn="ctr" rtl="0">
+                  <a:spcBef>
+                    <a:spcPts val="0"/>
+                  </a:spcBef>
+                  <a:spcAft>
+                    <a:spcPts val="0"/>
+                  </a:spcAft>
+                  <a:buNone/>
+                </a:pPr>
+                <a14:m>
+                  <m:oMathPara xmlns:m="http://schemas.openxmlformats.org/officeDocument/2006/math">
+                    <m:oMathParaPr>
+                      <m:jc m:val="centerGroup"/>
+                    </m:oMathParaPr>
+                    <m:oMath xmlns:m="http://schemas.openxmlformats.org/officeDocument/2006/math">
+                      <m:sSub>
+                        <m:sSubPr>
+                          <m:ctrlPr>
+                            <a:rPr lang="pt-BR" altLang="zh-CN" sz="1800" b="1" i="1" smtClean="0">
+                              <a:latin typeface="Cambria Math" panose="02040503050406030204" pitchFamily="18" charset="0"/>
+                            </a:rPr>
+                          </m:ctrlPr>
+                        </m:sSubPr>
+                        <m:e>
+                          <m:r>
+                            <a:rPr lang="en-US" altLang="zh-CN" sz="1800" b="1" i="1" smtClean="0">
+                              <a:latin typeface="Cambria Math" panose="02040503050406030204" pitchFamily="18" charset="0"/>
+                            </a:rPr>
+                            <m:t>𝑨</m:t>
+                          </m:r>
+                        </m:e>
+                        <m:sub>
+                          <m:r>
+                            <a:rPr lang="en-US" altLang="zh-CN" sz="1800" b="1" i="1" smtClean="0">
+                              <a:latin typeface="Cambria Math" panose="02040503050406030204" pitchFamily="18" charset="0"/>
+                            </a:rPr>
+                            <m:t>𝒗</m:t>
+                          </m:r>
+                        </m:sub>
+                      </m:sSub>
+                    </m:oMath>
+                  </m:oMathPara>
+                </a14:m>
+                <a:endParaRPr dirty="0">
+                  <a:latin typeface="Times New Roman"/>
+                  <a:ea typeface="Times New Roman"/>
+                  <a:cs typeface="Times New Roman"/>
+                  <a:sym typeface="Times New Roman"/>
+                </a:endParaRPr>
+              </a:p>
+            </p:txBody>
+          </p:sp>
+        </mc:Choice>
+        <mc:Fallback>
+          <p:sp>
+            <p:nvSpPr>
+              <p:cNvPr id="117" name="Google Shape;10169;p131">
+                <a:extLst>
+                  <a:ext uri="{FF2B5EF4-FFF2-40B4-BE49-F238E27FC236}">
+                    <a16:creationId xmlns:a16="http://schemas.microsoft.com/office/drawing/2014/main" id="{55FFA95A-6487-40BD-88FF-685CCB629647}"/>
+                  </a:ext>
+                </a:extLst>
+              </p:cNvPr>
+              <p:cNvSpPr>
+                <a:spLocks noRot="1" noChangeAspect="1" noMove="1" noResize="1" noEditPoints="1" noAdjustHandles="1" noChangeArrowheads="1" noChangeShapeType="1" noTextEdit="1"/>
+              </p:cNvSpPr>
+              <p:nvPr/>
+            </p:nvSpPr>
+            <p:spPr>
+              <a:xfrm>
+                <a:off x="2416279" y="3971905"/>
+                <a:ext cx="393310" cy="319275"/>
+              </a:xfrm>
+              <a:prstGeom prst="roundRect">
+                <a:avLst>
+                  <a:gd name="adj" fmla="val 16667"/>
+                </a:avLst>
+              </a:prstGeom>
+              <a:blipFill>
+                <a:blip r:embed="rId12"/>
+                <a:stretch>
+                  <a:fillRect l="-8955" b="-3704"/>
+                </a:stretch>
+              </a:blipFill>
+              <a:ln w="12700" cap="flat" cmpd="sng">
+                <a:solidFill>
+                  <a:schemeClr val="tx1"/>
+                </a:solidFill>
+                <a:prstDash val="solid"/>
+                <a:round/>
+                <a:headEnd type="none" w="sm" len="sm"/>
+                <a:tailEnd type="none" w="sm" len="sm"/>
+              </a:ln>
+            </p:spPr>
+            <p:txBody>
+              <a:bodyPr/>
+              <a:lstStyle/>
+              <a:p>
+                <a:r>
+                  <a:rPr lang="zh-CN" altLang="en-US">
+                    <a:noFill/>
+                  </a:rPr>
+                  <a:t> </a:t>
+                </a:r>
+              </a:p>
+            </p:txBody>
+          </p:sp>
+        </mc:Fallback>
+      </mc:AlternateContent>
+      <p:sp>
+        <p:nvSpPr>
+          <p:cNvPr id="118" name="梯形 117">
+            <a:extLst>
+              <a:ext uri="{FF2B5EF4-FFF2-40B4-BE49-F238E27FC236}">
+                <a16:creationId xmlns:a16="http://schemas.microsoft.com/office/drawing/2014/main" id="{D3AACE64-2E07-4B1B-9A80-81121ACC19D9}"/>
+              </a:ext>
+            </a:extLst>
+          </p:cNvPr>
+          <p:cNvSpPr/>
+          <p:nvPr/>
+        </p:nvSpPr>
+        <p:spPr>
+          <a:xfrm rot="5400000">
+            <a:off x="847724" y="3850006"/>
+            <a:ext cx="533398" cy="521972"/>
+          </a:xfrm>
+          <a:prstGeom prst="trapezoid">
+            <a:avLst/>
+          </a:prstGeom>
+          <a:gradFill flip="none" rotWithShape="1">
+            <a:gsLst>
+              <a:gs pos="0">
+                <a:schemeClr val="accent2">
+                  <a:lumMod val="60000"/>
+                  <a:lumOff val="40000"/>
+                  <a:tint val="66000"/>
+                  <a:satMod val="160000"/>
+                </a:schemeClr>
+              </a:gs>
+              <a:gs pos="50000">
+                <a:schemeClr val="accent2">
+                  <a:lumMod val="60000"/>
+                  <a:lumOff val="40000"/>
+                  <a:tint val="44500"/>
+                  <a:satMod val="160000"/>
+                </a:schemeClr>
+              </a:gs>
+              <a:gs pos="100000">
+                <a:schemeClr val="accent2">
+                  <a:lumMod val="60000"/>
+                  <a:lumOff val="40000"/>
+                  <a:tint val="23500"/>
+                  <a:satMod val="160000"/>
+                </a:schemeClr>
+              </a:gs>
+            </a:gsLst>
+            <a:path path="circle">
+              <a:fillToRect l="100000" t="100000"/>
+            </a:path>
+            <a:tileRect r="-100000" b="-100000"/>
+          </a:gradFill>
+          <a:ln>
+            <a:noFill/>
+          </a:ln>
+        </p:spPr>
+        <p:style>
+          <a:lnRef idx="2">
+            <a:schemeClr val="accent1">
+              <a:shade val="50000"/>
+            </a:schemeClr>
+          </a:lnRef>
+          <a:fillRef idx="1">
+            <a:schemeClr val="accent1"/>
+          </a:fillRef>
+          <a:effectRef idx="0">
+            <a:schemeClr val="accent1"/>
+          </a:effectRef>
+          <a:fontRef idx="minor">
+            <a:schemeClr val="lt1"/>
+          </a:fontRef>
+        </p:style>
+        <p:txBody>
+          <a:bodyPr vert="vert270" rtlCol="0" anchor="ctr"/>
+          <a:lstStyle/>
+          <a:p>
+            <a:endParaRPr lang="zh-CN" altLang="en-US" sz="1200" b="1" dirty="0">
+              <a:solidFill>
+                <a:schemeClr val="tx1"/>
+              </a:solidFill>
+            </a:endParaRPr>
+          </a:p>
+        </p:txBody>
+      </p:sp>
+      <p:sp>
+        <p:nvSpPr>
+          <p:cNvPr id="120" name="梯形 119">
+            <a:extLst>
+              <a:ext uri="{FF2B5EF4-FFF2-40B4-BE49-F238E27FC236}">
+                <a16:creationId xmlns:a16="http://schemas.microsoft.com/office/drawing/2014/main" id="{0FA9210B-A44F-4305-A438-01700610E6BA}"/>
+              </a:ext>
+            </a:extLst>
+          </p:cNvPr>
+          <p:cNvSpPr/>
+          <p:nvPr/>
+        </p:nvSpPr>
+        <p:spPr>
+          <a:xfrm rot="16200000">
+            <a:off x="1095375" y="3850005"/>
+            <a:ext cx="533398" cy="521972"/>
+          </a:xfrm>
+          <a:prstGeom prst="trapezoid">
+            <a:avLst/>
+          </a:prstGeom>
+          <a:gradFill flip="none" rotWithShape="1">
+            <a:gsLst>
+              <a:gs pos="0">
+                <a:schemeClr val="accent2">
+                  <a:lumMod val="60000"/>
+                  <a:lumOff val="40000"/>
+                  <a:tint val="66000"/>
+                  <a:satMod val="160000"/>
+                </a:schemeClr>
+              </a:gs>
+              <a:gs pos="50000">
+                <a:schemeClr val="accent2">
+                  <a:lumMod val="60000"/>
+                  <a:lumOff val="40000"/>
+                  <a:tint val="44500"/>
+                  <a:satMod val="160000"/>
+                </a:schemeClr>
+              </a:gs>
+              <a:gs pos="100000">
+                <a:schemeClr val="accent2">
+                  <a:lumMod val="60000"/>
+                  <a:lumOff val="40000"/>
+                  <a:tint val="23500"/>
+                  <a:satMod val="160000"/>
+                </a:schemeClr>
+              </a:gs>
+            </a:gsLst>
+            <a:path path="circle">
+              <a:fillToRect l="100000" t="100000"/>
+            </a:path>
+            <a:tileRect r="-100000" b="-100000"/>
+          </a:gradFill>
+          <a:ln>
+            <a:noFill/>
+          </a:ln>
+        </p:spPr>
+        <p:style>
+          <a:lnRef idx="2">
+            <a:schemeClr val="accent1">
+              <a:shade val="50000"/>
+            </a:schemeClr>
+          </a:lnRef>
+          <a:fillRef idx="1">
+            <a:schemeClr val="accent1"/>
+          </a:fillRef>
+          <a:effectRef idx="0">
+            <a:schemeClr val="accent1"/>
+          </a:effectRef>
+          <a:fontRef idx="minor">
+            <a:schemeClr val="lt1"/>
+          </a:fontRef>
+        </p:style>
+        <p:txBody>
+          <a:bodyPr vert="vert270" rtlCol="0" anchor="ctr"/>
+          <a:lstStyle/>
+          <a:p>
+            <a:endParaRPr lang="zh-CN" altLang="en-US" sz="1200" b="1" dirty="0">
+              <a:solidFill>
+                <a:schemeClr val="tx1"/>
+              </a:solidFill>
+            </a:endParaRPr>
+          </a:p>
+        </p:txBody>
+      </p:sp>
+      <p:sp>
+        <p:nvSpPr>
+          <p:cNvPr id="121" name="Google Shape;8410;p96">
+            <a:extLst>
+              <a:ext uri="{FF2B5EF4-FFF2-40B4-BE49-F238E27FC236}">
+                <a16:creationId xmlns:a16="http://schemas.microsoft.com/office/drawing/2014/main" id="{0498B19D-2E97-496A-9F52-09B2BA96EDAE}"/>
+              </a:ext>
+            </a:extLst>
+          </p:cNvPr>
+          <p:cNvSpPr txBox="1"/>
+          <p:nvPr/>
+        </p:nvSpPr>
+        <p:spPr>
+          <a:xfrm>
+            <a:off x="779361" y="3871567"/>
+            <a:ext cx="919899" cy="272565"/>
+          </a:xfrm>
+          <a:prstGeom prst="rect">
+            <a:avLst/>
+          </a:prstGeom>
+          <a:noFill/>
+          <a:ln>
+            <a:noFill/>
+          </a:ln>
+        </p:spPr>
+        <p:txBody>
+          <a:bodyPr spcFirstLastPara="1" wrap="square" lIns="91425" tIns="91425" rIns="91425" bIns="91425" anchor="t" anchorCtr="0">
+            <a:noAutofit/>
+          </a:bodyPr>
+          <a:lstStyle/>
+          <a:p>
+            <a:pPr algn="ctr"/>
+            <a:r>
+              <a:rPr lang="en-US" altLang="zh-CN" sz="1000" b="1" dirty="0"/>
+              <a:t>Pre-trained Model</a:t>
+            </a:r>
+          </a:p>
+        </p:txBody>
+      </p:sp>
+      <p:cxnSp>
+        <p:nvCxnSpPr>
+          <p:cNvPr id="122" name="连接符: 肘形 121">
+            <a:extLst>
+              <a:ext uri="{FF2B5EF4-FFF2-40B4-BE49-F238E27FC236}">
+                <a16:creationId xmlns:a16="http://schemas.microsoft.com/office/drawing/2014/main" id="{AEC3934D-2B5E-4BCB-80DD-E0885AF95938}"/>
+              </a:ext>
+            </a:extLst>
+          </p:cNvPr>
+          <p:cNvCxnSpPr>
+            <a:cxnSpLocks/>
+            <a:stCxn id="329" idx="2"/>
+            <a:endCxn id="118" idx="2"/>
+          </p:cNvCxnSpPr>
+          <p:nvPr/>
+        </p:nvCxnSpPr>
+        <p:spPr>
+          <a:xfrm rot="16200000" flipH="1">
+            <a:off x="269506" y="3527061"/>
+            <a:ext cx="986640" cy="181222"/>
+          </a:xfrm>
+          <a:prstGeom prst="bentConnector2">
+            <a:avLst/>
+          </a:prstGeom>
+          <a:ln w="19050">
+            <a:solidFill>
+              <a:schemeClr val="tx1"/>
+            </a:solidFill>
+            <a:tailEnd type="triangle"/>
+          </a:ln>
+        </p:spPr>
+        <p:style>
+          <a:lnRef idx="1">
+            <a:schemeClr val="accent1"/>
+          </a:lnRef>
+          <a:fillRef idx="0">
+            <a:schemeClr val="accent1"/>
+          </a:fillRef>
+          <a:effectRef idx="0">
+            <a:schemeClr val="accent1"/>
+          </a:effectRef>
+          <a:fontRef idx="minor">
+            <a:schemeClr val="tx1"/>
+          </a:fontRef>
+        </p:style>
+      </p:cxnSp>
+      <p:cxnSp>
+        <p:nvCxnSpPr>
+          <p:cNvPr id="123" name="Google Shape;10001;p124">
+            <a:extLst>
+              <a:ext uri="{FF2B5EF4-FFF2-40B4-BE49-F238E27FC236}">
+                <a16:creationId xmlns:a16="http://schemas.microsoft.com/office/drawing/2014/main" id="{1CB52FF8-9674-4C86-8638-42929DD9214D}"/>
+              </a:ext>
+            </a:extLst>
+          </p:cNvPr>
+          <p:cNvCxnSpPr>
+            <a:cxnSpLocks/>
+            <a:endCxn id="116" idx="0"/>
+          </p:cNvCxnSpPr>
+          <p:nvPr/>
+        </p:nvCxnSpPr>
+        <p:spPr>
+          <a:xfrm>
+            <a:off x="1642110" y="4134287"/>
+            <a:ext cx="291899" cy="0"/>
+          </a:xfrm>
+          <a:prstGeom prst="straightConnector1">
+            <a:avLst/>
+          </a:prstGeom>
+          <a:noFill/>
+          <a:ln w="19050" cap="flat" cmpd="sng">
+            <a:solidFill>
+              <a:srgbClr val="000000"/>
+            </a:solidFill>
+            <a:prstDash val="solid"/>
+            <a:round/>
+            <a:headEnd type="none" w="med" len="med"/>
+            <a:tailEnd type="triangle" w="med" len="med"/>
+          </a:ln>
+        </p:spPr>
+      </p:cxnSp>
+      <p:cxnSp>
+        <p:nvCxnSpPr>
+          <p:cNvPr id="127" name="Google Shape;10001;p124">
+            <a:extLst>
+              <a:ext uri="{FF2B5EF4-FFF2-40B4-BE49-F238E27FC236}">
+                <a16:creationId xmlns:a16="http://schemas.microsoft.com/office/drawing/2014/main" id="{D73EBC54-68C3-4C3D-9AD3-6DB3FF7E530F}"/>
+              </a:ext>
+            </a:extLst>
+          </p:cNvPr>
+          <p:cNvCxnSpPr>
+            <a:cxnSpLocks/>
+            <a:stCxn id="116" idx="2"/>
+            <a:endCxn id="117" idx="1"/>
+          </p:cNvCxnSpPr>
+          <p:nvPr/>
+        </p:nvCxnSpPr>
+        <p:spPr>
+          <a:xfrm flipV="1">
+            <a:off x="2137652" y="4131543"/>
+            <a:ext cx="278627" cy="2744"/>
+          </a:xfrm>
+          <a:prstGeom prst="straightConnector1">
+            <a:avLst/>
+          </a:prstGeom>
+          <a:noFill/>
+          <a:ln w="19050" cap="flat" cmpd="sng">
+            <a:solidFill>
+              <a:srgbClr val="000000"/>
+            </a:solidFill>
+            <a:prstDash val="solid"/>
+            <a:round/>
+            <a:headEnd type="none" w="med" len="med"/>
+            <a:tailEnd type="triangle" w="med" len="med"/>
+          </a:ln>
+        </p:spPr>
+      </p:cxnSp>
+      <p:cxnSp>
+        <p:nvCxnSpPr>
+          <p:cNvPr id="132" name="Google Shape;10001;p124">
+            <a:extLst>
+              <a:ext uri="{FF2B5EF4-FFF2-40B4-BE49-F238E27FC236}">
+                <a16:creationId xmlns:a16="http://schemas.microsoft.com/office/drawing/2014/main" id="{013D6505-74DF-4A83-85C4-DFE20C54A7BD}"/>
+              </a:ext>
+            </a:extLst>
+          </p:cNvPr>
+          <p:cNvCxnSpPr>
+            <a:cxnSpLocks/>
+          </p:cNvCxnSpPr>
+          <p:nvPr/>
+        </p:nvCxnSpPr>
+        <p:spPr>
+          <a:xfrm>
+            <a:off x="2796540" y="4141907"/>
+            <a:ext cx="228600" cy="0"/>
+          </a:xfrm>
+          <a:prstGeom prst="straightConnector1">
+            <a:avLst/>
+          </a:prstGeom>
+          <a:noFill/>
+          <a:ln w="19050" cap="flat" cmpd="sng">
+            <a:solidFill>
+              <a:srgbClr val="000000"/>
+            </a:solidFill>
+            <a:prstDash val="solid"/>
+            <a:round/>
+            <a:headEnd type="none" w="med" len="med"/>
+            <a:tailEnd type="triangle" w="med" len="med"/>
+          </a:ln>
+        </p:spPr>
+      </p:cxnSp>
+      <p:cxnSp>
+        <p:nvCxnSpPr>
+          <p:cNvPr id="135" name="连接符: 肘形 134">
+            <a:extLst>
+              <a:ext uri="{FF2B5EF4-FFF2-40B4-BE49-F238E27FC236}">
+                <a16:creationId xmlns:a16="http://schemas.microsoft.com/office/drawing/2014/main" id="{EC1A2052-5A3A-44EC-AC69-F7F3692DED61}"/>
+              </a:ext>
+            </a:extLst>
+          </p:cNvPr>
+          <p:cNvCxnSpPr>
+            <a:cxnSpLocks/>
+            <a:stCxn id="91" idx="5"/>
+            <a:endCxn id="59" idx="0"/>
+          </p:cNvCxnSpPr>
+          <p:nvPr/>
+        </p:nvCxnSpPr>
+        <p:spPr>
+          <a:xfrm>
+            <a:off x="3096165" y="1506906"/>
+            <a:ext cx="477956" cy="688213"/>
+          </a:xfrm>
+          <a:prstGeom prst="bentConnector2">
+            <a:avLst/>
+          </a:prstGeom>
+          <a:ln w="19050">
+            <a:solidFill>
+              <a:schemeClr val="tx1"/>
+            </a:solidFill>
+            <a:tailEnd type="triangle"/>
+          </a:ln>
+        </p:spPr>
+        <p:style>
+          <a:lnRef idx="1">
+            <a:schemeClr val="accent1"/>
+          </a:lnRef>
+          <a:fillRef idx="0">
+            <a:schemeClr val="accent1"/>
+          </a:fillRef>
+          <a:effectRef idx="0">
+            <a:schemeClr val="accent1"/>
+          </a:effectRef>
+          <a:fontRef idx="minor">
+            <a:schemeClr val="tx1"/>
+          </a:fontRef>
+        </p:style>
+      </p:cxnSp>
+    </p:spTree>
+    <p:extLst>
+      <p:ext uri="{BB962C8B-B14F-4D97-AF65-F5344CB8AC3E}">
+        <p14:creationId xmlns:p14="http://schemas.microsoft.com/office/powerpoint/2010/main" val="1079265876"/>
+      </p:ext>
+    </p:extLst>
+  </p:cSld>
+  <p:clrMapOvr>
+    <a:masterClrMapping/>
+  </p:clrMapOvr>
+</p:sld>
+</file>
+
+<file path=ppt/slides/slide4.xml><?xml version="1.0" encoding="utf-8"?>
+<p:sld xmlns:a="http://schemas.openxmlformats.org/drawingml/2006/main" xmlns:r="http://schemas.openxmlformats.org/officeDocument/2006/relationships" xmlns:p="http://schemas.openxmlformats.org/presentationml/2006/main">
+  <p:cSld>
+    <p:spTree>
+      <p:nvGrpSpPr>
         <p:cNvPr id="1" name="Shape 8022"/>
         <p:cNvGrpSpPr/>
         <p:nvPr/>
@@ -11790,7 +16263,7 @@
 </p:sld>
 </file>
 
-<file path=ppt/slides/slide4.xml><?xml version="1.0" encoding="utf-8"?>
+<file path=ppt/slides/slide5.xml><?xml version="1.0" encoding="utf-8"?>
 <p:sld xmlns:a="http://schemas.openxmlformats.org/drawingml/2006/main" xmlns:r="http://schemas.openxmlformats.org/officeDocument/2006/relationships" xmlns:p="http://schemas.openxmlformats.org/presentationml/2006/main">
   <p:cSld>
     <p:spTree>

</xml_diff>